<commit_message>
Added the PLC connection section.
</commit_message>
<xml_diff>
--- a/OT_System_Attack_Case_Study/Railway_Station/img/designDoc.pptx
+++ b/OT_System_Attack_Case_Study/Railway_Station/img/designDoc.pptx
@@ -6,6 +6,11 @@
   </p:sldMasterIdLst>
   <p:sldIdLst>
     <p:sldId id="256" r:id="rId2"/>
+    <p:sldId id="257" r:id="rId3"/>
+    <p:sldId id="258" r:id="rId4"/>
+    <p:sldId id="259" r:id="rId5"/>
+    <p:sldId id="260" r:id="rId6"/>
+    <p:sldId id="261" r:id="rId7"/>
   </p:sldIdLst>
   <p:sldSz cx="12192000" cy="6858000"/>
   <p:notesSz cx="6858000" cy="9144000"/>
@@ -104,6 +109,11 @@
       </a:defRPr>
     </a:lvl9pPr>
   </p:defaultTextStyle>
+  <p:extLst>
+    <p:ext uri="{EFAFB233-063F-42B5-8137-9DF3F51BA10A}">
+      <p15:sldGuideLst xmlns:p15="http://schemas.microsoft.com/office/powerpoint/2012/main"/>
+    </p:ext>
+  </p:extLst>
 </p:presentation>
 </file>
 
@@ -256,7 +266,7 @@
           <a:p>
             <a:fld id="{DD50288F-9E8D-482B-B740-3614303AF2FC}" type="datetimeFigureOut">
               <a:rPr lang="en-SG" smtClean="0"/>
-              <a:t>22/5/2025</a:t>
+              <a:t>23/5/2025</a:t>
             </a:fld>
             <a:endParaRPr lang="en-SG"/>
           </a:p>
@@ -456,7 +466,7 @@
           <a:p>
             <a:fld id="{DD50288F-9E8D-482B-B740-3614303AF2FC}" type="datetimeFigureOut">
               <a:rPr lang="en-SG" smtClean="0"/>
-              <a:t>22/5/2025</a:t>
+              <a:t>23/5/2025</a:t>
             </a:fld>
             <a:endParaRPr lang="en-SG"/>
           </a:p>
@@ -666,7 +676,7 @@
           <a:p>
             <a:fld id="{DD50288F-9E8D-482B-B740-3614303AF2FC}" type="datetimeFigureOut">
               <a:rPr lang="en-SG" smtClean="0"/>
-              <a:t>22/5/2025</a:t>
+              <a:t>23/5/2025</a:t>
             </a:fld>
             <a:endParaRPr lang="en-SG"/>
           </a:p>
@@ -866,7 +876,7 @@
           <a:p>
             <a:fld id="{DD50288F-9E8D-482B-B740-3614303AF2FC}" type="datetimeFigureOut">
               <a:rPr lang="en-SG" smtClean="0"/>
-              <a:t>22/5/2025</a:t>
+              <a:t>23/5/2025</a:t>
             </a:fld>
             <a:endParaRPr lang="en-SG"/>
           </a:p>
@@ -1142,7 +1152,7 @@
           <a:p>
             <a:fld id="{DD50288F-9E8D-482B-B740-3614303AF2FC}" type="datetimeFigureOut">
               <a:rPr lang="en-SG" smtClean="0"/>
-              <a:t>22/5/2025</a:t>
+              <a:t>23/5/2025</a:t>
             </a:fld>
             <a:endParaRPr lang="en-SG"/>
           </a:p>
@@ -1410,7 +1420,7 @@
           <a:p>
             <a:fld id="{DD50288F-9E8D-482B-B740-3614303AF2FC}" type="datetimeFigureOut">
               <a:rPr lang="en-SG" smtClean="0"/>
-              <a:t>22/5/2025</a:t>
+              <a:t>23/5/2025</a:t>
             </a:fld>
             <a:endParaRPr lang="en-SG"/>
           </a:p>
@@ -1825,7 +1835,7 @@
           <a:p>
             <a:fld id="{DD50288F-9E8D-482B-B740-3614303AF2FC}" type="datetimeFigureOut">
               <a:rPr lang="en-SG" smtClean="0"/>
-              <a:t>22/5/2025</a:t>
+              <a:t>23/5/2025</a:t>
             </a:fld>
             <a:endParaRPr lang="en-SG"/>
           </a:p>
@@ -1967,7 +1977,7 @@
           <a:p>
             <a:fld id="{DD50288F-9E8D-482B-B740-3614303AF2FC}" type="datetimeFigureOut">
               <a:rPr lang="en-SG" smtClean="0"/>
-              <a:t>22/5/2025</a:t>
+              <a:t>23/5/2025</a:t>
             </a:fld>
             <a:endParaRPr lang="en-SG"/>
           </a:p>
@@ -2080,7 +2090,7 @@
           <a:p>
             <a:fld id="{DD50288F-9E8D-482B-B740-3614303AF2FC}" type="datetimeFigureOut">
               <a:rPr lang="en-SG" smtClean="0"/>
-              <a:t>22/5/2025</a:t>
+              <a:t>23/5/2025</a:t>
             </a:fld>
             <a:endParaRPr lang="en-SG"/>
           </a:p>
@@ -2393,7 +2403,7 @@
           <a:p>
             <a:fld id="{DD50288F-9E8D-482B-B740-3614303AF2FC}" type="datetimeFigureOut">
               <a:rPr lang="en-SG" smtClean="0"/>
-              <a:t>22/5/2025</a:t>
+              <a:t>23/5/2025</a:t>
             </a:fld>
             <a:endParaRPr lang="en-SG"/>
           </a:p>
@@ -2682,7 +2692,7 @@
           <a:p>
             <a:fld id="{DD50288F-9E8D-482B-B740-3614303AF2FC}" type="datetimeFigureOut">
               <a:rPr lang="en-SG" smtClean="0"/>
-              <a:t>22/5/2025</a:t>
+              <a:t>23/5/2025</a:t>
             </a:fld>
             <a:endParaRPr lang="en-SG"/>
           </a:p>
@@ -2925,7 +2935,7 @@
           <a:p>
             <a:fld id="{DD50288F-9E8D-482B-B740-3614303AF2FC}" type="datetimeFigureOut">
               <a:rPr lang="en-SG" smtClean="0"/>
-              <a:t>22/5/2025</a:t>
+              <a:t>23/5/2025</a:t>
             </a:fld>
             <a:endParaRPr lang="en-SG"/>
           </a:p>
@@ -3509,6 +3519,3720 @@
 </p:sld>
 </file>
 
+<file path=ppt/slides/slide2.xml><?xml version="1.0" encoding="utf-8"?>
+<p:sld xmlns:a="http://schemas.openxmlformats.org/drawingml/2006/main" xmlns:r="http://schemas.openxmlformats.org/officeDocument/2006/relationships" xmlns:p="http://schemas.openxmlformats.org/presentationml/2006/main">
+  <p:cSld>
+    <p:spTree>
+      <p:nvGrpSpPr>
+        <p:cNvPr id="1" name=""/>
+        <p:cNvGrpSpPr/>
+        <p:nvPr/>
+      </p:nvGrpSpPr>
+      <p:grpSpPr>
+        <a:xfrm>
+          <a:off x="0" y="0"/>
+          <a:ext cx="0" cy="0"/>
+          <a:chOff x="0" y="0"/>
+          <a:chExt cx="0" cy="0"/>
+        </a:xfrm>
+      </p:grpSpPr>
+      <p:pic>
+        <p:nvPicPr>
+          <p:cNvPr id="5" name="Picture 4" descr="A computer screen shot of a computer scheme&#10;&#10;AI-generated content may be incorrect.">
+            <a:extLst>
+              <a:ext uri="{FF2B5EF4-FFF2-40B4-BE49-F238E27FC236}">
+                <a16:creationId xmlns:a16="http://schemas.microsoft.com/office/drawing/2014/main" id="{83D4FAD2-A44B-73E6-7E53-E68E87826ED6}"/>
+              </a:ext>
+            </a:extLst>
+          </p:cNvPr>
+          <p:cNvPicPr>
+            <a:picLocks noChangeAspect="1"/>
+          </p:cNvPicPr>
+          <p:nvPr/>
+        </p:nvPicPr>
+        <p:blipFill>
+          <a:blip r:embed="rId2">
+            <a:alphaModFix amt="60000"/>
+            <a:extLst>
+              <a:ext uri="{28A0092B-C50C-407E-A947-70E740481C1C}">
+                <a14:useLocalDpi xmlns:a14="http://schemas.microsoft.com/office/drawing/2010/main" val="0"/>
+              </a:ext>
+            </a:extLst>
+          </a:blip>
+          <a:stretch>
+            <a:fillRect/>
+          </a:stretch>
+        </p:blipFill>
+        <p:spPr>
+          <a:xfrm>
+            <a:off x="975943" y="832781"/>
+            <a:ext cx="9943694" cy="5344736"/>
+          </a:xfrm>
+          <a:prstGeom prst="rect">
+            <a:avLst/>
+          </a:prstGeom>
+        </p:spPr>
+      </p:pic>
+      <p:sp>
+        <p:nvSpPr>
+          <p:cNvPr id="6" name="Oval 5">
+            <a:extLst>
+              <a:ext uri="{FF2B5EF4-FFF2-40B4-BE49-F238E27FC236}">
+                <a16:creationId xmlns:a16="http://schemas.microsoft.com/office/drawing/2014/main" id="{24FB5CE8-E636-7BD7-B6D8-742676C5C9D2}"/>
+              </a:ext>
+            </a:extLst>
+          </p:cNvPr>
+          <p:cNvSpPr/>
+          <p:nvPr/>
+        </p:nvSpPr>
+        <p:spPr>
+          <a:xfrm>
+            <a:off x="2052084" y="2009553"/>
+            <a:ext cx="637953" cy="446568"/>
+          </a:xfrm>
+          <a:prstGeom prst="ellipse">
+            <a:avLst/>
+          </a:prstGeom>
+          <a:noFill/>
+          <a:ln>
+            <a:solidFill>
+              <a:schemeClr val="bg1"/>
+            </a:solidFill>
+            <a:prstDash val="sysDash"/>
+          </a:ln>
+        </p:spPr>
+        <p:style>
+          <a:lnRef idx="2">
+            <a:schemeClr val="accent1">
+              <a:shade val="15000"/>
+            </a:schemeClr>
+          </a:lnRef>
+          <a:fillRef idx="1">
+            <a:schemeClr val="accent1"/>
+          </a:fillRef>
+          <a:effectRef idx="0">
+            <a:schemeClr val="accent1"/>
+          </a:effectRef>
+          <a:fontRef idx="minor">
+            <a:schemeClr val="lt1"/>
+          </a:fontRef>
+        </p:style>
+        <p:txBody>
+          <a:bodyPr rtlCol="0" anchor="ctr"/>
+          <a:lstStyle/>
+          <a:p>
+            <a:pPr algn="ctr"/>
+            <a:endParaRPr lang="en-SG" dirty="0"/>
+          </a:p>
+        </p:txBody>
+      </p:sp>
+      <p:sp>
+        <p:nvSpPr>
+          <p:cNvPr id="7" name="Oval 6">
+            <a:extLst>
+              <a:ext uri="{FF2B5EF4-FFF2-40B4-BE49-F238E27FC236}">
+                <a16:creationId xmlns:a16="http://schemas.microsoft.com/office/drawing/2014/main" id="{F1FB3DFE-BEE2-7C67-D161-9A3DCC48561B}"/>
+              </a:ext>
+            </a:extLst>
+          </p:cNvPr>
+          <p:cNvSpPr/>
+          <p:nvPr/>
+        </p:nvSpPr>
+        <p:spPr>
+          <a:xfrm>
+            <a:off x="3352801" y="4128976"/>
+            <a:ext cx="1038446" cy="932122"/>
+          </a:xfrm>
+          <a:prstGeom prst="ellipse">
+            <a:avLst/>
+          </a:prstGeom>
+          <a:noFill/>
+          <a:ln>
+            <a:solidFill>
+              <a:schemeClr val="bg1"/>
+            </a:solidFill>
+            <a:prstDash val="sysDash"/>
+          </a:ln>
+        </p:spPr>
+        <p:style>
+          <a:lnRef idx="2">
+            <a:schemeClr val="accent1">
+              <a:shade val="15000"/>
+            </a:schemeClr>
+          </a:lnRef>
+          <a:fillRef idx="1">
+            <a:schemeClr val="accent1"/>
+          </a:fillRef>
+          <a:effectRef idx="0">
+            <a:schemeClr val="accent1"/>
+          </a:effectRef>
+          <a:fontRef idx="minor">
+            <a:schemeClr val="lt1"/>
+          </a:fontRef>
+        </p:style>
+        <p:txBody>
+          <a:bodyPr rtlCol="0" anchor="ctr"/>
+          <a:lstStyle/>
+          <a:p>
+            <a:pPr algn="ctr"/>
+            <a:endParaRPr lang="en-SG" dirty="0"/>
+          </a:p>
+        </p:txBody>
+      </p:sp>
+      <p:pic>
+        <p:nvPicPr>
+          <p:cNvPr id="9" name="Picture 8">
+            <a:extLst>
+              <a:ext uri="{FF2B5EF4-FFF2-40B4-BE49-F238E27FC236}">
+                <a16:creationId xmlns:a16="http://schemas.microsoft.com/office/drawing/2014/main" id="{80F0C9FC-0CA8-C639-02A2-48E73C569955}"/>
+              </a:ext>
+            </a:extLst>
+          </p:cNvPr>
+          <p:cNvPicPr>
+            <a:picLocks noChangeAspect="1"/>
+          </p:cNvPicPr>
+          <p:nvPr/>
+        </p:nvPicPr>
+        <p:blipFill>
+          <a:blip r:embed="rId3"/>
+          <a:stretch>
+            <a:fillRect/>
+          </a:stretch>
+        </p:blipFill>
+        <p:spPr>
+          <a:xfrm>
+            <a:off x="3051545" y="1070368"/>
+            <a:ext cx="3316709" cy="1304209"/>
+          </a:xfrm>
+          <a:prstGeom prst="rect">
+            <a:avLst/>
+          </a:prstGeom>
+          <a:ln w="19050">
+            <a:solidFill>
+              <a:srgbClr val="FF0000"/>
+            </a:solidFill>
+          </a:ln>
+        </p:spPr>
+      </p:pic>
+      <p:cxnSp>
+        <p:nvCxnSpPr>
+          <p:cNvPr id="11" name="Straight Arrow Connector 10">
+            <a:extLst>
+              <a:ext uri="{FF2B5EF4-FFF2-40B4-BE49-F238E27FC236}">
+                <a16:creationId xmlns:a16="http://schemas.microsoft.com/office/drawing/2014/main" id="{7D80985F-A4CB-415A-1C88-2E94470AD89F}"/>
+              </a:ext>
+            </a:extLst>
+          </p:cNvPr>
+          <p:cNvCxnSpPr>
+            <a:cxnSpLocks/>
+            <a:stCxn id="9" idx="1"/>
+            <a:endCxn id="6" idx="7"/>
+          </p:cNvCxnSpPr>
+          <p:nvPr/>
+        </p:nvCxnSpPr>
+        <p:spPr>
+          <a:xfrm flipH="1">
+            <a:off x="2596611" y="1722473"/>
+            <a:ext cx="454934" cy="352478"/>
+          </a:xfrm>
+          <a:prstGeom prst="straightConnector1">
+            <a:avLst/>
+          </a:prstGeom>
+          <a:ln>
+            <a:solidFill>
+              <a:schemeClr val="bg1"/>
+            </a:solidFill>
+            <a:prstDash val="sysDash"/>
+            <a:tailEnd type="triangle"/>
+          </a:ln>
+        </p:spPr>
+        <p:style>
+          <a:lnRef idx="2">
+            <a:schemeClr val="accent1"/>
+          </a:lnRef>
+          <a:fillRef idx="0">
+            <a:schemeClr val="accent1"/>
+          </a:fillRef>
+          <a:effectRef idx="1">
+            <a:schemeClr val="accent1"/>
+          </a:effectRef>
+          <a:fontRef idx="minor">
+            <a:schemeClr val="tx1"/>
+          </a:fontRef>
+        </p:style>
+      </p:cxnSp>
+      <p:cxnSp>
+        <p:nvCxnSpPr>
+          <p:cNvPr id="13" name="Straight Arrow Connector 12">
+            <a:extLst>
+              <a:ext uri="{FF2B5EF4-FFF2-40B4-BE49-F238E27FC236}">
+                <a16:creationId xmlns:a16="http://schemas.microsoft.com/office/drawing/2014/main" id="{A57D35B1-E243-EFEB-6206-6FEB732DEA25}"/>
+              </a:ext>
+            </a:extLst>
+          </p:cNvPr>
+          <p:cNvCxnSpPr>
+            <a:cxnSpLocks/>
+          </p:cNvCxnSpPr>
+          <p:nvPr/>
+        </p:nvCxnSpPr>
+        <p:spPr>
+          <a:xfrm>
+            <a:off x="4067449" y="2374577"/>
+            <a:ext cx="0" cy="1754399"/>
+          </a:xfrm>
+          <a:prstGeom prst="straightConnector1">
+            <a:avLst/>
+          </a:prstGeom>
+          <a:ln>
+            <a:solidFill>
+              <a:schemeClr val="bg1"/>
+            </a:solidFill>
+            <a:prstDash val="sysDash"/>
+            <a:tailEnd type="triangle"/>
+          </a:ln>
+        </p:spPr>
+        <p:style>
+          <a:lnRef idx="2">
+            <a:schemeClr val="accent1"/>
+          </a:lnRef>
+          <a:fillRef idx="0">
+            <a:schemeClr val="accent1"/>
+          </a:fillRef>
+          <a:effectRef idx="1">
+            <a:schemeClr val="accent1"/>
+          </a:effectRef>
+          <a:fontRef idx="minor">
+            <a:schemeClr val="tx1"/>
+          </a:fontRef>
+        </p:style>
+      </p:cxnSp>
+      <p:sp>
+        <p:nvSpPr>
+          <p:cNvPr id="15" name="TextBox 14">
+            <a:extLst>
+              <a:ext uri="{FF2B5EF4-FFF2-40B4-BE49-F238E27FC236}">
+                <a16:creationId xmlns:a16="http://schemas.microsoft.com/office/drawing/2014/main" id="{888BC802-5672-5620-5939-FDA3F0A8C055}"/>
+              </a:ext>
+            </a:extLst>
+          </p:cNvPr>
+          <p:cNvSpPr txBox="1"/>
+          <p:nvPr/>
+        </p:nvSpPr>
+        <p:spPr>
+          <a:xfrm>
+            <a:off x="2957624" y="794696"/>
+            <a:ext cx="3677092" cy="307777"/>
+          </a:xfrm>
+          <a:prstGeom prst="rect">
+            <a:avLst/>
+          </a:prstGeom>
+          <a:noFill/>
+        </p:spPr>
+        <p:txBody>
+          <a:bodyPr wrap="square" rtlCol="0">
+            <a:spAutoFit/>
+          </a:bodyPr>
+          <a:lstStyle/>
+          <a:p>
+            <a:r>
+              <a:rPr lang="en-US" sz="1400" b="1" dirty="0">
+                <a:solidFill>
+                  <a:srgbClr val="C00000"/>
+                </a:solidFill>
+              </a:rPr>
+              <a:t>Railway Station Physical World Simulation</a:t>
+            </a:r>
+            <a:endParaRPr lang="en-SG" sz="1400" b="1" dirty="0">
+              <a:solidFill>
+                <a:srgbClr val="C00000"/>
+              </a:solidFill>
+            </a:endParaRPr>
+          </a:p>
+        </p:txBody>
+      </p:sp>
+      <p:cxnSp>
+        <p:nvCxnSpPr>
+          <p:cNvPr id="24" name="Straight Arrow Connector 23">
+            <a:extLst>
+              <a:ext uri="{FF2B5EF4-FFF2-40B4-BE49-F238E27FC236}">
+                <a16:creationId xmlns:a16="http://schemas.microsoft.com/office/drawing/2014/main" id="{222A270D-84E0-A109-F5CB-ED0B9FC986C8}"/>
+              </a:ext>
+            </a:extLst>
+          </p:cNvPr>
+          <p:cNvCxnSpPr>
+            <a:cxnSpLocks/>
+          </p:cNvCxnSpPr>
+          <p:nvPr/>
+        </p:nvCxnSpPr>
+        <p:spPr>
+          <a:xfrm>
+            <a:off x="6096000" y="2374577"/>
+            <a:ext cx="634409" cy="357990"/>
+          </a:xfrm>
+          <a:prstGeom prst="straightConnector1">
+            <a:avLst/>
+          </a:prstGeom>
+          <a:ln>
+            <a:solidFill>
+              <a:schemeClr val="bg1"/>
+            </a:solidFill>
+            <a:prstDash val="sysDash"/>
+            <a:tailEnd type="triangle"/>
+          </a:ln>
+        </p:spPr>
+        <p:style>
+          <a:lnRef idx="2">
+            <a:schemeClr val="accent1"/>
+          </a:lnRef>
+          <a:fillRef idx="0">
+            <a:schemeClr val="accent1"/>
+          </a:fillRef>
+          <a:effectRef idx="1">
+            <a:schemeClr val="accent1"/>
+          </a:effectRef>
+          <a:fontRef idx="minor">
+            <a:schemeClr val="tx1"/>
+          </a:fontRef>
+        </p:style>
+      </p:cxnSp>
+      <p:sp>
+        <p:nvSpPr>
+          <p:cNvPr id="27" name="Oval 26">
+            <a:extLst>
+              <a:ext uri="{FF2B5EF4-FFF2-40B4-BE49-F238E27FC236}">
+                <a16:creationId xmlns:a16="http://schemas.microsoft.com/office/drawing/2014/main" id="{E3874448-24EE-76DF-8A59-3CD321434B43}"/>
+              </a:ext>
+            </a:extLst>
+          </p:cNvPr>
+          <p:cNvSpPr/>
+          <p:nvPr/>
+        </p:nvSpPr>
+        <p:spPr>
+          <a:xfrm>
+            <a:off x="6730409" y="2553572"/>
+            <a:ext cx="637953" cy="446568"/>
+          </a:xfrm>
+          <a:prstGeom prst="ellipse">
+            <a:avLst/>
+          </a:prstGeom>
+          <a:noFill/>
+          <a:ln>
+            <a:solidFill>
+              <a:schemeClr val="bg1"/>
+            </a:solidFill>
+            <a:prstDash val="sysDash"/>
+          </a:ln>
+        </p:spPr>
+        <p:style>
+          <a:lnRef idx="2">
+            <a:schemeClr val="accent1">
+              <a:shade val="15000"/>
+            </a:schemeClr>
+          </a:lnRef>
+          <a:fillRef idx="1">
+            <a:schemeClr val="accent1"/>
+          </a:fillRef>
+          <a:effectRef idx="0">
+            <a:schemeClr val="accent1"/>
+          </a:effectRef>
+          <a:fontRef idx="minor">
+            <a:schemeClr val="lt1"/>
+          </a:fontRef>
+        </p:style>
+        <p:txBody>
+          <a:bodyPr rtlCol="0" anchor="ctr"/>
+          <a:lstStyle/>
+          <a:p>
+            <a:pPr algn="ctr"/>
+            <a:endParaRPr lang="en-SG" dirty="0"/>
+          </a:p>
+        </p:txBody>
+      </p:sp>
+    </p:spTree>
+    <p:extLst>
+      <p:ext uri="{BB962C8B-B14F-4D97-AF65-F5344CB8AC3E}">
+        <p14:creationId xmlns:p14="http://schemas.microsoft.com/office/powerpoint/2010/main" val="303618498"/>
+      </p:ext>
+    </p:extLst>
+  </p:cSld>
+  <p:clrMapOvr>
+    <a:masterClrMapping/>
+  </p:clrMapOvr>
+</p:sld>
+</file>
+
+<file path=ppt/slides/slide3.xml><?xml version="1.0" encoding="utf-8"?>
+<p:sld xmlns:a="http://schemas.openxmlformats.org/drawingml/2006/main" xmlns:r="http://schemas.openxmlformats.org/officeDocument/2006/relationships" xmlns:p="http://schemas.openxmlformats.org/presentationml/2006/main">
+  <p:cSld>
+    <p:spTree>
+      <p:nvGrpSpPr>
+        <p:cNvPr id="1" name=""/>
+        <p:cNvGrpSpPr/>
+        <p:nvPr/>
+      </p:nvGrpSpPr>
+      <p:grpSpPr>
+        <a:xfrm>
+          <a:off x="0" y="0"/>
+          <a:ext cx="0" cy="0"/>
+          <a:chOff x="0" y="0"/>
+          <a:chExt cx="0" cy="0"/>
+        </a:xfrm>
+      </p:grpSpPr>
+      <p:pic>
+        <p:nvPicPr>
+          <p:cNvPr id="5" name="Picture 4">
+            <a:extLst>
+              <a:ext uri="{FF2B5EF4-FFF2-40B4-BE49-F238E27FC236}">
+                <a16:creationId xmlns:a16="http://schemas.microsoft.com/office/drawing/2014/main" id="{C7215C42-AC9B-5079-8B3B-B806FA505B48}"/>
+              </a:ext>
+            </a:extLst>
+          </p:cNvPr>
+          <p:cNvPicPr>
+            <a:picLocks noChangeAspect="1"/>
+          </p:cNvPicPr>
+          <p:nvPr/>
+        </p:nvPicPr>
+        <p:blipFill>
+          <a:blip r:embed="rId2"/>
+          <a:stretch>
+            <a:fillRect/>
+          </a:stretch>
+        </p:blipFill>
+        <p:spPr>
+          <a:xfrm>
+            <a:off x="3479187" y="1628431"/>
+            <a:ext cx="3466667" cy="1580952"/>
+          </a:xfrm>
+          <a:prstGeom prst="rect">
+            <a:avLst/>
+          </a:prstGeom>
+        </p:spPr>
+      </p:pic>
+      <p:pic>
+        <p:nvPicPr>
+          <p:cNvPr id="7" name="Picture 6">
+            <a:extLst>
+              <a:ext uri="{FF2B5EF4-FFF2-40B4-BE49-F238E27FC236}">
+                <a16:creationId xmlns:a16="http://schemas.microsoft.com/office/drawing/2014/main" id="{E0A0C9BF-6B83-ACFD-F82A-E0FFC3AA0343}"/>
+              </a:ext>
+            </a:extLst>
+          </p:cNvPr>
+          <p:cNvPicPr>
+            <a:picLocks noChangeAspect="1"/>
+          </p:cNvPicPr>
+          <p:nvPr/>
+        </p:nvPicPr>
+        <p:blipFill>
+          <a:blip r:embed="rId3"/>
+          <a:stretch>
+            <a:fillRect/>
+          </a:stretch>
+        </p:blipFill>
+        <p:spPr>
+          <a:xfrm>
+            <a:off x="4868963" y="3780373"/>
+            <a:ext cx="2262983" cy="1622755"/>
+          </a:xfrm>
+          <a:prstGeom prst="rect">
+            <a:avLst/>
+          </a:prstGeom>
+          <a:ln w="88900" cap="sq" cmpd="thickThin">
+            <a:solidFill>
+              <a:srgbClr val="000000"/>
+            </a:solidFill>
+            <a:prstDash val="solid"/>
+            <a:miter lim="800000"/>
+          </a:ln>
+          <a:effectLst>
+            <a:innerShdw blurRad="76200">
+              <a:srgbClr val="000000"/>
+            </a:innerShdw>
+          </a:effectLst>
+        </p:spPr>
+      </p:pic>
+      <p:cxnSp>
+        <p:nvCxnSpPr>
+          <p:cNvPr id="8" name="Straight Arrow Connector 7">
+            <a:extLst>
+              <a:ext uri="{FF2B5EF4-FFF2-40B4-BE49-F238E27FC236}">
+                <a16:creationId xmlns:a16="http://schemas.microsoft.com/office/drawing/2014/main" id="{E07BEF20-B926-DC82-B0BD-67F4B4FAEC27}"/>
+              </a:ext>
+            </a:extLst>
+          </p:cNvPr>
+          <p:cNvCxnSpPr>
+            <a:cxnSpLocks/>
+          </p:cNvCxnSpPr>
+          <p:nvPr/>
+        </p:nvCxnSpPr>
+        <p:spPr>
+          <a:xfrm flipV="1">
+            <a:off x="5368066" y="2710927"/>
+            <a:ext cx="0" cy="1045268"/>
+          </a:xfrm>
+          <a:prstGeom prst="straightConnector1">
+            <a:avLst/>
+          </a:prstGeom>
+          <a:ln>
+            <a:solidFill>
+              <a:srgbClr val="C00000"/>
+            </a:solidFill>
+            <a:prstDash val="sysDash"/>
+            <a:tailEnd type="triangle"/>
+          </a:ln>
+        </p:spPr>
+        <p:style>
+          <a:lnRef idx="2">
+            <a:schemeClr val="accent1"/>
+          </a:lnRef>
+          <a:fillRef idx="0">
+            <a:schemeClr val="accent1"/>
+          </a:fillRef>
+          <a:effectRef idx="1">
+            <a:schemeClr val="accent1"/>
+          </a:effectRef>
+          <a:fontRef idx="minor">
+            <a:schemeClr val="tx1"/>
+          </a:fontRef>
+        </p:style>
+      </p:cxnSp>
+      <p:sp>
+        <p:nvSpPr>
+          <p:cNvPr id="12" name="TextBox 11">
+            <a:extLst>
+              <a:ext uri="{FF2B5EF4-FFF2-40B4-BE49-F238E27FC236}">
+                <a16:creationId xmlns:a16="http://schemas.microsoft.com/office/drawing/2014/main" id="{170FC6D7-5084-F8E2-C6CE-86EF3A034D5F}"/>
+              </a:ext>
+            </a:extLst>
+          </p:cNvPr>
+          <p:cNvSpPr txBox="1"/>
+          <p:nvPr/>
+        </p:nvSpPr>
+        <p:spPr>
+          <a:xfrm>
+            <a:off x="5368066" y="3233561"/>
+            <a:ext cx="1888879" cy="523220"/>
+          </a:xfrm>
+          <a:prstGeom prst="rect">
+            <a:avLst/>
+          </a:prstGeom>
+          <a:noFill/>
+        </p:spPr>
+        <p:txBody>
+          <a:bodyPr wrap="square" rtlCol="0">
+            <a:spAutoFit/>
+          </a:bodyPr>
+          <a:lstStyle/>
+          <a:p>
+            <a:r>
+              <a:rPr lang="en-US" sz="1400" b="1" dirty="0">
+                <a:solidFill>
+                  <a:srgbClr val="C00000"/>
+                </a:solidFill>
+              </a:rPr>
+              <a:t>Railway Station Train Position Sensors</a:t>
+            </a:r>
+            <a:endParaRPr lang="en-SG" sz="1400" b="1" dirty="0">
+              <a:solidFill>
+                <a:srgbClr val="C00000"/>
+              </a:solidFill>
+            </a:endParaRPr>
+          </a:p>
+        </p:txBody>
+      </p:sp>
+      <p:cxnSp>
+        <p:nvCxnSpPr>
+          <p:cNvPr id="18" name="Connector: Elbow 17">
+            <a:extLst>
+              <a:ext uri="{FF2B5EF4-FFF2-40B4-BE49-F238E27FC236}">
+                <a16:creationId xmlns:a16="http://schemas.microsoft.com/office/drawing/2014/main" id="{E4BD737C-7055-FFB2-A1EC-7A891AEB60D7}"/>
+              </a:ext>
+            </a:extLst>
+          </p:cNvPr>
+          <p:cNvCxnSpPr>
+            <a:cxnSpLocks/>
+          </p:cNvCxnSpPr>
+          <p:nvPr/>
+        </p:nvCxnSpPr>
+        <p:spPr>
+          <a:xfrm rot="10800000">
+            <a:off x="4972028" y="2732175"/>
+            <a:ext cx="2934035" cy="311373"/>
+          </a:xfrm>
+          <a:prstGeom prst="bentConnector3">
+            <a:avLst>
+              <a:gd name="adj1" fmla="val 99553"/>
+            </a:avLst>
+          </a:prstGeom>
+          <a:ln>
+            <a:solidFill>
+              <a:srgbClr val="C00000"/>
+            </a:solidFill>
+            <a:prstDash val="sysDash"/>
+            <a:tailEnd type="triangle"/>
+          </a:ln>
+        </p:spPr>
+        <p:style>
+          <a:lnRef idx="2">
+            <a:schemeClr val="accent1"/>
+          </a:lnRef>
+          <a:fillRef idx="0">
+            <a:schemeClr val="accent1"/>
+          </a:fillRef>
+          <a:effectRef idx="1">
+            <a:schemeClr val="accent1"/>
+          </a:effectRef>
+          <a:fontRef idx="minor">
+            <a:schemeClr val="tx1"/>
+          </a:fontRef>
+        </p:style>
+      </p:cxnSp>
+      <p:sp>
+        <p:nvSpPr>
+          <p:cNvPr id="25" name="TextBox 24">
+            <a:extLst>
+              <a:ext uri="{FF2B5EF4-FFF2-40B4-BE49-F238E27FC236}">
+                <a16:creationId xmlns:a16="http://schemas.microsoft.com/office/drawing/2014/main" id="{426DCA54-2A92-9B01-DC1E-3BE415B57E71}"/>
+              </a:ext>
+            </a:extLst>
+          </p:cNvPr>
+          <p:cNvSpPr txBox="1"/>
+          <p:nvPr/>
+        </p:nvSpPr>
+        <p:spPr>
+          <a:xfrm>
+            <a:off x="7525530" y="2314267"/>
+            <a:ext cx="2288752" cy="523220"/>
+          </a:xfrm>
+          <a:prstGeom prst="rect">
+            <a:avLst/>
+          </a:prstGeom>
+          <a:noFill/>
+        </p:spPr>
+        <p:txBody>
+          <a:bodyPr wrap="square" rtlCol="0">
+            <a:spAutoFit/>
+          </a:bodyPr>
+          <a:lstStyle/>
+          <a:p>
+            <a:r>
+              <a:rPr lang="en-US" sz="1400" b="1" dirty="0">
+                <a:solidFill>
+                  <a:srgbClr val="C00000"/>
+                </a:solidFill>
+              </a:rPr>
+              <a:t>Railway Station Train Entrance Dock Signal </a:t>
+            </a:r>
+            <a:endParaRPr lang="en-SG" sz="1400" b="1" dirty="0">
+              <a:solidFill>
+                <a:srgbClr val="C00000"/>
+              </a:solidFill>
+            </a:endParaRPr>
+          </a:p>
+        </p:txBody>
+      </p:sp>
+      <p:pic>
+        <p:nvPicPr>
+          <p:cNvPr id="16" name="Picture 15">
+            <a:extLst>
+              <a:ext uri="{FF2B5EF4-FFF2-40B4-BE49-F238E27FC236}">
+                <a16:creationId xmlns:a16="http://schemas.microsoft.com/office/drawing/2014/main" id="{C03B8E29-73BA-F9C2-8FE8-4D563FCAB7C5}"/>
+              </a:ext>
+            </a:extLst>
+          </p:cNvPr>
+          <p:cNvPicPr>
+            <a:picLocks noChangeAspect="1"/>
+          </p:cNvPicPr>
+          <p:nvPr/>
+        </p:nvPicPr>
+        <p:blipFill>
+          <a:blip r:embed="rId4"/>
+          <a:stretch>
+            <a:fillRect/>
+          </a:stretch>
+        </p:blipFill>
+        <p:spPr>
+          <a:xfrm>
+            <a:off x="7906060" y="2964633"/>
+            <a:ext cx="2106728" cy="2446522"/>
+          </a:xfrm>
+          <a:prstGeom prst="rect">
+            <a:avLst/>
+          </a:prstGeom>
+          <a:ln w="88900" cap="sq" cmpd="thickThin">
+            <a:solidFill>
+              <a:srgbClr val="000000"/>
+            </a:solidFill>
+            <a:prstDash val="solid"/>
+            <a:miter lim="800000"/>
+          </a:ln>
+          <a:effectLst>
+            <a:innerShdw blurRad="76200">
+              <a:srgbClr val="000000"/>
+            </a:innerShdw>
+          </a:effectLst>
+        </p:spPr>
+      </p:pic>
+      <p:cxnSp>
+        <p:nvCxnSpPr>
+          <p:cNvPr id="28" name="Connector: Elbow 27">
+            <a:extLst>
+              <a:ext uri="{FF2B5EF4-FFF2-40B4-BE49-F238E27FC236}">
+                <a16:creationId xmlns:a16="http://schemas.microsoft.com/office/drawing/2014/main" id="{A95FF16D-5A00-3ACC-ECDA-7DB74993D3DB}"/>
+              </a:ext>
+            </a:extLst>
+          </p:cNvPr>
+          <p:cNvCxnSpPr>
+            <a:cxnSpLocks/>
+            <a:stCxn id="27" idx="0"/>
+          </p:cNvCxnSpPr>
+          <p:nvPr/>
+        </p:nvCxnSpPr>
+        <p:spPr>
+          <a:xfrm rot="5400000" flipH="1" flipV="1">
+            <a:off x="2880575" y="2240455"/>
+            <a:ext cx="1072616" cy="1155858"/>
+          </a:xfrm>
+          <a:prstGeom prst="bentConnector2">
+            <a:avLst/>
+          </a:prstGeom>
+          <a:ln>
+            <a:solidFill>
+              <a:srgbClr val="C00000"/>
+            </a:solidFill>
+            <a:prstDash val="sysDash"/>
+            <a:tailEnd type="triangle"/>
+          </a:ln>
+        </p:spPr>
+        <p:style>
+          <a:lnRef idx="2">
+            <a:schemeClr val="accent1"/>
+          </a:lnRef>
+          <a:fillRef idx="0">
+            <a:schemeClr val="accent1"/>
+          </a:fillRef>
+          <a:effectRef idx="1">
+            <a:schemeClr val="accent1"/>
+          </a:effectRef>
+          <a:fontRef idx="minor">
+            <a:schemeClr val="tx1"/>
+          </a:fontRef>
+        </p:style>
+      </p:cxnSp>
+      <p:sp>
+        <p:nvSpPr>
+          <p:cNvPr id="33" name="TextBox 32">
+            <a:extLst>
+              <a:ext uri="{FF2B5EF4-FFF2-40B4-BE49-F238E27FC236}">
+                <a16:creationId xmlns:a16="http://schemas.microsoft.com/office/drawing/2014/main" id="{48344E36-6121-8DCE-9C89-E672C69A4B88}"/>
+              </a:ext>
+            </a:extLst>
+          </p:cNvPr>
+          <p:cNvSpPr txBox="1"/>
+          <p:nvPr/>
+        </p:nvSpPr>
+        <p:spPr>
+          <a:xfrm>
+            <a:off x="3718930" y="3448633"/>
+            <a:ext cx="1134021" cy="1169551"/>
+          </a:xfrm>
+          <a:prstGeom prst="rect">
+            <a:avLst/>
+          </a:prstGeom>
+          <a:noFill/>
+        </p:spPr>
+        <p:txBody>
+          <a:bodyPr wrap="square" rtlCol="0">
+            <a:spAutoFit/>
+          </a:bodyPr>
+          <a:lstStyle/>
+          <a:p>
+            <a:r>
+              <a:rPr lang="en-US" sz="1400" b="1" dirty="0">
+                <a:solidFill>
+                  <a:srgbClr val="C00000"/>
+                </a:solidFill>
+              </a:rPr>
+              <a:t>Railway Station  Exist Train departure signal </a:t>
+            </a:r>
+            <a:endParaRPr lang="en-SG" sz="1400" b="1" dirty="0">
+              <a:solidFill>
+                <a:srgbClr val="C00000"/>
+              </a:solidFill>
+            </a:endParaRPr>
+          </a:p>
+        </p:txBody>
+      </p:sp>
+      <p:pic>
+        <p:nvPicPr>
+          <p:cNvPr id="35" name="Picture 34">
+            <a:extLst>
+              <a:ext uri="{FF2B5EF4-FFF2-40B4-BE49-F238E27FC236}">
+                <a16:creationId xmlns:a16="http://schemas.microsoft.com/office/drawing/2014/main" id="{45AEFE6A-9A75-F6EC-1892-5C282A8F0BEB}"/>
+              </a:ext>
+            </a:extLst>
+          </p:cNvPr>
+          <p:cNvPicPr>
+            <a:picLocks noChangeAspect="1"/>
+          </p:cNvPicPr>
+          <p:nvPr/>
+        </p:nvPicPr>
+        <p:blipFill>
+          <a:blip r:embed="rId5"/>
+          <a:stretch>
+            <a:fillRect/>
+          </a:stretch>
+        </p:blipFill>
+        <p:spPr>
+          <a:xfrm>
+            <a:off x="7256945" y="556990"/>
+            <a:ext cx="2804601" cy="1675850"/>
+          </a:xfrm>
+          <a:prstGeom prst="rect">
+            <a:avLst/>
+          </a:prstGeom>
+          <a:ln w="88900" cap="sq" cmpd="thickThin">
+            <a:solidFill>
+              <a:srgbClr val="000000"/>
+            </a:solidFill>
+            <a:prstDash val="solid"/>
+            <a:miter lim="800000"/>
+          </a:ln>
+          <a:effectLst>
+            <a:innerShdw blurRad="76200">
+              <a:srgbClr val="000000"/>
+            </a:innerShdw>
+          </a:effectLst>
+        </p:spPr>
+      </p:pic>
+      <p:cxnSp>
+        <p:nvCxnSpPr>
+          <p:cNvPr id="36" name="Connector: Elbow 35">
+            <a:extLst>
+              <a:ext uri="{FF2B5EF4-FFF2-40B4-BE49-F238E27FC236}">
+                <a16:creationId xmlns:a16="http://schemas.microsoft.com/office/drawing/2014/main" id="{79C28617-7571-B6D2-8401-47AE6DD09222}"/>
+              </a:ext>
+            </a:extLst>
+          </p:cNvPr>
+          <p:cNvCxnSpPr>
+            <a:cxnSpLocks/>
+          </p:cNvCxnSpPr>
+          <p:nvPr/>
+        </p:nvCxnSpPr>
+        <p:spPr>
+          <a:xfrm rot="10800000" flipV="1">
+            <a:off x="4572001" y="1057441"/>
+            <a:ext cx="2684945" cy="985385"/>
+          </a:xfrm>
+          <a:prstGeom prst="bentConnector3">
+            <a:avLst>
+              <a:gd name="adj1" fmla="val 100293"/>
+            </a:avLst>
+          </a:prstGeom>
+          <a:ln>
+            <a:solidFill>
+              <a:srgbClr val="C00000"/>
+            </a:solidFill>
+            <a:prstDash val="sysDash"/>
+            <a:tailEnd type="triangle"/>
+          </a:ln>
+        </p:spPr>
+        <p:style>
+          <a:lnRef idx="2">
+            <a:schemeClr val="accent1"/>
+          </a:lnRef>
+          <a:fillRef idx="0">
+            <a:schemeClr val="accent1"/>
+          </a:fillRef>
+          <a:effectRef idx="1">
+            <a:schemeClr val="accent1"/>
+          </a:effectRef>
+          <a:fontRef idx="minor">
+            <a:schemeClr val="tx1"/>
+          </a:fontRef>
+        </p:style>
+      </p:cxnSp>
+      <p:cxnSp>
+        <p:nvCxnSpPr>
+          <p:cNvPr id="39" name="Straight Arrow Connector 38">
+            <a:extLst>
+              <a:ext uri="{FF2B5EF4-FFF2-40B4-BE49-F238E27FC236}">
+                <a16:creationId xmlns:a16="http://schemas.microsoft.com/office/drawing/2014/main" id="{80EE7A73-41D1-A9DA-5FC0-A423CC612434}"/>
+              </a:ext>
+            </a:extLst>
+          </p:cNvPr>
+          <p:cNvCxnSpPr>
+            <a:cxnSpLocks/>
+          </p:cNvCxnSpPr>
+          <p:nvPr/>
+        </p:nvCxnSpPr>
+        <p:spPr>
+          <a:xfrm>
+            <a:off x="5254739" y="1057440"/>
+            <a:ext cx="0" cy="1653487"/>
+          </a:xfrm>
+          <a:prstGeom prst="straightConnector1">
+            <a:avLst/>
+          </a:prstGeom>
+          <a:ln>
+            <a:solidFill>
+              <a:srgbClr val="C00000"/>
+            </a:solidFill>
+            <a:prstDash val="sysDash"/>
+            <a:tailEnd type="triangle"/>
+          </a:ln>
+        </p:spPr>
+        <p:style>
+          <a:lnRef idx="2">
+            <a:schemeClr val="accent1"/>
+          </a:lnRef>
+          <a:fillRef idx="0">
+            <a:schemeClr val="accent1"/>
+          </a:fillRef>
+          <a:effectRef idx="1">
+            <a:schemeClr val="accent1"/>
+          </a:effectRef>
+          <a:fontRef idx="minor">
+            <a:schemeClr val="tx1"/>
+          </a:fontRef>
+        </p:style>
+      </p:cxnSp>
+      <p:sp>
+        <p:nvSpPr>
+          <p:cNvPr id="41" name="TextBox 40">
+            <a:extLst>
+              <a:ext uri="{FF2B5EF4-FFF2-40B4-BE49-F238E27FC236}">
+                <a16:creationId xmlns:a16="http://schemas.microsoft.com/office/drawing/2014/main" id="{07B308C4-586F-4271-AFC1-A5C39BEDFE62}"/>
+              </a:ext>
+            </a:extLst>
+          </p:cNvPr>
+          <p:cNvSpPr txBox="1"/>
+          <p:nvPr/>
+        </p:nvSpPr>
+        <p:spPr>
+          <a:xfrm>
+            <a:off x="1848658" y="583686"/>
+            <a:ext cx="3215633" cy="307777"/>
+          </a:xfrm>
+          <a:prstGeom prst="rect">
+            <a:avLst/>
+          </a:prstGeom>
+          <a:noFill/>
+        </p:spPr>
+        <p:txBody>
+          <a:bodyPr wrap="square" rtlCol="0">
+            <a:spAutoFit/>
+          </a:bodyPr>
+          <a:lstStyle/>
+          <a:p>
+            <a:r>
+              <a:rPr lang="en-US" sz="1400" b="1" dirty="0">
+                <a:solidFill>
+                  <a:srgbClr val="C00000"/>
+                </a:solidFill>
+              </a:rPr>
+              <a:t>Station Platform Emergency Buttons </a:t>
+            </a:r>
+            <a:endParaRPr lang="en-SG" sz="1400" b="1" dirty="0">
+              <a:solidFill>
+                <a:srgbClr val="C00000"/>
+              </a:solidFill>
+            </a:endParaRPr>
+          </a:p>
+        </p:txBody>
+      </p:sp>
+      <p:sp>
+        <p:nvSpPr>
+          <p:cNvPr id="46" name="TextBox 45">
+            <a:extLst>
+              <a:ext uri="{FF2B5EF4-FFF2-40B4-BE49-F238E27FC236}">
+                <a16:creationId xmlns:a16="http://schemas.microsoft.com/office/drawing/2014/main" id="{E76CB908-761E-0FD3-49CA-523B5ECFB0C0}"/>
+              </a:ext>
+            </a:extLst>
+          </p:cNvPr>
+          <p:cNvSpPr txBox="1"/>
+          <p:nvPr/>
+        </p:nvSpPr>
+        <p:spPr>
+          <a:xfrm>
+            <a:off x="5254738" y="558106"/>
+            <a:ext cx="2173702" cy="523220"/>
+          </a:xfrm>
+          <a:prstGeom prst="rect">
+            <a:avLst/>
+          </a:prstGeom>
+          <a:noFill/>
+        </p:spPr>
+        <p:txBody>
+          <a:bodyPr wrap="square" rtlCol="0">
+            <a:spAutoFit/>
+          </a:bodyPr>
+          <a:lstStyle/>
+          <a:p>
+            <a:r>
+              <a:rPr lang="en-US" sz="1400" b="1" dirty="0">
+                <a:solidFill>
+                  <a:srgbClr val="C00000"/>
+                </a:solidFill>
+              </a:rPr>
+              <a:t>Railway Station Platform Safety Doors</a:t>
+            </a:r>
+            <a:endParaRPr lang="en-SG" sz="1400" b="1" dirty="0">
+              <a:solidFill>
+                <a:srgbClr val="C00000"/>
+              </a:solidFill>
+            </a:endParaRPr>
+          </a:p>
+        </p:txBody>
+      </p:sp>
+      <p:cxnSp>
+        <p:nvCxnSpPr>
+          <p:cNvPr id="48" name="Connector: Elbow 47">
+            <a:extLst>
+              <a:ext uri="{FF2B5EF4-FFF2-40B4-BE49-F238E27FC236}">
+                <a16:creationId xmlns:a16="http://schemas.microsoft.com/office/drawing/2014/main" id="{A6080DEB-CC13-51A7-DCB5-CE8692F4B1EF}"/>
+              </a:ext>
+            </a:extLst>
+          </p:cNvPr>
+          <p:cNvCxnSpPr>
+            <a:cxnSpLocks/>
+          </p:cNvCxnSpPr>
+          <p:nvPr/>
+        </p:nvCxnSpPr>
+        <p:spPr>
+          <a:xfrm>
+            <a:off x="3274840" y="1495872"/>
+            <a:ext cx="761077" cy="466022"/>
+          </a:xfrm>
+          <a:prstGeom prst="bentConnector3">
+            <a:avLst/>
+          </a:prstGeom>
+          <a:ln>
+            <a:solidFill>
+              <a:srgbClr val="C00000"/>
+            </a:solidFill>
+            <a:prstDash val="sysDash"/>
+            <a:tailEnd type="triangle"/>
+          </a:ln>
+        </p:spPr>
+        <p:style>
+          <a:lnRef idx="2">
+            <a:schemeClr val="accent1"/>
+          </a:lnRef>
+          <a:fillRef idx="0">
+            <a:schemeClr val="accent1"/>
+          </a:fillRef>
+          <a:effectRef idx="1">
+            <a:schemeClr val="accent1"/>
+          </a:effectRef>
+          <a:fontRef idx="minor">
+            <a:schemeClr val="tx1"/>
+          </a:fontRef>
+        </p:style>
+      </p:cxnSp>
+      <p:pic>
+        <p:nvPicPr>
+          <p:cNvPr id="45" name="Picture 44">
+            <a:extLst>
+              <a:ext uri="{FF2B5EF4-FFF2-40B4-BE49-F238E27FC236}">
+                <a16:creationId xmlns:a16="http://schemas.microsoft.com/office/drawing/2014/main" id="{00EF2DEA-0D32-BF63-F5B2-A7C464B293C1}"/>
+              </a:ext>
+            </a:extLst>
+          </p:cNvPr>
+          <p:cNvPicPr>
+            <a:picLocks noChangeAspect="1"/>
+          </p:cNvPicPr>
+          <p:nvPr/>
+        </p:nvPicPr>
+        <p:blipFill>
+          <a:blip r:embed="rId6"/>
+          <a:stretch>
+            <a:fillRect/>
+          </a:stretch>
+        </p:blipFill>
+        <p:spPr>
+          <a:xfrm>
+            <a:off x="2077876" y="959175"/>
+            <a:ext cx="1235044" cy="1083651"/>
+          </a:xfrm>
+          <a:prstGeom prst="rect">
+            <a:avLst/>
+          </a:prstGeom>
+          <a:ln w="88900" cap="sq" cmpd="thickThin">
+            <a:solidFill>
+              <a:srgbClr val="000000"/>
+            </a:solidFill>
+            <a:prstDash val="solid"/>
+            <a:miter lim="800000"/>
+          </a:ln>
+          <a:effectLst>
+            <a:innerShdw blurRad="76200">
+              <a:srgbClr val="000000"/>
+            </a:innerShdw>
+          </a:effectLst>
+        </p:spPr>
+      </p:pic>
+      <p:pic>
+        <p:nvPicPr>
+          <p:cNvPr id="27" name="Picture 26">
+            <a:extLst>
+              <a:ext uri="{FF2B5EF4-FFF2-40B4-BE49-F238E27FC236}">
+                <a16:creationId xmlns:a16="http://schemas.microsoft.com/office/drawing/2014/main" id="{A6F73972-9BCC-45D4-FBF1-8CC597ED35EF}"/>
+              </a:ext>
+            </a:extLst>
+          </p:cNvPr>
+          <p:cNvPicPr>
+            <a:picLocks noChangeAspect="1"/>
+          </p:cNvPicPr>
+          <p:nvPr/>
+        </p:nvPicPr>
+        <p:blipFill>
+          <a:blip r:embed="rId7"/>
+          <a:stretch>
+            <a:fillRect/>
+          </a:stretch>
+        </p:blipFill>
+        <p:spPr>
+          <a:xfrm>
+            <a:off x="2077876" y="3354692"/>
+            <a:ext cx="1522155" cy="2056463"/>
+          </a:xfrm>
+          <a:prstGeom prst="rect">
+            <a:avLst/>
+          </a:prstGeom>
+          <a:ln w="88900" cap="sq" cmpd="thickThin">
+            <a:solidFill>
+              <a:srgbClr val="000000"/>
+            </a:solidFill>
+            <a:prstDash val="solid"/>
+            <a:miter lim="800000"/>
+          </a:ln>
+          <a:effectLst>
+            <a:innerShdw blurRad="76200">
+              <a:srgbClr val="000000"/>
+            </a:innerShdw>
+          </a:effectLst>
+        </p:spPr>
+      </p:pic>
+      <p:cxnSp>
+        <p:nvCxnSpPr>
+          <p:cNvPr id="54" name="Connector: Elbow 53">
+            <a:extLst>
+              <a:ext uri="{FF2B5EF4-FFF2-40B4-BE49-F238E27FC236}">
+                <a16:creationId xmlns:a16="http://schemas.microsoft.com/office/drawing/2014/main" id="{44A0A581-A507-844E-17A1-3C0C26D030A0}"/>
+              </a:ext>
+            </a:extLst>
+          </p:cNvPr>
+          <p:cNvCxnSpPr>
+            <a:cxnSpLocks/>
+          </p:cNvCxnSpPr>
+          <p:nvPr/>
+        </p:nvCxnSpPr>
+        <p:spPr>
+          <a:xfrm rot="16200000" flipV="1">
+            <a:off x="5528100" y="2312497"/>
+            <a:ext cx="969339" cy="426871"/>
+          </a:xfrm>
+          <a:prstGeom prst="bentConnector3">
+            <a:avLst>
+              <a:gd name="adj1" fmla="val 100940"/>
+            </a:avLst>
+          </a:prstGeom>
+          <a:ln>
+            <a:solidFill>
+              <a:srgbClr val="C00000"/>
+            </a:solidFill>
+            <a:prstDash val="sysDash"/>
+            <a:tailEnd type="triangle"/>
+          </a:ln>
+        </p:spPr>
+        <p:style>
+          <a:lnRef idx="2">
+            <a:schemeClr val="accent1"/>
+          </a:lnRef>
+          <a:fillRef idx="0">
+            <a:schemeClr val="accent1"/>
+          </a:fillRef>
+          <a:effectRef idx="1">
+            <a:schemeClr val="accent1"/>
+          </a:effectRef>
+          <a:fontRef idx="minor">
+            <a:schemeClr val="tx1"/>
+          </a:fontRef>
+        </p:style>
+      </p:cxnSp>
+      <p:sp>
+        <p:nvSpPr>
+          <p:cNvPr id="59" name="TextBox 58">
+            <a:extLst>
+              <a:ext uri="{FF2B5EF4-FFF2-40B4-BE49-F238E27FC236}">
+                <a16:creationId xmlns:a16="http://schemas.microsoft.com/office/drawing/2014/main" id="{A6E7F1E1-6BC1-A969-9BD3-AABE4C3A933C}"/>
+              </a:ext>
+            </a:extLst>
+          </p:cNvPr>
+          <p:cNvSpPr txBox="1"/>
+          <p:nvPr/>
+        </p:nvSpPr>
+        <p:spPr>
+          <a:xfrm>
+            <a:off x="3923547" y="1240506"/>
+            <a:ext cx="2662382" cy="307777"/>
+          </a:xfrm>
+          <a:prstGeom prst="rect">
+            <a:avLst/>
+          </a:prstGeom>
+          <a:noFill/>
+        </p:spPr>
+        <p:txBody>
+          <a:bodyPr wrap="square" rtlCol="0">
+            <a:spAutoFit/>
+          </a:bodyPr>
+          <a:lstStyle/>
+          <a:p>
+            <a:r>
+              <a:rPr lang="en-US" sz="1400" b="1" dirty="0">
+                <a:solidFill>
+                  <a:schemeClr val="tx2">
+                    <a:lumMod val="75000"/>
+                    <a:lumOff val="25000"/>
+                  </a:schemeClr>
+                </a:solidFill>
+              </a:rPr>
+              <a:t>Physical Simulation Program</a:t>
+            </a:r>
+            <a:endParaRPr lang="en-SG" sz="1400" b="1" dirty="0">
+              <a:solidFill>
+                <a:schemeClr val="tx2">
+                  <a:lumMod val="75000"/>
+                  <a:lumOff val="25000"/>
+                </a:schemeClr>
+              </a:solidFill>
+            </a:endParaRPr>
+          </a:p>
+        </p:txBody>
+      </p:sp>
+    </p:spTree>
+    <p:extLst>
+      <p:ext uri="{BB962C8B-B14F-4D97-AF65-F5344CB8AC3E}">
+        <p14:creationId xmlns:p14="http://schemas.microsoft.com/office/powerpoint/2010/main" val="521517480"/>
+      </p:ext>
+    </p:extLst>
+  </p:cSld>
+  <p:clrMapOvr>
+    <a:masterClrMapping/>
+  </p:clrMapOvr>
+</p:sld>
+</file>
+
+<file path=ppt/slides/slide4.xml><?xml version="1.0" encoding="utf-8"?>
+<p:sld xmlns:a="http://schemas.openxmlformats.org/drawingml/2006/main" xmlns:r="http://schemas.openxmlformats.org/officeDocument/2006/relationships" xmlns:p="http://schemas.openxmlformats.org/presentationml/2006/main">
+  <p:cSld>
+    <p:spTree>
+      <p:nvGrpSpPr>
+        <p:cNvPr id="1" name=""/>
+        <p:cNvGrpSpPr/>
+        <p:nvPr/>
+      </p:nvGrpSpPr>
+      <p:grpSpPr>
+        <a:xfrm>
+          <a:off x="0" y="0"/>
+          <a:ext cx="0" cy="0"/>
+          <a:chOff x="0" y="0"/>
+          <a:chExt cx="0" cy="0"/>
+        </a:xfrm>
+      </p:grpSpPr>
+      <p:pic>
+        <p:nvPicPr>
+          <p:cNvPr id="5" name="Picture 4">
+            <a:extLst>
+              <a:ext uri="{FF2B5EF4-FFF2-40B4-BE49-F238E27FC236}">
+                <a16:creationId xmlns:a16="http://schemas.microsoft.com/office/drawing/2014/main" id="{FE5B9EAD-E40F-8FB2-37E1-0643057BAD55}"/>
+              </a:ext>
+            </a:extLst>
+          </p:cNvPr>
+          <p:cNvPicPr>
+            <a:picLocks noChangeAspect="1"/>
+          </p:cNvPicPr>
+          <p:nvPr/>
+        </p:nvPicPr>
+        <p:blipFill>
+          <a:blip r:embed="rId2">
+            <a:alphaModFix amt="50000"/>
+          </a:blip>
+          <a:stretch>
+            <a:fillRect/>
+          </a:stretch>
+        </p:blipFill>
+        <p:spPr>
+          <a:xfrm>
+            <a:off x="1239792" y="1790933"/>
+            <a:ext cx="9438095" cy="3733333"/>
+          </a:xfrm>
+          <a:prstGeom prst="rect">
+            <a:avLst/>
+          </a:prstGeom>
+        </p:spPr>
+      </p:pic>
+      <p:pic>
+        <p:nvPicPr>
+          <p:cNvPr id="6" name="Picture 5" descr="TM221CE16R Schneider Electric Modicon M221 PLC CPU Mini USB Interface –  Ralakde Automation">
+            <a:extLst>
+              <a:ext uri="{FF2B5EF4-FFF2-40B4-BE49-F238E27FC236}">
+                <a16:creationId xmlns:a16="http://schemas.microsoft.com/office/drawing/2014/main" id="{A1262E27-82A7-2046-B86D-4EE144249EB4}"/>
+              </a:ext>
+            </a:extLst>
+          </p:cNvPr>
+          <p:cNvPicPr>
+            <a:picLocks noChangeAspect="1" noChangeArrowheads="1"/>
+          </p:cNvPicPr>
+          <p:nvPr/>
+        </p:nvPicPr>
+        <p:blipFill>
+          <a:blip r:embed="rId3">
+            <a:extLst>
+              <a:ext uri="{28A0092B-C50C-407E-A947-70E740481C1C}">
+                <a14:useLocalDpi xmlns:a14="http://schemas.microsoft.com/office/drawing/2010/main" val="0"/>
+              </a:ext>
+            </a:extLst>
+          </a:blip>
+          <a:srcRect/>
+          <a:stretch>
+            <a:fillRect/>
+          </a:stretch>
+        </p:blipFill>
+        <p:spPr bwMode="auto">
+          <a:xfrm>
+            <a:off x="4277770" y="1202731"/>
+            <a:ext cx="541118" cy="593226"/>
+          </a:xfrm>
+          <a:prstGeom prst="rect">
+            <a:avLst/>
+          </a:prstGeom>
+          <a:noFill/>
+          <a:extLst>
+            <a:ext uri="{909E8E84-426E-40DD-AFC4-6F175D3DCCD1}">
+              <a14:hiddenFill xmlns:a14="http://schemas.microsoft.com/office/drawing/2010/main">
+                <a:solidFill>
+                  <a:srgbClr val="FFFFFF"/>
+                </a:solidFill>
+              </a14:hiddenFill>
+            </a:ext>
+          </a:extLst>
+        </p:spPr>
+      </p:pic>
+      <p:cxnSp>
+        <p:nvCxnSpPr>
+          <p:cNvPr id="8" name="Connector: Elbow 7">
+            <a:extLst>
+              <a:ext uri="{FF2B5EF4-FFF2-40B4-BE49-F238E27FC236}">
+                <a16:creationId xmlns:a16="http://schemas.microsoft.com/office/drawing/2014/main" id="{AF3E99B8-8170-595F-EC05-7D98E273FEE5}"/>
+              </a:ext>
+            </a:extLst>
+          </p:cNvPr>
+          <p:cNvCxnSpPr>
+            <a:cxnSpLocks/>
+            <a:endCxn id="6" idx="2"/>
+          </p:cNvCxnSpPr>
+          <p:nvPr/>
+        </p:nvCxnSpPr>
+        <p:spPr>
+          <a:xfrm flipV="1">
+            <a:off x="3661492" y="1795957"/>
+            <a:ext cx="886837" cy="640532"/>
+          </a:xfrm>
+          <a:prstGeom prst="bentConnector2">
+            <a:avLst/>
+          </a:prstGeom>
+          <a:ln>
+            <a:solidFill>
+              <a:schemeClr val="accent6">
+                <a:lumMod val="75000"/>
+              </a:schemeClr>
+            </a:solidFill>
+          </a:ln>
+        </p:spPr>
+        <p:style>
+          <a:lnRef idx="2">
+            <a:schemeClr val="accent1"/>
+          </a:lnRef>
+          <a:fillRef idx="0">
+            <a:schemeClr val="accent1"/>
+          </a:fillRef>
+          <a:effectRef idx="1">
+            <a:schemeClr val="accent1"/>
+          </a:effectRef>
+          <a:fontRef idx="minor">
+            <a:schemeClr val="tx1"/>
+          </a:fontRef>
+        </p:style>
+      </p:cxnSp>
+      <p:cxnSp>
+        <p:nvCxnSpPr>
+          <p:cNvPr id="11" name="Connector: Elbow 10">
+            <a:extLst>
+              <a:ext uri="{FF2B5EF4-FFF2-40B4-BE49-F238E27FC236}">
+                <a16:creationId xmlns:a16="http://schemas.microsoft.com/office/drawing/2014/main" id="{4C090FD7-83A6-1D2A-A156-108E8AD6F74F}"/>
+              </a:ext>
+            </a:extLst>
+          </p:cNvPr>
+          <p:cNvCxnSpPr>
+            <a:cxnSpLocks/>
+          </p:cNvCxnSpPr>
+          <p:nvPr/>
+        </p:nvCxnSpPr>
+        <p:spPr>
+          <a:xfrm rot="10800000">
+            <a:off x="6812992" y="2396806"/>
+            <a:ext cx="1974392" cy="784748"/>
+          </a:xfrm>
+          <a:prstGeom prst="bentConnector3">
+            <a:avLst>
+              <a:gd name="adj1" fmla="val -18"/>
+            </a:avLst>
+          </a:prstGeom>
+          <a:ln>
+            <a:solidFill>
+              <a:schemeClr val="accent6">
+                <a:lumMod val="75000"/>
+              </a:schemeClr>
+            </a:solidFill>
+          </a:ln>
+        </p:spPr>
+        <p:style>
+          <a:lnRef idx="2">
+            <a:schemeClr val="accent1"/>
+          </a:lnRef>
+          <a:fillRef idx="0">
+            <a:schemeClr val="accent1"/>
+          </a:fillRef>
+          <a:effectRef idx="1">
+            <a:schemeClr val="accent1"/>
+          </a:effectRef>
+          <a:fontRef idx="minor">
+            <a:schemeClr val="tx1"/>
+          </a:fontRef>
+        </p:style>
+      </p:cxnSp>
+      <p:cxnSp>
+        <p:nvCxnSpPr>
+          <p:cNvPr id="16" name="Connector: Elbow 15">
+            <a:extLst>
+              <a:ext uri="{FF2B5EF4-FFF2-40B4-BE49-F238E27FC236}">
+                <a16:creationId xmlns:a16="http://schemas.microsoft.com/office/drawing/2014/main" id="{9D15E74D-94FD-6DB4-4305-E49D6948E764}"/>
+              </a:ext>
+            </a:extLst>
+          </p:cNvPr>
+          <p:cNvCxnSpPr>
+            <a:cxnSpLocks/>
+            <a:stCxn id="6" idx="3"/>
+          </p:cNvCxnSpPr>
+          <p:nvPr/>
+        </p:nvCxnSpPr>
+        <p:spPr>
+          <a:xfrm>
+            <a:off x="4818888" y="1499344"/>
+            <a:ext cx="3915900" cy="378684"/>
+          </a:xfrm>
+          <a:prstGeom prst="bentConnector3">
+            <a:avLst>
+              <a:gd name="adj1" fmla="val 99738"/>
+            </a:avLst>
+          </a:prstGeom>
+          <a:ln>
+            <a:solidFill>
+              <a:srgbClr val="C00000"/>
+            </a:solidFill>
+          </a:ln>
+        </p:spPr>
+        <p:style>
+          <a:lnRef idx="2">
+            <a:schemeClr val="accent1"/>
+          </a:lnRef>
+          <a:fillRef idx="0">
+            <a:schemeClr val="accent1"/>
+          </a:fillRef>
+          <a:effectRef idx="1">
+            <a:schemeClr val="accent1"/>
+          </a:effectRef>
+          <a:fontRef idx="minor">
+            <a:schemeClr val="tx1"/>
+          </a:fontRef>
+        </p:style>
+      </p:cxnSp>
+      <p:cxnSp>
+        <p:nvCxnSpPr>
+          <p:cNvPr id="18" name="Connector: Elbow 17">
+            <a:extLst>
+              <a:ext uri="{FF2B5EF4-FFF2-40B4-BE49-F238E27FC236}">
+                <a16:creationId xmlns:a16="http://schemas.microsoft.com/office/drawing/2014/main" id="{443411A4-6C24-CE15-288A-37AA63F846FB}"/>
+              </a:ext>
+            </a:extLst>
+          </p:cNvPr>
+          <p:cNvCxnSpPr>
+            <a:cxnSpLocks/>
+            <a:stCxn id="6" idx="1"/>
+          </p:cNvCxnSpPr>
+          <p:nvPr/>
+        </p:nvCxnSpPr>
+        <p:spPr>
+          <a:xfrm rot="10800000" flipV="1">
+            <a:off x="2304972" y="1499344"/>
+            <a:ext cx="1972799" cy="403670"/>
+          </a:xfrm>
+          <a:prstGeom prst="bentConnector3">
+            <a:avLst>
+              <a:gd name="adj1" fmla="val 99131"/>
+            </a:avLst>
+          </a:prstGeom>
+          <a:ln>
+            <a:solidFill>
+              <a:srgbClr val="C00000"/>
+            </a:solidFill>
+          </a:ln>
+        </p:spPr>
+        <p:style>
+          <a:lnRef idx="2">
+            <a:schemeClr val="accent1"/>
+          </a:lnRef>
+          <a:fillRef idx="0">
+            <a:schemeClr val="accent1"/>
+          </a:fillRef>
+          <a:effectRef idx="1">
+            <a:schemeClr val="accent1"/>
+          </a:effectRef>
+          <a:fontRef idx="minor">
+            <a:schemeClr val="tx1"/>
+          </a:fontRef>
+        </p:style>
+      </p:cxnSp>
+      <p:pic>
+        <p:nvPicPr>
+          <p:cNvPr id="27" name="Picture 26" descr="TM221CE16R Schneider Electric Modicon M221 PLC CPU Mini USB Interface –  Ralakde Automation">
+            <a:extLst>
+              <a:ext uri="{FF2B5EF4-FFF2-40B4-BE49-F238E27FC236}">
+                <a16:creationId xmlns:a16="http://schemas.microsoft.com/office/drawing/2014/main" id="{A1A9A7EE-B4C7-250B-71C9-F8F4124DC28E}"/>
+              </a:ext>
+            </a:extLst>
+          </p:cNvPr>
+          <p:cNvPicPr>
+            <a:picLocks noChangeAspect="1" noChangeArrowheads="1"/>
+          </p:cNvPicPr>
+          <p:nvPr/>
+        </p:nvPicPr>
+        <p:blipFill>
+          <a:blip r:embed="rId3">
+            <a:extLst>
+              <a:ext uri="{28A0092B-C50C-407E-A947-70E740481C1C}">
+                <a14:useLocalDpi xmlns:a14="http://schemas.microsoft.com/office/drawing/2010/main" val="0"/>
+              </a:ext>
+            </a:extLst>
+          </a:blip>
+          <a:srcRect/>
+          <a:stretch>
+            <a:fillRect/>
+          </a:stretch>
+        </p:blipFill>
+        <p:spPr bwMode="auto">
+          <a:xfrm>
+            <a:off x="8516825" y="3181554"/>
+            <a:ext cx="541118" cy="593226"/>
+          </a:xfrm>
+          <a:prstGeom prst="rect">
+            <a:avLst/>
+          </a:prstGeom>
+          <a:noFill/>
+          <a:extLst>
+            <a:ext uri="{909E8E84-426E-40DD-AFC4-6F175D3DCCD1}">
+              <a14:hiddenFill xmlns:a14="http://schemas.microsoft.com/office/drawing/2010/main">
+                <a:solidFill>
+                  <a:srgbClr val="FFFFFF"/>
+                </a:solidFill>
+              </a14:hiddenFill>
+            </a:ext>
+          </a:extLst>
+        </p:spPr>
+      </p:pic>
+      <p:cxnSp>
+        <p:nvCxnSpPr>
+          <p:cNvPr id="28" name="Connector: Elbow 27">
+            <a:extLst>
+              <a:ext uri="{FF2B5EF4-FFF2-40B4-BE49-F238E27FC236}">
+                <a16:creationId xmlns:a16="http://schemas.microsoft.com/office/drawing/2014/main" id="{B143E3D0-9CF7-79E5-493D-7722E2C39E40}"/>
+              </a:ext>
+            </a:extLst>
+          </p:cNvPr>
+          <p:cNvCxnSpPr>
+            <a:cxnSpLocks/>
+          </p:cNvCxnSpPr>
+          <p:nvPr/>
+        </p:nvCxnSpPr>
+        <p:spPr>
+          <a:xfrm rot="10800000">
+            <a:off x="7196329" y="2773491"/>
+            <a:ext cx="1320497" cy="633736"/>
+          </a:xfrm>
+          <a:prstGeom prst="bentConnector3">
+            <a:avLst>
+              <a:gd name="adj1" fmla="val 100550"/>
+            </a:avLst>
+          </a:prstGeom>
+          <a:ln>
+            <a:solidFill>
+              <a:srgbClr val="C00000"/>
+            </a:solidFill>
+          </a:ln>
+        </p:spPr>
+        <p:style>
+          <a:lnRef idx="2">
+            <a:schemeClr val="accent1"/>
+          </a:lnRef>
+          <a:fillRef idx="0">
+            <a:schemeClr val="accent1"/>
+          </a:fillRef>
+          <a:effectRef idx="1">
+            <a:schemeClr val="accent1"/>
+          </a:effectRef>
+          <a:fontRef idx="minor">
+            <a:schemeClr val="tx1"/>
+          </a:fontRef>
+        </p:style>
+      </p:cxnSp>
+      <p:cxnSp>
+        <p:nvCxnSpPr>
+          <p:cNvPr id="35" name="Connector: Elbow 34">
+            <a:extLst>
+              <a:ext uri="{FF2B5EF4-FFF2-40B4-BE49-F238E27FC236}">
+                <a16:creationId xmlns:a16="http://schemas.microsoft.com/office/drawing/2014/main" id="{B6D6E6CE-A37B-5E25-B627-A48B38539CDF}"/>
+              </a:ext>
+            </a:extLst>
+          </p:cNvPr>
+          <p:cNvCxnSpPr>
+            <a:cxnSpLocks/>
+          </p:cNvCxnSpPr>
+          <p:nvPr/>
+        </p:nvCxnSpPr>
+        <p:spPr>
+          <a:xfrm rot="10800000" flipV="1">
+            <a:off x="7114034" y="3632406"/>
+            <a:ext cx="1402790" cy="775000"/>
+          </a:xfrm>
+          <a:prstGeom prst="bentConnector3">
+            <a:avLst>
+              <a:gd name="adj1" fmla="val 99540"/>
+            </a:avLst>
+          </a:prstGeom>
+          <a:ln>
+            <a:solidFill>
+              <a:srgbClr val="C00000"/>
+            </a:solidFill>
+          </a:ln>
+        </p:spPr>
+        <p:style>
+          <a:lnRef idx="2">
+            <a:schemeClr val="accent1"/>
+          </a:lnRef>
+          <a:fillRef idx="0">
+            <a:schemeClr val="accent1"/>
+          </a:fillRef>
+          <a:effectRef idx="1">
+            <a:schemeClr val="accent1"/>
+          </a:effectRef>
+          <a:fontRef idx="minor">
+            <a:schemeClr val="tx1"/>
+          </a:fontRef>
+        </p:style>
+      </p:cxnSp>
+      <p:cxnSp>
+        <p:nvCxnSpPr>
+          <p:cNvPr id="39" name="Connector: Elbow 38">
+            <a:extLst>
+              <a:ext uri="{FF2B5EF4-FFF2-40B4-BE49-F238E27FC236}">
+                <a16:creationId xmlns:a16="http://schemas.microsoft.com/office/drawing/2014/main" id="{12F22D0D-F842-E71E-9256-21714C19A98C}"/>
+              </a:ext>
+            </a:extLst>
+          </p:cNvPr>
+          <p:cNvCxnSpPr>
+            <a:cxnSpLocks/>
+            <a:endCxn id="27" idx="3"/>
+          </p:cNvCxnSpPr>
+          <p:nvPr/>
+        </p:nvCxnSpPr>
+        <p:spPr>
+          <a:xfrm rot="16200000" flipH="1">
+            <a:off x="8212894" y="2633118"/>
+            <a:ext cx="1481666" cy="208432"/>
+          </a:xfrm>
+          <a:prstGeom prst="bentConnector4">
+            <a:avLst>
+              <a:gd name="adj1" fmla="val -123"/>
+              <a:gd name="adj2" fmla="val 209676"/>
+            </a:avLst>
+          </a:prstGeom>
+          <a:ln>
+            <a:solidFill>
+              <a:srgbClr val="C00000"/>
+            </a:solidFill>
+          </a:ln>
+        </p:spPr>
+        <p:style>
+          <a:lnRef idx="2">
+            <a:schemeClr val="accent1"/>
+          </a:lnRef>
+          <a:fillRef idx="0">
+            <a:schemeClr val="accent1"/>
+          </a:fillRef>
+          <a:effectRef idx="1">
+            <a:schemeClr val="accent1"/>
+          </a:effectRef>
+          <a:fontRef idx="minor">
+            <a:schemeClr val="tx1"/>
+          </a:fontRef>
+        </p:style>
+      </p:cxnSp>
+      <p:pic>
+        <p:nvPicPr>
+          <p:cNvPr id="45" name="Picture 44" descr="TM221CE16R Schneider Electric Modicon M221 PLC CPU Mini USB Interface –  Ralakde Automation">
+            <a:extLst>
+              <a:ext uri="{FF2B5EF4-FFF2-40B4-BE49-F238E27FC236}">
+                <a16:creationId xmlns:a16="http://schemas.microsoft.com/office/drawing/2014/main" id="{CC7BD3C5-BF9E-E679-D0A3-E151C841577B}"/>
+              </a:ext>
+            </a:extLst>
+          </p:cNvPr>
+          <p:cNvPicPr>
+            <a:picLocks noChangeAspect="1" noChangeArrowheads="1"/>
+          </p:cNvPicPr>
+          <p:nvPr/>
+        </p:nvPicPr>
+        <p:blipFill>
+          <a:blip r:embed="rId3">
+            <a:extLst>
+              <a:ext uri="{28A0092B-C50C-407E-A947-70E740481C1C}">
+                <a14:useLocalDpi xmlns:a14="http://schemas.microsoft.com/office/drawing/2010/main" val="0"/>
+              </a:ext>
+            </a:extLst>
+          </a:blip>
+          <a:srcRect/>
+          <a:stretch>
+            <a:fillRect/>
+          </a:stretch>
+        </p:blipFill>
+        <p:spPr bwMode="auto">
+          <a:xfrm>
+            <a:off x="1906397" y="3687270"/>
+            <a:ext cx="541118" cy="593226"/>
+          </a:xfrm>
+          <a:prstGeom prst="rect">
+            <a:avLst/>
+          </a:prstGeom>
+          <a:noFill/>
+          <a:extLst>
+            <a:ext uri="{909E8E84-426E-40DD-AFC4-6F175D3DCCD1}">
+              <a14:hiddenFill xmlns:a14="http://schemas.microsoft.com/office/drawing/2010/main">
+                <a:solidFill>
+                  <a:srgbClr val="FFFFFF"/>
+                </a:solidFill>
+              </a14:hiddenFill>
+            </a:ext>
+          </a:extLst>
+        </p:spPr>
+      </p:pic>
+      <p:cxnSp>
+        <p:nvCxnSpPr>
+          <p:cNvPr id="46" name="Connector: Elbow 45">
+            <a:extLst>
+              <a:ext uri="{FF2B5EF4-FFF2-40B4-BE49-F238E27FC236}">
+                <a16:creationId xmlns:a16="http://schemas.microsoft.com/office/drawing/2014/main" id="{485F5F6B-8AFC-951D-3017-E439F49161CE}"/>
+              </a:ext>
+            </a:extLst>
+          </p:cNvPr>
+          <p:cNvCxnSpPr>
+            <a:cxnSpLocks/>
+            <a:endCxn id="45" idx="3"/>
+          </p:cNvCxnSpPr>
+          <p:nvPr/>
+        </p:nvCxnSpPr>
+        <p:spPr>
+          <a:xfrm rot="10800000" flipV="1">
+            <a:off x="2447516" y="2926015"/>
+            <a:ext cx="1228373" cy="1057867"/>
+          </a:xfrm>
+          <a:prstGeom prst="bentConnector3">
+            <a:avLst>
+              <a:gd name="adj1" fmla="val 125"/>
+            </a:avLst>
+          </a:prstGeom>
+          <a:ln>
+            <a:solidFill>
+              <a:schemeClr val="accent6">
+                <a:lumMod val="75000"/>
+              </a:schemeClr>
+            </a:solidFill>
+          </a:ln>
+        </p:spPr>
+        <p:style>
+          <a:lnRef idx="2">
+            <a:schemeClr val="accent1"/>
+          </a:lnRef>
+          <a:fillRef idx="0">
+            <a:schemeClr val="accent1"/>
+          </a:fillRef>
+          <a:effectRef idx="1">
+            <a:schemeClr val="accent1"/>
+          </a:effectRef>
+          <a:fontRef idx="minor">
+            <a:schemeClr val="tx1"/>
+          </a:fontRef>
+        </p:style>
+      </p:cxnSp>
+      <p:cxnSp>
+        <p:nvCxnSpPr>
+          <p:cNvPr id="49" name="Connector: Elbow 48">
+            <a:extLst>
+              <a:ext uri="{FF2B5EF4-FFF2-40B4-BE49-F238E27FC236}">
+                <a16:creationId xmlns:a16="http://schemas.microsoft.com/office/drawing/2014/main" id="{98C2932B-862B-AE21-E3F1-8D9D19F28311}"/>
+              </a:ext>
+            </a:extLst>
+          </p:cNvPr>
+          <p:cNvCxnSpPr>
+            <a:cxnSpLocks/>
+          </p:cNvCxnSpPr>
+          <p:nvPr/>
+        </p:nvCxnSpPr>
+        <p:spPr>
+          <a:xfrm rot="5400000" flipH="1" flipV="1">
+            <a:off x="2320794" y="2900214"/>
+            <a:ext cx="1001290" cy="747844"/>
+          </a:xfrm>
+          <a:prstGeom prst="bentConnector3">
+            <a:avLst>
+              <a:gd name="adj1" fmla="val 1599"/>
+            </a:avLst>
+          </a:prstGeom>
+          <a:ln>
+            <a:solidFill>
+              <a:srgbClr val="C00000"/>
+            </a:solidFill>
+          </a:ln>
+        </p:spPr>
+        <p:style>
+          <a:lnRef idx="2">
+            <a:schemeClr val="accent1"/>
+          </a:lnRef>
+          <a:fillRef idx="0">
+            <a:schemeClr val="accent1"/>
+          </a:fillRef>
+          <a:effectRef idx="1">
+            <a:schemeClr val="accent1"/>
+          </a:effectRef>
+          <a:fontRef idx="minor">
+            <a:schemeClr val="tx1"/>
+          </a:fontRef>
+        </p:style>
+      </p:cxnSp>
+      <p:cxnSp>
+        <p:nvCxnSpPr>
+          <p:cNvPr id="56" name="Straight Connector 55">
+            <a:extLst>
+              <a:ext uri="{FF2B5EF4-FFF2-40B4-BE49-F238E27FC236}">
+                <a16:creationId xmlns:a16="http://schemas.microsoft.com/office/drawing/2014/main" id="{9C1BC191-8679-9556-A8D0-606E91BCAB7D}"/>
+              </a:ext>
+            </a:extLst>
+          </p:cNvPr>
+          <p:cNvCxnSpPr>
+            <a:cxnSpLocks/>
+          </p:cNvCxnSpPr>
+          <p:nvPr/>
+        </p:nvCxnSpPr>
+        <p:spPr>
+          <a:xfrm>
+            <a:off x="2368980" y="4225630"/>
+            <a:ext cx="0" cy="840144"/>
+          </a:xfrm>
+          <a:prstGeom prst="line">
+            <a:avLst/>
+          </a:prstGeom>
+          <a:ln>
+            <a:solidFill>
+              <a:srgbClr val="C00000"/>
+            </a:solidFill>
+          </a:ln>
+        </p:spPr>
+        <p:style>
+          <a:lnRef idx="2">
+            <a:schemeClr val="accent1"/>
+          </a:lnRef>
+          <a:fillRef idx="0">
+            <a:schemeClr val="accent1"/>
+          </a:fillRef>
+          <a:effectRef idx="1">
+            <a:schemeClr val="accent1"/>
+          </a:effectRef>
+          <a:fontRef idx="minor">
+            <a:schemeClr val="tx1"/>
+          </a:fontRef>
+        </p:style>
+      </p:cxnSp>
+      <p:cxnSp>
+        <p:nvCxnSpPr>
+          <p:cNvPr id="59" name="Connector: Elbow 58">
+            <a:extLst>
+              <a:ext uri="{FF2B5EF4-FFF2-40B4-BE49-F238E27FC236}">
+                <a16:creationId xmlns:a16="http://schemas.microsoft.com/office/drawing/2014/main" id="{FD7DAD94-6CA3-90A3-CF79-9E590212BB52}"/>
+              </a:ext>
+            </a:extLst>
+          </p:cNvPr>
+          <p:cNvCxnSpPr>
+            <a:cxnSpLocks/>
+          </p:cNvCxnSpPr>
+          <p:nvPr/>
+        </p:nvCxnSpPr>
+        <p:spPr>
+          <a:xfrm>
+            <a:off x="2401454" y="4178187"/>
+            <a:ext cx="6115369" cy="1033893"/>
+          </a:xfrm>
+          <a:prstGeom prst="bentConnector3">
+            <a:avLst>
+              <a:gd name="adj1" fmla="val 50000"/>
+            </a:avLst>
+          </a:prstGeom>
+          <a:ln>
+            <a:solidFill>
+              <a:srgbClr val="C00000"/>
+            </a:solidFill>
+          </a:ln>
+        </p:spPr>
+        <p:style>
+          <a:lnRef idx="2">
+            <a:schemeClr val="accent1"/>
+          </a:lnRef>
+          <a:fillRef idx="0">
+            <a:schemeClr val="accent1"/>
+          </a:fillRef>
+          <a:effectRef idx="1">
+            <a:schemeClr val="accent1"/>
+          </a:effectRef>
+          <a:fontRef idx="minor">
+            <a:schemeClr val="tx1"/>
+          </a:fontRef>
+        </p:style>
+      </p:cxnSp>
+      <p:sp>
+        <p:nvSpPr>
+          <p:cNvPr id="63" name="TextBox 62">
+            <a:extLst>
+              <a:ext uri="{FF2B5EF4-FFF2-40B4-BE49-F238E27FC236}">
+                <a16:creationId xmlns:a16="http://schemas.microsoft.com/office/drawing/2014/main" id="{1B12D4FC-7282-10D8-6243-02D499FA600E}"/>
+              </a:ext>
+            </a:extLst>
+          </p:cNvPr>
+          <p:cNvSpPr txBox="1"/>
+          <p:nvPr/>
+        </p:nvSpPr>
+        <p:spPr>
+          <a:xfrm>
+            <a:off x="4738332" y="1197149"/>
+            <a:ext cx="720806" cy="307777"/>
+          </a:xfrm>
+          <a:prstGeom prst="rect">
+            <a:avLst/>
+          </a:prstGeom>
+          <a:noFill/>
+        </p:spPr>
+        <p:txBody>
+          <a:bodyPr wrap="square" rtlCol="0">
+            <a:spAutoFit/>
+          </a:bodyPr>
+          <a:lstStyle/>
+          <a:p>
+            <a:r>
+              <a:rPr lang="en-US" sz="1400" b="1" dirty="0">
+                <a:solidFill>
+                  <a:srgbClr val="C00000"/>
+                </a:solidFill>
+              </a:rPr>
+              <a:t>PLC2</a:t>
+            </a:r>
+            <a:endParaRPr lang="en-SG" sz="1400" b="1" dirty="0">
+              <a:solidFill>
+                <a:srgbClr val="C00000"/>
+              </a:solidFill>
+            </a:endParaRPr>
+          </a:p>
+        </p:txBody>
+      </p:sp>
+      <p:sp>
+        <p:nvSpPr>
+          <p:cNvPr id="64" name="TextBox 63">
+            <a:extLst>
+              <a:ext uri="{FF2B5EF4-FFF2-40B4-BE49-F238E27FC236}">
+                <a16:creationId xmlns:a16="http://schemas.microsoft.com/office/drawing/2014/main" id="{85F1A20D-6E69-4CCC-D612-5076FB3C48BD}"/>
+              </a:ext>
+            </a:extLst>
+          </p:cNvPr>
+          <p:cNvSpPr txBox="1"/>
+          <p:nvPr/>
+        </p:nvSpPr>
+        <p:spPr>
+          <a:xfrm>
+            <a:off x="8516146" y="3744255"/>
+            <a:ext cx="720806" cy="307777"/>
+          </a:xfrm>
+          <a:prstGeom prst="rect">
+            <a:avLst/>
+          </a:prstGeom>
+          <a:noFill/>
+        </p:spPr>
+        <p:txBody>
+          <a:bodyPr wrap="square" rtlCol="0">
+            <a:spAutoFit/>
+          </a:bodyPr>
+          <a:lstStyle/>
+          <a:p>
+            <a:r>
+              <a:rPr lang="en-US" sz="1400" b="1" dirty="0">
+                <a:solidFill>
+                  <a:srgbClr val="C00000"/>
+                </a:solidFill>
+              </a:rPr>
+              <a:t>PLC1</a:t>
+            </a:r>
+            <a:endParaRPr lang="en-SG" sz="1400" b="1" dirty="0">
+              <a:solidFill>
+                <a:srgbClr val="C00000"/>
+              </a:solidFill>
+            </a:endParaRPr>
+          </a:p>
+        </p:txBody>
+      </p:sp>
+      <p:sp>
+        <p:nvSpPr>
+          <p:cNvPr id="65" name="TextBox 64">
+            <a:extLst>
+              <a:ext uri="{FF2B5EF4-FFF2-40B4-BE49-F238E27FC236}">
+                <a16:creationId xmlns:a16="http://schemas.microsoft.com/office/drawing/2014/main" id="{D5BA2788-A086-74DF-3E15-D5460526231A}"/>
+              </a:ext>
+            </a:extLst>
+          </p:cNvPr>
+          <p:cNvSpPr txBox="1"/>
+          <p:nvPr/>
+        </p:nvSpPr>
+        <p:spPr>
+          <a:xfrm>
+            <a:off x="1635009" y="4225630"/>
+            <a:ext cx="612443" cy="307777"/>
+          </a:xfrm>
+          <a:prstGeom prst="rect">
+            <a:avLst/>
+          </a:prstGeom>
+          <a:noFill/>
+        </p:spPr>
+        <p:txBody>
+          <a:bodyPr wrap="square" rtlCol="0">
+            <a:spAutoFit/>
+          </a:bodyPr>
+          <a:lstStyle/>
+          <a:p>
+            <a:r>
+              <a:rPr lang="en-US" sz="1400" b="1" dirty="0">
+                <a:solidFill>
+                  <a:srgbClr val="C00000"/>
+                </a:solidFill>
+              </a:rPr>
+              <a:t>PLC0</a:t>
+            </a:r>
+            <a:endParaRPr lang="en-SG" sz="1400" b="1" dirty="0">
+              <a:solidFill>
+                <a:srgbClr val="C00000"/>
+              </a:solidFill>
+            </a:endParaRPr>
+          </a:p>
+        </p:txBody>
+      </p:sp>
+      <p:cxnSp>
+        <p:nvCxnSpPr>
+          <p:cNvPr id="71" name="Straight Connector 70">
+            <a:extLst>
+              <a:ext uri="{FF2B5EF4-FFF2-40B4-BE49-F238E27FC236}">
+                <a16:creationId xmlns:a16="http://schemas.microsoft.com/office/drawing/2014/main" id="{64A66C3E-65EF-714A-DE82-2D3C862DF12F}"/>
+              </a:ext>
+            </a:extLst>
+          </p:cNvPr>
+          <p:cNvCxnSpPr>
+            <a:cxnSpLocks/>
+          </p:cNvCxnSpPr>
+          <p:nvPr/>
+        </p:nvCxnSpPr>
+        <p:spPr>
+          <a:xfrm>
+            <a:off x="2211168" y="4196475"/>
+            <a:ext cx="0" cy="1033893"/>
+          </a:xfrm>
+          <a:prstGeom prst="line">
+            <a:avLst/>
+          </a:prstGeom>
+          <a:ln>
+            <a:solidFill>
+              <a:srgbClr val="C00000"/>
+            </a:solidFill>
+          </a:ln>
+        </p:spPr>
+        <p:style>
+          <a:lnRef idx="2">
+            <a:schemeClr val="accent1"/>
+          </a:lnRef>
+          <a:fillRef idx="0">
+            <a:schemeClr val="accent1"/>
+          </a:fillRef>
+          <a:effectRef idx="1">
+            <a:schemeClr val="accent1"/>
+          </a:effectRef>
+          <a:fontRef idx="minor">
+            <a:schemeClr val="tx1"/>
+          </a:fontRef>
+        </p:style>
+      </p:cxnSp>
+    </p:spTree>
+    <p:extLst>
+      <p:ext uri="{BB962C8B-B14F-4D97-AF65-F5344CB8AC3E}">
+        <p14:creationId xmlns:p14="http://schemas.microsoft.com/office/powerpoint/2010/main" val="2293313693"/>
+      </p:ext>
+    </p:extLst>
+  </p:cSld>
+  <p:clrMapOvr>
+    <a:masterClrMapping/>
+  </p:clrMapOvr>
+</p:sld>
+</file>
+
+<file path=ppt/slides/slide5.xml><?xml version="1.0" encoding="utf-8"?>
+<p:sld xmlns:a="http://schemas.openxmlformats.org/drawingml/2006/main" xmlns:r="http://schemas.openxmlformats.org/officeDocument/2006/relationships" xmlns:p="http://schemas.openxmlformats.org/presentationml/2006/main">
+  <p:cSld>
+    <p:spTree>
+      <p:nvGrpSpPr>
+        <p:cNvPr id="1" name=""/>
+        <p:cNvGrpSpPr/>
+        <p:nvPr/>
+      </p:nvGrpSpPr>
+      <p:grpSpPr>
+        <a:xfrm>
+          <a:off x="0" y="0"/>
+          <a:ext cx="0" cy="0"/>
+          <a:chOff x="0" y="0"/>
+          <a:chExt cx="0" cy="0"/>
+        </a:xfrm>
+      </p:grpSpPr>
+      <p:cxnSp>
+        <p:nvCxnSpPr>
+          <p:cNvPr id="4" name="Straight Connector 3">
+            <a:extLst>
+              <a:ext uri="{FF2B5EF4-FFF2-40B4-BE49-F238E27FC236}">
+                <a16:creationId xmlns:a16="http://schemas.microsoft.com/office/drawing/2014/main" id="{FF79B4AB-F08B-0E71-D982-9DDDBD079ADE}"/>
+              </a:ext>
+            </a:extLst>
+          </p:cNvPr>
+          <p:cNvCxnSpPr>
+            <a:cxnSpLocks/>
+          </p:cNvCxnSpPr>
+          <p:nvPr/>
+        </p:nvCxnSpPr>
+        <p:spPr>
+          <a:xfrm>
+            <a:off x="1399916" y="3285383"/>
+            <a:ext cx="3214892" cy="0"/>
+          </a:xfrm>
+          <a:prstGeom prst="line">
+            <a:avLst/>
+          </a:prstGeom>
+        </p:spPr>
+        <p:style>
+          <a:lnRef idx="2">
+            <a:schemeClr val="accent1"/>
+          </a:lnRef>
+          <a:fillRef idx="0">
+            <a:schemeClr val="accent1"/>
+          </a:fillRef>
+          <a:effectRef idx="1">
+            <a:schemeClr val="accent1"/>
+          </a:effectRef>
+          <a:fontRef idx="minor">
+            <a:schemeClr val="tx1"/>
+          </a:fontRef>
+        </p:style>
+      </p:cxnSp>
+      <p:pic>
+        <p:nvPicPr>
+          <p:cNvPr id="36" name="Picture 35">
+            <a:extLst>
+              <a:ext uri="{FF2B5EF4-FFF2-40B4-BE49-F238E27FC236}">
+                <a16:creationId xmlns:a16="http://schemas.microsoft.com/office/drawing/2014/main" id="{1E17BD5C-C882-F621-9F57-223DCD4833A0}"/>
+              </a:ext>
+            </a:extLst>
+          </p:cNvPr>
+          <p:cNvPicPr>
+            <a:picLocks noChangeAspect="1"/>
+          </p:cNvPicPr>
+          <p:nvPr/>
+        </p:nvPicPr>
+        <p:blipFill>
+          <a:blip r:embed="rId2">
+            <a:extLst>
+              <a:ext uri="{28A0092B-C50C-407E-A947-70E740481C1C}">
+                <a14:useLocalDpi xmlns:a14="http://schemas.microsoft.com/office/drawing/2010/main" val="0"/>
+              </a:ext>
+            </a:extLst>
+          </a:blip>
+          <a:stretch>
+            <a:fillRect/>
+          </a:stretch>
+        </p:blipFill>
+        <p:spPr>
+          <a:xfrm>
+            <a:off x="1052402" y="3105190"/>
+            <a:ext cx="409524" cy="323810"/>
+          </a:xfrm>
+          <a:prstGeom prst="rect">
+            <a:avLst/>
+          </a:prstGeom>
+        </p:spPr>
+      </p:pic>
+      <p:sp>
+        <p:nvSpPr>
+          <p:cNvPr id="37" name="TextBox 36">
+            <a:extLst>
+              <a:ext uri="{FF2B5EF4-FFF2-40B4-BE49-F238E27FC236}">
+                <a16:creationId xmlns:a16="http://schemas.microsoft.com/office/drawing/2014/main" id="{D168C32B-E695-BF92-86BC-184F5AFA4A7A}"/>
+              </a:ext>
+            </a:extLst>
+          </p:cNvPr>
+          <p:cNvSpPr txBox="1"/>
+          <p:nvPr/>
+        </p:nvSpPr>
+        <p:spPr>
+          <a:xfrm>
+            <a:off x="881986" y="2583995"/>
+            <a:ext cx="1159879" cy="646331"/>
+          </a:xfrm>
+          <a:prstGeom prst="rect">
+            <a:avLst/>
+          </a:prstGeom>
+          <a:noFill/>
+        </p:spPr>
+        <p:txBody>
+          <a:bodyPr wrap="square" rtlCol="0">
+            <a:spAutoFit/>
+          </a:bodyPr>
+          <a:lstStyle/>
+          <a:p>
+            <a:r>
+              <a:rPr lang="en-US" sz="1200" b="1" dirty="0"/>
+              <a:t>%M [000002] </a:t>
+            </a:r>
+          </a:p>
+          <a:p>
+            <a:r>
+              <a:rPr lang="en-US" sz="1200" b="1" dirty="0"/>
+              <a:t>Train sensor 1</a:t>
+            </a:r>
+            <a:endParaRPr lang="en-SG" sz="1200" b="1" dirty="0"/>
+          </a:p>
+          <a:p>
+            <a:endParaRPr lang="en-SG" sz="1200" b="1" dirty="0"/>
+          </a:p>
+        </p:txBody>
+      </p:sp>
+      <p:sp>
+        <p:nvSpPr>
+          <p:cNvPr id="40" name="TextBox 39">
+            <a:extLst>
+              <a:ext uri="{FF2B5EF4-FFF2-40B4-BE49-F238E27FC236}">
+                <a16:creationId xmlns:a16="http://schemas.microsoft.com/office/drawing/2014/main" id="{2612960D-63AC-7A82-8B44-63BC2287D483}"/>
+              </a:ext>
+            </a:extLst>
+          </p:cNvPr>
+          <p:cNvSpPr txBox="1"/>
+          <p:nvPr/>
+        </p:nvSpPr>
+        <p:spPr>
+          <a:xfrm>
+            <a:off x="881986" y="1733798"/>
+            <a:ext cx="1633189" cy="461665"/>
+          </a:xfrm>
+          <a:prstGeom prst="rect">
+            <a:avLst/>
+          </a:prstGeom>
+          <a:noFill/>
+        </p:spPr>
+        <p:txBody>
+          <a:bodyPr wrap="square" rtlCol="0">
+            <a:spAutoFit/>
+          </a:bodyPr>
+          <a:lstStyle/>
+          <a:p>
+            <a:r>
+              <a:rPr lang="en-US" sz="1200" b="1" dirty="0"/>
+              <a:t>%C [000011] </a:t>
+            </a:r>
+          </a:p>
+          <a:p>
+            <a:r>
+              <a:rPr lang="en-SG" sz="1200" b="1" dirty="0"/>
+              <a:t>HMI Overload Switch </a:t>
+            </a:r>
+          </a:p>
+        </p:txBody>
+      </p:sp>
+      <p:pic>
+        <p:nvPicPr>
+          <p:cNvPr id="41" name="Picture 40">
+            <a:extLst>
+              <a:ext uri="{FF2B5EF4-FFF2-40B4-BE49-F238E27FC236}">
+                <a16:creationId xmlns:a16="http://schemas.microsoft.com/office/drawing/2014/main" id="{3A558ECB-38CF-FF71-49C1-086C0BF1F146}"/>
+              </a:ext>
+            </a:extLst>
+          </p:cNvPr>
+          <p:cNvPicPr>
+            <a:picLocks noChangeAspect="1"/>
+          </p:cNvPicPr>
+          <p:nvPr/>
+        </p:nvPicPr>
+        <p:blipFill>
+          <a:blip r:embed="rId3">
+            <a:extLst>
+              <a:ext uri="{28A0092B-C50C-407E-A947-70E740481C1C}">
+                <a14:useLocalDpi xmlns:a14="http://schemas.microsoft.com/office/drawing/2010/main" val="0"/>
+              </a:ext>
+            </a:extLst>
+          </a:blip>
+          <a:stretch>
+            <a:fillRect/>
+          </a:stretch>
+        </p:blipFill>
+        <p:spPr>
+          <a:xfrm>
+            <a:off x="1052401" y="2195463"/>
+            <a:ext cx="409524" cy="323810"/>
+          </a:xfrm>
+          <a:prstGeom prst="rect">
+            <a:avLst/>
+          </a:prstGeom>
+        </p:spPr>
+      </p:pic>
+      <p:cxnSp>
+        <p:nvCxnSpPr>
+          <p:cNvPr id="42" name="Straight Connector 41">
+            <a:extLst>
+              <a:ext uri="{FF2B5EF4-FFF2-40B4-BE49-F238E27FC236}">
+                <a16:creationId xmlns:a16="http://schemas.microsoft.com/office/drawing/2014/main" id="{E05D59F4-52E3-601E-8317-8D9C0A0BAFF4}"/>
+              </a:ext>
+            </a:extLst>
+          </p:cNvPr>
+          <p:cNvCxnSpPr>
+            <a:cxnSpLocks/>
+          </p:cNvCxnSpPr>
+          <p:nvPr/>
+        </p:nvCxnSpPr>
+        <p:spPr>
+          <a:xfrm>
+            <a:off x="1461925" y="2357368"/>
+            <a:ext cx="3214892" cy="0"/>
+          </a:xfrm>
+          <a:prstGeom prst="line">
+            <a:avLst/>
+          </a:prstGeom>
+        </p:spPr>
+        <p:style>
+          <a:lnRef idx="2">
+            <a:schemeClr val="accent1"/>
+          </a:lnRef>
+          <a:fillRef idx="0">
+            <a:schemeClr val="accent1"/>
+          </a:fillRef>
+          <a:effectRef idx="1">
+            <a:schemeClr val="accent1"/>
+          </a:effectRef>
+          <a:fontRef idx="minor">
+            <a:schemeClr val="tx1"/>
+          </a:fontRef>
+        </p:style>
+      </p:cxnSp>
+      <p:sp>
+        <p:nvSpPr>
+          <p:cNvPr id="43" name="Rectangle 42">
+            <a:extLst>
+              <a:ext uri="{FF2B5EF4-FFF2-40B4-BE49-F238E27FC236}">
+                <a16:creationId xmlns:a16="http://schemas.microsoft.com/office/drawing/2014/main" id="{8BCC26D5-74CA-B935-2906-A0A62996824A}"/>
+              </a:ext>
+            </a:extLst>
+          </p:cNvPr>
+          <p:cNvSpPr/>
+          <p:nvPr/>
+        </p:nvSpPr>
+        <p:spPr>
+          <a:xfrm>
+            <a:off x="4676817" y="2206629"/>
+            <a:ext cx="2172039" cy="1222371"/>
+          </a:xfrm>
+          <a:prstGeom prst="rect">
+            <a:avLst/>
+          </a:prstGeom>
+          <a:solidFill>
+            <a:schemeClr val="bg1"/>
+          </a:solidFill>
+          <a:ln>
+            <a:solidFill>
+              <a:schemeClr val="tx1"/>
+            </a:solidFill>
+          </a:ln>
+        </p:spPr>
+        <p:style>
+          <a:lnRef idx="2">
+            <a:schemeClr val="accent1">
+              <a:shade val="50000"/>
+            </a:schemeClr>
+          </a:lnRef>
+          <a:fillRef idx="1">
+            <a:schemeClr val="accent1"/>
+          </a:fillRef>
+          <a:effectRef idx="0">
+            <a:schemeClr val="accent1"/>
+          </a:effectRef>
+          <a:fontRef idx="minor">
+            <a:schemeClr val="lt1"/>
+          </a:fontRef>
+        </p:style>
+        <p:txBody>
+          <a:bodyPr rtlCol="0" anchor="ctr"/>
+          <a:lstStyle/>
+          <a:p>
+            <a:r>
+              <a:rPr lang="en-US" sz="1050" b="1" dirty="0">
+                <a:solidFill>
+                  <a:schemeClr val="tx1"/>
+                </a:solidFill>
+              </a:rPr>
+              <a:t>IF IN_STATE1 == STEP.HIGHER</a:t>
+            </a:r>
+          </a:p>
+          <a:p>
+            <a:r>
+              <a:rPr lang="en-US" sz="1050" b="1" dirty="0">
+                <a:solidFill>
+                  <a:schemeClr val="tx1"/>
+                </a:solidFill>
+              </a:rPr>
+              <a:t>  OUT =  TRUE</a:t>
+            </a:r>
+          </a:p>
+          <a:p>
+            <a:r>
+              <a:rPr lang="en-US" sz="1050" b="1" dirty="0">
+                <a:solidFill>
+                  <a:schemeClr val="tx1"/>
+                </a:solidFill>
+              </a:rPr>
+              <a:t>ELIF IN_STATA1 == STEP.LOWER</a:t>
+            </a:r>
+          </a:p>
+          <a:p>
+            <a:r>
+              <a:rPr lang="en-US" sz="1050" b="1" dirty="0">
+                <a:solidFill>
+                  <a:schemeClr val="tx1"/>
+                </a:solidFill>
+              </a:rPr>
+              <a:t>  OUT  = FALSE</a:t>
+            </a:r>
+          </a:p>
+          <a:p>
+            <a:r>
+              <a:rPr lang="en-US" sz="1050" b="1" dirty="0">
+                <a:solidFill>
+                  <a:schemeClr val="tx1"/>
+                </a:solidFill>
+              </a:rPr>
+              <a:t>ELSE</a:t>
+            </a:r>
+          </a:p>
+          <a:p>
+            <a:r>
+              <a:rPr lang="en-US" sz="1050" b="1" dirty="0">
+                <a:solidFill>
+                  <a:schemeClr val="tx1"/>
+                </a:solidFill>
+              </a:rPr>
+              <a:t>  OUT = IN_STATE2</a:t>
+            </a:r>
+          </a:p>
+          <a:p>
+            <a:r>
+              <a:rPr lang="en-US" sz="1050" b="1" dirty="0">
+                <a:solidFill>
+                  <a:schemeClr val="tx1"/>
+                </a:solidFill>
+              </a:rPr>
+              <a:t>END IF </a:t>
+            </a:r>
+          </a:p>
+        </p:txBody>
+      </p:sp>
+      <p:sp>
+        <p:nvSpPr>
+          <p:cNvPr id="44" name="TextBox 43">
+            <a:extLst>
+              <a:ext uri="{FF2B5EF4-FFF2-40B4-BE49-F238E27FC236}">
+                <a16:creationId xmlns:a16="http://schemas.microsoft.com/office/drawing/2014/main" id="{A47AE6F3-C103-4160-9C54-BF31B6844D79}"/>
+              </a:ext>
+            </a:extLst>
+          </p:cNvPr>
+          <p:cNvSpPr txBox="1"/>
+          <p:nvPr/>
+        </p:nvSpPr>
+        <p:spPr>
+          <a:xfrm>
+            <a:off x="3861371" y="2111147"/>
+            <a:ext cx="815445" cy="246221"/>
+          </a:xfrm>
+          <a:prstGeom prst="rect">
+            <a:avLst/>
+          </a:prstGeom>
+          <a:noFill/>
+        </p:spPr>
+        <p:txBody>
+          <a:bodyPr wrap="square" rtlCol="0">
+            <a:spAutoFit/>
+          </a:bodyPr>
+          <a:lstStyle/>
+          <a:p>
+            <a:r>
+              <a:rPr lang="en-US" sz="1000" b="1" dirty="0">
+                <a:solidFill>
+                  <a:schemeClr val="tx2">
+                    <a:lumMod val="90000"/>
+                    <a:lumOff val="10000"/>
+                  </a:schemeClr>
+                </a:solidFill>
+              </a:rPr>
+              <a:t>IN_STATE1 </a:t>
+            </a:r>
+            <a:endParaRPr lang="en-SG" sz="1000" b="1" dirty="0">
+              <a:solidFill>
+                <a:schemeClr val="tx2">
+                  <a:lumMod val="90000"/>
+                  <a:lumOff val="10000"/>
+                </a:schemeClr>
+              </a:solidFill>
+            </a:endParaRPr>
+          </a:p>
+        </p:txBody>
+      </p:sp>
+      <p:sp>
+        <p:nvSpPr>
+          <p:cNvPr id="45" name="TextBox 44">
+            <a:extLst>
+              <a:ext uri="{FF2B5EF4-FFF2-40B4-BE49-F238E27FC236}">
+                <a16:creationId xmlns:a16="http://schemas.microsoft.com/office/drawing/2014/main" id="{46619FE8-A7E7-3B9E-A047-C676FAFA6399}"/>
+              </a:ext>
+            </a:extLst>
+          </p:cNvPr>
+          <p:cNvSpPr txBox="1"/>
+          <p:nvPr/>
+        </p:nvSpPr>
+        <p:spPr>
+          <a:xfrm>
+            <a:off x="3865603" y="3023994"/>
+            <a:ext cx="815445" cy="246221"/>
+          </a:xfrm>
+          <a:prstGeom prst="rect">
+            <a:avLst/>
+          </a:prstGeom>
+          <a:noFill/>
+        </p:spPr>
+        <p:txBody>
+          <a:bodyPr wrap="square" rtlCol="0">
+            <a:spAutoFit/>
+          </a:bodyPr>
+          <a:lstStyle/>
+          <a:p>
+            <a:r>
+              <a:rPr lang="en-US" sz="1000" b="1" dirty="0">
+                <a:solidFill>
+                  <a:schemeClr val="tx2">
+                    <a:lumMod val="90000"/>
+                    <a:lumOff val="10000"/>
+                  </a:schemeClr>
+                </a:solidFill>
+              </a:rPr>
+              <a:t>IN_STATE2 </a:t>
+            </a:r>
+            <a:endParaRPr lang="en-SG" sz="1000" b="1" dirty="0">
+              <a:solidFill>
+                <a:schemeClr val="tx2">
+                  <a:lumMod val="90000"/>
+                  <a:lumOff val="10000"/>
+                </a:schemeClr>
+              </a:solidFill>
+            </a:endParaRPr>
+          </a:p>
+        </p:txBody>
+      </p:sp>
+      <p:cxnSp>
+        <p:nvCxnSpPr>
+          <p:cNvPr id="46" name="Straight Connector 45">
+            <a:extLst>
+              <a:ext uri="{FF2B5EF4-FFF2-40B4-BE49-F238E27FC236}">
+                <a16:creationId xmlns:a16="http://schemas.microsoft.com/office/drawing/2014/main" id="{040C97CF-ABBC-4AA9-C697-54B2EC0571D5}"/>
+              </a:ext>
+            </a:extLst>
+          </p:cNvPr>
+          <p:cNvCxnSpPr>
+            <a:cxnSpLocks/>
+          </p:cNvCxnSpPr>
+          <p:nvPr/>
+        </p:nvCxnSpPr>
+        <p:spPr>
+          <a:xfrm>
+            <a:off x="6848856" y="3248614"/>
+            <a:ext cx="1307592" cy="0"/>
+          </a:xfrm>
+          <a:prstGeom prst="line">
+            <a:avLst/>
+          </a:prstGeom>
+        </p:spPr>
+        <p:style>
+          <a:lnRef idx="2">
+            <a:schemeClr val="accent1"/>
+          </a:lnRef>
+          <a:fillRef idx="0">
+            <a:schemeClr val="accent1"/>
+          </a:fillRef>
+          <a:effectRef idx="1">
+            <a:schemeClr val="accent1"/>
+          </a:effectRef>
+          <a:fontRef idx="minor">
+            <a:schemeClr val="tx1"/>
+          </a:fontRef>
+        </p:style>
+      </p:cxnSp>
+      <p:sp>
+        <p:nvSpPr>
+          <p:cNvPr id="48" name="TextBox 47">
+            <a:extLst>
+              <a:ext uri="{FF2B5EF4-FFF2-40B4-BE49-F238E27FC236}">
+                <a16:creationId xmlns:a16="http://schemas.microsoft.com/office/drawing/2014/main" id="{1EC871D0-047A-82CB-E7A5-25B312F6AB0D}"/>
+              </a:ext>
+            </a:extLst>
+          </p:cNvPr>
+          <p:cNvSpPr txBox="1"/>
+          <p:nvPr/>
+        </p:nvSpPr>
+        <p:spPr>
+          <a:xfrm>
+            <a:off x="6802811" y="3023994"/>
+            <a:ext cx="462557" cy="246221"/>
+          </a:xfrm>
+          <a:prstGeom prst="rect">
+            <a:avLst/>
+          </a:prstGeom>
+          <a:noFill/>
+        </p:spPr>
+        <p:txBody>
+          <a:bodyPr wrap="square" rtlCol="0">
+            <a:spAutoFit/>
+          </a:bodyPr>
+          <a:lstStyle/>
+          <a:p>
+            <a:r>
+              <a:rPr lang="en-US" sz="1000" b="1" dirty="0">
+                <a:solidFill>
+                  <a:schemeClr val="tx2">
+                    <a:lumMod val="90000"/>
+                    <a:lumOff val="10000"/>
+                  </a:schemeClr>
+                </a:solidFill>
+              </a:rPr>
+              <a:t>OUT</a:t>
+            </a:r>
+            <a:endParaRPr lang="en-SG" sz="1000" b="1" dirty="0">
+              <a:solidFill>
+                <a:schemeClr val="tx2">
+                  <a:lumMod val="90000"/>
+                  <a:lumOff val="10000"/>
+                </a:schemeClr>
+              </a:solidFill>
+            </a:endParaRPr>
+          </a:p>
+        </p:txBody>
+      </p:sp>
+      <p:pic>
+        <p:nvPicPr>
+          <p:cNvPr id="50" name="Picture 49">
+            <a:extLst>
+              <a:ext uri="{FF2B5EF4-FFF2-40B4-BE49-F238E27FC236}">
+                <a16:creationId xmlns:a16="http://schemas.microsoft.com/office/drawing/2014/main" id="{4ECBB904-4ECA-85C8-B4BA-BF010243F1D4}"/>
+              </a:ext>
+            </a:extLst>
+          </p:cNvPr>
+          <p:cNvPicPr>
+            <a:picLocks noChangeAspect="1"/>
+          </p:cNvPicPr>
+          <p:nvPr/>
+        </p:nvPicPr>
+        <p:blipFill>
+          <a:blip r:embed="rId3">
+            <a:extLst>
+              <a:ext uri="{28A0092B-C50C-407E-A947-70E740481C1C}">
+                <a14:useLocalDpi xmlns:a14="http://schemas.microsoft.com/office/drawing/2010/main" val="0"/>
+              </a:ext>
+            </a:extLst>
+          </a:blip>
+          <a:stretch>
+            <a:fillRect/>
+          </a:stretch>
+        </p:blipFill>
+        <p:spPr>
+          <a:xfrm>
+            <a:off x="8156448" y="3086709"/>
+            <a:ext cx="409524" cy="323810"/>
+          </a:xfrm>
+          <a:prstGeom prst="rect">
+            <a:avLst/>
+          </a:prstGeom>
+        </p:spPr>
+      </p:pic>
+      <p:sp>
+        <p:nvSpPr>
+          <p:cNvPr id="51" name="TextBox 50">
+            <a:extLst>
+              <a:ext uri="{FF2B5EF4-FFF2-40B4-BE49-F238E27FC236}">
+                <a16:creationId xmlns:a16="http://schemas.microsoft.com/office/drawing/2014/main" id="{53CA5ACE-59AF-1990-F368-847D75A9DF9D}"/>
+              </a:ext>
+            </a:extLst>
+          </p:cNvPr>
+          <p:cNvSpPr txBox="1"/>
+          <p:nvPr/>
+        </p:nvSpPr>
+        <p:spPr>
+          <a:xfrm>
+            <a:off x="7437649" y="2603444"/>
+            <a:ext cx="1847122" cy="461665"/>
+          </a:xfrm>
+          <a:prstGeom prst="rect">
+            <a:avLst/>
+          </a:prstGeom>
+          <a:noFill/>
+        </p:spPr>
+        <p:txBody>
+          <a:bodyPr wrap="square" rtlCol="0">
+            <a:spAutoFit/>
+          </a:bodyPr>
+          <a:lstStyle/>
+          <a:p>
+            <a:r>
+              <a:rPr lang="en-US" sz="1200" b="1" dirty="0"/>
+              <a:t>%M  [000005] </a:t>
+            </a:r>
+          </a:p>
+          <a:p>
+            <a:r>
+              <a:rPr lang="en-US" sz="1200" b="1" dirty="0"/>
+              <a:t>Entrance Dock Signals</a:t>
+            </a:r>
+          </a:p>
+        </p:txBody>
+      </p:sp>
+      <p:cxnSp>
+        <p:nvCxnSpPr>
+          <p:cNvPr id="52" name="Straight Connector 51">
+            <a:extLst>
+              <a:ext uri="{FF2B5EF4-FFF2-40B4-BE49-F238E27FC236}">
+                <a16:creationId xmlns:a16="http://schemas.microsoft.com/office/drawing/2014/main" id="{498D0110-DDFF-4171-BFF9-F3754A7110E9}"/>
+              </a:ext>
+            </a:extLst>
+          </p:cNvPr>
+          <p:cNvCxnSpPr>
+            <a:cxnSpLocks/>
+          </p:cNvCxnSpPr>
+          <p:nvPr/>
+        </p:nvCxnSpPr>
+        <p:spPr>
+          <a:xfrm>
+            <a:off x="1399916" y="5122225"/>
+            <a:ext cx="3214892" cy="0"/>
+          </a:xfrm>
+          <a:prstGeom prst="line">
+            <a:avLst/>
+          </a:prstGeom>
+        </p:spPr>
+        <p:style>
+          <a:lnRef idx="2">
+            <a:schemeClr val="accent1"/>
+          </a:lnRef>
+          <a:fillRef idx="0">
+            <a:schemeClr val="accent1"/>
+          </a:fillRef>
+          <a:effectRef idx="1">
+            <a:schemeClr val="accent1"/>
+          </a:effectRef>
+          <a:fontRef idx="minor">
+            <a:schemeClr val="tx1"/>
+          </a:fontRef>
+        </p:style>
+      </p:cxnSp>
+      <p:pic>
+        <p:nvPicPr>
+          <p:cNvPr id="53" name="Picture 52">
+            <a:extLst>
+              <a:ext uri="{FF2B5EF4-FFF2-40B4-BE49-F238E27FC236}">
+                <a16:creationId xmlns:a16="http://schemas.microsoft.com/office/drawing/2014/main" id="{9B104350-39BC-3D3D-2360-9E3E93BF6B23}"/>
+              </a:ext>
+            </a:extLst>
+          </p:cNvPr>
+          <p:cNvPicPr>
+            <a:picLocks noChangeAspect="1"/>
+          </p:cNvPicPr>
+          <p:nvPr/>
+        </p:nvPicPr>
+        <p:blipFill>
+          <a:blip r:embed="rId2">
+            <a:extLst>
+              <a:ext uri="{28A0092B-C50C-407E-A947-70E740481C1C}">
+                <a14:useLocalDpi xmlns:a14="http://schemas.microsoft.com/office/drawing/2010/main" val="0"/>
+              </a:ext>
+            </a:extLst>
+          </a:blip>
+          <a:stretch>
+            <a:fillRect/>
+          </a:stretch>
+        </p:blipFill>
+        <p:spPr>
+          <a:xfrm>
+            <a:off x="1052402" y="4942032"/>
+            <a:ext cx="409524" cy="323810"/>
+          </a:xfrm>
+          <a:prstGeom prst="rect">
+            <a:avLst/>
+          </a:prstGeom>
+        </p:spPr>
+      </p:pic>
+      <p:sp>
+        <p:nvSpPr>
+          <p:cNvPr id="54" name="TextBox 53">
+            <a:extLst>
+              <a:ext uri="{FF2B5EF4-FFF2-40B4-BE49-F238E27FC236}">
+                <a16:creationId xmlns:a16="http://schemas.microsoft.com/office/drawing/2014/main" id="{F31E7B6F-26BF-DB6A-7294-78A50DED73A7}"/>
+              </a:ext>
+            </a:extLst>
+          </p:cNvPr>
+          <p:cNvSpPr txBox="1"/>
+          <p:nvPr/>
+        </p:nvSpPr>
+        <p:spPr>
+          <a:xfrm>
+            <a:off x="881986" y="4420837"/>
+            <a:ext cx="1159879" cy="646331"/>
+          </a:xfrm>
+          <a:prstGeom prst="rect">
+            <a:avLst/>
+          </a:prstGeom>
+          <a:noFill/>
+        </p:spPr>
+        <p:txBody>
+          <a:bodyPr wrap="square" rtlCol="0">
+            <a:spAutoFit/>
+          </a:bodyPr>
+          <a:lstStyle/>
+          <a:p>
+            <a:r>
+              <a:rPr lang="en-US" sz="1200" b="1" dirty="0"/>
+              <a:t>%M [000002] </a:t>
+            </a:r>
+          </a:p>
+          <a:p>
+            <a:r>
+              <a:rPr lang="en-US" sz="1200" b="1" dirty="0"/>
+              <a:t>Train sensor 1</a:t>
+            </a:r>
+            <a:endParaRPr lang="en-SG" sz="1200" b="1" dirty="0"/>
+          </a:p>
+          <a:p>
+            <a:endParaRPr lang="en-SG" sz="1200" b="1" dirty="0"/>
+          </a:p>
+        </p:txBody>
+      </p:sp>
+      <p:sp>
+        <p:nvSpPr>
+          <p:cNvPr id="55" name="TextBox 54">
+            <a:extLst>
+              <a:ext uri="{FF2B5EF4-FFF2-40B4-BE49-F238E27FC236}">
+                <a16:creationId xmlns:a16="http://schemas.microsoft.com/office/drawing/2014/main" id="{B0C6BF78-EDBF-D893-261B-88DBF6199CD4}"/>
+              </a:ext>
+            </a:extLst>
+          </p:cNvPr>
+          <p:cNvSpPr txBox="1"/>
+          <p:nvPr/>
+        </p:nvSpPr>
+        <p:spPr>
+          <a:xfrm>
+            <a:off x="881986" y="3570640"/>
+            <a:ext cx="1633189" cy="461665"/>
+          </a:xfrm>
+          <a:prstGeom prst="rect">
+            <a:avLst/>
+          </a:prstGeom>
+          <a:noFill/>
+        </p:spPr>
+        <p:txBody>
+          <a:bodyPr wrap="square" rtlCol="0">
+            <a:spAutoFit/>
+          </a:bodyPr>
+          <a:lstStyle/>
+          <a:p>
+            <a:r>
+              <a:rPr lang="en-US" sz="1200" b="1" dirty="0"/>
+              <a:t>%C [000012] </a:t>
+            </a:r>
+          </a:p>
+          <a:p>
+            <a:r>
+              <a:rPr lang="en-SG" sz="1200" b="1" dirty="0"/>
+              <a:t>HMI Overload Switch </a:t>
+            </a:r>
+          </a:p>
+        </p:txBody>
+      </p:sp>
+      <p:pic>
+        <p:nvPicPr>
+          <p:cNvPr id="56" name="Picture 55">
+            <a:extLst>
+              <a:ext uri="{FF2B5EF4-FFF2-40B4-BE49-F238E27FC236}">
+                <a16:creationId xmlns:a16="http://schemas.microsoft.com/office/drawing/2014/main" id="{A52483C7-C885-CF04-CEDF-290FD9D1092D}"/>
+              </a:ext>
+            </a:extLst>
+          </p:cNvPr>
+          <p:cNvPicPr>
+            <a:picLocks noChangeAspect="1"/>
+          </p:cNvPicPr>
+          <p:nvPr/>
+        </p:nvPicPr>
+        <p:blipFill>
+          <a:blip r:embed="rId3">
+            <a:extLst>
+              <a:ext uri="{28A0092B-C50C-407E-A947-70E740481C1C}">
+                <a14:useLocalDpi xmlns:a14="http://schemas.microsoft.com/office/drawing/2010/main" val="0"/>
+              </a:ext>
+            </a:extLst>
+          </a:blip>
+          <a:stretch>
+            <a:fillRect/>
+          </a:stretch>
+        </p:blipFill>
+        <p:spPr>
+          <a:xfrm>
+            <a:off x="1052401" y="4032305"/>
+            <a:ext cx="409524" cy="323810"/>
+          </a:xfrm>
+          <a:prstGeom prst="rect">
+            <a:avLst/>
+          </a:prstGeom>
+        </p:spPr>
+      </p:pic>
+      <p:cxnSp>
+        <p:nvCxnSpPr>
+          <p:cNvPr id="57" name="Straight Connector 56">
+            <a:extLst>
+              <a:ext uri="{FF2B5EF4-FFF2-40B4-BE49-F238E27FC236}">
+                <a16:creationId xmlns:a16="http://schemas.microsoft.com/office/drawing/2014/main" id="{A763973B-6294-B045-BE77-19D9A120F3EE}"/>
+              </a:ext>
+            </a:extLst>
+          </p:cNvPr>
+          <p:cNvCxnSpPr>
+            <a:cxnSpLocks/>
+          </p:cNvCxnSpPr>
+          <p:nvPr/>
+        </p:nvCxnSpPr>
+        <p:spPr>
+          <a:xfrm>
+            <a:off x="1461925" y="4194210"/>
+            <a:ext cx="3214892" cy="0"/>
+          </a:xfrm>
+          <a:prstGeom prst="line">
+            <a:avLst/>
+          </a:prstGeom>
+        </p:spPr>
+        <p:style>
+          <a:lnRef idx="2">
+            <a:schemeClr val="accent1"/>
+          </a:lnRef>
+          <a:fillRef idx="0">
+            <a:schemeClr val="accent1"/>
+          </a:fillRef>
+          <a:effectRef idx="1">
+            <a:schemeClr val="accent1"/>
+          </a:effectRef>
+          <a:fontRef idx="minor">
+            <a:schemeClr val="tx1"/>
+          </a:fontRef>
+        </p:style>
+      </p:cxnSp>
+      <p:sp>
+        <p:nvSpPr>
+          <p:cNvPr id="58" name="Rectangle 57">
+            <a:extLst>
+              <a:ext uri="{FF2B5EF4-FFF2-40B4-BE49-F238E27FC236}">
+                <a16:creationId xmlns:a16="http://schemas.microsoft.com/office/drawing/2014/main" id="{7A31E7B9-29AE-7C1B-26DA-A93AD7932E41}"/>
+              </a:ext>
+            </a:extLst>
+          </p:cNvPr>
+          <p:cNvSpPr/>
+          <p:nvPr/>
+        </p:nvSpPr>
+        <p:spPr>
+          <a:xfrm>
+            <a:off x="4676817" y="4043471"/>
+            <a:ext cx="2172039" cy="1222371"/>
+          </a:xfrm>
+          <a:prstGeom prst="rect">
+            <a:avLst/>
+          </a:prstGeom>
+          <a:solidFill>
+            <a:schemeClr val="bg1"/>
+          </a:solidFill>
+          <a:ln>
+            <a:solidFill>
+              <a:schemeClr val="tx1"/>
+            </a:solidFill>
+          </a:ln>
+        </p:spPr>
+        <p:style>
+          <a:lnRef idx="2">
+            <a:schemeClr val="accent1">
+              <a:shade val="50000"/>
+            </a:schemeClr>
+          </a:lnRef>
+          <a:fillRef idx="1">
+            <a:schemeClr val="accent1"/>
+          </a:fillRef>
+          <a:effectRef idx="0">
+            <a:schemeClr val="accent1"/>
+          </a:effectRef>
+          <a:fontRef idx="minor">
+            <a:schemeClr val="lt1"/>
+          </a:fontRef>
+        </p:style>
+        <p:txBody>
+          <a:bodyPr rtlCol="0" anchor="ctr"/>
+          <a:lstStyle/>
+          <a:p>
+            <a:r>
+              <a:rPr lang="en-US" sz="1050" b="1" dirty="0">
+                <a:solidFill>
+                  <a:schemeClr val="tx1"/>
+                </a:solidFill>
+              </a:rPr>
+              <a:t>IF IN_STATE1 == STEP.HIGHER</a:t>
+            </a:r>
+          </a:p>
+          <a:p>
+            <a:r>
+              <a:rPr lang="en-US" sz="1050" b="1" dirty="0">
+                <a:solidFill>
+                  <a:schemeClr val="tx1"/>
+                </a:solidFill>
+              </a:rPr>
+              <a:t>  OUT =  TRUE</a:t>
+            </a:r>
+          </a:p>
+          <a:p>
+            <a:r>
+              <a:rPr lang="en-US" sz="1050" b="1" dirty="0">
+                <a:solidFill>
+                  <a:schemeClr val="tx1"/>
+                </a:solidFill>
+              </a:rPr>
+              <a:t>ELIF IN_STATA1 == STEP.LOWER</a:t>
+            </a:r>
+          </a:p>
+          <a:p>
+            <a:r>
+              <a:rPr lang="en-US" sz="1050" b="1" dirty="0">
+                <a:solidFill>
+                  <a:schemeClr val="tx1"/>
+                </a:solidFill>
+              </a:rPr>
+              <a:t>  OUT  = FALSE</a:t>
+            </a:r>
+          </a:p>
+          <a:p>
+            <a:r>
+              <a:rPr lang="en-US" sz="1050" b="1" dirty="0">
+                <a:solidFill>
+                  <a:schemeClr val="tx1"/>
+                </a:solidFill>
+              </a:rPr>
+              <a:t>ELSE</a:t>
+            </a:r>
+          </a:p>
+          <a:p>
+            <a:r>
+              <a:rPr lang="en-US" sz="1050" b="1" dirty="0">
+                <a:solidFill>
+                  <a:schemeClr val="tx1"/>
+                </a:solidFill>
+              </a:rPr>
+              <a:t>  OUT = IN_STATE2</a:t>
+            </a:r>
+          </a:p>
+          <a:p>
+            <a:r>
+              <a:rPr lang="en-US" sz="1050" b="1" dirty="0">
+                <a:solidFill>
+                  <a:schemeClr val="tx1"/>
+                </a:solidFill>
+              </a:rPr>
+              <a:t>END IF </a:t>
+            </a:r>
+          </a:p>
+        </p:txBody>
+      </p:sp>
+      <p:sp>
+        <p:nvSpPr>
+          <p:cNvPr id="59" name="TextBox 58">
+            <a:extLst>
+              <a:ext uri="{FF2B5EF4-FFF2-40B4-BE49-F238E27FC236}">
+                <a16:creationId xmlns:a16="http://schemas.microsoft.com/office/drawing/2014/main" id="{1988DBDD-8729-7B4E-ADCB-3C97E0B81162}"/>
+              </a:ext>
+            </a:extLst>
+          </p:cNvPr>
+          <p:cNvSpPr txBox="1"/>
+          <p:nvPr/>
+        </p:nvSpPr>
+        <p:spPr>
+          <a:xfrm>
+            <a:off x="3861371" y="3947989"/>
+            <a:ext cx="815445" cy="246221"/>
+          </a:xfrm>
+          <a:prstGeom prst="rect">
+            <a:avLst/>
+          </a:prstGeom>
+          <a:noFill/>
+        </p:spPr>
+        <p:txBody>
+          <a:bodyPr wrap="square" rtlCol="0">
+            <a:spAutoFit/>
+          </a:bodyPr>
+          <a:lstStyle/>
+          <a:p>
+            <a:r>
+              <a:rPr lang="en-US" sz="1000" b="1" dirty="0">
+                <a:solidFill>
+                  <a:schemeClr val="tx2">
+                    <a:lumMod val="90000"/>
+                    <a:lumOff val="10000"/>
+                  </a:schemeClr>
+                </a:solidFill>
+              </a:rPr>
+              <a:t>IN_STATE1 </a:t>
+            </a:r>
+            <a:endParaRPr lang="en-SG" sz="1000" b="1" dirty="0">
+              <a:solidFill>
+                <a:schemeClr val="tx2">
+                  <a:lumMod val="90000"/>
+                  <a:lumOff val="10000"/>
+                </a:schemeClr>
+              </a:solidFill>
+            </a:endParaRPr>
+          </a:p>
+        </p:txBody>
+      </p:sp>
+      <p:sp>
+        <p:nvSpPr>
+          <p:cNvPr id="60" name="TextBox 59">
+            <a:extLst>
+              <a:ext uri="{FF2B5EF4-FFF2-40B4-BE49-F238E27FC236}">
+                <a16:creationId xmlns:a16="http://schemas.microsoft.com/office/drawing/2014/main" id="{4A5A3F5E-CC9D-0A31-2234-AFC82610DAEF}"/>
+              </a:ext>
+            </a:extLst>
+          </p:cNvPr>
+          <p:cNvSpPr txBox="1"/>
+          <p:nvPr/>
+        </p:nvSpPr>
+        <p:spPr>
+          <a:xfrm>
+            <a:off x="3865603" y="4860836"/>
+            <a:ext cx="815445" cy="246221"/>
+          </a:xfrm>
+          <a:prstGeom prst="rect">
+            <a:avLst/>
+          </a:prstGeom>
+          <a:noFill/>
+        </p:spPr>
+        <p:txBody>
+          <a:bodyPr wrap="square" rtlCol="0">
+            <a:spAutoFit/>
+          </a:bodyPr>
+          <a:lstStyle/>
+          <a:p>
+            <a:r>
+              <a:rPr lang="en-US" sz="1000" b="1" dirty="0">
+                <a:solidFill>
+                  <a:schemeClr val="tx2">
+                    <a:lumMod val="90000"/>
+                    <a:lumOff val="10000"/>
+                  </a:schemeClr>
+                </a:solidFill>
+              </a:rPr>
+              <a:t>IN_STATE2 </a:t>
+            </a:r>
+            <a:endParaRPr lang="en-SG" sz="1000" b="1" dirty="0">
+              <a:solidFill>
+                <a:schemeClr val="tx2">
+                  <a:lumMod val="90000"/>
+                  <a:lumOff val="10000"/>
+                </a:schemeClr>
+              </a:solidFill>
+            </a:endParaRPr>
+          </a:p>
+        </p:txBody>
+      </p:sp>
+      <p:cxnSp>
+        <p:nvCxnSpPr>
+          <p:cNvPr id="61" name="Straight Connector 60">
+            <a:extLst>
+              <a:ext uri="{FF2B5EF4-FFF2-40B4-BE49-F238E27FC236}">
+                <a16:creationId xmlns:a16="http://schemas.microsoft.com/office/drawing/2014/main" id="{9D64CE11-3BEC-7049-0F6A-4427896FED1F}"/>
+              </a:ext>
+            </a:extLst>
+          </p:cNvPr>
+          <p:cNvCxnSpPr>
+            <a:cxnSpLocks/>
+          </p:cNvCxnSpPr>
+          <p:nvPr/>
+        </p:nvCxnSpPr>
+        <p:spPr>
+          <a:xfrm>
+            <a:off x="6848856" y="5085456"/>
+            <a:ext cx="1307592" cy="0"/>
+          </a:xfrm>
+          <a:prstGeom prst="line">
+            <a:avLst/>
+          </a:prstGeom>
+        </p:spPr>
+        <p:style>
+          <a:lnRef idx="2">
+            <a:schemeClr val="accent1"/>
+          </a:lnRef>
+          <a:fillRef idx="0">
+            <a:schemeClr val="accent1"/>
+          </a:fillRef>
+          <a:effectRef idx="1">
+            <a:schemeClr val="accent1"/>
+          </a:effectRef>
+          <a:fontRef idx="minor">
+            <a:schemeClr val="tx1"/>
+          </a:fontRef>
+        </p:style>
+      </p:cxnSp>
+      <p:sp>
+        <p:nvSpPr>
+          <p:cNvPr id="62" name="TextBox 61">
+            <a:extLst>
+              <a:ext uri="{FF2B5EF4-FFF2-40B4-BE49-F238E27FC236}">
+                <a16:creationId xmlns:a16="http://schemas.microsoft.com/office/drawing/2014/main" id="{83F46DAD-2FAD-A52C-45F6-B4899B43253A}"/>
+              </a:ext>
+            </a:extLst>
+          </p:cNvPr>
+          <p:cNvSpPr txBox="1"/>
+          <p:nvPr/>
+        </p:nvSpPr>
+        <p:spPr>
+          <a:xfrm>
+            <a:off x="6802811" y="4860836"/>
+            <a:ext cx="462557" cy="246221"/>
+          </a:xfrm>
+          <a:prstGeom prst="rect">
+            <a:avLst/>
+          </a:prstGeom>
+          <a:noFill/>
+        </p:spPr>
+        <p:txBody>
+          <a:bodyPr wrap="square" rtlCol="0">
+            <a:spAutoFit/>
+          </a:bodyPr>
+          <a:lstStyle/>
+          <a:p>
+            <a:r>
+              <a:rPr lang="en-US" sz="1000" b="1" dirty="0">
+                <a:solidFill>
+                  <a:schemeClr val="tx2">
+                    <a:lumMod val="90000"/>
+                    <a:lumOff val="10000"/>
+                  </a:schemeClr>
+                </a:solidFill>
+              </a:rPr>
+              <a:t>OUT</a:t>
+            </a:r>
+            <a:endParaRPr lang="en-SG" sz="1000" b="1" dirty="0">
+              <a:solidFill>
+                <a:schemeClr val="tx2">
+                  <a:lumMod val="90000"/>
+                  <a:lumOff val="10000"/>
+                </a:schemeClr>
+              </a:solidFill>
+            </a:endParaRPr>
+          </a:p>
+        </p:txBody>
+      </p:sp>
+      <p:pic>
+        <p:nvPicPr>
+          <p:cNvPr id="63" name="Picture 62">
+            <a:extLst>
+              <a:ext uri="{FF2B5EF4-FFF2-40B4-BE49-F238E27FC236}">
+                <a16:creationId xmlns:a16="http://schemas.microsoft.com/office/drawing/2014/main" id="{E0B34021-A832-2C4A-EB76-257E6DCAE370}"/>
+              </a:ext>
+            </a:extLst>
+          </p:cNvPr>
+          <p:cNvPicPr>
+            <a:picLocks noChangeAspect="1"/>
+          </p:cNvPicPr>
+          <p:nvPr/>
+        </p:nvPicPr>
+        <p:blipFill>
+          <a:blip r:embed="rId3">
+            <a:extLst>
+              <a:ext uri="{28A0092B-C50C-407E-A947-70E740481C1C}">
+                <a14:useLocalDpi xmlns:a14="http://schemas.microsoft.com/office/drawing/2010/main" val="0"/>
+              </a:ext>
+            </a:extLst>
+          </a:blip>
+          <a:stretch>
+            <a:fillRect/>
+          </a:stretch>
+        </p:blipFill>
+        <p:spPr>
+          <a:xfrm>
+            <a:off x="8156448" y="4932695"/>
+            <a:ext cx="409524" cy="323810"/>
+          </a:xfrm>
+          <a:prstGeom prst="rect">
+            <a:avLst/>
+          </a:prstGeom>
+        </p:spPr>
+      </p:pic>
+      <p:sp>
+        <p:nvSpPr>
+          <p:cNvPr id="64" name="TextBox 63">
+            <a:extLst>
+              <a:ext uri="{FF2B5EF4-FFF2-40B4-BE49-F238E27FC236}">
+                <a16:creationId xmlns:a16="http://schemas.microsoft.com/office/drawing/2014/main" id="{DB1CAFE3-5C2C-FD85-538F-BC94C63C16F8}"/>
+              </a:ext>
+            </a:extLst>
+          </p:cNvPr>
+          <p:cNvSpPr txBox="1"/>
+          <p:nvPr/>
+        </p:nvSpPr>
+        <p:spPr>
+          <a:xfrm>
+            <a:off x="7542892" y="4432114"/>
+            <a:ext cx="2046159" cy="461665"/>
+          </a:xfrm>
+          <a:prstGeom prst="rect">
+            <a:avLst/>
+          </a:prstGeom>
+          <a:noFill/>
+        </p:spPr>
+        <p:txBody>
+          <a:bodyPr wrap="square" rtlCol="0">
+            <a:spAutoFit/>
+          </a:bodyPr>
+          <a:lstStyle/>
+          <a:p>
+            <a:r>
+              <a:rPr lang="en-US" sz="1200" b="1" dirty="0"/>
+              <a:t>%M  [000006] </a:t>
+            </a:r>
+          </a:p>
+          <a:p>
+            <a:r>
+              <a:rPr lang="en-US" sz="1200" b="1" dirty="0"/>
+              <a:t>Train Exit Departure Signal</a:t>
+            </a:r>
+          </a:p>
+        </p:txBody>
+      </p:sp>
+    </p:spTree>
+    <p:extLst>
+      <p:ext uri="{BB962C8B-B14F-4D97-AF65-F5344CB8AC3E}">
+        <p14:creationId xmlns:p14="http://schemas.microsoft.com/office/powerpoint/2010/main" val="727623830"/>
+      </p:ext>
+    </p:extLst>
+  </p:cSld>
+  <p:clrMapOvr>
+    <a:masterClrMapping/>
+  </p:clrMapOvr>
+</p:sld>
+</file>
+
+<file path=ppt/slides/slide6.xml><?xml version="1.0" encoding="utf-8"?>
+<p:sld xmlns:a="http://schemas.openxmlformats.org/drawingml/2006/main" xmlns:r="http://schemas.openxmlformats.org/officeDocument/2006/relationships" xmlns:p="http://schemas.openxmlformats.org/presentationml/2006/main">
+  <p:cSld>
+    <p:spTree>
+      <p:nvGrpSpPr>
+        <p:cNvPr id="1" name=""/>
+        <p:cNvGrpSpPr/>
+        <p:nvPr/>
+      </p:nvGrpSpPr>
+      <p:grpSpPr>
+        <a:xfrm>
+          <a:off x="0" y="0"/>
+          <a:ext cx="0" cy="0"/>
+          <a:chOff x="0" y="0"/>
+          <a:chExt cx="0" cy="0"/>
+        </a:xfrm>
+      </p:grpSpPr>
+      <p:sp>
+        <p:nvSpPr>
+          <p:cNvPr id="4" name="TextBox 3">
+            <a:extLst>
+              <a:ext uri="{FF2B5EF4-FFF2-40B4-BE49-F238E27FC236}">
+                <a16:creationId xmlns:a16="http://schemas.microsoft.com/office/drawing/2014/main" id="{3875B5DB-28E1-E734-F7DC-771BB9291467}"/>
+              </a:ext>
+            </a:extLst>
+          </p:cNvPr>
+          <p:cNvSpPr txBox="1"/>
+          <p:nvPr/>
+        </p:nvSpPr>
+        <p:spPr>
+          <a:xfrm>
+            <a:off x="672590" y="1345024"/>
+            <a:ext cx="1169149" cy="246221"/>
+          </a:xfrm>
+          <a:prstGeom prst="rect">
+            <a:avLst/>
+          </a:prstGeom>
+          <a:noFill/>
+        </p:spPr>
+        <p:txBody>
+          <a:bodyPr wrap="square" rtlCol="0">
+            <a:spAutoFit/>
+          </a:bodyPr>
+          <a:lstStyle/>
+          <a:p>
+            <a:r>
+              <a:rPr lang="en-US" sz="1000" b="1" dirty="0"/>
+              <a:t>Train sensor 1</a:t>
+            </a:r>
+            <a:endParaRPr lang="en-SG" sz="1000" b="1" dirty="0"/>
+          </a:p>
+        </p:txBody>
+      </p:sp>
+      <p:pic>
+        <p:nvPicPr>
+          <p:cNvPr id="6" name="Picture 5">
+            <a:extLst>
+              <a:ext uri="{FF2B5EF4-FFF2-40B4-BE49-F238E27FC236}">
+                <a16:creationId xmlns:a16="http://schemas.microsoft.com/office/drawing/2014/main" id="{51EF208F-736F-D757-196B-6729B68A51B5}"/>
+              </a:ext>
+            </a:extLst>
+          </p:cNvPr>
+          <p:cNvPicPr>
+            <a:picLocks noChangeAspect="1"/>
+          </p:cNvPicPr>
+          <p:nvPr/>
+        </p:nvPicPr>
+        <p:blipFill>
+          <a:blip r:embed="rId2">
+            <a:extLst>
+              <a:ext uri="{28A0092B-C50C-407E-A947-70E740481C1C}">
+                <a14:useLocalDpi xmlns:a14="http://schemas.microsoft.com/office/drawing/2010/main" val="0"/>
+              </a:ext>
+            </a:extLst>
+          </a:blip>
+          <a:stretch>
+            <a:fillRect/>
+          </a:stretch>
+        </p:blipFill>
+        <p:spPr>
+          <a:xfrm>
+            <a:off x="1918200" y="1249714"/>
+            <a:ext cx="476190" cy="466667"/>
+          </a:xfrm>
+          <a:prstGeom prst="rect">
+            <a:avLst/>
+          </a:prstGeom>
+        </p:spPr>
+      </p:pic>
+      <p:sp>
+        <p:nvSpPr>
+          <p:cNvPr id="9" name="TextBox 8">
+            <a:extLst>
+              <a:ext uri="{FF2B5EF4-FFF2-40B4-BE49-F238E27FC236}">
+                <a16:creationId xmlns:a16="http://schemas.microsoft.com/office/drawing/2014/main" id="{9B9549DE-0D7C-4EF4-8F87-06B9838F4CA4}"/>
+              </a:ext>
+            </a:extLst>
+          </p:cNvPr>
+          <p:cNvSpPr txBox="1"/>
+          <p:nvPr/>
+        </p:nvSpPr>
+        <p:spPr>
+          <a:xfrm>
+            <a:off x="7493583" y="1345023"/>
+            <a:ext cx="1606035" cy="246221"/>
+          </a:xfrm>
+          <a:prstGeom prst="rect">
+            <a:avLst/>
+          </a:prstGeom>
+          <a:noFill/>
+        </p:spPr>
+        <p:txBody>
+          <a:bodyPr wrap="square" rtlCol="0">
+            <a:spAutoFit/>
+          </a:bodyPr>
+          <a:lstStyle/>
+          <a:p>
+            <a:r>
+              <a:rPr lang="en-US" sz="1000" b="1" dirty="0"/>
+              <a:t>Entrance Dock Signal</a:t>
+            </a:r>
+            <a:endParaRPr lang="en-SG" sz="1000" b="1" dirty="0"/>
+          </a:p>
+        </p:txBody>
+      </p:sp>
+      <p:cxnSp>
+        <p:nvCxnSpPr>
+          <p:cNvPr id="10" name="Straight Connector 9">
+            <a:extLst>
+              <a:ext uri="{FF2B5EF4-FFF2-40B4-BE49-F238E27FC236}">
+                <a16:creationId xmlns:a16="http://schemas.microsoft.com/office/drawing/2014/main" id="{1213DBED-763D-81F2-FA70-1272F0FAC5A3}"/>
+              </a:ext>
+            </a:extLst>
+          </p:cNvPr>
+          <p:cNvCxnSpPr>
+            <a:cxnSpLocks/>
+          </p:cNvCxnSpPr>
+          <p:nvPr/>
+        </p:nvCxnSpPr>
+        <p:spPr>
+          <a:xfrm>
+            <a:off x="7073661" y="1492192"/>
+            <a:ext cx="419922" cy="0"/>
+          </a:xfrm>
+          <a:prstGeom prst="line">
+            <a:avLst/>
+          </a:prstGeom>
+        </p:spPr>
+        <p:style>
+          <a:lnRef idx="2">
+            <a:schemeClr val="accent1"/>
+          </a:lnRef>
+          <a:fillRef idx="0">
+            <a:schemeClr val="accent1"/>
+          </a:fillRef>
+          <a:effectRef idx="1">
+            <a:schemeClr val="accent1"/>
+          </a:effectRef>
+          <a:fontRef idx="minor">
+            <a:schemeClr val="tx1"/>
+          </a:fontRef>
+        </p:style>
+      </p:cxnSp>
+      <p:sp>
+        <p:nvSpPr>
+          <p:cNvPr id="11" name="Rectangle 10">
+            <a:extLst>
+              <a:ext uri="{FF2B5EF4-FFF2-40B4-BE49-F238E27FC236}">
+                <a16:creationId xmlns:a16="http://schemas.microsoft.com/office/drawing/2014/main" id="{5949CDAA-8312-4F28-C704-2963A497B802}"/>
+              </a:ext>
+            </a:extLst>
+          </p:cNvPr>
+          <p:cNvSpPr/>
+          <p:nvPr/>
+        </p:nvSpPr>
+        <p:spPr>
+          <a:xfrm>
+            <a:off x="7626096" y="523567"/>
+            <a:ext cx="2154189" cy="840816"/>
+          </a:xfrm>
+          <a:prstGeom prst="rect">
+            <a:avLst/>
+          </a:prstGeom>
+          <a:solidFill>
+            <a:schemeClr val="tx2">
+              <a:lumMod val="75000"/>
+              <a:lumOff val="25000"/>
+            </a:schemeClr>
+          </a:solidFill>
+          <a:ln>
+            <a:solidFill>
+              <a:schemeClr val="tx1"/>
+            </a:solidFill>
+          </a:ln>
+        </p:spPr>
+        <p:style>
+          <a:lnRef idx="2">
+            <a:schemeClr val="accent1">
+              <a:shade val="50000"/>
+            </a:schemeClr>
+          </a:lnRef>
+          <a:fillRef idx="1">
+            <a:schemeClr val="accent1"/>
+          </a:fillRef>
+          <a:effectRef idx="0">
+            <a:schemeClr val="accent1"/>
+          </a:effectRef>
+          <a:fontRef idx="minor">
+            <a:schemeClr val="lt1"/>
+          </a:fontRef>
+        </p:style>
+        <p:txBody>
+          <a:bodyPr rtlCol="0" anchor="ctr"/>
+          <a:lstStyle/>
+          <a:p>
+            <a:r>
+              <a:rPr lang="en-US" sz="1100" b="1" dirty="0"/>
+              <a:t>Condition Selector</a:t>
+            </a:r>
+          </a:p>
+          <a:p>
+            <a:r>
+              <a:rPr lang="en-US" sz="1100" b="1" dirty="0" err="1"/>
+              <a:t>Step.Lower</a:t>
+            </a:r>
+            <a:r>
+              <a:rPr lang="en-US" sz="1100" b="1" dirty="0"/>
+              <a:t> =&gt; output = False</a:t>
+            </a:r>
+          </a:p>
+          <a:p>
+            <a:r>
+              <a:rPr lang="en-US" sz="1100" b="1" dirty="0" err="1"/>
+              <a:t>Step.Higher</a:t>
+            </a:r>
+            <a:r>
+              <a:rPr lang="en-US" sz="1100" b="1" dirty="0"/>
+              <a:t> =&gt; output =  True </a:t>
+            </a:r>
+          </a:p>
+          <a:p>
+            <a:r>
+              <a:rPr lang="en-US" sz="1050" b="1" dirty="0"/>
+              <a:t>Step.Invalid_0 =&gt; output = input</a:t>
+            </a:r>
+          </a:p>
+        </p:txBody>
+      </p:sp>
+    </p:spTree>
+    <p:extLst>
+      <p:ext uri="{BB962C8B-B14F-4D97-AF65-F5344CB8AC3E}">
+        <p14:creationId xmlns:p14="http://schemas.microsoft.com/office/powerpoint/2010/main" val="595260543"/>
+      </p:ext>
+    </p:extLst>
+  </p:cSld>
+  <p:clrMapOvr>
+    <a:masterClrMapping/>
+  </p:clrMapOvr>
+</p:sld>
+</file>
+
 <file path=ppt/theme/theme1.xml><?xml version="1.0" encoding="utf-8"?>
 <a:theme xmlns:a="http://schemas.openxmlformats.org/drawingml/2006/main" name="Office Theme">
   <a:themeElements>

</xml_diff>

<commit_message>
update the logic design section.
</commit_message>
<xml_diff>
--- a/OT_System_Attack_Case_Study/Railway_Station/img/designDoc.pptx
+++ b/OT_System_Attack_Case_Study/Railway_Station/img/designDoc.pptx
@@ -10,7 +10,8 @@
     <p:sldId id="258" r:id="rId4"/>
     <p:sldId id="259" r:id="rId5"/>
     <p:sldId id="260" r:id="rId6"/>
-    <p:sldId id="261" r:id="rId7"/>
+    <p:sldId id="262" r:id="rId7"/>
+    <p:sldId id="263" r:id="rId8"/>
   </p:sldIdLst>
   <p:sldSz cx="12192000" cy="6858000"/>
   <p:notesSz cx="6858000" cy="9144000"/>
@@ -266,7 +267,7 @@
           <a:p>
             <a:fld id="{DD50288F-9E8D-482B-B740-3614303AF2FC}" type="datetimeFigureOut">
               <a:rPr lang="en-SG" smtClean="0"/>
-              <a:t>23/5/2025</a:t>
+              <a:t>24/5/2025</a:t>
             </a:fld>
             <a:endParaRPr lang="en-SG"/>
           </a:p>
@@ -466,7 +467,7 @@
           <a:p>
             <a:fld id="{DD50288F-9E8D-482B-B740-3614303AF2FC}" type="datetimeFigureOut">
               <a:rPr lang="en-SG" smtClean="0"/>
-              <a:t>23/5/2025</a:t>
+              <a:t>24/5/2025</a:t>
             </a:fld>
             <a:endParaRPr lang="en-SG"/>
           </a:p>
@@ -676,7 +677,7 @@
           <a:p>
             <a:fld id="{DD50288F-9E8D-482B-B740-3614303AF2FC}" type="datetimeFigureOut">
               <a:rPr lang="en-SG" smtClean="0"/>
-              <a:t>23/5/2025</a:t>
+              <a:t>24/5/2025</a:t>
             </a:fld>
             <a:endParaRPr lang="en-SG"/>
           </a:p>
@@ -876,7 +877,7 @@
           <a:p>
             <a:fld id="{DD50288F-9E8D-482B-B740-3614303AF2FC}" type="datetimeFigureOut">
               <a:rPr lang="en-SG" smtClean="0"/>
-              <a:t>23/5/2025</a:t>
+              <a:t>24/5/2025</a:t>
             </a:fld>
             <a:endParaRPr lang="en-SG"/>
           </a:p>
@@ -1152,7 +1153,7 @@
           <a:p>
             <a:fld id="{DD50288F-9E8D-482B-B740-3614303AF2FC}" type="datetimeFigureOut">
               <a:rPr lang="en-SG" smtClean="0"/>
-              <a:t>23/5/2025</a:t>
+              <a:t>24/5/2025</a:t>
             </a:fld>
             <a:endParaRPr lang="en-SG"/>
           </a:p>
@@ -1420,7 +1421,7 @@
           <a:p>
             <a:fld id="{DD50288F-9E8D-482B-B740-3614303AF2FC}" type="datetimeFigureOut">
               <a:rPr lang="en-SG" smtClean="0"/>
-              <a:t>23/5/2025</a:t>
+              <a:t>24/5/2025</a:t>
             </a:fld>
             <a:endParaRPr lang="en-SG"/>
           </a:p>
@@ -1835,7 +1836,7 @@
           <a:p>
             <a:fld id="{DD50288F-9E8D-482B-B740-3614303AF2FC}" type="datetimeFigureOut">
               <a:rPr lang="en-SG" smtClean="0"/>
-              <a:t>23/5/2025</a:t>
+              <a:t>24/5/2025</a:t>
             </a:fld>
             <a:endParaRPr lang="en-SG"/>
           </a:p>
@@ -1977,7 +1978,7 @@
           <a:p>
             <a:fld id="{DD50288F-9E8D-482B-B740-3614303AF2FC}" type="datetimeFigureOut">
               <a:rPr lang="en-SG" smtClean="0"/>
-              <a:t>23/5/2025</a:t>
+              <a:t>24/5/2025</a:t>
             </a:fld>
             <a:endParaRPr lang="en-SG"/>
           </a:p>
@@ -2090,7 +2091,7 @@
           <a:p>
             <a:fld id="{DD50288F-9E8D-482B-B740-3614303AF2FC}" type="datetimeFigureOut">
               <a:rPr lang="en-SG" smtClean="0"/>
-              <a:t>23/5/2025</a:t>
+              <a:t>24/5/2025</a:t>
             </a:fld>
             <a:endParaRPr lang="en-SG"/>
           </a:p>
@@ -2403,7 +2404,7 @@
           <a:p>
             <a:fld id="{DD50288F-9E8D-482B-B740-3614303AF2FC}" type="datetimeFigureOut">
               <a:rPr lang="en-SG" smtClean="0"/>
-              <a:t>23/5/2025</a:t>
+              <a:t>24/5/2025</a:t>
             </a:fld>
             <a:endParaRPr lang="en-SG"/>
           </a:p>
@@ -2692,7 +2693,7 @@
           <a:p>
             <a:fld id="{DD50288F-9E8D-482B-B740-3614303AF2FC}" type="datetimeFigureOut">
               <a:rPr lang="en-SG" smtClean="0"/>
-              <a:t>23/5/2025</a:t>
+              <a:t>24/5/2025</a:t>
             </a:fld>
             <a:endParaRPr lang="en-SG"/>
           </a:p>
@@ -2935,7 +2936,7 @@
           <a:p>
             <a:fld id="{DD50288F-9E8D-482B-B740-3614303AF2FC}" type="datetimeFigureOut">
               <a:rPr lang="en-SG" smtClean="0"/>
-              <a:t>23/5/2025</a:t>
+              <a:t>24/5/2025</a:t>
             </a:fld>
             <a:endParaRPr lang="en-SG"/>
           </a:p>
@@ -6263,42 +6264,6 @@
           </a:p>
         </p:txBody>
       </p:sp>
-      <p:pic>
-        <p:nvPicPr>
-          <p:cNvPr id="50" name="Picture 49">
-            <a:extLst>
-              <a:ext uri="{FF2B5EF4-FFF2-40B4-BE49-F238E27FC236}">
-                <a16:creationId xmlns:a16="http://schemas.microsoft.com/office/drawing/2014/main" id="{4ECBB904-4ECA-85C8-B4BA-BF010243F1D4}"/>
-              </a:ext>
-            </a:extLst>
-          </p:cNvPr>
-          <p:cNvPicPr>
-            <a:picLocks noChangeAspect="1"/>
-          </p:cNvPicPr>
-          <p:nvPr/>
-        </p:nvPicPr>
-        <p:blipFill>
-          <a:blip r:embed="rId3">
-            <a:extLst>
-              <a:ext uri="{28A0092B-C50C-407E-A947-70E740481C1C}">
-                <a14:useLocalDpi xmlns:a14="http://schemas.microsoft.com/office/drawing/2010/main" val="0"/>
-              </a:ext>
-            </a:extLst>
-          </a:blip>
-          <a:stretch>
-            <a:fillRect/>
-          </a:stretch>
-        </p:blipFill>
-        <p:spPr>
-          <a:xfrm>
-            <a:off x="8156448" y="3086709"/>
-            <a:ext cx="409524" cy="323810"/>
-          </a:xfrm>
-          <a:prstGeom prst="rect">
-            <a:avLst/>
-          </a:prstGeom>
-        </p:spPr>
-      </p:pic>
       <p:sp>
         <p:nvSpPr>
           <p:cNvPr id="51" name="TextBox 50">
@@ -6882,12 +6847,53 @@
           </a:p>
         </p:txBody>
       </p:sp>
+      <p:sp>
+        <p:nvSpPr>
+          <p:cNvPr id="64" name="TextBox 63">
+            <a:extLst>
+              <a:ext uri="{FF2B5EF4-FFF2-40B4-BE49-F238E27FC236}">
+                <a16:creationId xmlns:a16="http://schemas.microsoft.com/office/drawing/2014/main" id="{DB1CAFE3-5C2C-FD85-538F-BC94C63C16F8}"/>
+              </a:ext>
+            </a:extLst>
+          </p:cNvPr>
+          <p:cNvSpPr txBox="1"/>
+          <p:nvPr/>
+        </p:nvSpPr>
+        <p:spPr>
+          <a:xfrm>
+            <a:off x="7542892" y="4432114"/>
+            <a:ext cx="2046159" cy="461665"/>
+          </a:xfrm>
+          <a:prstGeom prst="rect">
+            <a:avLst/>
+          </a:prstGeom>
+          <a:noFill/>
+        </p:spPr>
+        <p:txBody>
+          <a:bodyPr wrap="square" rtlCol="0">
+            <a:spAutoFit/>
+          </a:bodyPr>
+          <a:lstStyle/>
+          <a:p>
+            <a:r>
+              <a:rPr lang="en-US" sz="1200" b="1" dirty="0"/>
+              <a:t>%M  [000006] </a:t>
+            </a:r>
+          </a:p>
+          <a:p>
+            <a:r>
+              <a:rPr lang="en-US" sz="1200" b="1" dirty="0"/>
+              <a:t>Train Exit Departure Signal</a:t>
+            </a:r>
+          </a:p>
+        </p:txBody>
+      </p:sp>
       <p:pic>
         <p:nvPicPr>
-          <p:cNvPr id="63" name="Picture 62">
-            <a:extLst>
-              <a:ext uri="{FF2B5EF4-FFF2-40B4-BE49-F238E27FC236}">
-                <a16:creationId xmlns:a16="http://schemas.microsoft.com/office/drawing/2014/main" id="{E0B34021-A832-2C4A-EB76-257E6DCAE370}"/>
+          <p:cNvPr id="2" name="Picture 1">
+            <a:extLst>
+              <a:ext uri="{FF2B5EF4-FFF2-40B4-BE49-F238E27FC236}">
+                <a16:creationId xmlns:a16="http://schemas.microsoft.com/office/drawing/2014/main" id="{31DDA6F0-F689-71B1-CD09-C702F2A23F30}"/>
               </a:ext>
             </a:extLst>
           </p:cNvPr>
@@ -6897,7 +6903,7 @@
           <p:nvPr/>
         </p:nvPicPr>
         <p:blipFill>
-          <a:blip r:embed="rId3">
+          <a:blip r:embed="rId4">
             <a:extLst>
               <a:ext uri="{28A0092B-C50C-407E-A947-70E740481C1C}">
                 <a14:useLocalDpi xmlns:a14="http://schemas.microsoft.com/office/drawing/2010/main" val="0"/>
@@ -6910,55 +6916,50 @@
         </p:blipFill>
         <p:spPr>
           <a:xfrm>
-            <a:off x="8156448" y="4932695"/>
-            <a:ext cx="409524" cy="323810"/>
+            <a:off x="8156448" y="3095666"/>
+            <a:ext cx="438095" cy="342857"/>
           </a:xfrm>
           <a:prstGeom prst="rect">
             <a:avLst/>
           </a:prstGeom>
         </p:spPr>
       </p:pic>
-      <p:sp>
-        <p:nvSpPr>
-          <p:cNvPr id="64" name="TextBox 63">
-            <a:extLst>
-              <a:ext uri="{FF2B5EF4-FFF2-40B4-BE49-F238E27FC236}">
-                <a16:creationId xmlns:a16="http://schemas.microsoft.com/office/drawing/2014/main" id="{DB1CAFE3-5C2C-FD85-538F-BC94C63C16F8}"/>
-              </a:ext>
-            </a:extLst>
-          </p:cNvPr>
-          <p:cNvSpPr txBox="1"/>
-          <p:nvPr/>
-        </p:nvSpPr>
-        <p:spPr>
-          <a:xfrm>
-            <a:off x="7542892" y="4432114"/>
-            <a:ext cx="2046159" cy="461665"/>
+      <p:pic>
+        <p:nvPicPr>
+          <p:cNvPr id="3" name="Picture 2">
+            <a:extLst>
+              <a:ext uri="{FF2B5EF4-FFF2-40B4-BE49-F238E27FC236}">
+                <a16:creationId xmlns:a16="http://schemas.microsoft.com/office/drawing/2014/main" id="{AD9C6205-1495-4F54-5B97-CD1B4BA2E875}"/>
+              </a:ext>
+            </a:extLst>
+          </p:cNvPr>
+          <p:cNvPicPr>
+            <a:picLocks noChangeAspect="1"/>
+          </p:cNvPicPr>
+          <p:nvPr/>
+        </p:nvPicPr>
+        <p:blipFill>
+          <a:blip r:embed="rId4">
+            <a:extLst>
+              <a:ext uri="{28A0092B-C50C-407E-A947-70E740481C1C}">
+                <a14:useLocalDpi xmlns:a14="http://schemas.microsoft.com/office/drawing/2010/main" val="0"/>
+              </a:ext>
+            </a:extLst>
+          </a:blip>
+          <a:stretch>
+            <a:fillRect/>
+          </a:stretch>
+        </p:blipFill>
+        <p:spPr>
+          <a:xfrm>
+            <a:off x="8127876" y="4914027"/>
+            <a:ext cx="438095" cy="342857"/>
           </a:xfrm>
           <a:prstGeom prst="rect">
             <a:avLst/>
           </a:prstGeom>
-          <a:noFill/>
-        </p:spPr>
-        <p:txBody>
-          <a:bodyPr wrap="square" rtlCol="0">
-            <a:spAutoFit/>
-          </a:bodyPr>
-          <a:lstStyle/>
-          <a:p>
-            <a:r>
-              <a:rPr lang="en-US" sz="1200" b="1" dirty="0"/>
-              <a:t>%M  [000006] </a:t>
-            </a:r>
-          </a:p>
-          <a:p>
-            <a:r>
-              <a:rPr lang="en-US" sz="1200" b="1" dirty="0"/>
-              <a:t>Train Exit Departure Signal</a:t>
-            </a:r>
-          </a:p>
-        </p:txBody>
-      </p:sp>
+        </p:spPr>
+      </p:pic>
     </p:spTree>
     <p:extLst>
       <p:ext uri="{BB962C8B-B14F-4D97-AF65-F5344CB8AC3E}">
@@ -6977,7 +6978,13 @@
   <p:cSld>
     <p:spTree>
       <p:nvGrpSpPr>
-        <p:cNvPr id="1" name=""/>
+        <p:cNvPr id="1" name="">
+          <a:extLst>
+            <a:ext uri="{FF2B5EF4-FFF2-40B4-BE49-F238E27FC236}">
+              <a16:creationId xmlns:a16="http://schemas.microsoft.com/office/drawing/2014/main" id="{1F45179B-0979-0958-6F2F-E4FDA5C7E451}"/>
+            </a:ext>
+          </a:extLst>
+        </p:cNvPr>
         <p:cNvGrpSpPr/>
         <p:nvPr/>
       </p:nvGrpSpPr>
@@ -6989,120 +6996,12 @@
           <a:chExt cx="0" cy="0"/>
         </a:xfrm>
       </p:grpSpPr>
-      <p:sp>
-        <p:nvSpPr>
-          <p:cNvPr id="4" name="TextBox 3">
-            <a:extLst>
-              <a:ext uri="{FF2B5EF4-FFF2-40B4-BE49-F238E27FC236}">
-                <a16:creationId xmlns:a16="http://schemas.microsoft.com/office/drawing/2014/main" id="{3875B5DB-28E1-E734-F7DC-771BB9291467}"/>
-              </a:ext>
-            </a:extLst>
-          </p:cNvPr>
-          <p:cNvSpPr txBox="1"/>
-          <p:nvPr/>
-        </p:nvSpPr>
-        <p:spPr>
-          <a:xfrm>
-            <a:off x="672590" y="1345024"/>
-            <a:ext cx="1169149" cy="246221"/>
-          </a:xfrm>
-          <a:prstGeom prst="rect">
-            <a:avLst/>
-          </a:prstGeom>
-          <a:noFill/>
-        </p:spPr>
-        <p:txBody>
-          <a:bodyPr wrap="square" rtlCol="0">
-            <a:spAutoFit/>
-          </a:bodyPr>
-          <a:lstStyle/>
-          <a:p>
-            <a:r>
-              <a:rPr lang="en-US" sz="1000" b="1" dirty="0"/>
-              <a:t>Train sensor 1</a:t>
-            </a:r>
-            <a:endParaRPr lang="en-SG" sz="1000" b="1" dirty="0"/>
-          </a:p>
-        </p:txBody>
-      </p:sp>
-      <p:pic>
-        <p:nvPicPr>
-          <p:cNvPr id="6" name="Picture 5">
-            <a:extLst>
-              <a:ext uri="{FF2B5EF4-FFF2-40B4-BE49-F238E27FC236}">
-                <a16:creationId xmlns:a16="http://schemas.microsoft.com/office/drawing/2014/main" id="{51EF208F-736F-D757-196B-6729B68A51B5}"/>
-              </a:ext>
-            </a:extLst>
-          </p:cNvPr>
-          <p:cNvPicPr>
-            <a:picLocks noChangeAspect="1"/>
-          </p:cNvPicPr>
-          <p:nvPr/>
-        </p:nvPicPr>
-        <p:blipFill>
-          <a:blip r:embed="rId2">
-            <a:extLst>
-              <a:ext uri="{28A0092B-C50C-407E-A947-70E740481C1C}">
-                <a14:useLocalDpi xmlns:a14="http://schemas.microsoft.com/office/drawing/2010/main" val="0"/>
-              </a:ext>
-            </a:extLst>
-          </a:blip>
-          <a:stretch>
-            <a:fillRect/>
-          </a:stretch>
-        </p:blipFill>
-        <p:spPr>
-          <a:xfrm>
-            <a:off x="1918200" y="1249714"/>
-            <a:ext cx="476190" cy="466667"/>
-          </a:xfrm>
-          <a:prstGeom prst="rect">
-            <a:avLst/>
-          </a:prstGeom>
-        </p:spPr>
-      </p:pic>
-      <p:sp>
-        <p:nvSpPr>
-          <p:cNvPr id="9" name="TextBox 8">
-            <a:extLst>
-              <a:ext uri="{FF2B5EF4-FFF2-40B4-BE49-F238E27FC236}">
-                <a16:creationId xmlns:a16="http://schemas.microsoft.com/office/drawing/2014/main" id="{9B9549DE-0D7C-4EF4-8F87-06B9838F4CA4}"/>
-              </a:ext>
-            </a:extLst>
-          </p:cNvPr>
-          <p:cNvSpPr txBox="1"/>
-          <p:nvPr/>
-        </p:nvSpPr>
-        <p:spPr>
-          <a:xfrm>
-            <a:off x="7493583" y="1345023"/>
-            <a:ext cx="1606035" cy="246221"/>
-          </a:xfrm>
-          <a:prstGeom prst="rect">
-            <a:avLst/>
-          </a:prstGeom>
-          <a:noFill/>
-        </p:spPr>
-        <p:txBody>
-          <a:bodyPr wrap="square" rtlCol="0">
-            <a:spAutoFit/>
-          </a:bodyPr>
-          <a:lstStyle/>
-          <a:p>
-            <a:r>
-              <a:rPr lang="en-US" sz="1000" b="1" dirty="0"/>
-              <a:t>Entrance Dock Signal</a:t>
-            </a:r>
-            <a:endParaRPr lang="en-SG" sz="1000" b="1" dirty="0"/>
-          </a:p>
-        </p:txBody>
-      </p:sp>
       <p:cxnSp>
         <p:nvCxnSpPr>
-          <p:cNvPr id="10" name="Straight Connector 9">
-            <a:extLst>
-              <a:ext uri="{FF2B5EF4-FFF2-40B4-BE49-F238E27FC236}">
-                <a16:creationId xmlns:a16="http://schemas.microsoft.com/office/drawing/2014/main" id="{1213DBED-763D-81F2-FA70-1272F0FAC5A3}"/>
+          <p:cNvPr id="4" name="Straight Connector 3">
+            <a:extLst>
+              <a:ext uri="{FF2B5EF4-FFF2-40B4-BE49-F238E27FC236}">
+                <a16:creationId xmlns:a16="http://schemas.microsoft.com/office/drawing/2014/main" id="{128BC062-448C-A3E1-82C5-84AE024536F4}"/>
               </a:ext>
             </a:extLst>
           </p:cNvPr>
@@ -7113,8 +7012,8 @@
         </p:nvCxnSpPr>
         <p:spPr>
           <a:xfrm>
-            <a:off x="7073661" y="1492192"/>
-            <a:ext cx="419922" cy="0"/>
+            <a:off x="1254605" y="2068684"/>
+            <a:ext cx="3250612" cy="0"/>
           </a:xfrm>
           <a:prstGeom prst="line">
             <a:avLst/>
@@ -7137,10 +7036,170 @@
       </p:cxnSp>
       <p:sp>
         <p:nvSpPr>
-          <p:cNvPr id="11" name="Rectangle 10">
-            <a:extLst>
-              <a:ext uri="{FF2B5EF4-FFF2-40B4-BE49-F238E27FC236}">
-                <a16:creationId xmlns:a16="http://schemas.microsoft.com/office/drawing/2014/main" id="{5949CDAA-8312-4F28-C704-2963A497B802}"/>
+          <p:cNvPr id="37" name="TextBox 36">
+            <a:extLst>
+              <a:ext uri="{FF2B5EF4-FFF2-40B4-BE49-F238E27FC236}">
+                <a16:creationId xmlns:a16="http://schemas.microsoft.com/office/drawing/2014/main" id="{F11BF282-6325-7DA6-CB6F-6F5E471E9A3E}"/>
+              </a:ext>
+            </a:extLst>
+          </p:cNvPr>
+          <p:cNvSpPr txBox="1"/>
+          <p:nvPr/>
+        </p:nvSpPr>
+        <p:spPr>
+          <a:xfrm>
+            <a:off x="736675" y="1367296"/>
+            <a:ext cx="1213446" cy="646331"/>
+          </a:xfrm>
+          <a:prstGeom prst="rect">
+            <a:avLst/>
+          </a:prstGeom>
+          <a:noFill/>
+        </p:spPr>
+        <p:txBody>
+          <a:bodyPr wrap="square" rtlCol="0">
+            <a:spAutoFit/>
+          </a:bodyPr>
+          <a:lstStyle/>
+          <a:p>
+            <a:r>
+              <a:rPr lang="en-US" sz="1200" b="1" dirty="0"/>
+              <a:t>%M [000102] </a:t>
+            </a:r>
+          </a:p>
+          <a:p>
+            <a:r>
+              <a:rPr lang="en-US" sz="1200" b="1" dirty="0"/>
+              <a:t>Train sensor 2</a:t>
+            </a:r>
+            <a:endParaRPr lang="en-SG" sz="1200" b="1" dirty="0"/>
+          </a:p>
+          <a:p>
+            <a:endParaRPr lang="en-SG" sz="1200" b="1" dirty="0"/>
+          </a:p>
+        </p:txBody>
+      </p:sp>
+      <p:sp>
+        <p:nvSpPr>
+          <p:cNvPr id="40" name="TextBox 39">
+            <a:extLst>
+              <a:ext uri="{FF2B5EF4-FFF2-40B4-BE49-F238E27FC236}">
+                <a16:creationId xmlns:a16="http://schemas.microsoft.com/office/drawing/2014/main" id="{2B326454-FC87-049D-8870-4AEF8829E4E3}"/>
+              </a:ext>
+            </a:extLst>
+          </p:cNvPr>
+          <p:cNvSpPr txBox="1"/>
+          <p:nvPr/>
+        </p:nvSpPr>
+        <p:spPr>
+          <a:xfrm>
+            <a:off x="736675" y="517099"/>
+            <a:ext cx="2235866" cy="461665"/>
+          </a:xfrm>
+          <a:prstGeom prst="rect">
+            <a:avLst/>
+          </a:prstGeom>
+          <a:noFill/>
+        </p:spPr>
+        <p:txBody>
+          <a:bodyPr wrap="square" rtlCol="0">
+            <a:spAutoFit/>
+          </a:bodyPr>
+          <a:lstStyle/>
+          <a:p>
+            <a:r>
+              <a:rPr lang="en-US" sz="1200" b="1" dirty="0"/>
+              <a:t>%C [000111] </a:t>
+            </a:r>
+          </a:p>
+          <a:p>
+            <a:r>
+              <a:rPr lang="en-SG" sz="1200" b="1" dirty="0"/>
+              <a:t>HMI Door Overload Switch </a:t>
+            </a:r>
+          </a:p>
+        </p:txBody>
+      </p:sp>
+      <p:pic>
+        <p:nvPicPr>
+          <p:cNvPr id="41" name="Picture 40">
+            <a:extLst>
+              <a:ext uri="{FF2B5EF4-FFF2-40B4-BE49-F238E27FC236}">
+                <a16:creationId xmlns:a16="http://schemas.microsoft.com/office/drawing/2014/main" id="{1EBD8DC7-E991-BF41-117B-F6B7DEEB8750}"/>
+              </a:ext>
+            </a:extLst>
+          </p:cNvPr>
+          <p:cNvPicPr>
+            <a:picLocks noChangeAspect="1"/>
+          </p:cNvPicPr>
+          <p:nvPr/>
+        </p:nvPicPr>
+        <p:blipFill>
+          <a:blip r:embed="rId2">
+            <a:extLst>
+              <a:ext uri="{28A0092B-C50C-407E-A947-70E740481C1C}">
+                <a14:useLocalDpi xmlns:a14="http://schemas.microsoft.com/office/drawing/2010/main" val="0"/>
+              </a:ext>
+            </a:extLst>
+          </a:blip>
+          <a:stretch>
+            <a:fillRect/>
+          </a:stretch>
+        </p:blipFill>
+        <p:spPr>
+          <a:xfrm>
+            <a:off x="907090" y="978764"/>
+            <a:ext cx="409524" cy="323810"/>
+          </a:xfrm>
+          <a:prstGeom prst="rect">
+            <a:avLst/>
+          </a:prstGeom>
+        </p:spPr>
+      </p:pic>
+      <p:cxnSp>
+        <p:nvCxnSpPr>
+          <p:cNvPr id="42" name="Straight Connector 41">
+            <a:extLst>
+              <a:ext uri="{FF2B5EF4-FFF2-40B4-BE49-F238E27FC236}">
+                <a16:creationId xmlns:a16="http://schemas.microsoft.com/office/drawing/2014/main" id="{7D46B1CD-3624-8BE6-94EB-3D6F8C7C4A11}"/>
+              </a:ext>
+            </a:extLst>
+          </p:cNvPr>
+          <p:cNvCxnSpPr>
+            <a:cxnSpLocks/>
+          </p:cNvCxnSpPr>
+          <p:nvPr/>
+        </p:nvCxnSpPr>
+        <p:spPr>
+          <a:xfrm>
+            <a:off x="1316614" y="1140669"/>
+            <a:ext cx="3214892" cy="0"/>
+          </a:xfrm>
+          <a:prstGeom prst="line">
+            <a:avLst/>
+          </a:prstGeom>
+        </p:spPr>
+        <p:style>
+          <a:lnRef idx="2">
+            <a:schemeClr val="accent1"/>
+          </a:lnRef>
+          <a:fillRef idx="0">
+            <a:schemeClr val="accent1"/>
+          </a:fillRef>
+          <a:effectRef idx="1">
+            <a:schemeClr val="accent1"/>
+          </a:effectRef>
+          <a:fontRef idx="minor">
+            <a:schemeClr val="tx1"/>
+          </a:fontRef>
+        </p:style>
+      </p:cxnSp>
+      <p:sp>
+        <p:nvSpPr>
+          <p:cNvPr id="43" name="Rectangle 42">
+            <a:extLst>
+              <a:ext uri="{FF2B5EF4-FFF2-40B4-BE49-F238E27FC236}">
+                <a16:creationId xmlns:a16="http://schemas.microsoft.com/office/drawing/2014/main" id="{8DA7321B-2B69-C6F0-7DDA-9EAF621456B9}"/>
               </a:ext>
             </a:extLst>
           </p:cNvPr>
@@ -7149,17 +7208,14 @@
         </p:nvSpPr>
         <p:spPr>
           <a:xfrm>
-            <a:off x="7626096" y="523567"/>
-            <a:ext cx="2154189" cy="840816"/>
+            <a:off x="4531506" y="989930"/>
+            <a:ext cx="2172039" cy="1222371"/>
           </a:xfrm>
           <a:prstGeom prst="rect">
             <a:avLst/>
           </a:prstGeom>
           <a:solidFill>
-            <a:schemeClr val="tx2">
-              <a:lumMod val="75000"/>
-              <a:lumOff val="25000"/>
-            </a:schemeClr>
+            <a:schemeClr val="bg1"/>
           </a:solidFill>
           <a:ln>
             <a:solidFill>
@@ -7188,42 +7244,3483 @@
           <a:lstStyle/>
           <a:p>
             <a:r>
-              <a:rPr lang="en-US" sz="1100" b="1" dirty="0"/>
-              <a:t>Condition Selector</a:t>
-            </a:r>
-          </a:p>
-          <a:p>
-            <a:r>
-              <a:rPr lang="en-US" sz="1100" b="1" dirty="0" err="1"/>
-              <a:t>Step.Lower</a:t>
-            </a:r>
-            <a:r>
-              <a:rPr lang="en-US" sz="1100" b="1" dirty="0"/>
-              <a:t> =&gt; output = False</a:t>
-            </a:r>
-          </a:p>
-          <a:p>
-            <a:r>
-              <a:rPr lang="en-US" sz="1100" b="1" dirty="0" err="1"/>
-              <a:t>Step.Higher</a:t>
-            </a:r>
-            <a:r>
-              <a:rPr lang="en-US" sz="1100" b="1" dirty="0"/>
-              <a:t> =&gt; output =  True </a:t>
-            </a:r>
-          </a:p>
-          <a:p>
-            <a:r>
-              <a:rPr lang="en-US" sz="1050" b="1" dirty="0"/>
-              <a:t>Step.Invalid_0 =&gt; output = input</a:t>
-            </a:r>
+              <a:rPr lang="en-US" sz="1050" b="1" dirty="0">
+                <a:solidFill>
+                  <a:schemeClr val="tx1"/>
+                </a:solidFill>
+              </a:rPr>
+              <a:t>IF IN_STATE1 == STEP.HIGHER</a:t>
+            </a:r>
+          </a:p>
+          <a:p>
+            <a:r>
+              <a:rPr lang="en-US" sz="1050" b="1" dirty="0">
+                <a:solidFill>
+                  <a:schemeClr val="tx1"/>
+                </a:solidFill>
+              </a:rPr>
+              <a:t>  OUT =  TRUE</a:t>
+            </a:r>
+          </a:p>
+          <a:p>
+            <a:r>
+              <a:rPr lang="en-US" sz="1050" b="1" dirty="0">
+                <a:solidFill>
+                  <a:schemeClr val="tx1"/>
+                </a:solidFill>
+              </a:rPr>
+              <a:t>ELIF IN_STATA1 == STEP.LOWER</a:t>
+            </a:r>
+          </a:p>
+          <a:p>
+            <a:r>
+              <a:rPr lang="en-US" sz="1050" b="1" dirty="0">
+                <a:solidFill>
+                  <a:schemeClr val="tx1"/>
+                </a:solidFill>
+              </a:rPr>
+              <a:t>  OUT  = FALSE</a:t>
+            </a:r>
+          </a:p>
+          <a:p>
+            <a:r>
+              <a:rPr lang="en-US" sz="1050" b="1" dirty="0">
+                <a:solidFill>
+                  <a:schemeClr val="tx1"/>
+                </a:solidFill>
+              </a:rPr>
+              <a:t>ELSE</a:t>
+            </a:r>
+          </a:p>
+          <a:p>
+            <a:r>
+              <a:rPr lang="en-US" sz="1050" b="1" dirty="0">
+                <a:solidFill>
+                  <a:schemeClr val="tx1"/>
+                </a:solidFill>
+              </a:rPr>
+              <a:t>  OUT = IN_STATE2</a:t>
+            </a:r>
+          </a:p>
+          <a:p>
+            <a:r>
+              <a:rPr lang="en-US" sz="1050" b="1" dirty="0">
+                <a:solidFill>
+                  <a:schemeClr val="tx1"/>
+                </a:solidFill>
+              </a:rPr>
+              <a:t>END IF </a:t>
+            </a:r>
+          </a:p>
+        </p:txBody>
+      </p:sp>
+      <p:sp>
+        <p:nvSpPr>
+          <p:cNvPr id="44" name="TextBox 43">
+            <a:extLst>
+              <a:ext uri="{FF2B5EF4-FFF2-40B4-BE49-F238E27FC236}">
+                <a16:creationId xmlns:a16="http://schemas.microsoft.com/office/drawing/2014/main" id="{5C5B6140-EFDF-0F8D-EA34-8F26519DFC3F}"/>
+              </a:ext>
+            </a:extLst>
+          </p:cNvPr>
+          <p:cNvSpPr txBox="1"/>
+          <p:nvPr/>
+        </p:nvSpPr>
+        <p:spPr>
+          <a:xfrm>
+            <a:off x="3716060" y="894448"/>
+            <a:ext cx="815445" cy="246221"/>
+          </a:xfrm>
+          <a:prstGeom prst="rect">
+            <a:avLst/>
+          </a:prstGeom>
+          <a:noFill/>
+        </p:spPr>
+        <p:txBody>
+          <a:bodyPr wrap="square" rtlCol="0">
+            <a:spAutoFit/>
+          </a:bodyPr>
+          <a:lstStyle/>
+          <a:p>
+            <a:r>
+              <a:rPr lang="en-US" sz="1000" b="1" dirty="0">
+                <a:solidFill>
+                  <a:schemeClr val="tx2">
+                    <a:lumMod val="90000"/>
+                    <a:lumOff val="10000"/>
+                  </a:schemeClr>
+                </a:solidFill>
+              </a:rPr>
+              <a:t>IN_STATE1 </a:t>
+            </a:r>
+            <a:endParaRPr lang="en-SG" sz="1000" b="1" dirty="0">
+              <a:solidFill>
+                <a:schemeClr val="tx2">
+                  <a:lumMod val="90000"/>
+                  <a:lumOff val="10000"/>
+                </a:schemeClr>
+              </a:solidFill>
+            </a:endParaRPr>
+          </a:p>
+        </p:txBody>
+      </p:sp>
+      <p:sp>
+        <p:nvSpPr>
+          <p:cNvPr id="45" name="TextBox 44">
+            <a:extLst>
+              <a:ext uri="{FF2B5EF4-FFF2-40B4-BE49-F238E27FC236}">
+                <a16:creationId xmlns:a16="http://schemas.microsoft.com/office/drawing/2014/main" id="{34B778CA-C029-BF0E-E07E-D79D2A1CA8CC}"/>
+              </a:ext>
+            </a:extLst>
+          </p:cNvPr>
+          <p:cNvSpPr txBox="1"/>
+          <p:nvPr/>
+        </p:nvSpPr>
+        <p:spPr>
+          <a:xfrm>
+            <a:off x="3709754" y="1787385"/>
+            <a:ext cx="815445" cy="246221"/>
+          </a:xfrm>
+          <a:prstGeom prst="rect">
+            <a:avLst/>
+          </a:prstGeom>
+          <a:noFill/>
+        </p:spPr>
+        <p:txBody>
+          <a:bodyPr wrap="square" rtlCol="0">
+            <a:spAutoFit/>
+          </a:bodyPr>
+          <a:lstStyle/>
+          <a:p>
+            <a:r>
+              <a:rPr lang="en-US" sz="1000" b="1" dirty="0">
+                <a:solidFill>
+                  <a:schemeClr val="tx2">
+                    <a:lumMod val="90000"/>
+                    <a:lumOff val="10000"/>
+                  </a:schemeClr>
+                </a:solidFill>
+              </a:rPr>
+              <a:t>IN_STATE2 </a:t>
+            </a:r>
+            <a:endParaRPr lang="en-SG" sz="1000" b="1" dirty="0">
+              <a:solidFill>
+                <a:schemeClr val="tx2">
+                  <a:lumMod val="90000"/>
+                  <a:lumOff val="10000"/>
+                </a:schemeClr>
+              </a:solidFill>
+            </a:endParaRPr>
+          </a:p>
+        </p:txBody>
+      </p:sp>
+      <p:cxnSp>
+        <p:nvCxnSpPr>
+          <p:cNvPr id="46" name="Straight Connector 45">
+            <a:extLst>
+              <a:ext uri="{FF2B5EF4-FFF2-40B4-BE49-F238E27FC236}">
+                <a16:creationId xmlns:a16="http://schemas.microsoft.com/office/drawing/2014/main" id="{48FD6EFF-C1A2-F6D0-B67B-9BEDA8163CEE}"/>
+              </a:ext>
+            </a:extLst>
+          </p:cNvPr>
+          <p:cNvCxnSpPr>
+            <a:cxnSpLocks/>
+          </p:cNvCxnSpPr>
+          <p:nvPr/>
+        </p:nvCxnSpPr>
+        <p:spPr>
+          <a:xfrm>
+            <a:off x="6703545" y="2031915"/>
+            <a:ext cx="1307592" cy="0"/>
+          </a:xfrm>
+          <a:prstGeom prst="line">
+            <a:avLst/>
+          </a:prstGeom>
+        </p:spPr>
+        <p:style>
+          <a:lnRef idx="2">
+            <a:schemeClr val="accent1"/>
+          </a:lnRef>
+          <a:fillRef idx="0">
+            <a:schemeClr val="accent1"/>
+          </a:fillRef>
+          <a:effectRef idx="1">
+            <a:schemeClr val="accent1"/>
+          </a:effectRef>
+          <a:fontRef idx="minor">
+            <a:schemeClr val="tx1"/>
+          </a:fontRef>
+        </p:style>
+      </p:cxnSp>
+      <p:sp>
+        <p:nvSpPr>
+          <p:cNvPr id="48" name="TextBox 47">
+            <a:extLst>
+              <a:ext uri="{FF2B5EF4-FFF2-40B4-BE49-F238E27FC236}">
+                <a16:creationId xmlns:a16="http://schemas.microsoft.com/office/drawing/2014/main" id="{26888A8B-78A1-AD12-2B80-95EB30C33B7D}"/>
+              </a:ext>
+            </a:extLst>
+          </p:cNvPr>
+          <p:cNvSpPr txBox="1"/>
+          <p:nvPr/>
+        </p:nvSpPr>
+        <p:spPr>
+          <a:xfrm>
+            <a:off x="6657500" y="1807295"/>
+            <a:ext cx="462557" cy="246221"/>
+          </a:xfrm>
+          <a:prstGeom prst="rect">
+            <a:avLst/>
+          </a:prstGeom>
+          <a:noFill/>
+        </p:spPr>
+        <p:txBody>
+          <a:bodyPr wrap="square" rtlCol="0">
+            <a:spAutoFit/>
+          </a:bodyPr>
+          <a:lstStyle/>
+          <a:p>
+            <a:r>
+              <a:rPr lang="en-US" sz="1000" b="1" dirty="0">
+                <a:solidFill>
+                  <a:schemeClr val="tx2">
+                    <a:lumMod val="90000"/>
+                    <a:lumOff val="10000"/>
+                  </a:schemeClr>
+                </a:solidFill>
+              </a:rPr>
+              <a:t>OUT</a:t>
+            </a:r>
+            <a:endParaRPr lang="en-SG" sz="1000" b="1" dirty="0">
+              <a:solidFill>
+                <a:schemeClr val="tx2">
+                  <a:lumMod val="90000"/>
+                  <a:lumOff val="10000"/>
+                </a:schemeClr>
+              </a:solidFill>
+            </a:endParaRPr>
+          </a:p>
+        </p:txBody>
+      </p:sp>
+      <p:sp>
+        <p:nvSpPr>
+          <p:cNvPr id="51" name="TextBox 50">
+            <a:extLst>
+              <a:ext uri="{FF2B5EF4-FFF2-40B4-BE49-F238E27FC236}">
+                <a16:creationId xmlns:a16="http://schemas.microsoft.com/office/drawing/2014/main" id="{F8DD8452-A6B1-8BA7-BA85-FACC4DC2EFDD}"/>
+              </a:ext>
+            </a:extLst>
+          </p:cNvPr>
+          <p:cNvSpPr txBox="1"/>
+          <p:nvPr/>
+        </p:nvSpPr>
+        <p:spPr>
+          <a:xfrm>
+            <a:off x="7292338" y="1386745"/>
+            <a:ext cx="1847122" cy="461665"/>
+          </a:xfrm>
+          <a:prstGeom prst="rect">
+            <a:avLst/>
+          </a:prstGeom>
+          <a:noFill/>
+        </p:spPr>
+        <p:txBody>
+          <a:bodyPr wrap="square" rtlCol="0">
+            <a:spAutoFit/>
+          </a:bodyPr>
+          <a:lstStyle/>
+          <a:p>
+            <a:r>
+              <a:rPr lang="en-US" sz="1200" b="1" dirty="0"/>
+              <a:t>%M  [000105]</a:t>
+            </a:r>
+          </a:p>
+          <a:p>
+            <a:r>
+              <a:rPr lang="en-US" sz="1200" b="1" dirty="0"/>
+              <a:t>Platform Door Motor</a:t>
+            </a:r>
+          </a:p>
+        </p:txBody>
+      </p:sp>
+      <p:cxnSp>
+        <p:nvCxnSpPr>
+          <p:cNvPr id="52" name="Straight Connector 51">
+            <a:extLst>
+              <a:ext uri="{FF2B5EF4-FFF2-40B4-BE49-F238E27FC236}">
+                <a16:creationId xmlns:a16="http://schemas.microsoft.com/office/drawing/2014/main" id="{B33C70B0-F522-73D6-0433-6E3FF677DBC5}"/>
+              </a:ext>
+            </a:extLst>
+          </p:cNvPr>
+          <p:cNvCxnSpPr>
+            <a:cxnSpLocks/>
+          </p:cNvCxnSpPr>
+          <p:nvPr/>
+        </p:nvCxnSpPr>
+        <p:spPr>
+          <a:xfrm>
+            <a:off x="6747851" y="3662513"/>
+            <a:ext cx="1263286" cy="0"/>
+          </a:xfrm>
+          <a:prstGeom prst="line">
+            <a:avLst/>
+          </a:prstGeom>
+        </p:spPr>
+        <p:style>
+          <a:lnRef idx="2">
+            <a:schemeClr val="accent1"/>
+          </a:lnRef>
+          <a:fillRef idx="0">
+            <a:schemeClr val="accent1"/>
+          </a:fillRef>
+          <a:effectRef idx="1">
+            <a:schemeClr val="accent1"/>
+          </a:effectRef>
+          <a:fontRef idx="minor">
+            <a:schemeClr val="tx1"/>
+          </a:fontRef>
+        </p:style>
+      </p:cxnSp>
+      <p:sp>
+        <p:nvSpPr>
+          <p:cNvPr id="55" name="TextBox 54">
+            <a:extLst>
+              <a:ext uri="{FF2B5EF4-FFF2-40B4-BE49-F238E27FC236}">
+                <a16:creationId xmlns:a16="http://schemas.microsoft.com/office/drawing/2014/main" id="{1BD02395-0273-249E-84F0-9EE42EA64D92}"/>
+              </a:ext>
+            </a:extLst>
+          </p:cNvPr>
+          <p:cNvSpPr txBox="1"/>
+          <p:nvPr/>
+        </p:nvSpPr>
+        <p:spPr>
+          <a:xfrm>
+            <a:off x="832778" y="3209986"/>
+            <a:ext cx="2139763" cy="461665"/>
+          </a:xfrm>
+          <a:prstGeom prst="rect">
+            <a:avLst/>
+          </a:prstGeom>
+          <a:noFill/>
+        </p:spPr>
+        <p:txBody>
+          <a:bodyPr wrap="square" rtlCol="0">
+            <a:spAutoFit/>
+          </a:bodyPr>
+          <a:lstStyle/>
+          <a:p>
+            <a:r>
+              <a:rPr lang="en-US" sz="1200" b="1" dirty="0"/>
+              <a:t>%C [000112] </a:t>
+            </a:r>
+          </a:p>
+          <a:p>
+            <a:r>
+              <a:rPr lang="en-SG" sz="1200" b="1" dirty="0"/>
+              <a:t>HMI  Signal Overload Switch </a:t>
+            </a:r>
+          </a:p>
+        </p:txBody>
+      </p:sp>
+      <p:pic>
+        <p:nvPicPr>
+          <p:cNvPr id="56" name="Picture 55">
+            <a:extLst>
+              <a:ext uri="{FF2B5EF4-FFF2-40B4-BE49-F238E27FC236}">
+                <a16:creationId xmlns:a16="http://schemas.microsoft.com/office/drawing/2014/main" id="{2A8EA7F1-7D86-05CB-73F0-48303BD70A90}"/>
+              </a:ext>
+            </a:extLst>
+          </p:cNvPr>
+          <p:cNvPicPr>
+            <a:picLocks noChangeAspect="1"/>
+          </p:cNvPicPr>
+          <p:nvPr/>
+        </p:nvPicPr>
+        <p:blipFill>
+          <a:blip r:embed="rId2">
+            <a:extLst>
+              <a:ext uri="{28A0092B-C50C-407E-A947-70E740481C1C}">
+                <a14:useLocalDpi xmlns:a14="http://schemas.microsoft.com/office/drawing/2010/main" val="0"/>
+              </a:ext>
+            </a:extLst>
+          </a:blip>
+          <a:stretch>
+            <a:fillRect/>
+          </a:stretch>
+        </p:blipFill>
+        <p:spPr>
+          <a:xfrm>
+            <a:off x="960661" y="3671651"/>
+            <a:ext cx="409524" cy="323810"/>
+          </a:xfrm>
+          <a:prstGeom prst="rect">
+            <a:avLst/>
+          </a:prstGeom>
+        </p:spPr>
+      </p:pic>
+      <p:cxnSp>
+        <p:nvCxnSpPr>
+          <p:cNvPr id="57" name="Straight Connector 56">
+            <a:extLst>
+              <a:ext uri="{FF2B5EF4-FFF2-40B4-BE49-F238E27FC236}">
+                <a16:creationId xmlns:a16="http://schemas.microsoft.com/office/drawing/2014/main" id="{9029D66C-E02C-A8C0-7FED-5CE41F5A4338}"/>
+              </a:ext>
+            </a:extLst>
+          </p:cNvPr>
+          <p:cNvCxnSpPr>
+            <a:cxnSpLocks/>
+          </p:cNvCxnSpPr>
+          <p:nvPr/>
+        </p:nvCxnSpPr>
+        <p:spPr>
+          <a:xfrm>
+            <a:off x="1380818" y="3833556"/>
+            <a:ext cx="3214892" cy="0"/>
+          </a:xfrm>
+          <a:prstGeom prst="line">
+            <a:avLst/>
+          </a:prstGeom>
+        </p:spPr>
+        <p:style>
+          <a:lnRef idx="2">
+            <a:schemeClr val="accent1"/>
+          </a:lnRef>
+          <a:fillRef idx="0">
+            <a:schemeClr val="accent1"/>
+          </a:fillRef>
+          <a:effectRef idx="1">
+            <a:schemeClr val="accent1"/>
+          </a:effectRef>
+          <a:fontRef idx="minor">
+            <a:schemeClr val="tx1"/>
+          </a:fontRef>
+        </p:style>
+      </p:cxnSp>
+      <p:sp>
+        <p:nvSpPr>
+          <p:cNvPr id="59" name="TextBox 58">
+            <a:extLst>
+              <a:ext uri="{FF2B5EF4-FFF2-40B4-BE49-F238E27FC236}">
+                <a16:creationId xmlns:a16="http://schemas.microsoft.com/office/drawing/2014/main" id="{B94890C7-0288-E7CE-7583-582EFBECA1C6}"/>
+              </a:ext>
+            </a:extLst>
+          </p:cNvPr>
+          <p:cNvSpPr txBox="1"/>
+          <p:nvPr/>
+        </p:nvSpPr>
+        <p:spPr>
+          <a:xfrm>
+            <a:off x="3760367" y="2547067"/>
+            <a:ext cx="815445" cy="246221"/>
+          </a:xfrm>
+          <a:prstGeom prst="rect">
+            <a:avLst/>
+          </a:prstGeom>
+          <a:noFill/>
+        </p:spPr>
+        <p:txBody>
+          <a:bodyPr wrap="square" rtlCol="0">
+            <a:spAutoFit/>
+          </a:bodyPr>
+          <a:lstStyle/>
+          <a:p>
+            <a:r>
+              <a:rPr lang="en-US" sz="1000" b="1" dirty="0">
+                <a:solidFill>
+                  <a:schemeClr val="tx2">
+                    <a:lumMod val="90000"/>
+                    <a:lumOff val="10000"/>
+                  </a:schemeClr>
+                </a:solidFill>
+              </a:rPr>
+              <a:t>IN_STATE1 </a:t>
+            </a:r>
+            <a:endParaRPr lang="en-SG" sz="1000" b="1" dirty="0">
+              <a:solidFill>
+                <a:schemeClr val="tx2">
+                  <a:lumMod val="90000"/>
+                  <a:lumOff val="10000"/>
+                </a:schemeClr>
+              </a:solidFill>
+            </a:endParaRPr>
+          </a:p>
+        </p:txBody>
+      </p:sp>
+      <p:sp>
+        <p:nvSpPr>
+          <p:cNvPr id="60" name="TextBox 59">
+            <a:extLst>
+              <a:ext uri="{FF2B5EF4-FFF2-40B4-BE49-F238E27FC236}">
+                <a16:creationId xmlns:a16="http://schemas.microsoft.com/office/drawing/2014/main" id="{A3FF6120-9D3C-0CA6-003D-F2671B00E9D8}"/>
+              </a:ext>
+            </a:extLst>
+          </p:cNvPr>
+          <p:cNvSpPr txBox="1"/>
+          <p:nvPr/>
+        </p:nvSpPr>
+        <p:spPr>
+          <a:xfrm>
+            <a:off x="3783886" y="3587335"/>
+            <a:ext cx="815445" cy="246221"/>
+          </a:xfrm>
+          <a:prstGeom prst="rect">
+            <a:avLst/>
+          </a:prstGeom>
+          <a:noFill/>
+        </p:spPr>
+        <p:txBody>
+          <a:bodyPr wrap="square" rtlCol="0">
+            <a:spAutoFit/>
+          </a:bodyPr>
+          <a:lstStyle/>
+          <a:p>
+            <a:r>
+              <a:rPr lang="en-US" sz="1000" b="1" dirty="0">
+                <a:solidFill>
+                  <a:schemeClr val="tx2">
+                    <a:lumMod val="90000"/>
+                    <a:lumOff val="10000"/>
+                  </a:schemeClr>
+                </a:solidFill>
+              </a:rPr>
+              <a:t>IN_STATE2 </a:t>
+            </a:r>
+            <a:endParaRPr lang="en-SG" sz="1000" b="1" dirty="0">
+              <a:solidFill>
+                <a:schemeClr val="tx2">
+                  <a:lumMod val="90000"/>
+                  <a:lumOff val="10000"/>
+                </a:schemeClr>
+              </a:solidFill>
+            </a:endParaRPr>
+          </a:p>
+        </p:txBody>
+      </p:sp>
+      <p:cxnSp>
+        <p:nvCxnSpPr>
+          <p:cNvPr id="61" name="Straight Connector 60">
+            <a:extLst>
+              <a:ext uri="{FF2B5EF4-FFF2-40B4-BE49-F238E27FC236}">
+                <a16:creationId xmlns:a16="http://schemas.microsoft.com/office/drawing/2014/main" id="{6D86C308-236B-8328-76B0-AC3A8448E258}"/>
+              </a:ext>
+            </a:extLst>
+          </p:cNvPr>
+          <p:cNvCxnSpPr>
+            <a:cxnSpLocks/>
+          </p:cNvCxnSpPr>
+          <p:nvPr/>
+        </p:nvCxnSpPr>
+        <p:spPr>
+          <a:xfrm>
+            <a:off x="3648232" y="2784610"/>
+            <a:ext cx="951099" cy="0"/>
+          </a:xfrm>
+          <a:prstGeom prst="line">
+            <a:avLst/>
+          </a:prstGeom>
+        </p:spPr>
+        <p:style>
+          <a:lnRef idx="2">
+            <a:schemeClr val="accent1"/>
+          </a:lnRef>
+          <a:fillRef idx="0">
+            <a:schemeClr val="accent1"/>
+          </a:fillRef>
+          <a:effectRef idx="1">
+            <a:schemeClr val="accent1"/>
+          </a:effectRef>
+          <a:fontRef idx="minor">
+            <a:schemeClr val="tx1"/>
+          </a:fontRef>
+        </p:style>
+      </p:cxnSp>
+      <p:sp>
+        <p:nvSpPr>
+          <p:cNvPr id="64" name="TextBox 63">
+            <a:extLst>
+              <a:ext uri="{FF2B5EF4-FFF2-40B4-BE49-F238E27FC236}">
+                <a16:creationId xmlns:a16="http://schemas.microsoft.com/office/drawing/2014/main" id="{843F5D4C-D470-B38C-99AE-A3C831C7B85F}"/>
+              </a:ext>
+            </a:extLst>
+          </p:cNvPr>
+          <p:cNvSpPr txBox="1"/>
+          <p:nvPr/>
+        </p:nvSpPr>
+        <p:spPr>
+          <a:xfrm>
+            <a:off x="7379494" y="2956909"/>
+            <a:ext cx="2046159" cy="461665"/>
+          </a:xfrm>
+          <a:prstGeom prst="rect">
+            <a:avLst/>
+          </a:prstGeom>
+          <a:noFill/>
+        </p:spPr>
+        <p:txBody>
+          <a:bodyPr wrap="square" rtlCol="0">
+            <a:spAutoFit/>
+          </a:bodyPr>
+          <a:lstStyle/>
+          <a:p>
+            <a:r>
+              <a:rPr lang="en-US" sz="1200" b="1" dirty="0"/>
+              <a:t>%M  [000006] </a:t>
+            </a:r>
+          </a:p>
+          <a:p>
+            <a:r>
+              <a:rPr lang="en-US" sz="1200" b="1" dirty="0"/>
+              <a:t>Train Exit Departure Signal</a:t>
+            </a:r>
+          </a:p>
+        </p:txBody>
+      </p:sp>
+      <p:pic>
+        <p:nvPicPr>
+          <p:cNvPr id="2" name="Picture 1">
+            <a:extLst>
+              <a:ext uri="{FF2B5EF4-FFF2-40B4-BE49-F238E27FC236}">
+                <a16:creationId xmlns:a16="http://schemas.microsoft.com/office/drawing/2014/main" id="{2516BF7F-0055-0369-49FB-C71C2E31009B}"/>
+              </a:ext>
+            </a:extLst>
+          </p:cNvPr>
+          <p:cNvPicPr>
+            <a:picLocks noChangeAspect="1"/>
+          </p:cNvPicPr>
+          <p:nvPr/>
+        </p:nvPicPr>
+        <p:blipFill>
+          <a:blip r:embed="rId3">
+            <a:extLst>
+              <a:ext uri="{28A0092B-C50C-407E-A947-70E740481C1C}">
+                <a14:useLocalDpi xmlns:a14="http://schemas.microsoft.com/office/drawing/2010/main" val="0"/>
+              </a:ext>
+            </a:extLst>
+          </a:blip>
+          <a:stretch>
+            <a:fillRect/>
+          </a:stretch>
+        </p:blipFill>
+        <p:spPr>
+          <a:xfrm>
+            <a:off x="8011137" y="1868334"/>
+            <a:ext cx="438095" cy="342857"/>
+          </a:xfrm>
+          <a:prstGeom prst="rect">
+            <a:avLst/>
+          </a:prstGeom>
+        </p:spPr>
+      </p:pic>
+      <p:pic>
+        <p:nvPicPr>
+          <p:cNvPr id="3" name="Picture 2">
+            <a:extLst>
+              <a:ext uri="{FF2B5EF4-FFF2-40B4-BE49-F238E27FC236}">
+                <a16:creationId xmlns:a16="http://schemas.microsoft.com/office/drawing/2014/main" id="{2E186A30-BF39-C3FF-9693-50C26F90E66D}"/>
+              </a:ext>
+            </a:extLst>
+          </p:cNvPr>
+          <p:cNvPicPr>
+            <a:picLocks noChangeAspect="1"/>
+          </p:cNvPicPr>
+          <p:nvPr/>
+        </p:nvPicPr>
+        <p:blipFill>
+          <a:blip r:embed="rId3">
+            <a:extLst>
+              <a:ext uri="{28A0092B-C50C-407E-A947-70E740481C1C}">
+                <a14:useLocalDpi xmlns:a14="http://schemas.microsoft.com/office/drawing/2010/main" val="0"/>
+              </a:ext>
+            </a:extLst>
+          </a:blip>
+          <a:stretch>
+            <a:fillRect/>
+          </a:stretch>
+        </p:blipFill>
+        <p:spPr>
+          <a:xfrm>
+            <a:off x="8011137" y="3500222"/>
+            <a:ext cx="438095" cy="342857"/>
+          </a:xfrm>
+          <a:prstGeom prst="rect">
+            <a:avLst/>
+          </a:prstGeom>
+        </p:spPr>
+      </p:pic>
+      <p:sp>
+        <p:nvSpPr>
+          <p:cNvPr id="5" name="Rectangle 4">
+            <a:extLst>
+              <a:ext uri="{FF2B5EF4-FFF2-40B4-BE49-F238E27FC236}">
+                <a16:creationId xmlns:a16="http://schemas.microsoft.com/office/drawing/2014/main" id="{08E79908-A4A4-021C-028D-2F154402CEDB}"/>
+              </a:ext>
+            </a:extLst>
+          </p:cNvPr>
+          <p:cNvSpPr/>
+          <p:nvPr/>
+        </p:nvSpPr>
+        <p:spPr>
+          <a:xfrm>
+            <a:off x="2122402" y="1963781"/>
+            <a:ext cx="1541307" cy="996892"/>
+          </a:xfrm>
+          <a:prstGeom prst="rect">
+            <a:avLst/>
+          </a:prstGeom>
+          <a:solidFill>
+            <a:schemeClr val="bg1"/>
+          </a:solidFill>
+          <a:ln>
+            <a:solidFill>
+              <a:schemeClr val="tx1"/>
+            </a:solidFill>
+          </a:ln>
+        </p:spPr>
+        <p:style>
+          <a:lnRef idx="2">
+            <a:schemeClr val="accent1">
+              <a:shade val="50000"/>
+            </a:schemeClr>
+          </a:lnRef>
+          <a:fillRef idx="1">
+            <a:schemeClr val="accent1"/>
+          </a:fillRef>
+          <a:effectRef idx="0">
+            <a:schemeClr val="accent1"/>
+          </a:effectRef>
+          <a:fontRef idx="minor">
+            <a:schemeClr val="lt1"/>
+          </a:fontRef>
+        </p:style>
+        <p:txBody>
+          <a:bodyPr rtlCol="0" anchor="ctr"/>
+          <a:lstStyle/>
+          <a:p>
+            <a:r>
+              <a:rPr lang="en-US" sz="1050" b="1" dirty="0">
+                <a:solidFill>
+                  <a:schemeClr val="tx1"/>
+                </a:solidFill>
+              </a:rPr>
+              <a:t>COUNT DOWN TIMER</a:t>
+            </a:r>
+          </a:p>
+          <a:p>
+            <a:endParaRPr lang="en-US" sz="1050" b="1" dirty="0">
+              <a:solidFill>
+                <a:schemeClr val="tx1"/>
+              </a:solidFill>
+            </a:endParaRPr>
+          </a:p>
+          <a:p>
+            <a:r>
+              <a:rPr lang="en-US" sz="1050" b="1" dirty="0">
+                <a:solidFill>
+                  <a:schemeClr val="tx1"/>
+                </a:solidFill>
+              </a:rPr>
+              <a:t>  COUNT = 10</a:t>
+            </a:r>
+          </a:p>
+        </p:txBody>
+      </p:sp>
+      <p:pic>
+        <p:nvPicPr>
+          <p:cNvPr id="6" name="Picture 5">
+            <a:extLst>
+              <a:ext uri="{FF2B5EF4-FFF2-40B4-BE49-F238E27FC236}">
+                <a16:creationId xmlns:a16="http://schemas.microsoft.com/office/drawing/2014/main" id="{C2ED9397-5864-C980-1172-20E0C2428A2A}"/>
+              </a:ext>
+            </a:extLst>
+          </p:cNvPr>
+          <p:cNvPicPr>
+            <a:picLocks noChangeAspect="1"/>
+          </p:cNvPicPr>
+          <p:nvPr/>
+        </p:nvPicPr>
+        <p:blipFill>
+          <a:blip r:embed="rId2">
+            <a:extLst>
+              <a:ext uri="{28A0092B-C50C-407E-A947-70E740481C1C}">
+                <a14:useLocalDpi xmlns:a14="http://schemas.microsoft.com/office/drawing/2010/main" val="0"/>
+              </a:ext>
+            </a:extLst>
+          </a:blip>
+          <a:stretch>
+            <a:fillRect/>
+          </a:stretch>
+        </p:blipFill>
+        <p:spPr>
+          <a:xfrm>
+            <a:off x="890797" y="1916266"/>
+            <a:ext cx="409524" cy="323810"/>
+          </a:xfrm>
+          <a:prstGeom prst="rect">
+            <a:avLst/>
+          </a:prstGeom>
+        </p:spPr>
+      </p:pic>
+      <p:cxnSp>
+        <p:nvCxnSpPr>
+          <p:cNvPr id="7" name="Straight Connector 6">
+            <a:extLst>
+              <a:ext uri="{FF2B5EF4-FFF2-40B4-BE49-F238E27FC236}">
+                <a16:creationId xmlns:a16="http://schemas.microsoft.com/office/drawing/2014/main" id="{C2C4A108-4D89-E931-0463-C6BAD62F5139}"/>
+              </a:ext>
+            </a:extLst>
+          </p:cNvPr>
+          <p:cNvCxnSpPr>
+            <a:cxnSpLocks/>
+          </p:cNvCxnSpPr>
+          <p:nvPr/>
+        </p:nvCxnSpPr>
+        <p:spPr>
+          <a:xfrm>
+            <a:off x="1300321" y="2784610"/>
+            <a:ext cx="822081" cy="0"/>
+          </a:xfrm>
+          <a:prstGeom prst="line">
+            <a:avLst/>
+          </a:prstGeom>
+        </p:spPr>
+        <p:style>
+          <a:lnRef idx="2">
+            <a:schemeClr val="accent1"/>
+          </a:lnRef>
+          <a:fillRef idx="0">
+            <a:schemeClr val="accent1"/>
+          </a:fillRef>
+          <a:effectRef idx="1">
+            <a:schemeClr val="accent1"/>
+          </a:effectRef>
+          <a:fontRef idx="minor">
+            <a:schemeClr val="tx1"/>
+          </a:fontRef>
+        </p:style>
+      </p:cxnSp>
+      <p:sp>
+        <p:nvSpPr>
+          <p:cNvPr id="11" name="TextBox 10">
+            <a:extLst>
+              <a:ext uri="{FF2B5EF4-FFF2-40B4-BE49-F238E27FC236}">
+                <a16:creationId xmlns:a16="http://schemas.microsoft.com/office/drawing/2014/main" id="{5D0E485E-29D1-D42A-7B4F-682811BC3FB9}"/>
+              </a:ext>
+            </a:extLst>
+          </p:cNvPr>
+          <p:cNvSpPr txBox="1"/>
+          <p:nvPr/>
+        </p:nvSpPr>
+        <p:spPr>
+          <a:xfrm>
+            <a:off x="845647" y="2633138"/>
+            <a:ext cx="532410" cy="461665"/>
+          </a:xfrm>
+          <a:prstGeom prst="rect">
+            <a:avLst/>
+          </a:prstGeom>
+          <a:noFill/>
+        </p:spPr>
+        <p:txBody>
+          <a:bodyPr wrap="square" rtlCol="0">
+            <a:spAutoFit/>
+          </a:bodyPr>
+          <a:lstStyle/>
+          <a:p>
+            <a:r>
+              <a:rPr lang="en-US" sz="1200" b="1" dirty="0"/>
+              <a:t>CLK</a:t>
+            </a:r>
+            <a:endParaRPr lang="en-SG" sz="1200" b="1" dirty="0"/>
+          </a:p>
+          <a:p>
+            <a:endParaRPr lang="en-SG" sz="1200" b="1" dirty="0"/>
+          </a:p>
+        </p:txBody>
+      </p:sp>
+      <p:sp>
+        <p:nvSpPr>
+          <p:cNvPr id="58" name="Rectangle 57">
+            <a:extLst>
+              <a:ext uri="{FF2B5EF4-FFF2-40B4-BE49-F238E27FC236}">
+                <a16:creationId xmlns:a16="http://schemas.microsoft.com/office/drawing/2014/main" id="{E0490EEC-9FDA-2B65-395D-441234B616E6}"/>
+              </a:ext>
+            </a:extLst>
+          </p:cNvPr>
+          <p:cNvSpPr/>
+          <p:nvPr/>
+        </p:nvSpPr>
+        <p:spPr>
+          <a:xfrm>
+            <a:off x="4575812" y="2670178"/>
+            <a:ext cx="2172039" cy="1222371"/>
+          </a:xfrm>
+          <a:prstGeom prst="rect">
+            <a:avLst/>
+          </a:prstGeom>
+          <a:solidFill>
+            <a:schemeClr val="bg1"/>
+          </a:solidFill>
+          <a:ln>
+            <a:solidFill>
+              <a:schemeClr val="tx1"/>
+            </a:solidFill>
+          </a:ln>
+        </p:spPr>
+        <p:style>
+          <a:lnRef idx="2">
+            <a:schemeClr val="accent1">
+              <a:shade val="50000"/>
+            </a:schemeClr>
+          </a:lnRef>
+          <a:fillRef idx="1">
+            <a:schemeClr val="accent1"/>
+          </a:fillRef>
+          <a:effectRef idx="0">
+            <a:schemeClr val="accent1"/>
+          </a:effectRef>
+          <a:fontRef idx="minor">
+            <a:schemeClr val="lt1"/>
+          </a:fontRef>
+        </p:style>
+        <p:txBody>
+          <a:bodyPr rtlCol="0" anchor="ctr"/>
+          <a:lstStyle/>
+          <a:p>
+            <a:r>
+              <a:rPr lang="en-US" sz="1050" b="1" dirty="0">
+                <a:solidFill>
+                  <a:schemeClr val="tx1"/>
+                </a:solidFill>
+              </a:rPr>
+              <a:t>IF IN_STATE2 == STEP.HIGHER</a:t>
+            </a:r>
+          </a:p>
+          <a:p>
+            <a:r>
+              <a:rPr lang="en-US" sz="1050" b="1" dirty="0">
+                <a:solidFill>
+                  <a:schemeClr val="tx1"/>
+                </a:solidFill>
+              </a:rPr>
+              <a:t>  OUT =  TRUE</a:t>
+            </a:r>
+          </a:p>
+          <a:p>
+            <a:r>
+              <a:rPr lang="en-US" sz="1050" b="1" dirty="0">
+                <a:solidFill>
+                  <a:schemeClr val="tx1"/>
+                </a:solidFill>
+              </a:rPr>
+              <a:t>ELIF IN_STATA2 == STEP.LOWER</a:t>
+            </a:r>
+          </a:p>
+          <a:p>
+            <a:r>
+              <a:rPr lang="en-US" sz="1050" b="1" dirty="0">
+                <a:solidFill>
+                  <a:schemeClr val="tx1"/>
+                </a:solidFill>
+              </a:rPr>
+              <a:t>  OUT  = FALSE</a:t>
+            </a:r>
+          </a:p>
+          <a:p>
+            <a:r>
+              <a:rPr lang="en-US" sz="1050" b="1" dirty="0">
+                <a:solidFill>
+                  <a:schemeClr val="tx1"/>
+                </a:solidFill>
+              </a:rPr>
+              <a:t>ELSE</a:t>
+            </a:r>
+          </a:p>
+          <a:p>
+            <a:r>
+              <a:rPr lang="en-US" sz="1050" b="1" dirty="0">
+                <a:solidFill>
+                  <a:schemeClr val="tx1"/>
+                </a:solidFill>
+              </a:rPr>
+              <a:t>  OUT = IN_STATE1</a:t>
+            </a:r>
+          </a:p>
+          <a:p>
+            <a:r>
+              <a:rPr lang="en-US" sz="1050" b="1" dirty="0">
+                <a:solidFill>
+                  <a:schemeClr val="tx1"/>
+                </a:solidFill>
+              </a:rPr>
+              <a:t>END IF </a:t>
+            </a:r>
+          </a:p>
+        </p:txBody>
+      </p:sp>
+      <p:sp>
+        <p:nvSpPr>
+          <p:cNvPr id="62" name="TextBox 61">
+            <a:extLst>
+              <a:ext uri="{FF2B5EF4-FFF2-40B4-BE49-F238E27FC236}">
+                <a16:creationId xmlns:a16="http://schemas.microsoft.com/office/drawing/2014/main" id="{6FB01D50-ECF3-9740-4979-F4FEAD804202}"/>
+              </a:ext>
+            </a:extLst>
+          </p:cNvPr>
+          <p:cNvSpPr txBox="1"/>
+          <p:nvPr/>
+        </p:nvSpPr>
+        <p:spPr>
+          <a:xfrm>
+            <a:off x="3227441" y="1964970"/>
+            <a:ext cx="462557" cy="246221"/>
+          </a:xfrm>
+          <a:prstGeom prst="rect">
+            <a:avLst/>
+          </a:prstGeom>
+          <a:noFill/>
+        </p:spPr>
+        <p:txBody>
+          <a:bodyPr wrap="square" rtlCol="0">
+            <a:spAutoFit/>
+          </a:bodyPr>
+          <a:lstStyle/>
+          <a:p>
+            <a:r>
+              <a:rPr lang="en-US" sz="1000" b="1" dirty="0">
+                <a:solidFill>
+                  <a:schemeClr val="tx2">
+                    <a:lumMod val="90000"/>
+                    <a:lumOff val="10000"/>
+                  </a:schemeClr>
+                </a:solidFill>
+              </a:rPr>
+              <a:t>OUT</a:t>
+            </a:r>
+            <a:endParaRPr lang="en-SG" sz="1000" b="1" dirty="0">
+              <a:solidFill>
+                <a:schemeClr val="tx2">
+                  <a:lumMod val="90000"/>
+                  <a:lumOff val="10000"/>
+                </a:schemeClr>
+              </a:solidFill>
+            </a:endParaRPr>
+          </a:p>
+        </p:txBody>
+      </p:sp>
+      <p:sp>
+        <p:nvSpPr>
+          <p:cNvPr id="14" name="TextBox 13">
+            <a:extLst>
+              <a:ext uri="{FF2B5EF4-FFF2-40B4-BE49-F238E27FC236}">
+                <a16:creationId xmlns:a16="http://schemas.microsoft.com/office/drawing/2014/main" id="{0D05921B-80B5-0E05-9AB5-C584A569177E}"/>
+              </a:ext>
+            </a:extLst>
+          </p:cNvPr>
+          <p:cNvSpPr txBox="1"/>
+          <p:nvPr/>
+        </p:nvSpPr>
+        <p:spPr>
+          <a:xfrm>
+            <a:off x="2972541" y="2660380"/>
+            <a:ext cx="882383" cy="246221"/>
+          </a:xfrm>
+          <a:prstGeom prst="rect">
+            <a:avLst/>
+          </a:prstGeom>
+          <a:noFill/>
+        </p:spPr>
+        <p:txBody>
+          <a:bodyPr wrap="square" rtlCol="0">
+            <a:spAutoFit/>
+          </a:bodyPr>
+          <a:lstStyle/>
+          <a:p>
+            <a:r>
+              <a:rPr lang="en-US" sz="1000" b="1" dirty="0">
+                <a:solidFill>
+                  <a:schemeClr val="tx2">
+                    <a:lumMod val="90000"/>
+                    <a:lumOff val="10000"/>
+                  </a:schemeClr>
+                </a:solidFill>
+              </a:rPr>
+              <a:t>NOT OUT</a:t>
+            </a:r>
+            <a:endParaRPr lang="en-SG" sz="1000" b="1" dirty="0">
+              <a:solidFill>
+                <a:schemeClr val="tx2">
+                  <a:lumMod val="90000"/>
+                  <a:lumOff val="10000"/>
+                </a:schemeClr>
+              </a:solidFill>
+            </a:endParaRPr>
+          </a:p>
+        </p:txBody>
+      </p:sp>
+      <p:sp>
+        <p:nvSpPr>
+          <p:cNvPr id="16" name="TextBox 15">
+            <a:extLst>
+              <a:ext uri="{FF2B5EF4-FFF2-40B4-BE49-F238E27FC236}">
+                <a16:creationId xmlns:a16="http://schemas.microsoft.com/office/drawing/2014/main" id="{13724193-A605-B1E0-91F0-560F7395707E}"/>
+              </a:ext>
+            </a:extLst>
+          </p:cNvPr>
+          <p:cNvSpPr txBox="1"/>
+          <p:nvPr/>
+        </p:nvSpPr>
+        <p:spPr>
+          <a:xfrm>
+            <a:off x="6747851" y="3394692"/>
+            <a:ext cx="462557" cy="246221"/>
+          </a:xfrm>
+          <a:prstGeom prst="rect">
+            <a:avLst/>
+          </a:prstGeom>
+          <a:noFill/>
+        </p:spPr>
+        <p:txBody>
+          <a:bodyPr wrap="square" rtlCol="0">
+            <a:spAutoFit/>
+          </a:bodyPr>
+          <a:lstStyle/>
+          <a:p>
+            <a:r>
+              <a:rPr lang="en-US" sz="1000" b="1" dirty="0">
+                <a:solidFill>
+                  <a:schemeClr val="tx2">
+                    <a:lumMod val="90000"/>
+                    <a:lumOff val="10000"/>
+                  </a:schemeClr>
+                </a:solidFill>
+              </a:rPr>
+              <a:t>OUT</a:t>
+            </a:r>
+            <a:endParaRPr lang="en-SG" sz="1000" b="1" dirty="0">
+              <a:solidFill>
+                <a:schemeClr val="tx2">
+                  <a:lumMod val="90000"/>
+                  <a:lumOff val="10000"/>
+                </a:schemeClr>
+              </a:solidFill>
+            </a:endParaRPr>
           </a:p>
         </p:txBody>
       </p:sp>
     </p:spTree>
     <p:extLst>
       <p:ext uri="{BB962C8B-B14F-4D97-AF65-F5344CB8AC3E}">
-        <p14:creationId xmlns:p14="http://schemas.microsoft.com/office/powerpoint/2010/main" val="595260543"/>
+        <p14:creationId xmlns:p14="http://schemas.microsoft.com/office/powerpoint/2010/main" val="3560264709"/>
+      </p:ext>
+    </p:extLst>
+  </p:cSld>
+  <p:clrMapOvr>
+    <a:masterClrMapping/>
+  </p:clrMapOvr>
+</p:sld>
+</file>
+
+<file path=ppt/slides/slide7.xml><?xml version="1.0" encoding="utf-8"?>
+<p:sld xmlns:a="http://schemas.openxmlformats.org/drawingml/2006/main" xmlns:r="http://schemas.openxmlformats.org/officeDocument/2006/relationships" xmlns:p="http://schemas.openxmlformats.org/presentationml/2006/main">
+  <p:cSld>
+    <p:spTree>
+      <p:nvGrpSpPr>
+        <p:cNvPr id="1" name="">
+          <a:extLst>
+            <a:ext uri="{FF2B5EF4-FFF2-40B4-BE49-F238E27FC236}">
+              <a16:creationId xmlns:a16="http://schemas.microsoft.com/office/drawing/2014/main" id="{8ECC6CDE-05AE-733C-ED71-5CF5A3DC7069}"/>
+            </a:ext>
+          </a:extLst>
+        </p:cNvPr>
+        <p:cNvGrpSpPr/>
+        <p:nvPr/>
+      </p:nvGrpSpPr>
+      <p:grpSpPr>
+        <a:xfrm>
+          <a:off x="0" y="0"/>
+          <a:ext cx="0" cy="0"/>
+          <a:chOff x="0" y="0"/>
+          <a:chExt cx="0" cy="0"/>
+        </a:xfrm>
+      </p:grpSpPr>
+      <p:cxnSp>
+        <p:nvCxnSpPr>
+          <p:cNvPr id="4" name="Straight Connector 3">
+            <a:extLst>
+              <a:ext uri="{FF2B5EF4-FFF2-40B4-BE49-F238E27FC236}">
+                <a16:creationId xmlns:a16="http://schemas.microsoft.com/office/drawing/2014/main" id="{D2D6C2B8-BFF7-D4D4-B35D-DBDBE6837AF6}"/>
+              </a:ext>
+            </a:extLst>
+          </p:cNvPr>
+          <p:cNvCxnSpPr>
+            <a:cxnSpLocks/>
+          </p:cNvCxnSpPr>
+          <p:nvPr/>
+        </p:nvCxnSpPr>
+        <p:spPr>
+          <a:xfrm>
+            <a:off x="1240152" y="1791998"/>
+            <a:ext cx="3250612" cy="0"/>
+          </a:xfrm>
+          <a:prstGeom prst="line">
+            <a:avLst/>
+          </a:prstGeom>
+        </p:spPr>
+        <p:style>
+          <a:lnRef idx="2">
+            <a:schemeClr val="accent1"/>
+          </a:lnRef>
+          <a:fillRef idx="0">
+            <a:schemeClr val="accent1"/>
+          </a:fillRef>
+          <a:effectRef idx="1">
+            <a:schemeClr val="accent1"/>
+          </a:effectRef>
+          <a:fontRef idx="minor">
+            <a:schemeClr val="tx1"/>
+          </a:fontRef>
+        </p:style>
+      </p:cxnSp>
+      <p:sp>
+        <p:nvSpPr>
+          <p:cNvPr id="40" name="TextBox 39">
+            <a:extLst>
+              <a:ext uri="{FF2B5EF4-FFF2-40B4-BE49-F238E27FC236}">
+                <a16:creationId xmlns:a16="http://schemas.microsoft.com/office/drawing/2014/main" id="{F7236953-7DF3-D8D0-35D3-72E7EC47C942}"/>
+              </a:ext>
+            </a:extLst>
+          </p:cNvPr>
+          <p:cNvSpPr txBox="1"/>
+          <p:nvPr/>
+        </p:nvSpPr>
+        <p:spPr>
+          <a:xfrm>
+            <a:off x="747402" y="708215"/>
+            <a:ext cx="3059148" cy="276999"/>
+          </a:xfrm>
+          <a:prstGeom prst="rect">
+            <a:avLst/>
+          </a:prstGeom>
+          <a:noFill/>
+        </p:spPr>
+        <p:txBody>
+          <a:bodyPr wrap="square" rtlCol="0">
+            <a:spAutoFit/>
+          </a:bodyPr>
+          <a:lstStyle/>
+          <a:p>
+            <a:r>
+              <a:rPr lang="en-US" sz="1200" b="1" dirty="0"/>
+              <a:t>%C [001000] </a:t>
+            </a:r>
+            <a:r>
+              <a:rPr lang="en-SG" sz="1200" b="1" dirty="0"/>
+              <a:t>Platform emergency button</a:t>
+            </a:r>
+          </a:p>
+        </p:txBody>
+      </p:sp>
+      <p:pic>
+        <p:nvPicPr>
+          <p:cNvPr id="41" name="Picture 40">
+            <a:extLst>
+              <a:ext uri="{FF2B5EF4-FFF2-40B4-BE49-F238E27FC236}">
+                <a16:creationId xmlns:a16="http://schemas.microsoft.com/office/drawing/2014/main" id="{EF3A7482-5A48-9AE2-31D3-6FD8917A6DD0}"/>
+              </a:ext>
+            </a:extLst>
+          </p:cNvPr>
+          <p:cNvPicPr>
+            <a:picLocks noChangeAspect="1"/>
+          </p:cNvPicPr>
+          <p:nvPr/>
+        </p:nvPicPr>
+        <p:blipFill>
+          <a:blip r:embed="rId2">
+            <a:extLst>
+              <a:ext uri="{28A0092B-C50C-407E-A947-70E740481C1C}">
+                <a14:useLocalDpi xmlns:a14="http://schemas.microsoft.com/office/drawing/2010/main" val="0"/>
+              </a:ext>
+            </a:extLst>
+          </a:blip>
+          <a:stretch>
+            <a:fillRect/>
+          </a:stretch>
+        </p:blipFill>
+        <p:spPr>
+          <a:xfrm>
+            <a:off x="907090" y="978764"/>
+            <a:ext cx="409524" cy="323810"/>
+          </a:xfrm>
+          <a:prstGeom prst="rect">
+            <a:avLst/>
+          </a:prstGeom>
+        </p:spPr>
+      </p:pic>
+      <p:cxnSp>
+        <p:nvCxnSpPr>
+          <p:cNvPr id="42" name="Straight Connector 41">
+            <a:extLst>
+              <a:ext uri="{FF2B5EF4-FFF2-40B4-BE49-F238E27FC236}">
+                <a16:creationId xmlns:a16="http://schemas.microsoft.com/office/drawing/2014/main" id="{E6E5BC5F-4C23-1167-F153-12AE11395E93}"/>
+              </a:ext>
+            </a:extLst>
+          </p:cNvPr>
+          <p:cNvCxnSpPr>
+            <a:cxnSpLocks/>
+          </p:cNvCxnSpPr>
+          <p:nvPr/>
+        </p:nvCxnSpPr>
+        <p:spPr>
+          <a:xfrm>
+            <a:off x="1316614" y="1140669"/>
+            <a:ext cx="3214892" cy="0"/>
+          </a:xfrm>
+          <a:prstGeom prst="line">
+            <a:avLst/>
+          </a:prstGeom>
+        </p:spPr>
+        <p:style>
+          <a:lnRef idx="2">
+            <a:schemeClr val="accent1"/>
+          </a:lnRef>
+          <a:fillRef idx="0">
+            <a:schemeClr val="accent1"/>
+          </a:fillRef>
+          <a:effectRef idx="1">
+            <a:schemeClr val="accent1"/>
+          </a:effectRef>
+          <a:fontRef idx="minor">
+            <a:schemeClr val="tx1"/>
+          </a:fontRef>
+        </p:style>
+      </p:cxnSp>
+      <p:sp>
+        <p:nvSpPr>
+          <p:cNvPr id="43" name="Rectangle 42">
+            <a:extLst>
+              <a:ext uri="{FF2B5EF4-FFF2-40B4-BE49-F238E27FC236}">
+                <a16:creationId xmlns:a16="http://schemas.microsoft.com/office/drawing/2014/main" id="{1CC7D2BC-B01A-931F-8445-FCE4DE22320F}"/>
+              </a:ext>
+            </a:extLst>
+          </p:cNvPr>
+          <p:cNvSpPr/>
+          <p:nvPr/>
+        </p:nvSpPr>
+        <p:spPr>
+          <a:xfrm>
+            <a:off x="4531507" y="1021830"/>
+            <a:ext cx="2125994" cy="878404"/>
+          </a:xfrm>
+          <a:prstGeom prst="rect">
+            <a:avLst/>
+          </a:prstGeom>
+          <a:solidFill>
+            <a:schemeClr val="bg1"/>
+          </a:solidFill>
+          <a:ln>
+            <a:solidFill>
+              <a:schemeClr val="tx1"/>
+            </a:solidFill>
+          </a:ln>
+        </p:spPr>
+        <p:style>
+          <a:lnRef idx="2">
+            <a:schemeClr val="accent1">
+              <a:shade val="50000"/>
+            </a:schemeClr>
+          </a:lnRef>
+          <a:fillRef idx="1">
+            <a:schemeClr val="accent1"/>
+          </a:fillRef>
+          <a:effectRef idx="0">
+            <a:schemeClr val="accent1"/>
+          </a:effectRef>
+          <a:fontRef idx="minor">
+            <a:schemeClr val="lt1"/>
+          </a:fontRef>
+        </p:style>
+        <p:txBody>
+          <a:bodyPr rtlCol="0" anchor="ctr"/>
+          <a:lstStyle/>
+          <a:p>
+            <a:r>
+              <a:rPr lang="en-US" sz="1050" b="1" dirty="0">
+                <a:solidFill>
+                  <a:schemeClr val="tx1"/>
+                </a:solidFill>
+              </a:rPr>
+              <a:t>IF IN_STATE1 == STEP.HIGHER</a:t>
+            </a:r>
+          </a:p>
+          <a:p>
+            <a:r>
+              <a:rPr lang="en-US" sz="1050" b="1" dirty="0">
+                <a:solidFill>
+                  <a:schemeClr val="tx1"/>
+                </a:solidFill>
+              </a:rPr>
+              <a:t>  OUT =False</a:t>
+            </a:r>
+          </a:p>
+          <a:p>
+            <a:r>
+              <a:rPr lang="en-US" sz="1050" b="1" dirty="0">
+                <a:solidFill>
+                  <a:schemeClr val="tx1"/>
+                </a:solidFill>
+              </a:rPr>
+              <a:t>ELSE</a:t>
+            </a:r>
+          </a:p>
+          <a:p>
+            <a:r>
+              <a:rPr lang="en-US" sz="1050" b="1" dirty="0">
+                <a:solidFill>
+                  <a:schemeClr val="tx1"/>
+                </a:solidFill>
+              </a:rPr>
+              <a:t>  OUT = IN_STATE2</a:t>
+            </a:r>
+          </a:p>
+          <a:p>
+            <a:r>
+              <a:rPr lang="en-US" sz="1050" b="1" dirty="0">
+                <a:solidFill>
+                  <a:schemeClr val="tx1"/>
+                </a:solidFill>
+              </a:rPr>
+              <a:t>END IF </a:t>
+            </a:r>
+          </a:p>
+        </p:txBody>
+      </p:sp>
+      <p:sp>
+        <p:nvSpPr>
+          <p:cNvPr id="44" name="TextBox 43">
+            <a:extLst>
+              <a:ext uri="{FF2B5EF4-FFF2-40B4-BE49-F238E27FC236}">
+                <a16:creationId xmlns:a16="http://schemas.microsoft.com/office/drawing/2014/main" id="{1000F414-3148-A5CA-4A8A-B8DFB0E00E61}"/>
+              </a:ext>
+            </a:extLst>
+          </p:cNvPr>
+          <p:cNvSpPr txBox="1"/>
+          <p:nvPr/>
+        </p:nvSpPr>
+        <p:spPr>
+          <a:xfrm>
+            <a:off x="3716060" y="894448"/>
+            <a:ext cx="815445" cy="246221"/>
+          </a:xfrm>
+          <a:prstGeom prst="rect">
+            <a:avLst/>
+          </a:prstGeom>
+          <a:noFill/>
+        </p:spPr>
+        <p:txBody>
+          <a:bodyPr wrap="square" rtlCol="0">
+            <a:spAutoFit/>
+          </a:bodyPr>
+          <a:lstStyle/>
+          <a:p>
+            <a:r>
+              <a:rPr lang="en-US" sz="1000" b="1" dirty="0">
+                <a:solidFill>
+                  <a:schemeClr val="tx2">
+                    <a:lumMod val="90000"/>
+                    <a:lumOff val="10000"/>
+                  </a:schemeClr>
+                </a:solidFill>
+              </a:rPr>
+              <a:t>IN_STATE1 </a:t>
+            </a:r>
+            <a:endParaRPr lang="en-SG" sz="1000" b="1" dirty="0">
+              <a:solidFill>
+                <a:schemeClr val="tx2">
+                  <a:lumMod val="90000"/>
+                  <a:lumOff val="10000"/>
+                </a:schemeClr>
+              </a:solidFill>
+            </a:endParaRPr>
+          </a:p>
+        </p:txBody>
+      </p:sp>
+      <p:sp>
+        <p:nvSpPr>
+          <p:cNvPr id="45" name="TextBox 44">
+            <a:extLst>
+              <a:ext uri="{FF2B5EF4-FFF2-40B4-BE49-F238E27FC236}">
+                <a16:creationId xmlns:a16="http://schemas.microsoft.com/office/drawing/2014/main" id="{1629CE50-69D9-5B0B-6489-437CEAEE6E08}"/>
+              </a:ext>
+            </a:extLst>
+          </p:cNvPr>
+          <p:cNvSpPr txBox="1"/>
+          <p:nvPr/>
+        </p:nvSpPr>
+        <p:spPr>
+          <a:xfrm>
+            <a:off x="3654053" y="1461032"/>
+            <a:ext cx="815445" cy="246221"/>
+          </a:xfrm>
+          <a:prstGeom prst="rect">
+            <a:avLst/>
+          </a:prstGeom>
+          <a:noFill/>
+        </p:spPr>
+        <p:txBody>
+          <a:bodyPr wrap="square" rtlCol="0">
+            <a:spAutoFit/>
+          </a:bodyPr>
+          <a:lstStyle/>
+          <a:p>
+            <a:r>
+              <a:rPr lang="en-US" sz="1000" b="1" dirty="0">
+                <a:solidFill>
+                  <a:schemeClr val="tx2">
+                    <a:lumMod val="90000"/>
+                    <a:lumOff val="10000"/>
+                  </a:schemeClr>
+                </a:solidFill>
+              </a:rPr>
+              <a:t>IN_STATE2 </a:t>
+            </a:r>
+            <a:endParaRPr lang="en-SG" sz="1000" b="1" dirty="0">
+              <a:solidFill>
+                <a:schemeClr val="tx2">
+                  <a:lumMod val="90000"/>
+                  <a:lumOff val="10000"/>
+                </a:schemeClr>
+              </a:solidFill>
+            </a:endParaRPr>
+          </a:p>
+        </p:txBody>
+      </p:sp>
+      <p:cxnSp>
+        <p:nvCxnSpPr>
+          <p:cNvPr id="46" name="Straight Connector 45">
+            <a:extLst>
+              <a:ext uri="{FF2B5EF4-FFF2-40B4-BE49-F238E27FC236}">
+                <a16:creationId xmlns:a16="http://schemas.microsoft.com/office/drawing/2014/main" id="{72EE67FC-028C-95B8-2A1E-F84204D8A544}"/>
+              </a:ext>
+            </a:extLst>
+          </p:cNvPr>
+          <p:cNvCxnSpPr>
+            <a:cxnSpLocks/>
+          </p:cNvCxnSpPr>
+          <p:nvPr/>
+        </p:nvCxnSpPr>
+        <p:spPr>
+          <a:xfrm>
+            <a:off x="6682280" y="1727544"/>
+            <a:ext cx="1307592" cy="0"/>
+          </a:xfrm>
+          <a:prstGeom prst="line">
+            <a:avLst/>
+          </a:prstGeom>
+        </p:spPr>
+        <p:style>
+          <a:lnRef idx="2">
+            <a:schemeClr val="accent1"/>
+          </a:lnRef>
+          <a:fillRef idx="0">
+            <a:schemeClr val="accent1"/>
+          </a:fillRef>
+          <a:effectRef idx="1">
+            <a:schemeClr val="accent1"/>
+          </a:effectRef>
+          <a:fontRef idx="minor">
+            <a:schemeClr val="tx1"/>
+          </a:fontRef>
+        </p:style>
+      </p:cxnSp>
+      <p:sp>
+        <p:nvSpPr>
+          <p:cNvPr id="48" name="TextBox 47">
+            <a:extLst>
+              <a:ext uri="{FF2B5EF4-FFF2-40B4-BE49-F238E27FC236}">
+                <a16:creationId xmlns:a16="http://schemas.microsoft.com/office/drawing/2014/main" id="{56722479-E113-6659-4840-5F792FE4485D}"/>
+              </a:ext>
+            </a:extLst>
+          </p:cNvPr>
+          <p:cNvSpPr txBox="1"/>
+          <p:nvPr/>
+        </p:nvSpPr>
+        <p:spPr>
+          <a:xfrm>
+            <a:off x="6657501" y="1492291"/>
+            <a:ext cx="462557" cy="246221"/>
+          </a:xfrm>
+          <a:prstGeom prst="rect">
+            <a:avLst/>
+          </a:prstGeom>
+          <a:noFill/>
+        </p:spPr>
+        <p:txBody>
+          <a:bodyPr wrap="square" rtlCol="0">
+            <a:spAutoFit/>
+          </a:bodyPr>
+          <a:lstStyle/>
+          <a:p>
+            <a:r>
+              <a:rPr lang="en-US" sz="1000" b="1" dirty="0">
+                <a:solidFill>
+                  <a:schemeClr val="tx2">
+                    <a:lumMod val="90000"/>
+                    <a:lumOff val="10000"/>
+                  </a:schemeClr>
+                </a:solidFill>
+              </a:rPr>
+              <a:t>OUT</a:t>
+            </a:r>
+            <a:endParaRPr lang="en-SG" sz="1000" b="1" dirty="0">
+              <a:solidFill>
+                <a:schemeClr val="tx2">
+                  <a:lumMod val="90000"/>
+                  <a:lumOff val="10000"/>
+                </a:schemeClr>
+              </a:solidFill>
+            </a:endParaRPr>
+          </a:p>
+        </p:txBody>
+      </p:sp>
+      <p:sp>
+        <p:nvSpPr>
+          <p:cNvPr id="51" name="TextBox 50">
+            <a:extLst>
+              <a:ext uri="{FF2B5EF4-FFF2-40B4-BE49-F238E27FC236}">
+                <a16:creationId xmlns:a16="http://schemas.microsoft.com/office/drawing/2014/main" id="{5432AEC0-413B-EF9D-FF29-168FF10950C1}"/>
+              </a:ext>
+            </a:extLst>
+          </p:cNvPr>
+          <p:cNvSpPr txBox="1"/>
+          <p:nvPr/>
+        </p:nvSpPr>
+        <p:spPr>
+          <a:xfrm>
+            <a:off x="7292339" y="1071741"/>
+            <a:ext cx="1847122" cy="461665"/>
+          </a:xfrm>
+          <a:prstGeom prst="rect">
+            <a:avLst/>
+          </a:prstGeom>
+          <a:noFill/>
+        </p:spPr>
+        <p:txBody>
+          <a:bodyPr wrap="square" rtlCol="0">
+            <a:spAutoFit/>
+          </a:bodyPr>
+          <a:lstStyle/>
+          <a:p>
+            <a:r>
+              <a:rPr lang="en-US" sz="1200" b="1" dirty="0"/>
+              <a:t>%M  </a:t>
+            </a:r>
+            <a:r>
+              <a:rPr lang="en-US" sz="1200" b="1"/>
+              <a:t>[000106]</a:t>
+            </a:r>
+            <a:endParaRPr lang="en-US" sz="1200" b="1" dirty="0"/>
+          </a:p>
+          <a:p>
+            <a:r>
+              <a:rPr lang="en-US" sz="1200" b="1" dirty="0"/>
+              <a:t>Platform Door Motor</a:t>
+            </a:r>
+          </a:p>
+        </p:txBody>
+      </p:sp>
+      <p:pic>
+        <p:nvPicPr>
+          <p:cNvPr id="2" name="Picture 1">
+            <a:extLst>
+              <a:ext uri="{FF2B5EF4-FFF2-40B4-BE49-F238E27FC236}">
+                <a16:creationId xmlns:a16="http://schemas.microsoft.com/office/drawing/2014/main" id="{C6F5A842-BEC7-1345-51A9-9D7E83689FA2}"/>
+              </a:ext>
+            </a:extLst>
+          </p:cNvPr>
+          <p:cNvPicPr>
+            <a:picLocks noChangeAspect="1"/>
+          </p:cNvPicPr>
+          <p:nvPr/>
+        </p:nvPicPr>
+        <p:blipFill>
+          <a:blip r:embed="rId3">
+            <a:extLst>
+              <a:ext uri="{28A0092B-C50C-407E-A947-70E740481C1C}">
+                <a14:useLocalDpi xmlns:a14="http://schemas.microsoft.com/office/drawing/2010/main" val="0"/>
+              </a:ext>
+            </a:extLst>
+          </a:blip>
+          <a:stretch>
+            <a:fillRect/>
+          </a:stretch>
+        </p:blipFill>
+        <p:spPr>
+          <a:xfrm>
+            <a:off x="8011138" y="1553330"/>
+            <a:ext cx="438095" cy="342857"/>
+          </a:xfrm>
+          <a:prstGeom prst="rect">
+            <a:avLst/>
+          </a:prstGeom>
+        </p:spPr>
+      </p:pic>
+      <p:pic>
+        <p:nvPicPr>
+          <p:cNvPr id="6" name="Picture 5">
+            <a:extLst>
+              <a:ext uri="{FF2B5EF4-FFF2-40B4-BE49-F238E27FC236}">
+                <a16:creationId xmlns:a16="http://schemas.microsoft.com/office/drawing/2014/main" id="{58DC2A65-8CCF-5E44-A0F9-474643C8CC7C}"/>
+              </a:ext>
+            </a:extLst>
+          </p:cNvPr>
+          <p:cNvPicPr>
+            <a:picLocks noChangeAspect="1"/>
+          </p:cNvPicPr>
+          <p:nvPr/>
+        </p:nvPicPr>
+        <p:blipFill>
+          <a:blip r:embed="rId2">
+            <a:extLst>
+              <a:ext uri="{28A0092B-C50C-407E-A947-70E740481C1C}">
+                <a14:useLocalDpi xmlns:a14="http://schemas.microsoft.com/office/drawing/2010/main" val="0"/>
+              </a:ext>
+            </a:extLst>
+          </a:blip>
+          <a:stretch>
+            <a:fillRect/>
+          </a:stretch>
+        </p:blipFill>
+        <p:spPr>
+          <a:xfrm>
+            <a:off x="887613" y="1629011"/>
+            <a:ext cx="409524" cy="323810"/>
+          </a:xfrm>
+          <a:prstGeom prst="rect">
+            <a:avLst/>
+          </a:prstGeom>
+        </p:spPr>
+      </p:pic>
+      <p:sp>
+        <p:nvSpPr>
+          <p:cNvPr id="8" name="TextBox 7">
+            <a:extLst>
+              <a:ext uri="{FF2B5EF4-FFF2-40B4-BE49-F238E27FC236}">
+                <a16:creationId xmlns:a16="http://schemas.microsoft.com/office/drawing/2014/main" id="{D4630A70-0F5E-CE30-84DF-E41AC32B3F2D}"/>
+              </a:ext>
+            </a:extLst>
+          </p:cNvPr>
+          <p:cNvSpPr txBox="1"/>
+          <p:nvPr/>
+        </p:nvSpPr>
+        <p:spPr>
+          <a:xfrm>
+            <a:off x="747402" y="1350307"/>
+            <a:ext cx="2635583" cy="276999"/>
+          </a:xfrm>
+          <a:prstGeom prst="rect">
+            <a:avLst/>
+          </a:prstGeom>
+          <a:noFill/>
+        </p:spPr>
+        <p:txBody>
+          <a:bodyPr wrap="square" rtlCol="0">
+            <a:spAutoFit/>
+          </a:bodyPr>
+          <a:lstStyle/>
+          <a:p>
+            <a:r>
+              <a:rPr lang="en-US" sz="1200" b="1" dirty="0"/>
+              <a:t>%M  [000106] Platform Door Motor</a:t>
+            </a:r>
+          </a:p>
+        </p:txBody>
+      </p:sp>
+      <p:cxnSp>
+        <p:nvCxnSpPr>
+          <p:cNvPr id="9" name="Straight Connector 8">
+            <a:extLst>
+              <a:ext uri="{FF2B5EF4-FFF2-40B4-BE49-F238E27FC236}">
+                <a16:creationId xmlns:a16="http://schemas.microsoft.com/office/drawing/2014/main" id="{77DBF989-8AE4-8C29-9783-C71578156C09}"/>
+              </a:ext>
+            </a:extLst>
+          </p:cNvPr>
+          <p:cNvCxnSpPr>
+            <a:cxnSpLocks/>
+          </p:cNvCxnSpPr>
+          <p:nvPr/>
+        </p:nvCxnSpPr>
+        <p:spPr>
+          <a:xfrm>
+            <a:off x="1250785" y="3060132"/>
+            <a:ext cx="3250612" cy="0"/>
+          </a:xfrm>
+          <a:prstGeom prst="line">
+            <a:avLst/>
+          </a:prstGeom>
+        </p:spPr>
+        <p:style>
+          <a:lnRef idx="2">
+            <a:schemeClr val="accent1"/>
+          </a:lnRef>
+          <a:fillRef idx="0">
+            <a:schemeClr val="accent1"/>
+          </a:fillRef>
+          <a:effectRef idx="1">
+            <a:schemeClr val="accent1"/>
+          </a:effectRef>
+          <a:fontRef idx="minor">
+            <a:schemeClr val="tx1"/>
+          </a:fontRef>
+        </p:style>
+      </p:cxnSp>
+      <p:cxnSp>
+        <p:nvCxnSpPr>
+          <p:cNvPr id="13" name="Straight Connector 12">
+            <a:extLst>
+              <a:ext uri="{FF2B5EF4-FFF2-40B4-BE49-F238E27FC236}">
+                <a16:creationId xmlns:a16="http://schemas.microsoft.com/office/drawing/2014/main" id="{D9AF2E32-AB03-B3EA-21C3-4AFBDBB894C7}"/>
+              </a:ext>
+            </a:extLst>
+          </p:cNvPr>
+          <p:cNvCxnSpPr>
+            <a:cxnSpLocks/>
+          </p:cNvCxnSpPr>
+          <p:nvPr/>
+        </p:nvCxnSpPr>
+        <p:spPr>
+          <a:xfrm>
+            <a:off x="3716060" y="2472601"/>
+            <a:ext cx="815446" cy="0"/>
+          </a:xfrm>
+          <a:prstGeom prst="line">
+            <a:avLst/>
+          </a:prstGeom>
+        </p:spPr>
+        <p:style>
+          <a:lnRef idx="2">
+            <a:schemeClr val="accent1"/>
+          </a:lnRef>
+          <a:fillRef idx="0">
+            <a:schemeClr val="accent1"/>
+          </a:fillRef>
+          <a:effectRef idx="1">
+            <a:schemeClr val="accent1"/>
+          </a:effectRef>
+          <a:fontRef idx="minor">
+            <a:schemeClr val="tx1"/>
+          </a:fontRef>
+        </p:style>
+      </p:cxnSp>
+      <p:sp>
+        <p:nvSpPr>
+          <p:cNvPr id="15" name="Rectangle 14">
+            <a:extLst>
+              <a:ext uri="{FF2B5EF4-FFF2-40B4-BE49-F238E27FC236}">
+                <a16:creationId xmlns:a16="http://schemas.microsoft.com/office/drawing/2014/main" id="{B6681579-A881-46FF-467E-E6928380C910}"/>
+              </a:ext>
+            </a:extLst>
+          </p:cNvPr>
+          <p:cNvSpPr/>
+          <p:nvPr/>
+        </p:nvSpPr>
+        <p:spPr>
+          <a:xfrm>
+            <a:off x="4531507" y="2321863"/>
+            <a:ext cx="2125994" cy="878404"/>
+          </a:xfrm>
+          <a:prstGeom prst="rect">
+            <a:avLst/>
+          </a:prstGeom>
+          <a:solidFill>
+            <a:schemeClr val="bg1"/>
+          </a:solidFill>
+          <a:ln>
+            <a:solidFill>
+              <a:schemeClr val="tx1"/>
+            </a:solidFill>
+          </a:ln>
+        </p:spPr>
+        <p:style>
+          <a:lnRef idx="2">
+            <a:schemeClr val="accent1">
+              <a:shade val="50000"/>
+            </a:schemeClr>
+          </a:lnRef>
+          <a:fillRef idx="1">
+            <a:schemeClr val="accent1"/>
+          </a:fillRef>
+          <a:effectRef idx="0">
+            <a:schemeClr val="accent1"/>
+          </a:effectRef>
+          <a:fontRef idx="minor">
+            <a:schemeClr val="lt1"/>
+          </a:fontRef>
+        </p:style>
+        <p:txBody>
+          <a:bodyPr rtlCol="0" anchor="ctr"/>
+          <a:lstStyle/>
+          <a:p>
+            <a:r>
+              <a:rPr lang="en-US" sz="1050" b="1" dirty="0">
+                <a:solidFill>
+                  <a:schemeClr val="tx1"/>
+                </a:solidFill>
+              </a:rPr>
+              <a:t>IF IN_STATE1 == STEP.HIGHER</a:t>
+            </a:r>
+          </a:p>
+          <a:p>
+            <a:r>
+              <a:rPr lang="en-US" sz="1050" b="1" dirty="0">
+                <a:solidFill>
+                  <a:schemeClr val="tx1"/>
+                </a:solidFill>
+              </a:rPr>
+              <a:t>  OUT =False</a:t>
+            </a:r>
+          </a:p>
+          <a:p>
+            <a:r>
+              <a:rPr lang="en-US" sz="1050" b="1" dirty="0">
+                <a:solidFill>
+                  <a:schemeClr val="tx1"/>
+                </a:solidFill>
+              </a:rPr>
+              <a:t>ELSE</a:t>
+            </a:r>
+          </a:p>
+          <a:p>
+            <a:r>
+              <a:rPr lang="en-US" sz="1050" b="1" dirty="0">
+                <a:solidFill>
+                  <a:schemeClr val="tx1"/>
+                </a:solidFill>
+              </a:rPr>
+              <a:t>  OUT = IN_STATE2</a:t>
+            </a:r>
+          </a:p>
+          <a:p>
+            <a:r>
+              <a:rPr lang="en-US" sz="1050" b="1" dirty="0">
+                <a:solidFill>
+                  <a:schemeClr val="tx1"/>
+                </a:solidFill>
+              </a:rPr>
+              <a:t>END IF </a:t>
+            </a:r>
+          </a:p>
+        </p:txBody>
+      </p:sp>
+      <p:sp>
+        <p:nvSpPr>
+          <p:cNvPr id="17" name="TextBox 16">
+            <a:extLst>
+              <a:ext uri="{FF2B5EF4-FFF2-40B4-BE49-F238E27FC236}">
+                <a16:creationId xmlns:a16="http://schemas.microsoft.com/office/drawing/2014/main" id="{C9F18AB8-0B78-D2EE-A450-1B5546DD9D5C}"/>
+              </a:ext>
+            </a:extLst>
+          </p:cNvPr>
+          <p:cNvSpPr txBox="1"/>
+          <p:nvPr/>
+        </p:nvSpPr>
+        <p:spPr>
+          <a:xfrm>
+            <a:off x="3716060" y="2162581"/>
+            <a:ext cx="815445" cy="246221"/>
+          </a:xfrm>
+          <a:prstGeom prst="rect">
+            <a:avLst/>
+          </a:prstGeom>
+          <a:noFill/>
+        </p:spPr>
+        <p:txBody>
+          <a:bodyPr wrap="square" rtlCol="0">
+            <a:spAutoFit/>
+          </a:bodyPr>
+          <a:lstStyle/>
+          <a:p>
+            <a:r>
+              <a:rPr lang="en-US" sz="1000" b="1" dirty="0">
+                <a:solidFill>
+                  <a:schemeClr val="tx2">
+                    <a:lumMod val="90000"/>
+                    <a:lumOff val="10000"/>
+                  </a:schemeClr>
+                </a:solidFill>
+              </a:rPr>
+              <a:t>IN_STATE1 </a:t>
+            </a:r>
+            <a:endParaRPr lang="en-SG" sz="1000" b="1" dirty="0">
+              <a:solidFill>
+                <a:schemeClr val="tx2">
+                  <a:lumMod val="90000"/>
+                  <a:lumOff val="10000"/>
+                </a:schemeClr>
+              </a:solidFill>
+            </a:endParaRPr>
+          </a:p>
+        </p:txBody>
+      </p:sp>
+      <p:sp>
+        <p:nvSpPr>
+          <p:cNvPr id="18" name="TextBox 17">
+            <a:extLst>
+              <a:ext uri="{FF2B5EF4-FFF2-40B4-BE49-F238E27FC236}">
+                <a16:creationId xmlns:a16="http://schemas.microsoft.com/office/drawing/2014/main" id="{428BDABB-3973-A500-525C-FB7129B7CE13}"/>
+              </a:ext>
+            </a:extLst>
+          </p:cNvPr>
+          <p:cNvSpPr txBox="1"/>
+          <p:nvPr/>
+        </p:nvSpPr>
+        <p:spPr>
+          <a:xfrm>
+            <a:off x="3664686" y="2729166"/>
+            <a:ext cx="815445" cy="246221"/>
+          </a:xfrm>
+          <a:prstGeom prst="rect">
+            <a:avLst/>
+          </a:prstGeom>
+          <a:noFill/>
+        </p:spPr>
+        <p:txBody>
+          <a:bodyPr wrap="square" rtlCol="0">
+            <a:spAutoFit/>
+          </a:bodyPr>
+          <a:lstStyle/>
+          <a:p>
+            <a:r>
+              <a:rPr lang="en-US" sz="1000" b="1" dirty="0">
+                <a:solidFill>
+                  <a:schemeClr val="tx2">
+                    <a:lumMod val="90000"/>
+                    <a:lumOff val="10000"/>
+                  </a:schemeClr>
+                </a:solidFill>
+              </a:rPr>
+              <a:t>IN_STATE2 </a:t>
+            </a:r>
+            <a:endParaRPr lang="en-SG" sz="1000" b="1" dirty="0">
+              <a:solidFill>
+                <a:schemeClr val="tx2">
+                  <a:lumMod val="90000"/>
+                  <a:lumOff val="10000"/>
+                </a:schemeClr>
+              </a:solidFill>
+            </a:endParaRPr>
+          </a:p>
+        </p:txBody>
+      </p:sp>
+      <p:cxnSp>
+        <p:nvCxnSpPr>
+          <p:cNvPr id="19" name="Straight Connector 18">
+            <a:extLst>
+              <a:ext uri="{FF2B5EF4-FFF2-40B4-BE49-F238E27FC236}">
+                <a16:creationId xmlns:a16="http://schemas.microsoft.com/office/drawing/2014/main" id="{E3C63880-818F-9637-02A2-70EAFB3801E1}"/>
+              </a:ext>
+            </a:extLst>
+          </p:cNvPr>
+          <p:cNvCxnSpPr>
+            <a:cxnSpLocks/>
+          </p:cNvCxnSpPr>
+          <p:nvPr/>
+        </p:nvCxnSpPr>
+        <p:spPr>
+          <a:xfrm>
+            <a:off x="6682280" y="3027577"/>
+            <a:ext cx="1307592" cy="0"/>
+          </a:xfrm>
+          <a:prstGeom prst="line">
+            <a:avLst/>
+          </a:prstGeom>
+        </p:spPr>
+        <p:style>
+          <a:lnRef idx="2">
+            <a:schemeClr val="accent1"/>
+          </a:lnRef>
+          <a:fillRef idx="0">
+            <a:schemeClr val="accent1"/>
+          </a:fillRef>
+          <a:effectRef idx="1">
+            <a:schemeClr val="accent1"/>
+          </a:effectRef>
+          <a:fontRef idx="minor">
+            <a:schemeClr val="tx1"/>
+          </a:fontRef>
+        </p:style>
+      </p:cxnSp>
+      <p:sp>
+        <p:nvSpPr>
+          <p:cNvPr id="20" name="TextBox 19">
+            <a:extLst>
+              <a:ext uri="{FF2B5EF4-FFF2-40B4-BE49-F238E27FC236}">
+                <a16:creationId xmlns:a16="http://schemas.microsoft.com/office/drawing/2014/main" id="{8E333D1C-C529-B2D8-3CF1-DA97EDEA6421}"/>
+              </a:ext>
+            </a:extLst>
+          </p:cNvPr>
+          <p:cNvSpPr txBox="1"/>
+          <p:nvPr/>
+        </p:nvSpPr>
+        <p:spPr>
+          <a:xfrm>
+            <a:off x="6657501" y="2792324"/>
+            <a:ext cx="462557" cy="246221"/>
+          </a:xfrm>
+          <a:prstGeom prst="rect">
+            <a:avLst/>
+          </a:prstGeom>
+          <a:noFill/>
+        </p:spPr>
+        <p:txBody>
+          <a:bodyPr wrap="square" rtlCol="0">
+            <a:spAutoFit/>
+          </a:bodyPr>
+          <a:lstStyle/>
+          <a:p>
+            <a:r>
+              <a:rPr lang="en-US" sz="1000" b="1" dirty="0">
+                <a:solidFill>
+                  <a:schemeClr val="tx2">
+                    <a:lumMod val="90000"/>
+                    <a:lumOff val="10000"/>
+                  </a:schemeClr>
+                </a:solidFill>
+              </a:rPr>
+              <a:t>OUT</a:t>
+            </a:r>
+            <a:endParaRPr lang="en-SG" sz="1000" b="1" dirty="0">
+              <a:solidFill>
+                <a:schemeClr val="tx2">
+                  <a:lumMod val="90000"/>
+                  <a:lumOff val="10000"/>
+                </a:schemeClr>
+              </a:solidFill>
+            </a:endParaRPr>
+          </a:p>
+        </p:txBody>
+      </p:sp>
+      <p:sp>
+        <p:nvSpPr>
+          <p:cNvPr id="21" name="TextBox 20">
+            <a:extLst>
+              <a:ext uri="{FF2B5EF4-FFF2-40B4-BE49-F238E27FC236}">
+                <a16:creationId xmlns:a16="http://schemas.microsoft.com/office/drawing/2014/main" id="{6E88538F-2677-CDB3-621C-D2D6B2F2DED6}"/>
+              </a:ext>
+            </a:extLst>
+          </p:cNvPr>
+          <p:cNvSpPr txBox="1"/>
+          <p:nvPr/>
+        </p:nvSpPr>
+        <p:spPr>
+          <a:xfrm>
+            <a:off x="7292339" y="2403673"/>
+            <a:ext cx="1847122" cy="461665"/>
+          </a:xfrm>
+          <a:prstGeom prst="rect">
+            <a:avLst/>
+          </a:prstGeom>
+          <a:noFill/>
+        </p:spPr>
+        <p:txBody>
+          <a:bodyPr wrap="square" rtlCol="0">
+            <a:spAutoFit/>
+          </a:bodyPr>
+          <a:lstStyle/>
+          <a:p>
+            <a:r>
+              <a:rPr lang="en-US" sz="1200" b="1" dirty="0"/>
+              <a:t>%M  [000009]</a:t>
+            </a:r>
+          </a:p>
+          <a:p>
+            <a:r>
+              <a:rPr lang="en-US" sz="1200" b="1" dirty="0"/>
+              <a:t>Train 3</a:t>
+            </a:r>
+            <a:r>
+              <a:rPr lang="en-US" sz="1200" b="1" baseline="30000" dirty="0"/>
+              <a:t>rd</a:t>
+            </a:r>
+            <a:r>
+              <a:rPr lang="en-US" sz="1200" b="1" dirty="0"/>
+              <a:t> track power </a:t>
+            </a:r>
+          </a:p>
+        </p:txBody>
+      </p:sp>
+      <p:pic>
+        <p:nvPicPr>
+          <p:cNvPr id="22" name="Picture 21">
+            <a:extLst>
+              <a:ext uri="{FF2B5EF4-FFF2-40B4-BE49-F238E27FC236}">
+                <a16:creationId xmlns:a16="http://schemas.microsoft.com/office/drawing/2014/main" id="{86DBB4DF-85D6-6FC0-D746-C08FB158A925}"/>
+              </a:ext>
+            </a:extLst>
+          </p:cNvPr>
+          <p:cNvPicPr>
+            <a:picLocks noChangeAspect="1"/>
+          </p:cNvPicPr>
+          <p:nvPr/>
+        </p:nvPicPr>
+        <p:blipFill>
+          <a:blip r:embed="rId3">
+            <a:extLst>
+              <a:ext uri="{28A0092B-C50C-407E-A947-70E740481C1C}">
+                <a14:useLocalDpi xmlns:a14="http://schemas.microsoft.com/office/drawing/2010/main" val="0"/>
+              </a:ext>
+            </a:extLst>
+          </a:blip>
+          <a:stretch>
+            <a:fillRect/>
+          </a:stretch>
+        </p:blipFill>
+        <p:spPr>
+          <a:xfrm>
+            <a:off x="8011138" y="2853363"/>
+            <a:ext cx="438095" cy="342857"/>
+          </a:xfrm>
+          <a:prstGeom prst="rect">
+            <a:avLst/>
+          </a:prstGeom>
+        </p:spPr>
+      </p:pic>
+      <p:pic>
+        <p:nvPicPr>
+          <p:cNvPr id="23" name="Picture 22">
+            <a:extLst>
+              <a:ext uri="{FF2B5EF4-FFF2-40B4-BE49-F238E27FC236}">
+                <a16:creationId xmlns:a16="http://schemas.microsoft.com/office/drawing/2014/main" id="{7C9F6AA8-7697-8CAC-9747-7FB28674436C}"/>
+              </a:ext>
+            </a:extLst>
+          </p:cNvPr>
+          <p:cNvPicPr>
+            <a:picLocks noChangeAspect="1"/>
+          </p:cNvPicPr>
+          <p:nvPr/>
+        </p:nvPicPr>
+        <p:blipFill>
+          <a:blip r:embed="rId2">
+            <a:extLst>
+              <a:ext uri="{28A0092B-C50C-407E-A947-70E740481C1C}">
+                <a14:useLocalDpi xmlns:a14="http://schemas.microsoft.com/office/drawing/2010/main" val="0"/>
+              </a:ext>
+            </a:extLst>
+          </a:blip>
+          <a:stretch>
+            <a:fillRect/>
+          </a:stretch>
+        </p:blipFill>
+        <p:spPr>
+          <a:xfrm>
+            <a:off x="898246" y="2897145"/>
+            <a:ext cx="409524" cy="323810"/>
+          </a:xfrm>
+          <a:prstGeom prst="rect">
+            <a:avLst/>
+          </a:prstGeom>
+        </p:spPr>
+      </p:pic>
+      <p:sp>
+        <p:nvSpPr>
+          <p:cNvPr id="24" name="TextBox 23">
+            <a:extLst>
+              <a:ext uri="{FF2B5EF4-FFF2-40B4-BE49-F238E27FC236}">
+                <a16:creationId xmlns:a16="http://schemas.microsoft.com/office/drawing/2014/main" id="{326B5371-F6F5-3DBB-CAF6-CD86A3D33EE7}"/>
+              </a:ext>
+            </a:extLst>
+          </p:cNvPr>
+          <p:cNvSpPr txBox="1"/>
+          <p:nvPr/>
+        </p:nvSpPr>
+        <p:spPr>
+          <a:xfrm>
+            <a:off x="809409" y="2394512"/>
+            <a:ext cx="2635583" cy="461665"/>
+          </a:xfrm>
+          <a:prstGeom prst="rect">
+            <a:avLst/>
+          </a:prstGeom>
+          <a:noFill/>
+        </p:spPr>
+        <p:txBody>
+          <a:bodyPr wrap="square" rtlCol="0">
+            <a:spAutoFit/>
+          </a:bodyPr>
+          <a:lstStyle/>
+          <a:p>
+            <a:r>
+              <a:rPr lang="en-US" sz="1200" b="1" dirty="0"/>
+              <a:t>%M  [000009] </a:t>
+            </a:r>
+          </a:p>
+          <a:p>
+            <a:r>
+              <a:rPr lang="en-US" sz="1200" b="1" dirty="0"/>
+              <a:t>Station Train 3</a:t>
+            </a:r>
+            <a:r>
+              <a:rPr lang="en-US" sz="1200" b="1" baseline="30000" dirty="0"/>
+              <a:t>rd</a:t>
+            </a:r>
+            <a:r>
+              <a:rPr lang="en-US" sz="1200" b="1" dirty="0"/>
+              <a:t> track power </a:t>
+            </a:r>
+          </a:p>
+        </p:txBody>
+      </p:sp>
+      <p:cxnSp>
+        <p:nvCxnSpPr>
+          <p:cNvPr id="26" name="Straight Connector 25">
+            <a:extLst>
+              <a:ext uri="{FF2B5EF4-FFF2-40B4-BE49-F238E27FC236}">
+                <a16:creationId xmlns:a16="http://schemas.microsoft.com/office/drawing/2014/main" id="{511C0D2E-7F23-0724-07C4-3D4260F72C23}"/>
+              </a:ext>
+            </a:extLst>
+          </p:cNvPr>
+          <p:cNvCxnSpPr/>
+          <p:nvPr/>
+        </p:nvCxnSpPr>
+        <p:spPr>
+          <a:xfrm>
+            <a:off x="3716060" y="1140669"/>
+            <a:ext cx="0" cy="1331932"/>
+          </a:xfrm>
+          <a:prstGeom prst="line">
+            <a:avLst/>
+          </a:prstGeom>
+        </p:spPr>
+        <p:style>
+          <a:lnRef idx="2">
+            <a:schemeClr val="accent1"/>
+          </a:lnRef>
+          <a:fillRef idx="0">
+            <a:schemeClr val="accent1"/>
+          </a:fillRef>
+          <a:effectRef idx="1">
+            <a:schemeClr val="accent1"/>
+          </a:effectRef>
+          <a:fontRef idx="minor">
+            <a:schemeClr val="tx1"/>
+          </a:fontRef>
+        </p:style>
+      </p:cxnSp>
+      <p:sp>
+        <p:nvSpPr>
+          <p:cNvPr id="28" name="Rectangle 27">
+            <a:extLst>
+              <a:ext uri="{FF2B5EF4-FFF2-40B4-BE49-F238E27FC236}">
+                <a16:creationId xmlns:a16="http://schemas.microsoft.com/office/drawing/2014/main" id="{5B0783E4-7F4F-51E6-A1F5-C16FD715488E}"/>
+              </a:ext>
+            </a:extLst>
+          </p:cNvPr>
+          <p:cNvSpPr/>
+          <p:nvPr/>
+        </p:nvSpPr>
+        <p:spPr>
+          <a:xfrm>
+            <a:off x="4591728" y="3503056"/>
+            <a:ext cx="2125994" cy="878404"/>
+          </a:xfrm>
+          <a:prstGeom prst="rect">
+            <a:avLst/>
+          </a:prstGeom>
+          <a:solidFill>
+            <a:schemeClr val="bg1"/>
+          </a:solidFill>
+          <a:ln>
+            <a:solidFill>
+              <a:schemeClr val="tx1"/>
+            </a:solidFill>
+          </a:ln>
+        </p:spPr>
+        <p:style>
+          <a:lnRef idx="2">
+            <a:schemeClr val="accent1">
+              <a:shade val="50000"/>
+            </a:schemeClr>
+          </a:lnRef>
+          <a:fillRef idx="1">
+            <a:schemeClr val="accent1"/>
+          </a:fillRef>
+          <a:effectRef idx="0">
+            <a:schemeClr val="accent1"/>
+          </a:effectRef>
+          <a:fontRef idx="minor">
+            <a:schemeClr val="lt1"/>
+          </a:fontRef>
+        </p:style>
+        <p:txBody>
+          <a:bodyPr rtlCol="0" anchor="ctr"/>
+          <a:lstStyle/>
+          <a:p>
+            <a:r>
+              <a:rPr lang="en-US" sz="1050" b="1" dirty="0">
+                <a:solidFill>
+                  <a:schemeClr val="tx1"/>
+                </a:solidFill>
+              </a:rPr>
+              <a:t>IF IN_STATE1 == STEP.HIGHER</a:t>
+            </a:r>
+          </a:p>
+          <a:p>
+            <a:r>
+              <a:rPr lang="en-US" sz="1050" b="1" dirty="0">
+                <a:solidFill>
+                  <a:schemeClr val="tx1"/>
+                </a:solidFill>
+              </a:rPr>
+              <a:t>  OUT =False</a:t>
+            </a:r>
+          </a:p>
+          <a:p>
+            <a:r>
+              <a:rPr lang="en-US" sz="1050" b="1" dirty="0">
+                <a:solidFill>
+                  <a:schemeClr val="tx1"/>
+                </a:solidFill>
+              </a:rPr>
+              <a:t>ELSE</a:t>
+            </a:r>
+          </a:p>
+          <a:p>
+            <a:r>
+              <a:rPr lang="en-US" sz="1050" b="1" dirty="0">
+                <a:solidFill>
+                  <a:schemeClr val="tx1"/>
+                </a:solidFill>
+              </a:rPr>
+              <a:t>  OUT = IN_STATE2</a:t>
+            </a:r>
+          </a:p>
+          <a:p>
+            <a:r>
+              <a:rPr lang="en-US" sz="1050" b="1" dirty="0">
+                <a:solidFill>
+                  <a:schemeClr val="tx1"/>
+                </a:solidFill>
+              </a:rPr>
+              <a:t>END IF </a:t>
+            </a:r>
+          </a:p>
+        </p:txBody>
+      </p:sp>
+      <p:cxnSp>
+        <p:nvCxnSpPr>
+          <p:cNvPr id="29" name="Straight Connector 28">
+            <a:extLst>
+              <a:ext uri="{FF2B5EF4-FFF2-40B4-BE49-F238E27FC236}">
+                <a16:creationId xmlns:a16="http://schemas.microsoft.com/office/drawing/2014/main" id="{91B259E6-0029-D5F9-2AF3-9046B8083585}"/>
+              </a:ext>
+            </a:extLst>
+          </p:cNvPr>
+          <p:cNvCxnSpPr>
+            <a:cxnSpLocks/>
+          </p:cNvCxnSpPr>
+          <p:nvPr/>
+        </p:nvCxnSpPr>
+        <p:spPr>
+          <a:xfrm>
+            <a:off x="3538851" y="1124950"/>
+            <a:ext cx="0" cy="2553915"/>
+          </a:xfrm>
+          <a:prstGeom prst="line">
+            <a:avLst/>
+          </a:prstGeom>
+        </p:spPr>
+        <p:style>
+          <a:lnRef idx="2">
+            <a:schemeClr val="accent1"/>
+          </a:lnRef>
+          <a:fillRef idx="0">
+            <a:schemeClr val="accent1"/>
+          </a:fillRef>
+          <a:effectRef idx="1">
+            <a:schemeClr val="accent1"/>
+          </a:effectRef>
+          <a:fontRef idx="minor">
+            <a:schemeClr val="tx1"/>
+          </a:fontRef>
+        </p:style>
+      </p:cxnSp>
+      <p:sp>
+        <p:nvSpPr>
+          <p:cNvPr id="31" name="TextBox 30">
+            <a:extLst>
+              <a:ext uri="{FF2B5EF4-FFF2-40B4-BE49-F238E27FC236}">
+                <a16:creationId xmlns:a16="http://schemas.microsoft.com/office/drawing/2014/main" id="{C9948D9E-6ED0-7DDC-2D6D-1E8F7286A026}"/>
+              </a:ext>
+            </a:extLst>
+          </p:cNvPr>
+          <p:cNvSpPr txBox="1"/>
+          <p:nvPr/>
+        </p:nvSpPr>
+        <p:spPr>
+          <a:xfrm>
+            <a:off x="3711133" y="3430714"/>
+            <a:ext cx="815445" cy="246221"/>
+          </a:xfrm>
+          <a:prstGeom prst="rect">
+            <a:avLst/>
+          </a:prstGeom>
+          <a:noFill/>
+        </p:spPr>
+        <p:txBody>
+          <a:bodyPr wrap="square" rtlCol="0">
+            <a:spAutoFit/>
+          </a:bodyPr>
+          <a:lstStyle/>
+          <a:p>
+            <a:r>
+              <a:rPr lang="en-US" sz="1000" b="1" dirty="0">
+                <a:solidFill>
+                  <a:schemeClr val="tx2">
+                    <a:lumMod val="90000"/>
+                    <a:lumOff val="10000"/>
+                  </a:schemeClr>
+                </a:solidFill>
+              </a:rPr>
+              <a:t>IN_STATE1 </a:t>
+            </a:r>
+            <a:endParaRPr lang="en-SG" sz="1000" b="1" dirty="0">
+              <a:solidFill>
+                <a:schemeClr val="tx2">
+                  <a:lumMod val="90000"/>
+                  <a:lumOff val="10000"/>
+                </a:schemeClr>
+              </a:solidFill>
+            </a:endParaRPr>
+          </a:p>
+        </p:txBody>
+      </p:sp>
+      <p:cxnSp>
+        <p:nvCxnSpPr>
+          <p:cNvPr id="32" name="Straight Connector 31">
+            <a:extLst>
+              <a:ext uri="{FF2B5EF4-FFF2-40B4-BE49-F238E27FC236}">
+                <a16:creationId xmlns:a16="http://schemas.microsoft.com/office/drawing/2014/main" id="{A9326D48-C8AA-9BF2-449F-4161B538DBE2}"/>
+              </a:ext>
+            </a:extLst>
+          </p:cNvPr>
+          <p:cNvCxnSpPr>
+            <a:cxnSpLocks/>
+          </p:cNvCxnSpPr>
+          <p:nvPr/>
+        </p:nvCxnSpPr>
+        <p:spPr>
+          <a:xfrm>
+            <a:off x="3528218" y="3678865"/>
+            <a:ext cx="1083145" cy="0"/>
+          </a:xfrm>
+          <a:prstGeom prst="line">
+            <a:avLst/>
+          </a:prstGeom>
+        </p:spPr>
+        <p:style>
+          <a:lnRef idx="2">
+            <a:schemeClr val="accent1"/>
+          </a:lnRef>
+          <a:fillRef idx="0">
+            <a:schemeClr val="accent1"/>
+          </a:fillRef>
+          <a:effectRef idx="1">
+            <a:schemeClr val="accent1"/>
+          </a:effectRef>
+          <a:fontRef idx="minor">
+            <a:schemeClr val="tx1"/>
+          </a:fontRef>
+        </p:style>
+      </p:cxnSp>
+      <p:cxnSp>
+        <p:nvCxnSpPr>
+          <p:cNvPr id="34" name="Straight Connector 33">
+            <a:extLst>
+              <a:ext uri="{FF2B5EF4-FFF2-40B4-BE49-F238E27FC236}">
+                <a16:creationId xmlns:a16="http://schemas.microsoft.com/office/drawing/2014/main" id="{E39C93B3-46DE-B8B3-F216-D92E3218705B}"/>
+              </a:ext>
+            </a:extLst>
+          </p:cNvPr>
+          <p:cNvCxnSpPr>
+            <a:cxnSpLocks/>
+          </p:cNvCxnSpPr>
+          <p:nvPr/>
+        </p:nvCxnSpPr>
+        <p:spPr>
+          <a:xfrm>
+            <a:off x="1316614" y="4157463"/>
+            <a:ext cx="3250612" cy="0"/>
+          </a:xfrm>
+          <a:prstGeom prst="line">
+            <a:avLst/>
+          </a:prstGeom>
+        </p:spPr>
+        <p:style>
+          <a:lnRef idx="2">
+            <a:schemeClr val="accent1"/>
+          </a:lnRef>
+          <a:fillRef idx="0">
+            <a:schemeClr val="accent1"/>
+          </a:fillRef>
+          <a:effectRef idx="1">
+            <a:schemeClr val="accent1"/>
+          </a:effectRef>
+          <a:fontRef idx="minor">
+            <a:schemeClr val="tx1"/>
+          </a:fontRef>
+        </p:style>
+      </p:cxnSp>
+      <p:sp>
+        <p:nvSpPr>
+          <p:cNvPr id="35" name="TextBox 34">
+            <a:extLst>
+              <a:ext uri="{FF2B5EF4-FFF2-40B4-BE49-F238E27FC236}">
+                <a16:creationId xmlns:a16="http://schemas.microsoft.com/office/drawing/2014/main" id="{0D75E1CC-9D1E-57E2-824A-CF28110BBA2E}"/>
+              </a:ext>
+            </a:extLst>
+          </p:cNvPr>
+          <p:cNvSpPr txBox="1"/>
+          <p:nvPr/>
+        </p:nvSpPr>
+        <p:spPr>
+          <a:xfrm>
+            <a:off x="3732306" y="3920600"/>
+            <a:ext cx="815445" cy="246221"/>
+          </a:xfrm>
+          <a:prstGeom prst="rect">
+            <a:avLst/>
+          </a:prstGeom>
+          <a:noFill/>
+        </p:spPr>
+        <p:txBody>
+          <a:bodyPr wrap="square" rtlCol="0">
+            <a:spAutoFit/>
+          </a:bodyPr>
+          <a:lstStyle/>
+          <a:p>
+            <a:r>
+              <a:rPr lang="en-US" sz="1000" b="1" dirty="0">
+                <a:solidFill>
+                  <a:schemeClr val="tx2">
+                    <a:lumMod val="90000"/>
+                    <a:lumOff val="10000"/>
+                  </a:schemeClr>
+                </a:solidFill>
+              </a:rPr>
+              <a:t>IN_STATE2 </a:t>
+            </a:r>
+            <a:endParaRPr lang="en-SG" sz="1000" b="1" dirty="0">
+              <a:solidFill>
+                <a:schemeClr val="tx2">
+                  <a:lumMod val="90000"/>
+                  <a:lumOff val="10000"/>
+                </a:schemeClr>
+              </a:solidFill>
+            </a:endParaRPr>
+          </a:p>
+        </p:txBody>
+      </p:sp>
+      <p:pic>
+        <p:nvPicPr>
+          <p:cNvPr id="36" name="Picture 35">
+            <a:extLst>
+              <a:ext uri="{FF2B5EF4-FFF2-40B4-BE49-F238E27FC236}">
+                <a16:creationId xmlns:a16="http://schemas.microsoft.com/office/drawing/2014/main" id="{675FA03A-BB97-1FA1-FE32-A8ED0C119B0E}"/>
+              </a:ext>
+            </a:extLst>
+          </p:cNvPr>
+          <p:cNvPicPr>
+            <a:picLocks noChangeAspect="1"/>
+          </p:cNvPicPr>
+          <p:nvPr/>
+        </p:nvPicPr>
+        <p:blipFill>
+          <a:blip r:embed="rId2">
+            <a:extLst>
+              <a:ext uri="{28A0092B-C50C-407E-A947-70E740481C1C}">
+                <a14:useLocalDpi xmlns:a14="http://schemas.microsoft.com/office/drawing/2010/main" val="0"/>
+              </a:ext>
+            </a:extLst>
+          </a:blip>
+          <a:stretch>
+            <a:fillRect/>
+          </a:stretch>
+        </p:blipFill>
+        <p:spPr>
+          <a:xfrm>
+            <a:off x="964075" y="3994476"/>
+            <a:ext cx="409524" cy="323810"/>
+          </a:xfrm>
+          <a:prstGeom prst="rect">
+            <a:avLst/>
+          </a:prstGeom>
+        </p:spPr>
+      </p:pic>
+      <p:sp>
+        <p:nvSpPr>
+          <p:cNvPr id="38" name="TextBox 37">
+            <a:extLst>
+              <a:ext uri="{FF2B5EF4-FFF2-40B4-BE49-F238E27FC236}">
+                <a16:creationId xmlns:a16="http://schemas.microsoft.com/office/drawing/2014/main" id="{E3EACCE6-11F0-C01C-E47C-C1B6DE3B9D0B}"/>
+              </a:ext>
+            </a:extLst>
+          </p:cNvPr>
+          <p:cNvSpPr txBox="1"/>
+          <p:nvPr/>
+        </p:nvSpPr>
+        <p:spPr>
+          <a:xfrm>
+            <a:off x="811613" y="3503056"/>
+            <a:ext cx="2803593" cy="461665"/>
+          </a:xfrm>
+          <a:prstGeom prst="rect">
+            <a:avLst/>
+          </a:prstGeom>
+          <a:noFill/>
+        </p:spPr>
+        <p:txBody>
+          <a:bodyPr wrap="square" rtlCol="0">
+            <a:spAutoFit/>
+          </a:bodyPr>
+          <a:lstStyle/>
+          <a:p>
+            <a:r>
+              <a:rPr lang="en-US" sz="1200" b="1" dirty="0"/>
+              <a:t>%M  [000005] </a:t>
+            </a:r>
+          </a:p>
+          <a:p>
+            <a:r>
+              <a:rPr lang="en-US" sz="1200" b="1" dirty="0"/>
+              <a:t>Entrance Dock Signals</a:t>
+            </a:r>
+          </a:p>
+        </p:txBody>
+      </p:sp>
+      <p:cxnSp>
+        <p:nvCxnSpPr>
+          <p:cNvPr id="39" name="Straight Connector 38">
+            <a:extLst>
+              <a:ext uri="{FF2B5EF4-FFF2-40B4-BE49-F238E27FC236}">
+                <a16:creationId xmlns:a16="http://schemas.microsoft.com/office/drawing/2014/main" id="{9FA9FEC7-058D-37AD-734E-AC5AED207F45}"/>
+              </a:ext>
+            </a:extLst>
+          </p:cNvPr>
+          <p:cNvCxnSpPr>
+            <a:cxnSpLocks/>
+          </p:cNvCxnSpPr>
+          <p:nvPr/>
+        </p:nvCxnSpPr>
+        <p:spPr>
+          <a:xfrm>
+            <a:off x="6717722" y="4165754"/>
+            <a:ext cx="1307592" cy="0"/>
+          </a:xfrm>
+          <a:prstGeom prst="line">
+            <a:avLst/>
+          </a:prstGeom>
+        </p:spPr>
+        <p:style>
+          <a:lnRef idx="2">
+            <a:schemeClr val="accent1"/>
+          </a:lnRef>
+          <a:fillRef idx="0">
+            <a:schemeClr val="accent1"/>
+          </a:fillRef>
+          <a:effectRef idx="1">
+            <a:schemeClr val="accent1"/>
+          </a:effectRef>
+          <a:fontRef idx="minor">
+            <a:schemeClr val="tx1"/>
+          </a:fontRef>
+        </p:style>
+      </p:cxnSp>
+      <p:sp>
+        <p:nvSpPr>
+          <p:cNvPr id="47" name="TextBox 46">
+            <a:extLst>
+              <a:ext uri="{FF2B5EF4-FFF2-40B4-BE49-F238E27FC236}">
+                <a16:creationId xmlns:a16="http://schemas.microsoft.com/office/drawing/2014/main" id="{4296F36D-D009-35DE-BBCE-56381491ACF2}"/>
+              </a:ext>
+            </a:extLst>
+          </p:cNvPr>
+          <p:cNvSpPr txBox="1"/>
+          <p:nvPr/>
+        </p:nvSpPr>
+        <p:spPr>
+          <a:xfrm>
+            <a:off x="6692943" y="3930501"/>
+            <a:ext cx="462557" cy="246221"/>
+          </a:xfrm>
+          <a:prstGeom prst="rect">
+            <a:avLst/>
+          </a:prstGeom>
+          <a:noFill/>
+        </p:spPr>
+        <p:txBody>
+          <a:bodyPr wrap="square" rtlCol="0">
+            <a:spAutoFit/>
+          </a:bodyPr>
+          <a:lstStyle/>
+          <a:p>
+            <a:r>
+              <a:rPr lang="en-US" sz="1000" b="1" dirty="0">
+                <a:solidFill>
+                  <a:schemeClr val="tx2">
+                    <a:lumMod val="90000"/>
+                    <a:lumOff val="10000"/>
+                  </a:schemeClr>
+                </a:solidFill>
+              </a:rPr>
+              <a:t>OUT</a:t>
+            </a:r>
+            <a:endParaRPr lang="en-SG" sz="1000" b="1" dirty="0">
+              <a:solidFill>
+                <a:schemeClr val="tx2">
+                  <a:lumMod val="90000"/>
+                  <a:lumOff val="10000"/>
+                </a:schemeClr>
+              </a:solidFill>
+            </a:endParaRPr>
+          </a:p>
+        </p:txBody>
+      </p:sp>
+      <p:sp>
+        <p:nvSpPr>
+          <p:cNvPr id="49" name="TextBox 48">
+            <a:extLst>
+              <a:ext uri="{FF2B5EF4-FFF2-40B4-BE49-F238E27FC236}">
+                <a16:creationId xmlns:a16="http://schemas.microsoft.com/office/drawing/2014/main" id="{63A49066-049C-1554-FDA2-7A01236CCC82}"/>
+              </a:ext>
+            </a:extLst>
+          </p:cNvPr>
+          <p:cNvSpPr txBox="1"/>
+          <p:nvPr/>
+        </p:nvSpPr>
+        <p:spPr>
+          <a:xfrm>
+            <a:off x="7327781" y="3541850"/>
+            <a:ext cx="1847122" cy="461665"/>
+          </a:xfrm>
+          <a:prstGeom prst="rect">
+            <a:avLst/>
+          </a:prstGeom>
+          <a:noFill/>
+        </p:spPr>
+        <p:txBody>
+          <a:bodyPr wrap="square" rtlCol="0">
+            <a:spAutoFit/>
+          </a:bodyPr>
+          <a:lstStyle/>
+          <a:p>
+            <a:r>
+              <a:rPr lang="en-US" sz="1200" b="1" dirty="0"/>
+              <a:t>%M  [000005]</a:t>
+            </a:r>
+          </a:p>
+          <a:p>
+            <a:r>
+              <a:rPr lang="en-US" sz="1200" b="1" dirty="0"/>
+              <a:t>Entrance Dock Signals</a:t>
+            </a:r>
+          </a:p>
+        </p:txBody>
+      </p:sp>
+      <p:pic>
+        <p:nvPicPr>
+          <p:cNvPr id="50" name="Picture 49">
+            <a:extLst>
+              <a:ext uri="{FF2B5EF4-FFF2-40B4-BE49-F238E27FC236}">
+                <a16:creationId xmlns:a16="http://schemas.microsoft.com/office/drawing/2014/main" id="{72C8A5AB-6C37-89E6-1107-FBDC83BE5BE0}"/>
+              </a:ext>
+            </a:extLst>
+          </p:cNvPr>
+          <p:cNvPicPr>
+            <a:picLocks noChangeAspect="1"/>
+          </p:cNvPicPr>
+          <p:nvPr/>
+        </p:nvPicPr>
+        <p:blipFill>
+          <a:blip r:embed="rId3">
+            <a:extLst>
+              <a:ext uri="{28A0092B-C50C-407E-A947-70E740481C1C}">
+                <a14:useLocalDpi xmlns:a14="http://schemas.microsoft.com/office/drawing/2010/main" val="0"/>
+              </a:ext>
+            </a:extLst>
+          </a:blip>
+          <a:stretch>
+            <a:fillRect/>
+          </a:stretch>
+        </p:blipFill>
+        <p:spPr>
+          <a:xfrm>
+            <a:off x="8046580" y="3991540"/>
+            <a:ext cx="438095" cy="342857"/>
+          </a:xfrm>
+          <a:prstGeom prst="rect">
+            <a:avLst/>
+          </a:prstGeom>
+        </p:spPr>
+      </p:pic>
+      <p:sp>
+        <p:nvSpPr>
+          <p:cNvPr id="53" name="Rectangle 52">
+            <a:extLst>
+              <a:ext uri="{FF2B5EF4-FFF2-40B4-BE49-F238E27FC236}">
+                <a16:creationId xmlns:a16="http://schemas.microsoft.com/office/drawing/2014/main" id="{2BDBC23D-852D-7E55-3706-88B6F367F96F}"/>
+              </a:ext>
+            </a:extLst>
+          </p:cNvPr>
+          <p:cNvSpPr/>
+          <p:nvPr/>
+        </p:nvSpPr>
+        <p:spPr>
+          <a:xfrm>
+            <a:off x="4628957" y="4633506"/>
+            <a:ext cx="2125994" cy="878404"/>
+          </a:xfrm>
+          <a:prstGeom prst="rect">
+            <a:avLst/>
+          </a:prstGeom>
+          <a:solidFill>
+            <a:schemeClr val="bg1"/>
+          </a:solidFill>
+          <a:ln>
+            <a:solidFill>
+              <a:schemeClr val="tx1"/>
+            </a:solidFill>
+          </a:ln>
+        </p:spPr>
+        <p:style>
+          <a:lnRef idx="2">
+            <a:schemeClr val="accent1">
+              <a:shade val="50000"/>
+            </a:schemeClr>
+          </a:lnRef>
+          <a:fillRef idx="1">
+            <a:schemeClr val="accent1"/>
+          </a:fillRef>
+          <a:effectRef idx="0">
+            <a:schemeClr val="accent1"/>
+          </a:effectRef>
+          <a:fontRef idx="minor">
+            <a:schemeClr val="lt1"/>
+          </a:fontRef>
+        </p:style>
+        <p:txBody>
+          <a:bodyPr rtlCol="0" anchor="ctr"/>
+          <a:lstStyle/>
+          <a:p>
+            <a:r>
+              <a:rPr lang="en-US" sz="1050" b="1" dirty="0">
+                <a:solidFill>
+                  <a:schemeClr val="tx1"/>
+                </a:solidFill>
+              </a:rPr>
+              <a:t>IF IN_STATE1 == STEP.HIGHER</a:t>
+            </a:r>
+          </a:p>
+          <a:p>
+            <a:r>
+              <a:rPr lang="en-US" sz="1050" b="1" dirty="0">
+                <a:solidFill>
+                  <a:schemeClr val="tx1"/>
+                </a:solidFill>
+              </a:rPr>
+              <a:t>  OUT =False</a:t>
+            </a:r>
+          </a:p>
+          <a:p>
+            <a:r>
+              <a:rPr lang="en-US" sz="1050" b="1" dirty="0">
+                <a:solidFill>
+                  <a:schemeClr val="tx1"/>
+                </a:solidFill>
+              </a:rPr>
+              <a:t>ELSE</a:t>
+            </a:r>
+          </a:p>
+          <a:p>
+            <a:r>
+              <a:rPr lang="en-US" sz="1050" b="1" dirty="0">
+                <a:solidFill>
+                  <a:schemeClr val="tx1"/>
+                </a:solidFill>
+              </a:rPr>
+              <a:t>  OUT = IN_STATE2</a:t>
+            </a:r>
+          </a:p>
+          <a:p>
+            <a:r>
+              <a:rPr lang="en-US" sz="1050" b="1" dirty="0">
+                <a:solidFill>
+                  <a:schemeClr val="tx1"/>
+                </a:solidFill>
+              </a:rPr>
+              <a:t>END IF </a:t>
+            </a:r>
+          </a:p>
+        </p:txBody>
+      </p:sp>
+      <p:sp>
+        <p:nvSpPr>
+          <p:cNvPr id="54" name="TextBox 53">
+            <a:extLst>
+              <a:ext uri="{FF2B5EF4-FFF2-40B4-BE49-F238E27FC236}">
+                <a16:creationId xmlns:a16="http://schemas.microsoft.com/office/drawing/2014/main" id="{6364FBD0-59BF-9FB8-7CC7-348D2FA49EAE}"/>
+              </a:ext>
+            </a:extLst>
+          </p:cNvPr>
+          <p:cNvSpPr txBox="1"/>
+          <p:nvPr/>
+        </p:nvSpPr>
+        <p:spPr>
+          <a:xfrm>
+            <a:off x="3664686" y="4565650"/>
+            <a:ext cx="815445" cy="246221"/>
+          </a:xfrm>
+          <a:prstGeom prst="rect">
+            <a:avLst/>
+          </a:prstGeom>
+          <a:noFill/>
+        </p:spPr>
+        <p:txBody>
+          <a:bodyPr wrap="square" rtlCol="0">
+            <a:spAutoFit/>
+          </a:bodyPr>
+          <a:lstStyle/>
+          <a:p>
+            <a:r>
+              <a:rPr lang="en-US" sz="1000" b="1" dirty="0">
+                <a:solidFill>
+                  <a:schemeClr val="tx2">
+                    <a:lumMod val="90000"/>
+                    <a:lumOff val="10000"/>
+                  </a:schemeClr>
+                </a:solidFill>
+              </a:rPr>
+              <a:t>IN_STATE1 </a:t>
+            </a:r>
+            <a:endParaRPr lang="en-SG" sz="1000" b="1" dirty="0">
+              <a:solidFill>
+                <a:schemeClr val="tx2">
+                  <a:lumMod val="90000"/>
+                  <a:lumOff val="10000"/>
+                </a:schemeClr>
+              </a:solidFill>
+            </a:endParaRPr>
+          </a:p>
+        </p:txBody>
+      </p:sp>
+      <p:cxnSp>
+        <p:nvCxnSpPr>
+          <p:cNvPr id="63" name="Straight Connector 62">
+            <a:extLst>
+              <a:ext uri="{FF2B5EF4-FFF2-40B4-BE49-F238E27FC236}">
+                <a16:creationId xmlns:a16="http://schemas.microsoft.com/office/drawing/2014/main" id="{643D84FE-6B56-9DAB-8184-93A807B5D28A}"/>
+              </a:ext>
+            </a:extLst>
+          </p:cNvPr>
+          <p:cNvCxnSpPr>
+            <a:cxnSpLocks/>
+          </p:cNvCxnSpPr>
+          <p:nvPr/>
+        </p:nvCxnSpPr>
+        <p:spPr>
+          <a:xfrm>
+            <a:off x="3327994" y="4808890"/>
+            <a:ext cx="1299332" cy="425"/>
+          </a:xfrm>
+          <a:prstGeom prst="line">
+            <a:avLst/>
+          </a:prstGeom>
+        </p:spPr>
+        <p:style>
+          <a:lnRef idx="2">
+            <a:schemeClr val="accent1"/>
+          </a:lnRef>
+          <a:fillRef idx="0">
+            <a:schemeClr val="accent1"/>
+          </a:fillRef>
+          <a:effectRef idx="1">
+            <a:schemeClr val="accent1"/>
+          </a:effectRef>
+          <a:fontRef idx="minor">
+            <a:schemeClr val="tx1"/>
+          </a:fontRef>
+        </p:style>
+      </p:cxnSp>
+      <p:sp>
+        <p:nvSpPr>
+          <p:cNvPr id="65" name="TextBox 64">
+            <a:extLst>
+              <a:ext uri="{FF2B5EF4-FFF2-40B4-BE49-F238E27FC236}">
+                <a16:creationId xmlns:a16="http://schemas.microsoft.com/office/drawing/2014/main" id="{1252E8C9-FC23-721E-FBD4-4C7D318E7767}"/>
+              </a:ext>
+            </a:extLst>
+          </p:cNvPr>
+          <p:cNvSpPr txBox="1"/>
+          <p:nvPr/>
+        </p:nvSpPr>
+        <p:spPr>
+          <a:xfrm>
+            <a:off x="3711132" y="5041267"/>
+            <a:ext cx="815445" cy="246221"/>
+          </a:xfrm>
+          <a:prstGeom prst="rect">
+            <a:avLst/>
+          </a:prstGeom>
+          <a:noFill/>
+        </p:spPr>
+        <p:txBody>
+          <a:bodyPr wrap="square" rtlCol="0">
+            <a:spAutoFit/>
+          </a:bodyPr>
+          <a:lstStyle/>
+          <a:p>
+            <a:r>
+              <a:rPr lang="en-US" sz="1000" b="1" dirty="0">
+                <a:solidFill>
+                  <a:schemeClr val="tx2">
+                    <a:lumMod val="90000"/>
+                    <a:lumOff val="10000"/>
+                  </a:schemeClr>
+                </a:solidFill>
+              </a:rPr>
+              <a:t>IN_STATE2 </a:t>
+            </a:r>
+            <a:endParaRPr lang="en-SG" sz="1000" b="1" dirty="0">
+              <a:solidFill>
+                <a:schemeClr val="tx2">
+                  <a:lumMod val="90000"/>
+                  <a:lumOff val="10000"/>
+                </a:schemeClr>
+              </a:solidFill>
+            </a:endParaRPr>
+          </a:p>
+        </p:txBody>
+      </p:sp>
+      <p:cxnSp>
+        <p:nvCxnSpPr>
+          <p:cNvPr id="66" name="Straight Connector 65">
+            <a:extLst>
+              <a:ext uri="{FF2B5EF4-FFF2-40B4-BE49-F238E27FC236}">
+                <a16:creationId xmlns:a16="http://schemas.microsoft.com/office/drawing/2014/main" id="{F5F06875-C115-FB66-0229-477A45CDC972}"/>
+              </a:ext>
+            </a:extLst>
+          </p:cNvPr>
+          <p:cNvCxnSpPr>
+            <a:cxnSpLocks/>
+          </p:cNvCxnSpPr>
+          <p:nvPr/>
+        </p:nvCxnSpPr>
+        <p:spPr>
+          <a:xfrm>
+            <a:off x="6754951" y="5296204"/>
+            <a:ext cx="1307592" cy="0"/>
+          </a:xfrm>
+          <a:prstGeom prst="line">
+            <a:avLst/>
+          </a:prstGeom>
+        </p:spPr>
+        <p:style>
+          <a:lnRef idx="2">
+            <a:schemeClr val="accent1"/>
+          </a:lnRef>
+          <a:fillRef idx="0">
+            <a:schemeClr val="accent1"/>
+          </a:fillRef>
+          <a:effectRef idx="1">
+            <a:schemeClr val="accent1"/>
+          </a:effectRef>
+          <a:fontRef idx="minor">
+            <a:schemeClr val="tx1"/>
+          </a:fontRef>
+        </p:style>
+      </p:cxnSp>
+      <p:sp>
+        <p:nvSpPr>
+          <p:cNvPr id="67" name="TextBox 66">
+            <a:extLst>
+              <a:ext uri="{FF2B5EF4-FFF2-40B4-BE49-F238E27FC236}">
+                <a16:creationId xmlns:a16="http://schemas.microsoft.com/office/drawing/2014/main" id="{24A41E12-6E48-6AD7-3BC1-E9DA9D3EE2EF}"/>
+              </a:ext>
+            </a:extLst>
+          </p:cNvPr>
+          <p:cNvSpPr txBox="1"/>
+          <p:nvPr/>
+        </p:nvSpPr>
+        <p:spPr>
+          <a:xfrm>
+            <a:off x="6730172" y="5060951"/>
+            <a:ext cx="462557" cy="246221"/>
+          </a:xfrm>
+          <a:prstGeom prst="rect">
+            <a:avLst/>
+          </a:prstGeom>
+          <a:noFill/>
+        </p:spPr>
+        <p:txBody>
+          <a:bodyPr wrap="square" rtlCol="0">
+            <a:spAutoFit/>
+          </a:bodyPr>
+          <a:lstStyle/>
+          <a:p>
+            <a:r>
+              <a:rPr lang="en-US" sz="1000" b="1" dirty="0">
+                <a:solidFill>
+                  <a:schemeClr val="tx2">
+                    <a:lumMod val="90000"/>
+                    <a:lumOff val="10000"/>
+                  </a:schemeClr>
+                </a:solidFill>
+              </a:rPr>
+              <a:t>OUT</a:t>
+            </a:r>
+            <a:endParaRPr lang="en-SG" sz="1000" b="1" dirty="0">
+              <a:solidFill>
+                <a:schemeClr val="tx2">
+                  <a:lumMod val="90000"/>
+                  <a:lumOff val="10000"/>
+                </a:schemeClr>
+              </a:solidFill>
+            </a:endParaRPr>
+          </a:p>
+        </p:txBody>
+      </p:sp>
+      <p:sp>
+        <p:nvSpPr>
+          <p:cNvPr id="68" name="TextBox 67">
+            <a:extLst>
+              <a:ext uri="{FF2B5EF4-FFF2-40B4-BE49-F238E27FC236}">
+                <a16:creationId xmlns:a16="http://schemas.microsoft.com/office/drawing/2014/main" id="{CFD6682F-979C-D3C0-EBE5-36976DB14ACD}"/>
+              </a:ext>
+            </a:extLst>
+          </p:cNvPr>
+          <p:cNvSpPr txBox="1"/>
+          <p:nvPr/>
+        </p:nvSpPr>
+        <p:spPr>
+          <a:xfrm>
+            <a:off x="7336076" y="4599286"/>
+            <a:ext cx="2125993" cy="461665"/>
+          </a:xfrm>
+          <a:prstGeom prst="rect">
+            <a:avLst/>
+          </a:prstGeom>
+          <a:noFill/>
+        </p:spPr>
+        <p:txBody>
+          <a:bodyPr wrap="square" rtlCol="0">
+            <a:spAutoFit/>
+          </a:bodyPr>
+          <a:lstStyle/>
+          <a:p>
+            <a:r>
+              <a:rPr lang="en-US" sz="1200" b="1" dirty="0"/>
+              <a:t>%M  [000006]</a:t>
+            </a:r>
+          </a:p>
+          <a:p>
+            <a:r>
+              <a:rPr lang="en-US" sz="1200" b="1" dirty="0"/>
+              <a:t>Train Exit Departure Signal</a:t>
+            </a:r>
+          </a:p>
+        </p:txBody>
+      </p:sp>
+      <p:pic>
+        <p:nvPicPr>
+          <p:cNvPr id="69" name="Picture 68">
+            <a:extLst>
+              <a:ext uri="{FF2B5EF4-FFF2-40B4-BE49-F238E27FC236}">
+                <a16:creationId xmlns:a16="http://schemas.microsoft.com/office/drawing/2014/main" id="{5E4DFCCA-B8A3-E4BC-5FA0-4C65C555D9A2}"/>
+              </a:ext>
+            </a:extLst>
+          </p:cNvPr>
+          <p:cNvPicPr>
+            <a:picLocks noChangeAspect="1"/>
+          </p:cNvPicPr>
+          <p:nvPr/>
+        </p:nvPicPr>
+        <p:blipFill>
+          <a:blip r:embed="rId3">
+            <a:extLst>
+              <a:ext uri="{28A0092B-C50C-407E-A947-70E740481C1C}">
+                <a14:useLocalDpi xmlns:a14="http://schemas.microsoft.com/office/drawing/2010/main" val="0"/>
+              </a:ext>
+            </a:extLst>
+          </a:blip>
+          <a:stretch>
+            <a:fillRect/>
+          </a:stretch>
+        </p:blipFill>
+        <p:spPr>
+          <a:xfrm>
+            <a:off x="8083809" y="5121990"/>
+            <a:ext cx="438095" cy="342857"/>
+          </a:xfrm>
+          <a:prstGeom prst="rect">
+            <a:avLst/>
+          </a:prstGeom>
+        </p:spPr>
+      </p:pic>
+      <p:cxnSp>
+        <p:nvCxnSpPr>
+          <p:cNvPr id="71" name="Straight Connector 70">
+            <a:extLst>
+              <a:ext uri="{FF2B5EF4-FFF2-40B4-BE49-F238E27FC236}">
+                <a16:creationId xmlns:a16="http://schemas.microsoft.com/office/drawing/2014/main" id="{3C9B44B7-1B4C-A996-89A7-9BA7EAE0B9DF}"/>
+              </a:ext>
+            </a:extLst>
+          </p:cNvPr>
+          <p:cNvCxnSpPr>
+            <a:cxnSpLocks/>
+          </p:cNvCxnSpPr>
+          <p:nvPr/>
+        </p:nvCxnSpPr>
+        <p:spPr>
+          <a:xfrm>
+            <a:off x="3327994" y="1146357"/>
+            <a:ext cx="0" cy="3662958"/>
+          </a:xfrm>
+          <a:prstGeom prst="line">
+            <a:avLst/>
+          </a:prstGeom>
+        </p:spPr>
+        <p:style>
+          <a:lnRef idx="2">
+            <a:schemeClr val="accent1"/>
+          </a:lnRef>
+          <a:fillRef idx="0">
+            <a:schemeClr val="accent1"/>
+          </a:fillRef>
+          <a:effectRef idx="1">
+            <a:schemeClr val="accent1"/>
+          </a:effectRef>
+          <a:fontRef idx="minor">
+            <a:schemeClr val="tx1"/>
+          </a:fontRef>
+        </p:style>
+      </p:cxnSp>
+      <p:cxnSp>
+        <p:nvCxnSpPr>
+          <p:cNvPr id="74" name="Straight Connector 73">
+            <a:extLst>
+              <a:ext uri="{FF2B5EF4-FFF2-40B4-BE49-F238E27FC236}">
+                <a16:creationId xmlns:a16="http://schemas.microsoft.com/office/drawing/2014/main" id="{00679C1C-D202-6807-03AD-30EA6D2BE0F1}"/>
+              </a:ext>
+            </a:extLst>
+          </p:cNvPr>
+          <p:cNvCxnSpPr>
+            <a:cxnSpLocks/>
+          </p:cNvCxnSpPr>
+          <p:nvPr/>
+        </p:nvCxnSpPr>
+        <p:spPr>
+          <a:xfrm>
+            <a:off x="1380591" y="5308702"/>
+            <a:ext cx="3250612" cy="0"/>
+          </a:xfrm>
+          <a:prstGeom prst="line">
+            <a:avLst/>
+          </a:prstGeom>
+        </p:spPr>
+        <p:style>
+          <a:lnRef idx="2">
+            <a:schemeClr val="accent1"/>
+          </a:lnRef>
+          <a:fillRef idx="0">
+            <a:schemeClr val="accent1"/>
+          </a:fillRef>
+          <a:effectRef idx="1">
+            <a:schemeClr val="accent1"/>
+          </a:effectRef>
+          <a:fontRef idx="minor">
+            <a:schemeClr val="tx1"/>
+          </a:fontRef>
+        </p:style>
+      </p:cxnSp>
+      <p:pic>
+        <p:nvPicPr>
+          <p:cNvPr id="75" name="Picture 74">
+            <a:extLst>
+              <a:ext uri="{FF2B5EF4-FFF2-40B4-BE49-F238E27FC236}">
+                <a16:creationId xmlns:a16="http://schemas.microsoft.com/office/drawing/2014/main" id="{31392864-0EEC-7309-1EDF-9EF2F8DA3E89}"/>
+              </a:ext>
+            </a:extLst>
+          </p:cNvPr>
+          <p:cNvPicPr>
+            <a:picLocks noChangeAspect="1"/>
+          </p:cNvPicPr>
+          <p:nvPr/>
+        </p:nvPicPr>
+        <p:blipFill>
+          <a:blip r:embed="rId2">
+            <a:extLst>
+              <a:ext uri="{28A0092B-C50C-407E-A947-70E740481C1C}">
+                <a14:useLocalDpi xmlns:a14="http://schemas.microsoft.com/office/drawing/2010/main" val="0"/>
+              </a:ext>
+            </a:extLst>
+          </a:blip>
+          <a:stretch>
+            <a:fillRect/>
+          </a:stretch>
+        </p:blipFill>
+        <p:spPr>
+          <a:xfrm>
+            <a:off x="1028052" y="5145715"/>
+            <a:ext cx="409524" cy="323810"/>
+          </a:xfrm>
+          <a:prstGeom prst="rect">
+            <a:avLst/>
+          </a:prstGeom>
+        </p:spPr>
+      </p:pic>
+      <p:sp>
+        <p:nvSpPr>
+          <p:cNvPr id="76" name="TextBox 75">
+            <a:extLst>
+              <a:ext uri="{FF2B5EF4-FFF2-40B4-BE49-F238E27FC236}">
+                <a16:creationId xmlns:a16="http://schemas.microsoft.com/office/drawing/2014/main" id="{F2992EE9-A4DE-7D31-38F0-C822F3284935}"/>
+              </a:ext>
+            </a:extLst>
+          </p:cNvPr>
+          <p:cNvSpPr txBox="1"/>
+          <p:nvPr/>
+        </p:nvSpPr>
+        <p:spPr>
+          <a:xfrm>
+            <a:off x="875590" y="4654295"/>
+            <a:ext cx="2803593" cy="461665"/>
+          </a:xfrm>
+          <a:prstGeom prst="rect">
+            <a:avLst/>
+          </a:prstGeom>
+          <a:noFill/>
+        </p:spPr>
+        <p:txBody>
+          <a:bodyPr wrap="square" rtlCol="0">
+            <a:spAutoFit/>
+          </a:bodyPr>
+          <a:lstStyle/>
+          <a:p>
+            <a:r>
+              <a:rPr lang="en-US" sz="1200" b="1" dirty="0"/>
+              <a:t>%M  [000006] </a:t>
+            </a:r>
+          </a:p>
+          <a:p>
+            <a:r>
+              <a:rPr lang="en-US" sz="1200" b="1" dirty="0"/>
+              <a:t>Train Exit Departure Signal</a:t>
+            </a:r>
+          </a:p>
+        </p:txBody>
+      </p:sp>
+    </p:spTree>
+    <p:extLst>
+      <p:ext uri="{BB962C8B-B14F-4D97-AF65-F5344CB8AC3E}">
+        <p14:creationId xmlns:p14="http://schemas.microsoft.com/office/powerpoint/2010/main" val="61915818"/>
       </p:ext>
     </p:extLst>
   </p:cSld>

</xml_diff>

<commit_message>
update the system workflow diagram.
</commit_message>
<xml_diff>
--- a/OT_System_Attack_Case_Study/Railway_Station/img/designDoc.pptx
+++ b/OT_System_Attack_Case_Study/Railway_Station/img/designDoc.pptx
@@ -4,14 +4,18 @@
   <p:sldMasterIdLst>
     <p:sldMasterId id="2147483648" r:id="rId1"/>
   </p:sldMasterIdLst>
+  <p:notesMasterIdLst>
+    <p:notesMasterId r:id="rId10"/>
+  </p:notesMasterIdLst>
   <p:sldIdLst>
     <p:sldId id="256" r:id="rId2"/>
     <p:sldId id="257" r:id="rId3"/>
     <p:sldId id="258" r:id="rId4"/>
-    <p:sldId id="259" r:id="rId5"/>
-    <p:sldId id="260" r:id="rId6"/>
-    <p:sldId id="262" r:id="rId7"/>
-    <p:sldId id="263" r:id="rId8"/>
+    <p:sldId id="264" r:id="rId5"/>
+    <p:sldId id="259" r:id="rId6"/>
+    <p:sldId id="260" r:id="rId7"/>
+    <p:sldId id="262" r:id="rId8"/>
+    <p:sldId id="263" r:id="rId9"/>
   </p:sldIdLst>
   <p:sldSz cx="12192000" cy="6858000"/>
   <p:notesSz cx="6858000" cy="9144000"/>
@@ -116,6 +120,440 @@
     </p:ext>
   </p:extLst>
 </p:presentation>
+</file>
+
+<file path=ppt/notesMasters/notesMaster1.xml><?xml version="1.0" encoding="utf-8"?>
+<p:notesMaster xmlns:a="http://schemas.openxmlformats.org/drawingml/2006/main" xmlns:r="http://schemas.openxmlformats.org/officeDocument/2006/relationships" xmlns:p="http://schemas.openxmlformats.org/presentationml/2006/main">
+  <p:cSld>
+    <p:bg>
+      <p:bgRef idx="1001">
+        <a:schemeClr val="bg1"/>
+      </p:bgRef>
+    </p:bg>
+    <p:spTree>
+      <p:nvGrpSpPr>
+        <p:cNvPr id="1" name=""/>
+        <p:cNvGrpSpPr/>
+        <p:nvPr/>
+      </p:nvGrpSpPr>
+      <p:grpSpPr>
+        <a:xfrm>
+          <a:off x="0" y="0"/>
+          <a:ext cx="0" cy="0"/>
+          <a:chOff x="0" y="0"/>
+          <a:chExt cx="0" cy="0"/>
+        </a:xfrm>
+      </p:grpSpPr>
+      <p:sp>
+        <p:nvSpPr>
+          <p:cNvPr id="2" name="Header Placeholder 1"/>
+          <p:cNvSpPr>
+            <a:spLocks noGrp="1"/>
+          </p:cNvSpPr>
+          <p:nvPr>
+            <p:ph type="hdr" sz="quarter"/>
+          </p:nvPr>
+        </p:nvSpPr>
+        <p:spPr>
+          <a:xfrm>
+            <a:off x="0" y="0"/>
+            <a:ext cx="2971800" cy="458788"/>
+          </a:xfrm>
+          <a:prstGeom prst="rect">
+            <a:avLst/>
+          </a:prstGeom>
+        </p:spPr>
+        <p:txBody>
+          <a:bodyPr vert="horz" lIns="91440" tIns="45720" rIns="91440" bIns="45720" rtlCol="0"/>
+          <a:lstStyle>
+            <a:lvl1pPr algn="l">
+              <a:defRPr sz="1200"/>
+            </a:lvl1pPr>
+          </a:lstStyle>
+          <a:p>
+            <a:endParaRPr lang="en-SG"/>
+          </a:p>
+        </p:txBody>
+      </p:sp>
+      <p:sp>
+        <p:nvSpPr>
+          <p:cNvPr id="3" name="Date Placeholder 2"/>
+          <p:cNvSpPr>
+            <a:spLocks noGrp="1"/>
+          </p:cNvSpPr>
+          <p:nvPr>
+            <p:ph type="dt" idx="1"/>
+          </p:nvPr>
+        </p:nvSpPr>
+        <p:spPr>
+          <a:xfrm>
+            <a:off x="3884613" y="0"/>
+            <a:ext cx="2971800" cy="458788"/>
+          </a:xfrm>
+          <a:prstGeom prst="rect">
+            <a:avLst/>
+          </a:prstGeom>
+        </p:spPr>
+        <p:txBody>
+          <a:bodyPr vert="horz" lIns="91440" tIns="45720" rIns="91440" bIns="45720" rtlCol="0"/>
+          <a:lstStyle>
+            <a:lvl1pPr algn="r">
+              <a:defRPr sz="1200"/>
+            </a:lvl1pPr>
+          </a:lstStyle>
+          <a:p>
+            <a:fld id="{B05B9264-E5CB-4935-AFB5-B7D2BEA12084}" type="datetimeFigureOut">
+              <a:rPr lang="en-SG" smtClean="0"/>
+              <a:t>24/5/2025</a:t>
+            </a:fld>
+            <a:endParaRPr lang="en-SG"/>
+          </a:p>
+        </p:txBody>
+      </p:sp>
+      <p:sp>
+        <p:nvSpPr>
+          <p:cNvPr id="4" name="Slide Image Placeholder 3"/>
+          <p:cNvSpPr>
+            <a:spLocks noGrp="1" noRot="1" noChangeAspect="1"/>
+          </p:cNvSpPr>
+          <p:nvPr>
+            <p:ph type="sldImg" idx="2"/>
+          </p:nvPr>
+        </p:nvSpPr>
+        <p:spPr>
+          <a:xfrm>
+            <a:off x="685800" y="1143000"/>
+            <a:ext cx="5486400" cy="3086100"/>
+          </a:xfrm>
+          <a:prstGeom prst="rect">
+            <a:avLst/>
+          </a:prstGeom>
+          <a:noFill/>
+          <a:ln w="12700">
+            <a:solidFill>
+              <a:prstClr val="black"/>
+            </a:solidFill>
+          </a:ln>
+        </p:spPr>
+        <p:txBody>
+          <a:bodyPr vert="horz" lIns="91440" tIns="45720" rIns="91440" bIns="45720" rtlCol="0" anchor="ctr"/>
+          <a:lstStyle/>
+          <a:p>
+            <a:endParaRPr lang="en-SG"/>
+          </a:p>
+        </p:txBody>
+      </p:sp>
+      <p:sp>
+        <p:nvSpPr>
+          <p:cNvPr id="5" name="Notes Placeholder 4"/>
+          <p:cNvSpPr>
+            <a:spLocks noGrp="1"/>
+          </p:cNvSpPr>
+          <p:nvPr>
+            <p:ph type="body" sz="quarter" idx="3"/>
+          </p:nvPr>
+        </p:nvSpPr>
+        <p:spPr>
+          <a:xfrm>
+            <a:off x="685800" y="4400550"/>
+            <a:ext cx="5486400" cy="3600450"/>
+          </a:xfrm>
+          <a:prstGeom prst="rect">
+            <a:avLst/>
+          </a:prstGeom>
+        </p:spPr>
+        <p:txBody>
+          <a:bodyPr vert="horz" lIns="91440" tIns="45720" rIns="91440" bIns="45720" rtlCol="0"/>
+          <a:lstStyle/>
+          <a:p>
+            <a:pPr lvl="0"/>
+            <a:r>
+              <a:rPr lang="en-US"/>
+              <a:t>Click to edit Master text styles</a:t>
+            </a:r>
+          </a:p>
+          <a:p>
+            <a:pPr lvl="1"/>
+            <a:r>
+              <a:rPr lang="en-US"/>
+              <a:t>Second level</a:t>
+            </a:r>
+          </a:p>
+          <a:p>
+            <a:pPr lvl="2"/>
+            <a:r>
+              <a:rPr lang="en-US"/>
+              <a:t>Third level</a:t>
+            </a:r>
+          </a:p>
+          <a:p>
+            <a:pPr lvl="3"/>
+            <a:r>
+              <a:rPr lang="en-US"/>
+              <a:t>Fourth level</a:t>
+            </a:r>
+          </a:p>
+          <a:p>
+            <a:pPr lvl="4"/>
+            <a:r>
+              <a:rPr lang="en-US"/>
+              <a:t>Fifth level</a:t>
+            </a:r>
+            <a:endParaRPr lang="en-SG"/>
+          </a:p>
+        </p:txBody>
+      </p:sp>
+      <p:sp>
+        <p:nvSpPr>
+          <p:cNvPr id="6" name="Footer Placeholder 5"/>
+          <p:cNvSpPr>
+            <a:spLocks noGrp="1"/>
+          </p:cNvSpPr>
+          <p:nvPr>
+            <p:ph type="ftr" sz="quarter" idx="4"/>
+          </p:nvPr>
+        </p:nvSpPr>
+        <p:spPr>
+          <a:xfrm>
+            <a:off x="0" y="8685213"/>
+            <a:ext cx="2971800" cy="458787"/>
+          </a:xfrm>
+          <a:prstGeom prst="rect">
+            <a:avLst/>
+          </a:prstGeom>
+        </p:spPr>
+        <p:txBody>
+          <a:bodyPr vert="horz" lIns="91440" tIns="45720" rIns="91440" bIns="45720" rtlCol="0" anchor="b"/>
+          <a:lstStyle>
+            <a:lvl1pPr algn="l">
+              <a:defRPr sz="1200"/>
+            </a:lvl1pPr>
+          </a:lstStyle>
+          <a:p>
+            <a:endParaRPr lang="en-SG"/>
+          </a:p>
+        </p:txBody>
+      </p:sp>
+      <p:sp>
+        <p:nvSpPr>
+          <p:cNvPr id="7" name="Slide Number Placeholder 6"/>
+          <p:cNvSpPr>
+            <a:spLocks noGrp="1"/>
+          </p:cNvSpPr>
+          <p:nvPr>
+            <p:ph type="sldNum" sz="quarter" idx="5"/>
+          </p:nvPr>
+        </p:nvSpPr>
+        <p:spPr>
+          <a:xfrm>
+            <a:off x="3884613" y="8685213"/>
+            <a:ext cx="2971800" cy="458787"/>
+          </a:xfrm>
+          <a:prstGeom prst="rect">
+            <a:avLst/>
+          </a:prstGeom>
+        </p:spPr>
+        <p:txBody>
+          <a:bodyPr vert="horz" lIns="91440" tIns="45720" rIns="91440" bIns="45720" rtlCol="0" anchor="b"/>
+          <a:lstStyle>
+            <a:lvl1pPr algn="r">
+              <a:defRPr sz="1200"/>
+            </a:lvl1pPr>
+          </a:lstStyle>
+          <a:p>
+            <a:fld id="{1A62F6F1-BECB-41D2-8937-6D71F2468149}" type="slidenum">
+              <a:rPr lang="en-SG" smtClean="0"/>
+              <a:t>‹#›</a:t>
+            </a:fld>
+            <a:endParaRPr lang="en-SG"/>
+          </a:p>
+        </p:txBody>
+      </p:sp>
+    </p:spTree>
+    <p:extLst>
+      <p:ext uri="{BB962C8B-B14F-4D97-AF65-F5344CB8AC3E}">
+        <p14:creationId xmlns:p14="http://schemas.microsoft.com/office/powerpoint/2010/main" val="2598008941"/>
+      </p:ext>
+    </p:extLst>
+  </p:cSld>
+  <p:clrMap bg1="lt1" tx1="dk1" bg2="lt2" tx2="dk2" accent1="accent1" accent2="accent2" accent3="accent3" accent4="accent4" accent5="accent5" accent6="accent6" hlink="hlink" folHlink="folHlink"/>
+  <p:notesStyle>
+    <a:lvl1pPr marL="0" algn="l" defTabSz="914400" rtl="0" eaLnBrk="1" latinLnBrk="0" hangingPunct="1">
+      <a:defRPr sz="1200" kern="1200">
+        <a:solidFill>
+          <a:schemeClr val="tx1"/>
+        </a:solidFill>
+        <a:latin typeface="+mn-lt"/>
+        <a:ea typeface="+mn-ea"/>
+        <a:cs typeface="+mn-cs"/>
+      </a:defRPr>
+    </a:lvl1pPr>
+    <a:lvl2pPr marL="457200" algn="l" defTabSz="914400" rtl="0" eaLnBrk="1" latinLnBrk="0" hangingPunct="1">
+      <a:defRPr sz="1200" kern="1200">
+        <a:solidFill>
+          <a:schemeClr val="tx1"/>
+        </a:solidFill>
+        <a:latin typeface="+mn-lt"/>
+        <a:ea typeface="+mn-ea"/>
+        <a:cs typeface="+mn-cs"/>
+      </a:defRPr>
+    </a:lvl2pPr>
+    <a:lvl3pPr marL="914400" algn="l" defTabSz="914400" rtl="0" eaLnBrk="1" latinLnBrk="0" hangingPunct="1">
+      <a:defRPr sz="1200" kern="1200">
+        <a:solidFill>
+          <a:schemeClr val="tx1"/>
+        </a:solidFill>
+        <a:latin typeface="+mn-lt"/>
+        <a:ea typeface="+mn-ea"/>
+        <a:cs typeface="+mn-cs"/>
+      </a:defRPr>
+    </a:lvl3pPr>
+    <a:lvl4pPr marL="1371600" algn="l" defTabSz="914400" rtl="0" eaLnBrk="1" latinLnBrk="0" hangingPunct="1">
+      <a:defRPr sz="1200" kern="1200">
+        <a:solidFill>
+          <a:schemeClr val="tx1"/>
+        </a:solidFill>
+        <a:latin typeface="+mn-lt"/>
+        <a:ea typeface="+mn-ea"/>
+        <a:cs typeface="+mn-cs"/>
+      </a:defRPr>
+    </a:lvl4pPr>
+    <a:lvl5pPr marL="1828800" algn="l" defTabSz="914400" rtl="0" eaLnBrk="1" latinLnBrk="0" hangingPunct="1">
+      <a:defRPr sz="1200" kern="1200">
+        <a:solidFill>
+          <a:schemeClr val="tx1"/>
+        </a:solidFill>
+        <a:latin typeface="+mn-lt"/>
+        <a:ea typeface="+mn-ea"/>
+        <a:cs typeface="+mn-cs"/>
+      </a:defRPr>
+    </a:lvl5pPr>
+    <a:lvl6pPr marL="2286000" algn="l" defTabSz="914400" rtl="0" eaLnBrk="1" latinLnBrk="0" hangingPunct="1">
+      <a:defRPr sz="1200" kern="1200">
+        <a:solidFill>
+          <a:schemeClr val="tx1"/>
+        </a:solidFill>
+        <a:latin typeface="+mn-lt"/>
+        <a:ea typeface="+mn-ea"/>
+        <a:cs typeface="+mn-cs"/>
+      </a:defRPr>
+    </a:lvl6pPr>
+    <a:lvl7pPr marL="2743200" algn="l" defTabSz="914400" rtl="0" eaLnBrk="1" latinLnBrk="0" hangingPunct="1">
+      <a:defRPr sz="1200" kern="1200">
+        <a:solidFill>
+          <a:schemeClr val="tx1"/>
+        </a:solidFill>
+        <a:latin typeface="+mn-lt"/>
+        <a:ea typeface="+mn-ea"/>
+        <a:cs typeface="+mn-cs"/>
+      </a:defRPr>
+    </a:lvl7pPr>
+    <a:lvl8pPr marL="3200400" algn="l" defTabSz="914400" rtl="0" eaLnBrk="1" latinLnBrk="0" hangingPunct="1">
+      <a:defRPr sz="1200" kern="1200">
+        <a:solidFill>
+          <a:schemeClr val="tx1"/>
+        </a:solidFill>
+        <a:latin typeface="+mn-lt"/>
+        <a:ea typeface="+mn-ea"/>
+        <a:cs typeface="+mn-cs"/>
+      </a:defRPr>
+    </a:lvl8pPr>
+    <a:lvl9pPr marL="3657600" algn="l" defTabSz="914400" rtl="0" eaLnBrk="1" latinLnBrk="0" hangingPunct="1">
+      <a:defRPr sz="1200" kern="1200">
+        <a:solidFill>
+          <a:schemeClr val="tx1"/>
+        </a:solidFill>
+        <a:latin typeface="+mn-lt"/>
+        <a:ea typeface="+mn-ea"/>
+        <a:cs typeface="+mn-cs"/>
+      </a:defRPr>
+    </a:lvl9pPr>
+  </p:notesStyle>
+</p:notesMaster>
+</file>
+
+<file path=ppt/notesSlides/notesSlide1.xml><?xml version="1.0" encoding="utf-8"?>
+<p:notes xmlns:a="http://schemas.openxmlformats.org/drawingml/2006/main" xmlns:r="http://schemas.openxmlformats.org/officeDocument/2006/relationships" xmlns:p="http://schemas.openxmlformats.org/presentationml/2006/main">
+  <p:cSld>
+    <p:spTree>
+      <p:nvGrpSpPr>
+        <p:cNvPr id="1" name=""/>
+        <p:cNvGrpSpPr/>
+        <p:nvPr/>
+      </p:nvGrpSpPr>
+      <p:grpSpPr>
+        <a:xfrm>
+          <a:off x="0" y="0"/>
+          <a:ext cx="0" cy="0"/>
+          <a:chOff x="0" y="0"/>
+          <a:chExt cx="0" cy="0"/>
+        </a:xfrm>
+      </p:grpSpPr>
+      <p:sp>
+        <p:nvSpPr>
+          <p:cNvPr id="2" name="Slide Image Placeholder 1"/>
+          <p:cNvSpPr>
+            <a:spLocks noGrp="1" noRot="1" noChangeAspect="1"/>
+          </p:cNvSpPr>
+          <p:nvPr>
+            <p:ph type="sldImg"/>
+          </p:nvPr>
+        </p:nvSpPr>
+        <p:spPr/>
+      </p:sp>
+      <p:sp>
+        <p:nvSpPr>
+          <p:cNvPr id="3" name="Notes Placeholder 2"/>
+          <p:cNvSpPr>
+            <a:spLocks noGrp="1"/>
+          </p:cNvSpPr>
+          <p:nvPr>
+            <p:ph type="body" idx="1"/>
+          </p:nvPr>
+        </p:nvSpPr>
+        <p:spPr/>
+        <p:txBody>
+          <a:bodyPr/>
+          <a:lstStyle/>
+          <a:p>
+            <a:endParaRPr lang="en-SG" dirty="0"/>
+          </a:p>
+        </p:txBody>
+      </p:sp>
+      <p:sp>
+        <p:nvSpPr>
+          <p:cNvPr id="4" name="Slide Number Placeholder 3"/>
+          <p:cNvSpPr>
+            <a:spLocks noGrp="1"/>
+          </p:cNvSpPr>
+          <p:nvPr>
+            <p:ph type="sldNum" sz="quarter" idx="5"/>
+          </p:nvPr>
+        </p:nvSpPr>
+        <p:spPr/>
+        <p:txBody>
+          <a:bodyPr/>
+          <a:lstStyle/>
+          <a:p>
+            <a:fld id="{1A62F6F1-BECB-41D2-8937-6D71F2468149}" type="slidenum">
+              <a:rPr lang="en-SG" smtClean="0"/>
+              <a:t>4</a:t>
+            </a:fld>
+            <a:endParaRPr lang="en-SG"/>
+          </a:p>
+        </p:txBody>
+      </p:sp>
+    </p:spTree>
+    <p:extLst>
+      <p:ext uri="{BB962C8B-B14F-4D97-AF65-F5344CB8AC3E}">
+        <p14:creationId xmlns:p14="http://schemas.microsoft.com/office/powerpoint/2010/main" val="2335436603"/>
+      </p:ext>
+    </p:extLst>
+  </p:cSld>
+  <p:clrMapOvr>
+    <a:masterClrMapping/>
+  </p:clrMapOvr>
+</p:notes>
 </file>
 
 <file path=ppt/slideLayouts/slideLayout1.xml><?xml version="1.0" encoding="utf-8"?>
@@ -4841,12 +5279,64 @@
           <a:chExt cx="0" cy="0"/>
         </a:xfrm>
       </p:grpSpPr>
+      <p:sp>
+        <p:nvSpPr>
+          <p:cNvPr id="15" name="Rectangle 14">
+            <a:extLst>
+              <a:ext uri="{FF2B5EF4-FFF2-40B4-BE49-F238E27FC236}">
+                <a16:creationId xmlns:a16="http://schemas.microsoft.com/office/drawing/2014/main" id="{ED47880E-D3AD-C392-7070-EB89FE711E11}"/>
+              </a:ext>
+            </a:extLst>
+          </p:cNvPr>
+          <p:cNvSpPr/>
+          <p:nvPr/>
+        </p:nvSpPr>
+        <p:spPr>
+          <a:xfrm>
+            <a:off x="552894" y="888903"/>
+            <a:ext cx="6337004" cy="1923704"/>
+          </a:xfrm>
+          <a:prstGeom prst="rect">
+            <a:avLst/>
+          </a:prstGeom>
+          <a:solidFill>
+            <a:schemeClr val="tx2">
+              <a:lumMod val="10000"/>
+              <a:lumOff val="90000"/>
+            </a:schemeClr>
+          </a:solidFill>
+        </p:spPr>
+        <p:style>
+          <a:lnRef idx="2">
+            <a:schemeClr val="accent1">
+              <a:shade val="15000"/>
+            </a:schemeClr>
+          </a:lnRef>
+          <a:fillRef idx="1">
+            <a:schemeClr val="accent1"/>
+          </a:fillRef>
+          <a:effectRef idx="0">
+            <a:schemeClr val="accent1"/>
+          </a:effectRef>
+          <a:fontRef idx="minor">
+            <a:schemeClr val="lt1"/>
+          </a:fontRef>
+        </p:style>
+        <p:txBody>
+          <a:bodyPr rtlCol="0" anchor="ctr"/>
+          <a:lstStyle/>
+          <a:p>
+            <a:pPr algn="ctr"/>
+            <a:endParaRPr lang="en-SG" dirty="0"/>
+          </a:p>
+        </p:txBody>
+      </p:sp>
       <p:pic>
         <p:nvPicPr>
-          <p:cNvPr id="5" name="Picture 4">
-            <a:extLst>
-              <a:ext uri="{FF2B5EF4-FFF2-40B4-BE49-F238E27FC236}">
-                <a16:creationId xmlns:a16="http://schemas.microsoft.com/office/drawing/2014/main" id="{FE5B9EAD-E40F-8FB2-37E1-0643057BAD55}"/>
+          <p:cNvPr id="14" name="Picture 13">
+            <a:extLst>
+              <a:ext uri="{FF2B5EF4-FFF2-40B4-BE49-F238E27FC236}">
+                <a16:creationId xmlns:a16="http://schemas.microsoft.com/office/drawing/2014/main" id="{35E41F51-BC61-122E-CD7A-E48A7132BC68}"/>
               </a:ext>
             </a:extLst>
           </p:cNvPr>
@@ -4856,8 +5346,8 @@
           <p:nvPr/>
         </p:nvPicPr>
         <p:blipFill>
-          <a:blip r:embed="rId2">
-            <a:alphaModFix amt="50000"/>
+          <a:blip r:embed="rId3">
+            <a:alphaModFix amt="85000"/>
           </a:blip>
           <a:stretch>
             <a:fillRect/>
@@ -4865,20 +5355,895 @@
         </p:blipFill>
         <p:spPr>
           <a:xfrm>
-            <a:off x="1239792" y="1790933"/>
-            <a:ext cx="9438095" cy="3733333"/>
+            <a:off x="566183" y="2835936"/>
+            <a:ext cx="6323716" cy="2486636"/>
           </a:xfrm>
           <a:prstGeom prst="rect">
             <a:avLst/>
           </a:prstGeom>
+          <a:ln w="19050">
+            <a:solidFill>
+              <a:schemeClr val="tx1"/>
+            </a:solidFill>
+          </a:ln>
         </p:spPr>
       </p:pic>
       <p:pic>
         <p:nvPicPr>
-          <p:cNvPr id="6" name="Picture 5" descr="TM221CE16R Schneider Electric Modicon M221 PLC CPU Mini USB Interface –  Ralakde Automation">
-            <a:extLst>
-              <a:ext uri="{FF2B5EF4-FFF2-40B4-BE49-F238E27FC236}">
-                <a16:creationId xmlns:a16="http://schemas.microsoft.com/office/drawing/2014/main" id="{A1262E27-82A7-2046-B86D-4EE144249EB4}"/>
+          <p:cNvPr id="5" name="Picture 4">
+            <a:extLst>
+              <a:ext uri="{FF2B5EF4-FFF2-40B4-BE49-F238E27FC236}">
+                <a16:creationId xmlns:a16="http://schemas.microsoft.com/office/drawing/2014/main" id="{8EC31B7A-62A8-9610-30CA-013B194CCA58}"/>
+              </a:ext>
+            </a:extLst>
+          </p:cNvPr>
+          <p:cNvPicPr>
+            <a:picLocks noChangeAspect="1"/>
+          </p:cNvPicPr>
+          <p:nvPr/>
+        </p:nvPicPr>
+        <p:blipFill>
+          <a:blip r:embed="rId4"/>
+          <a:srcRect t="10060" b="13164"/>
+          <a:stretch/>
+        </p:blipFill>
+        <p:spPr>
+          <a:xfrm>
+            <a:off x="777240" y="1175004"/>
+            <a:ext cx="2114891" cy="1498365"/>
+          </a:xfrm>
+          <a:prstGeom prst="rect">
+            <a:avLst/>
+          </a:prstGeom>
+        </p:spPr>
+      </p:pic>
+      <p:pic>
+        <p:nvPicPr>
+          <p:cNvPr id="6" name="Picture 5">
+            <a:extLst>
+              <a:ext uri="{FF2B5EF4-FFF2-40B4-BE49-F238E27FC236}">
+                <a16:creationId xmlns:a16="http://schemas.microsoft.com/office/drawing/2014/main" id="{4D23E7F0-A765-974B-6E38-F0F3E77AAB81}"/>
+              </a:ext>
+            </a:extLst>
+          </p:cNvPr>
+          <p:cNvPicPr>
+            <a:picLocks noChangeAspect="1"/>
+          </p:cNvPicPr>
+          <p:nvPr/>
+        </p:nvPicPr>
+        <p:blipFill>
+          <a:blip r:embed="rId5"/>
+          <a:stretch>
+            <a:fillRect/>
+          </a:stretch>
+        </p:blipFill>
+        <p:spPr>
+          <a:xfrm>
+            <a:off x="3221078" y="1174519"/>
+            <a:ext cx="3339872" cy="1523128"/>
+          </a:xfrm>
+          <a:prstGeom prst="rect">
+            <a:avLst/>
+          </a:prstGeom>
+        </p:spPr>
+      </p:pic>
+      <p:pic>
+        <p:nvPicPr>
+          <p:cNvPr id="7" name="Picture 6">
+            <a:extLst>
+              <a:ext uri="{FF2B5EF4-FFF2-40B4-BE49-F238E27FC236}">
+                <a16:creationId xmlns:a16="http://schemas.microsoft.com/office/drawing/2014/main" id="{D845FA48-DE5F-613E-F42E-E3CD9C5A9E3C}"/>
+              </a:ext>
+            </a:extLst>
+          </p:cNvPr>
+          <p:cNvPicPr>
+            <a:picLocks noChangeAspect="1"/>
+          </p:cNvPicPr>
+          <p:nvPr/>
+        </p:nvPicPr>
+        <p:blipFill>
+          <a:blip r:embed="rId6"/>
+          <a:stretch>
+            <a:fillRect/>
+          </a:stretch>
+        </p:blipFill>
+        <p:spPr>
+          <a:xfrm>
+            <a:off x="2081383" y="5269362"/>
+            <a:ext cx="1345665" cy="964959"/>
+          </a:xfrm>
+          <a:prstGeom prst="rect">
+            <a:avLst/>
+          </a:prstGeom>
+          <a:ln w="28575" cap="sq" cmpd="thickThin">
+            <a:solidFill>
+              <a:srgbClr val="000000"/>
+            </a:solidFill>
+            <a:prstDash val="solid"/>
+            <a:miter lim="800000"/>
+          </a:ln>
+          <a:effectLst>
+            <a:innerShdw blurRad="76200">
+              <a:srgbClr val="000000"/>
+            </a:innerShdw>
+          </a:effectLst>
+        </p:spPr>
+      </p:pic>
+      <p:pic>
+        <p:nvPicPr>
+          <p:cNvPr id="8" name="Picture 7">
+            <a:extLst>
+              <a:ext uri="{FF2B5EF4-FFF2-40B4-BE49-F238E27FC236}">
+                <a16:creationId xmlns:a16="http://schemas.microsoft.com/office/drawing/2014/main" id="{46DB7A58-AB76-4E19-55B0-20F8A253B0F7}"/>
+              </a:ext>
+            </a:extLst>
+          </p:cNvPr>
+          <p:cNvPicPr>
+            <a:picLocks noChangeAspect="1"/>
+          </p:cNvPicPr>
+          <p:nvPr/>
+        </p:nvPicPr>
+        <p:blipFill>
+          <a:blip r:embed="rId7"/>
+          <a:stretch>
+            <a:fillRect/>
+          </a:stretch>
+        </p:blipFill>
+        <p:spPr>
+          <a:xfrm>
+            <a:off x="552893" y="4707988"/>
+            <a:ext cx="1314343" cy="1526333"/>
+          </a:xfrm>
+          <a:prstGeom prst="rect">
+            <a:avLst/>
+          </a:prstGeom>
+          <a:ln w="28575" cap="sq" cmpd="thickThin">
+            <a:solidFill>
+              <a:srgbClr val="000000"/>
+            </a:solidFill>
+            <a:prstDash val="solid"/>
+            <a:miter lim="800000"/>
+          </a:ln>
+          <a:effectLst>
+            <a:innerShdw blurRad="76200">
+              <a:srgbClr val="000000"/>
+            </a:innerShdw>
+          </a:effectLst>
+        </p:spPr>
+      </p:pic>
+      <p:pic>
+        <p:nvPicPr>
+          <p:cNvPr id="9" name="Picture 8">
+            <a:extLst>
+              <a:ext uri="{FF2B5EF4-FFF2-40B4-BE49-F238E27FC236}">
+                <a16:creationId xmlns:a16="http://schemas.microsoft.com/office/drawing/2014/main" id="{57A1327E-B756-3322-E98C-CBF670514C4E}"/>
+              </a:ext>
+            </a:extLst>
+          </p:cNvPr>
+          <p:cNvPicPr>
+            <a:picLocks noChangeAspect="1"/>
+          </p:cNvPicPr>
+          <p:nvPr/>
+        </p:nvPicPr>
+        <p:blipFill>
+          <a:blip r:embed="rId8"/>
+          <a:stretch>
+            <a:fillRect/>
+          </a:stretch>
+        </p:blipFill>
+        <p:spPr>
+          <a:xfrm>
+            <a:off x="3641195" y="5099825"/>
+            <a:ext cx="1898368" cy="1134343"/>
+          </a:xfrm>
+          <a:prstGeom prst="rect">
+            <a:avLst/>
+          </a:prstGeom>
+          <a:ln w="28575" cap="sq" cmpd="thickThin">
+            <a:solidFill>
+              <a:srgbClr val="000000"/>
+            </a:solidFill>
+            <a:prstDash val="solid"/>
+            <a:miter lim="800000"/>
+          </a:ln>
+          <a:effectLst>
+            <a:innerShdw blurRad="76200">
+              <a:srgbClr val="000000"/>
+            </a:innerShdw>
+          </a:effectLst>
+        </p:spPr>
+      </p:pic>
+      <p:pic>
+        <p:nvPicPr>
+          <p:cNvPr id="11" name="Picture 10">
+            <a:extLst>
+              <a:ext uri="{FF2B5EF4-FFF2-40B4-BE49-F238E27FC236}">
+                <a16:creationId xmlns:a16="http://schemas.microsoft.com/office/drawing/2014/main" id="{B7964050-672A-5097-C1BC-810B9FBAFCE3}"/>
+              </a:ext>
+            </a:extLst>
+          </p:cNvPr>
+          <p:cNvPicPr>
+            <a:picLocks noChangeAspect="1"/>
+          </p:cNvPicPr>
+          <p:nvPr/>
+        </p:nvPicPr>
+        <p:blipFill>
+          <a:blip r:embed="rId9"/>
+          <a:stretch>
+            <a:fillRect/>
+          </a:stretch>
+        </p:blipFill>
+        <p:spPr>
+          <a:xfrm>
+            <a:off x="5645274" y="4551954"/>
+            <a:ext cx="1244623" cy="1681513"/>
+          </a:xfrm>
+          <a:prstGeom prst="rect">
+            <a:avLst/>
+          </a:prstGeom>
+          <a:ln w="28575" cap="sq" cmpd="thickThin">
+            <a:solidFill>
+              <a:srgbClr val="000000"/>
+            </a:solidFill>
+            <a:prstDash val="solid"/>
+            <a:miter lim="800000"/>
+          </a:ln>
+          <a:effectLst>
+            <a:innerShdw blurRad="76200">
+              <a:srgbClr val="000000"/>
+            </a:innerShdw>
+          </a:effectLst>
+        </p:spPr>
+      </p:pic>
+      <p:pic>
+        <p:nvPicPr>
+          <p:cNvPr id="13" name="Picture 12">
+            <a:extLst>
+              <a:ext uri="{FF2B5EF4-FFF2-40B4-BE49-F238E27FC236}">
+                <a16:creationId xmlns:a16="http://schemas.microsoft.com/office/drawing/2014/main" id="{0C13AB9B-A7B0-2258-01D4-77D617B491A2}"/>
+              </a:ext>
+            </a:extLst>
+          </p:cNvPr>
+          <p:cNvPicPr>
+            <a:picLocks noChangeAspect="1"/>
+          </p:cNvPicPr>
+          <p:nvPr/>
+        </p:nvPicPr>
+        <p:blipFill>
+          <a:blip r:embed="rId10"/>
+          <a:stretch>
+            <a:fillRect/>
+          </a:stretch>
+        </p:blipFill>
+        <p:spPr>
+          <a:xfrm>
+            <a:off x="7472574" y="1138931"/>
+            <a:ext cx="4108285" cy="1460332"/>
+          </a:xfrm>
+          <a:prstGeom prst="rect">
+            <a:avLst/>
+          </a:prstGeom>
+        </p:spPr>
+      </p:pic>
+      <p:cxnSp>
+        <p:nvCxnSpPr>
+          <p:cNvPr id="17" name="Straight Arrow Connector 16">
+            <a:extLst>
+              <a:ext uri="{FF2B5EF4-FFF2-40B4-BE49-F238E27FC236}">
+                <a16:creationId xmlns:a16="http://schemas.microsoft.com/office/drawing/2014/main" id="{8E2692AA-DF8D-E4BA-6D6E-B5291328394D}"/>
+              </a:ext>
+            </a:extLst>
+          </p:cNvPr>
+          <p:cNvCxnSpPr/>
+          <p:nvPr/>
+        </p:nvCxnSpPr>
+        <p:spPr>
+          <a:xfrm>
+            <a:off x="1392866" y="4835753"/>
+            <a:ext cx="0" cy="455029"/>
+          </a:xfrm>
+          <a:prstGeom prst="straightConnector1">
+            <a:avLst/>
+          </a:prstGeom>
+          <a:ln>
+            <a:tailEnd type="triangle"/>
+          </a:ln>
+        </p:spPr>
+        <p:style>
+          <a:lnRef idx="2">
+            <a:schemeClr val="accent1"/>
+          </a:lnRef>
+          <a:fillRef idx="0">
+            <a:schemeClr val="accent1"/>
+          </a:fillRef>
+          <a:effectRef idx="1">
+            <a:schemeClr val="accent1"/>
+          </a:effectRef>
+          <a:fontRef idx="minor">
+            <a:schemeClr val="tx1"/>
+          </a:fontRef>
+        </p:style>
+      </p:cxnSp>
+      <p:cxnSp>
+        <p:nvCxnSpPr>
+          <p:cNvPr id="18" name="Straight Arrow Connector 17">
+            <a:extLst>
+              <a:ext uri="{FF2B5EF4-FFF2-40B4-BE49-F238E27FC236}">
+                <a16:creationId xmlns:a16="http://schemas.microsoft.com/office/drawing/2014/main" id="{D4403573-5CB0-D709-3CE5-B8A91FDC733D}"/>
+              </a:ext>
+            </a:extLst>
+          </p:cNvPr>
+          <p:cNvCxnSpPr>
+            <a:cxnSpLocks/>
+          </p:cNvCxnSpPr>
+          <p:nvPr/>
+        </p:nvCxnSpPr>
+        <p:spPr>
+          <a:xfrm flipV="1">
+            <a:off x="5666540" y="3124752"/>
+            <a:ext cx="0" cy="1333161"/>
+          </a:xfrm>
+          <a:prstGeom prst="straightConnector1">
+            <a:avLst/>
+          </a:prstGeom>
+          <a:ln>
+            <a:solidFill>
+              <a:srgbClr val="C00000"/>
+            </a:solidFill>
+            <a:prstDash val="sysDash"/>
+            <a:tailEnd type="triangle"/>
+          </a:ln>
+        </p:spPr>
+        <p:style>
+          <a:lnRef idx="2">
+            <a:schemeClr val="accent1"/>
+          </a:lnRef>
+          <a:fillRef idx="0">
+            <a:schemeClr val="accent1"/>
+          </a:fillRef>
+          <a:effectRef idx="1">
+            <a:schemeClr val="accent1"/>
+          </a:effectRef>
+          <a:fontRef idx="minor">
+            <a:schemeClr val="tx1"/>
+          </a:fontRef>
+        </p:style>
+      </p:cxnSp>
+      <p:cxnSp>
+        <p:nvCxnSpPr>
+          <p:cNvPr id="20" name="Straight Arrow Connector 19">
+            <a:extLst>
+              <a:ext uri="{FF2B5EF4-FFF2-40B4-BE49-F238E27FC236}">
+                <a16:creationId xmlns:a16="http://schemas.microsoft.com/office/drawing/2014/main" id="{B6E87208-CA45-91DB-2B6C-994DD0778A63}"/>
+              </a:ext>
+            </a:extLst>
+          </p:cNvPr>
+          <p:cNvCxnSpPr>
+            <a:cxnSpLocks/>
+          </p:cNvCxnSpPr>
+          <p:nvPr/>
+        </p:nvCxnSpPr>
+        <p:spPr>
+          <a:xfrm flipV="1">
+            <a:off x="4476307" y="4707988"/>
+            <a:ext cx="0" cy="391837"/>
+          </a:xfrm>
+          <a:prstGeom prst="straightConnector1">
+            <a:avLst/>
+          </a:prstGeom>
+          <a:ln>
+            <a:solidFill>
+              <a:srgbClr val="C00000"/>
+            </a:solidFill>
+            <a:prstDash val="sysDash"/>
+            <a:tailEnd type="triangle"/>
+          </a:ln>
+        </p:spPr>
+        <p:style>
+          <a:lnRef idx="2">
+            <a:schemeClr val="accent1"/>
+          </a:lnRef>
+          <a:fillRef idx="0">
+            <a:schemeClr val="accent1"/>
+          </a:fillRef>
+          <a:effectRef idx="1">
+            <a:schemeClr val="accent1"/>
+          </a:effectRef>
+          <a:fontRef idx="minor">
+            <a:schemeClr val="tx1"/>
+          </a:fontRef>
+        </p:style>
+      </p:cxnSp>
+      <p:cxnSp>
+        <p:nvCxnSpPr>
+          <p:cNvPr id="23" name="Straight Arrow Connector 22">
+            <a:extLst>
+              <a:ext uri="{FF2B5EF4-FFF2-40B4-BE49-F238E27FC236}">
+                <a16:creationId xmlns:a16="http://schemas.microsoft.com/office/drawing/2014/main" id="{BB5747B7-6A8A-8D68-AF82-C4EF78D00578}"/>
+              </a:ext>
+            </a:extLst>
+          </p:cNvPr>
+          <p:cNvCxnSpPr>
+            <a:cxnSpLocks/>
+          </p:cNvCxnSpPr>
+          <p:nvPr/>
+        </p:nvCxnSpPr>
+        <p:spPr>
+          <a:xfrm flipV="1">
+            <a:off x="4054549" y="4707988"/>
+            <a:ext cx="0" cy="391837"/>
+          </a:xfrm>
+          <a:prstGeom prst="straightConnector1">
+            <a:avLst/>
+          </a:prstGeom>
+          <a:ln>
+            <a:solidFill>
+              <a:srgbClr val="C00000"/>
+            </a:solidFill>
+            <a:prstDash val="sysDash"/>
+            <a:tailEnd type="triangle"/>
+          </a:ln>
+        </p:spPr>
+        <p:style>
+          <a:lnRef idx="2">
+            <a:schemeClr val="accent1"/>
+          </a:lnRef>
+          <a:fillRef idx="0">
+            <a:schemeClr val="accent1"/>
+          </a:fillRef>
+          <a:effectRef idx="1">
+            <a:schemeClr val="accent1"/>
+          </a:effectRef>
+          <a:fontRef idx="minor">
+            <a:schemeClr val="tx1"/>
+          </a:fontRef>
+        </p:style>
+      </p:cxnSp>
+      <p:cxnSp>
+        <p:nvCxnSpPr>
+          <p:cNvPr id="24" name="Straight Arrow Connector 23">
+            <a:extLst>
+              <a:ext uri="{FF2B5EF4-FFF2-40B4-BE49-F238E27FC236}">
+                <a16:creationId xmlns:a16="http://schemas.microsoft.com/office/drawing/2014/main" id="{A5FE09D5-1DD9-A7F9-30CD-3842254E2126}"/>
+              </a:ext>
+            </a:extLst>
+          </p:cNvPr>
+          <p:cNvCxnSpPr>
+            <a:cxnSpLocks/>
+          </p:cNvCxnSpPr>
+          <p:nvPr/>
+        </p:nvCxnSpPr>
+        <p:spPr>
+          <a:xfrm flipV="1">
+            <a:off x="2081383" y="3255549"/>
+            <a:ext cx="0" cy="2013813"/>
+          </a:xfrm>
+          <a:prstGeom prst="straightConnector1">
+            <a:avLst/>
+          </a:prstGeom>
+          <a:ln>
+            <a:solidFill>
+              <a:srgbClr val="C00000"/>
+            </a:solidFill>
+            <a:prstDash val="sysDash"/>
+            <a:tailEnd type="triangle"/>
+          </a:ln>
+        </p:spPr>
+        <p:style>
+          <a:lnRef idx="2">
+            <a:schemeClr val="accent1"/>
+          </a:lnRef>
+          <a:fillRef idx="0">
+            <a:schemeClr val="accent1"/>
+          </a:fillRef>
+          <a:effectRef idx="1">
+            <a:schemeClr val="accent1"/>
+          </a:effectRef>
+          <a:fontRef idx="minor">
+            <a:schemeClr val="tx1"/>
+          </a:fontRef>
+        </p:style>
+      </p:cxnSp>
+      <p:cxnSp>
+        <p:nvCxnSpPr>
+          <p:cNvPr id="26" name="Straight Arrow Connector 25">
+            <a:extLst>
+              <a:ext uri="{FF2B5EF4-FFF2-40B4-BE49-F238E27FC236}">
+                <a16:creationId xmlns:a16="http://schemas.microsoft.com/office/drawing/2014/main" id="{9626F4FB-E3CC-5368-FF0F-F95C24CBF701}"/>
+              </a:ext>
+            </a:extLst>
+          </p:cNvPr>
+          <p:cNvCxnSpPr>
+            <a:cxnSpLocks/>
+          </p:cNvCxnSpPr>
+          <p:nvPr/>
+        </p:nvCxnSpPr>
+        <p:spPr>
+          <a:xfrm flipV="1">
+            <a:off x="1117365" y="3003912"/>
+            <a:ext cx="0" cy="1704076"/>
+          </a:xfrm>
+          <a:prstGeom prst="straightConnector1">
+            <a:avLst/>
+          </a:prstGeom>
+          <a:ln>
+            <a:solidFill>
+              <a:srgbClr val="C00000"/>
+            </a:solidFill>
+            <a:prstDash val="sysDash"/>
+            <a:tailEnd type="triangle"/>
+          </a:ln>
+        </p:spPr>
+        <p:style>
+          <a:lnRef idx="2">
+            <a:schemeClr val="accent1"/>
+          </a:lnRef>
+          <a:fillRef idx="0">
+            <a:schemeClr val="accent1"/>
+          </a:fillRef>
+          <a:effectRef idx="1">
+            <a:schemeClr val="accent1"/>
+          </a:effectRef>
+          <a:fontRef idx="minor">
+            <a:schemeClr val="tx1"/>
+          </a:fontRef>
+        </p:style>
+      </p:cxnSp>
+      <p:cxnSp>
+        <p:nvCxnSpPr>
+          <p:cNvPr id="28" name="Straight Arrow Connector 27">
+            <a:extLst>
+              <a:ext uri="{FF2B5EF4-FFF2-40B4-BE49-F238E27FC236}">
+                <a16:creationId xmlns:a16="http://schemas.microsoft.com/office/drawing/2014/main" id="{620CBE9E-D6FE-3BBD-89C5-39DD83BC986A}"/>
+              </a:ext>
+            </a:extLst>
+          </p:cNvPr>
+          <p:cNvCxnSpPr>
+            <a:cxnSpLocks/>
+          </p:cNvCxnSpPr>
+          <p:nvPr/>
+        </p:nvCxnSpPr>
+        <p:spPr>
+          <a:xfrm>
+            <a:off x="3312654" y="4395017"/>
+            <a:ext cx="0" cy="250075"/>
+          </a:xfrm>
+          <a:prstGeom prst="straightConnector1">
+            <a:avLst/>
+          </a:prstGeom>
+          <a:ln>
+            <a:solidFill>
+              <a:srgbClr val="C00000"/>
+            </a:solidFill>
+            <a:prstDash val="sysDash"/>
+            <a:tailEnd type="triangle"/>
+          </a:ln>
+        </p:spPr>
+        <p:style>
+          <a:lnRef idx="2">
+            <a:schemeClr val="accent1"/>
+          </a:lnRef>
+          <a:fillRef idx="0">
+            <a:schemeClr val="accent1"/>
+          </a:fillRef>
+          <a:effectRef idx="1">
+            <a:schemeClr val="accent1"/>
+          </a:effectRef>
+          <a:fontRef idx="minor">
+            <a:schemeClr val="tx1"/>
+          </a:fontRef>
+        </p:style>
+      </p:cxnSp>
+      <p:pic>
+        <p:nvPicPr>
+          <p:cNvPr id="10" name="Picture 9">
+            <a:extLst>
+              <a:ext uri="{FF2B5EF4-FFF2-40B4-BE49-F238E27FC236}">
+                <a16:creationId xmlns:a16="http://schemas.microsoft.com/office/drawing/2014/main" id="{99F1A5DA-6B43-EE2B-BB0D-8CB215433534}"/>
+              </a:ext>
+            </a:extLst>
+          </p:cNvPr>
+          <p:cNvPicPr>
+            <a:picLocks noChangeAspect="1"/>
+          </p:cNvPicPr>
+          <p:nvPr/>
+        </p:nvPicPr>
+        <p:blipFill>
+          <a:blip r:embed="rId11"/>
+          <a:stretch>
+            <a:fillRect/>
+          </a:stretch>
+        </p:blipFill>
+        <p:spPr>
+          <a:xfrm>
+            <a:off x="2928280" y="3647386"/>
+            <a:ext cx="923763" cy="810527"/>
+          </a:xfrm>
+          <a:prstGeom prst="rect">
+            <a:avLst/>
+          </a:prstGeom>
+          <a:ln w="28575" cap="sq" cmpd="thickThin">
+            <a:solidFill>
+              <a:schemeClr val="bg1"/>
+            </a:solidFill>
+            <a:prstDash val="solid"/>
+            <a:miter lim="800000"/>
+          </a:ln>
+          <a:effectLst>
+            <a:innerShdw blurRad="76200">
+              <a:srgbClr val="000000"/>
+            </a:innerShdw>
+          </a:effectLst>
+        </p:spPr>
+      </p:pic>
+      <p:sp>
+        <p:nvSpPr>
+          <p:cNvPr id="34" name="TextBox 33">
+            <a:extLst>
+              <a:ext uri="{FF2B5EF4-FFF2-40B4-BE49-F238E27FC236}">
+                <a16:creationId xmlns:a16="http://schemas.microsoft.com/office/drawing/2014/main" id="{C0B3DCC7-7AFC-F2D9-4A0A-04644DD36374}"/>
+              </a:ext>
+            </a:extLst>
+          </p:cNvPr>
+          <p:cNvSpPr txBox="1"/>
+          <p:nvPr/>
+        </p:nvSpPr>
+        <p:spPr>
+          <a:xfrm>
+            <a:off x="584259" y="888902"/>
+            <a:ext cx="3669658" cy="307777"/>
+          </a:xfrm>
+          <a:prstGeom prst="rect">
+            <a:avLst/>
+          </a:prstGeom>
+          <a:noFill/>
+        </p:spPr>
+        <p:txBody>
+          <a:bodyPr wrap="square" rtlCol="0">
+            <a:spAutoFit/>
+          </a:bodyPr>
+          <a:lstStyle/>
+          <a:p>
+            <a:r>
+              <a:rPr lang="en-US" sz="1400" b="1" dirty="0">
+                <a:solidFill>
+                  <a:schemeClr val="tx2">
+                    <a:lumMod val="75000"/>
+                    <a:lumOff val="25000"/>
+                  </a:schemeClr>
+                </a:solidFill>
+              </a:rPr>
+              <a:t>Physical World Components  Simulation</a:t>
+            </a:r>
+            <a:endParaRPr lang="en-SG" sz="1400" b="1" dirty="0">
+              <a:solidFill>
+                <a:schemeClr val="tx2">
+                  <a:lumMod val="75000"/>
+                  <a:lumOff val="25000"/>
+                </a:schemeClr>
+              </a:solidFill>
+            </a:endParaRPr>
+          </a:p>
+        </p:txBody>
+      </p:sp>
+      <p:sp>
+        <p:nvSpPr>
+          <p:cNvPr id="35" name="TextBox 34">
+            <a:extLst>
+              <a:ext uri="{FF2B5EF4-FFF2-40B4-BE49-F238E27FC236}">
+                <a16:creationId xmlns:a16="http://schemas.microsoft.com/office/drawing/2014/main" id="{26E1CD6F-28BA-0215-14C8-D227DF082A67}"/>
+              </a:ext>
+            </a:extLst>
+          </p:cNvPr>
+          <p:cNvSpPr txBox="1"/>
+          <p:nvPr/>
+        </p:nvSpPr>
+        <p:spPr>
+          <a:xfrm>
+            <a:off x="5657968" y="4105814"/>
+            <a:ext cx="1358086" cy="461665"/>
+          </a:xfrm>
+          <a:prstGeom prst="rect">
+            <a:avLst/>
+          </a:prstGeom>
+          <a:noFill/>
+        </p:spPr>
+        <p:txBody>
+          <a:bodyPr wrap="square" rtlCol="0">
+            <a:spAutoFit/>
+          </a:bodyPr>
+          <a:lstStyle/>
+          <a:p>
+            <a:r>
+              <a:rPr lang="en-US" sz="1200" b="1" dirty="0"/>
+              <a:t>Station  Exist departure signal </a:t>
+            </a:r>
+            <a:endParaRPr lang="en-SG" sz="1200" b="1" dirty="0"/>
+          </a:p>
+        </p:txBody>
+      </p:sp>
+      <p:sp>
+        <p:nvSpPr>
+          <p:cNvPr id="36" name="TextBox 35">
+            <a:extLst>
+              <a:ext uri="{FF2B5EF4-FFF2-40B4-BE49-F238E27FC236}">
+                <a16:creationId xmlns:a16="http://schemas.microsoft.com/office/drawing/2014/main" id="{2BAA3CDD-4E82-1FE8-6A86-913DBDF82F70}"/>
+              </a:ext>
+            </a:extLst>
+          </p:cNvPr>
+          <p:cNvSpPr txBox="1"/>
+          <p:nvPr/>
+        </p:nvSpPr>
+        <p:spPr>
+          <a:xfrm>
+            <a:off x="552893" y="5809672"/>
+            <a:ext cx="1358086" cy="461665"/>
+          </a:xfrm>
+          <a:prstGeom prst="rect">
+            <a:avLst/>
+          </a:prstGeom>
+          <a:noFill/>
+        </p:spPr>
+        <p:txBody>
+          <a:bodyPr wrap="square" rtlCol="0">
+            <a:spAutoFit/>
+          </a:bodyPr>
+          <a:lstStyle/>
+          <a:p>
+            <a:r>
+              <a:rPr lang="en-US" sz="1200" b="1" dirty="0">
+                <a:solidFill>
+                  <a:schemeClr val="bg1"/>
+                </a:solidFill>
+              </a:rPr>
+              <a:t>Station Entrance Dock Signal </a:t>
+            </a:r>
+            <a:endParaRPr lang="en-SG" sz="1200" b="1" dirty="0">
+              <a:solidFill>
+                <a:schemeClr val="bg1"/>
+              </a:solidFill>
+            </a:endParaRPr>
+          </a:p>
+        </p:txBody>
+      </p:sp>
+      <p:sp>
+        <p:nvSpPr>
+          <p:cNvPr id="37" name="TextBox 36">
+            <a:extLst>
+              <a:ext uri="{FF2B5EF4-FFF2-40B4-BE49-F238E27FC236}">
+                <a16:creationId xmlns:a16="http://schemas.microsoft.com/office/drawing/2014/main" id="{9ADB9E15-E571-A553-9311-9156C5E2D389}"/>
+              </a:ext>
+            </a:extLst>
+          </p:cNvPr>
+          <p:cNvSpPr txBox="1"/>
+          <p:nvPr/>
+        </p:nvSpPr>
+        <p:spPr>
+          <a:xfrm>
+            <a:off x="2053301" y="5809672"/>
+            <a:ext cx="1358086" cy="461665"/>
+          </a:xfrm>
+          <a:prstGeom prst="rect">
+            <a:avLst/>
+          </a:prstGeom>
+          <a:noFill/>
+        </p:spPr>
+        <p:txBody>
+          <a:bodyPr wrap="square" rtlCol="0">
+            <a:spAutoFit/>
+          </a:bodyPr>
+          <a:lstStyle/>
+          <a:p>
+            <a:r>
+              <a:rPr lang="en-US" sz="1200" b="1" dirty="0">
+                <a:solidFill>
+                  <a:schemeClr val="bg1"/>
+                </a:solidFill>
+              </a:rPr>
+              <a:t>Train Position Sensors</a:t>
+            </a:r>
+            <a:endParaRPr lang="en-SG" sz="1200" b="1" dirty="0">
+              <a:solidFill>
+                <a:schemeClr val="bg1"/>
+              </a:solidFill>
+            </a:endParaRPr>
+          </a:p>
+        </p:txBody>
+      </p:sp>
+      <p:sp>
+        <p:nvSpPr>
+          <p:cNvPr id="39" name="TextBox 38">
+            <a:extLst>
+              <a:ext uri="{FF2B5EF4-FFF2-40B4-BE49-F238E27FC236}">
+                <a16:creationId xmlns:a16="http://schemas.microsoft.com/office/drawing/2014/main" id="{7E05F1E8-3EE9-6A88-B533-C32812E89BF2}"/>
+              </a:ext>
+            </a:extLst>
+          </p:cNvPr>
+          <p:cNvSpPr txBox="1"/>
+          <p:nvPr/>
+        </p:nvSpPr>
+        <p:spPr>
+          <a:xfrm>
+            <a:off x="3669419" y="5819649"/>
+            <a:ext cx="1805450" cy="461665"/>
+          </a:xfrm>
+          <a:prstGeom prst="rect">
+            <a:avLst/>
+          </a:prstGeom>
+          <a:noFill/>
+        </p:spPr>
+        <p:txBody>
+          <a:bodyPr wrap="square" rtlCol="0">
+            <a:spAutoFit/>
+          </a:bodyPr>
+          <a:lstStyle/>
+          <a:p>
+            <a:r>
+              <a:rPr lang="en-US" sz="1200" b="1" dirty="0">
+                <a:solidFill>
+                  <a:schemeClr val="bg1"/>
+                </a:solidFill>
+              </a:rPr>
+              <a:t>Station Platform Safety Doors</a:t>
+            </a:r>
+            <a:endParaRPr lang="en-SG" sz="1200" b="1" dirty="0">
+              <a:solidFill>
+                <a:schemeClr val="bg1"/>
+              </a:solidFill>
+            </a:endParaRPr>
+          </a:p>
+        </p:txBody>
+      </p:sp>
+      <p:sp>
+        <p:nvSpPr>
+          <p:cNvPr id="40" name="TextBox 39">
+            <a:extLst>
+              <a:ext uri="{FF2B5EF4-FFF2-40B4-BE49-F238E27FC236}">
+                <a16:creationId xmlns:a16="http://schemas.microsoft.com/office/drawing/2014/main" id="{F9879279-1A7A-DE50-85C9-CF2908DB1960}"/>
+              </a:ext>
+            </a:extLst>
+          </p:cNvPr>
+          <p:cNvSpPr txBox="1"/>
+          <p:nvPr/>
+        </p:nvSpPr>
+        <p:spPr>
+          <a:xfrm>
+            <a:off x="3852043" y="3597476"/>
+            <a:ext cx="1039690" cy="830997"/>
+          </a:xfrm>
+          <a:prstGeom prst="rect">
+            <a:avLst/>
+          </a:prstGeom>
+          <a:noFill/>
+        </p:spPr>
+        <p:txBody>
+          <a:bodyPr wrap="square" rtlCol="0">
+            <a:spAutoFit/>
+          </a:bodyPr>
+          <a:lstStyle/>
+          <a:p>
+            <a:r>
+              <a:rPr lang="en-US" sz="1200" b="1" dirty="0">
+                <a:solidFill>
+                  <a:srgbClr val="C00000"/>
+                </a:solidFill>
+              </a:rPr>
+              <a:t>Station Platform Emergency Buttons </a:t>
+            </a:r>
+            <a:endParaRPr lang="en-SG" sz="1200" b="1" dirty="0">
+              <a:solidFill>
+                <a:srgbClr val="C00000"/>
+              </a:solidFill>
+            </a:endParaRPr>
+          </a:p>
+        </p:txBody>
+      </p:sp>
+      <p:pic>
+        <p:nvPicPr>
+          <p:cNvPr id="41" name="Picture 40" descr="TM221CE16R Schneider Electric Modicon M221 PLC CPU Mini USB Interface –  Ralakde Automation">
+            <a:extLst>
+              <a:ext uri="{FF2B5EF4-FFF2-40B4-BE49-F238E27FC236}">
+                <a16:creationId xmlns:a16="http://schemas.microsoft.com/office/drawing/2014/main" id="{DDF8D4E6-56FD-85E7-F5E7-2A18C2E5AB18}"/>
               </a:ext>
             </a:extLst>
           </p:cNvPr>
@@ -4888,7 +6253,7 @@
           <p:nvPr/>
         </p:nvPicPr>
         <p:blipFill>
-          <a:blip r:embed="rId3">
+          <a:blip r:embed="rId12">
             <a:extLst>
               <a:ext uri="{28A0092B-C50C-407E-A947-70E740481C1C}">
                 <a14:useLocalDpi xmlns:a14="http://schemas.microsoft.com/office/drawing/2010/main" val="0"/>
@@ -4902,8 +6267,8 @@
         </p:blipFill>
         <p:spPr bwMode="auto">
           <a:xfrm>
-            <a:off x="4277770" y="1202731"/>
-            <a:ext cx="541118" cy="593226"/>
+            <a:off x="9100448" y="5184333"/>
+            <a:ext cx="606702" cy="665125"/>
           </a:xfrm>
           <a:prstGeom prst="rect">
             <a:avLst/>
@@ -4920,197 +6285,12 @@
           </a:extLst>
         </p:spPr>
       </p:pic>
-      <p:cxnSp>
-        <p:nvCxnSpPr>
-          <p:cNvPr id="8" name="Connector: Elbow 7">
-            <a:extLst>
-              <a:ext uri="{FF2B5EF4-FFF2-40B4-BE49-F238E27FC236}">
-                <a16:creationId xmlns:a16="http://schemas.microsoft.com/office/drawing/2014/main" id="{AF3E99B8-8170-595F-EC05-7D98E273FEE5}"/>
-              </a:ext>
-            </a:extLst>
-          </p:cNvPr>
-          <p:cNvCxnSpPr>
-            <a:cxnSpLocks/>
-            <a:endCxn id="6" idx="2"/>
-          </p:cNvCxnSpPr>
-          <p:nvPr/>
-        </p:nvCxnSpPr>
-        <p:spPr>
-          <a:xfrm flipV="1">
-            <a:off x="3661492" y="1795957"/>
-            <a:ext cx="886837" cy="640532"/>
-          </a:xfrm>
-          <a:prstGeom prst="bentConnector2">
-            <a:avLst/>
-          </a:prstGeom>
-          <a:ln>
-            <a:solidFill>
-              <a:schemeClr val="accent6">
-                <a:lumMod val="75000"/>
-              </a:schemeClr>
-            </a:solidFill>
-          </a:ln>
-        </p:spPr>
-        <p:style>
-          <a:lnRef idx="2">
-            <a:schemeClr val="accent1"/>
-          </a:lnRef>
-          <a:fillRef idx="0">
-            <a:schemeClr val="accent1"/>
-          </a:fillRef>
-          <a:effectRef idx="1">
-            <a:schemeClr val="accent1"/>
-          </a:effectRef>
-          <a:fontRef idx="minor">
-            <a:schemeClr val="tx1"/>
-          </a:fontRef>
-        </p:style>
-      </p:cxnSp>
-      <p:cxnSp>
-        <p:nvCxnSpPr>
-          <p:cNvPr id="11" name="Connector: Elbow 10">
-            <a:extLst>
-              <a:ext uri="{FF2B5EF4-FFF2-40B4-BE49-F238E27FC236}">
-                <a16:creationId xmlns:a16="http://schemas.microsoft.com/office/drawing/2014/main" id="{4C090FD7-83A6-1D2A-A156-108E8AD6F74F}"/>
-              </a:ext>
-            </a:extLst>
-          </p:cNvPr>
-          <p:cNvCxnSpPr>
-            <a:cxnSpLocks/>
-          </p:cNvCxnSpPr>
-          <p:nvPr/>
-        </p:nvCxnSpPr>
-        <p:spPr>
-          <a:xfrm rot="10800000">
-            <a:off x="6812992" y="2396806"/>
-            <a:ext cx="1974392" cy="784748"/>
-          </a:xfrm>
-          <a:prstGeom prst="bentConnector3">
-            <a:avLst>
-              <a:gd name="adj1" fmla="val -18"/>
-            </a:avLst>
-          </a:prstGeom>
-          <a:ln>
-            <a:solidFill>
-              <a:schemeClr val="accent6">
-                <a:lumMod val="75000"/>
-              </a:schemeClr>
-            </a:solidFill>
-          </a:ln>
-        </p:spPr>
-        <p:style>
-          <a:lnRef idx="2">
-            <a:schemeClr val="accent1"/>
-          </a:lnRef>
-          <a:fillRef idx="0">
-            <a:schemeClr val="accent1"/>
-          </a:fillRef>
-          <a:effectRef idx="1">
-            <a:schemeClr val="accent1"/>
-          </a:effectRef>
-          <a:fontRef idx="minor">
-            <a:schemeClr val="tx1"/>
-          </a:fontRef>
-        </p:style>
-      </p:cxnSp>
-      <p:cxnSp>
-        <p:nvCxnSpPr>
-          <p:cNvPr id="16" name="Connector: Elbow 15">
-            <a:extLst>
-              <a:ext uri="{FF2B5EF4-FFF2-40B4-BE49-F238E27FC236}">
-                <a16:creationId xmlns:a16="http://schemas.microsoft.com/office/drawing/2014/main" id="{9D15E74D-94FD-6DB4-4305-E49D6948E764}"/>
-              </a:ext>
-            </a:extLst>
-          </p:cNvPr>
-          <p:cNvCxnSpPr>
-            <a:cxnSpLocks/>
-            <a:stCxn id="6" idx="3"/>
-          </p:cNvCxnSpPr>
-          <p:nvPr/>
-        </p:nvCxnSpPr>
-        <p:spPr>
-          <a:xfrm>
-            <a:off x="4818888" y="1499344"/>
-            <a:ext cx="3915900" cy="378684"/>
-          </a:xfrm>
-          <a:prstGeom prst="bentConnector3">
-            <a:avLst>
-              <a:gd name="adj1" fmla="val 99738"/>
-            </a:avLst>
-          </a:prstGeom>
-          <a:ln>
-            <a:solidFill>
-              <a:srgbClr val="C00000"/>
-            </a:solidFill>
-          </a:ln>
-        </p:spPr>
-        <p:style>
-          <a:lnRef idx="2">
-            <a:schemeClr val="accent1"/>
-          </a:lnRef>
-          <a:fillRef idx="0">
-            <a:schemeClr val="accent1"/>
-          </a:fillRef>
-          <a:effectRef idx="1">
-            <a:schemeClr val="accent1"/>
-          </a:effectRef>
-          <a:fontRef idx="minor">
-            <a:schemeClr val="tx1"/>
-          </a:fontRef>
-        </p:style>
-      </p:cxnSp>
-      <p:cxnSp>
-        <p:nvCxnSpPr>
-          <p:cNvPr id="18" name="Connector: Elbow 17">
-            <a:extLst>
-              <a:ext uri="{FF2B5EF4-FFF2-40B4-BE49-F238E27FC236}">
-                <a16:creationId xmlns:a16="http://schemas.microsoft.com/office/drawing/2014/main" id="{443411A4-6C24-CE15-288A-37AA63F846FB}"/>
-              </a:ext>
-            </a:extLst>
-          </p:cNvPr>
-          <p:cNvCxnSpPr>
-            <a:cxnSpLocks/>
-            <a:stCxn id="6" idx="1"/>
-          </p:cNvCxnSpPr>
-          <p:nvPr/>
-        </p:nvCxnSpPr>
-        <p:spPr>
-          <a:xfrm rot="10800000" flipV="1">
-            <a:off x="2304972" y="1499344"/>
-            <a:ext cx="1972799" cy="403670"/>
-          </a:xfrm>
-          <a:prstGeom prst="bentConnector3">
-            <a:avLst>
-              <a:gd name="adj1" fmla="val 99131"/>
-            </a:avLst>
-          </a:prstGeom>
-          <a:ln>
-            <a:solidFill>
-              <a:srgbClr val="C00000"/>
-            </a:solidFill>
-          </a:ln>
-        </p:spPr>
-        <p:style>
-          <a:lnRef idx="2">
-            <a:schemeClr val="accent1"/>
-          </a:lnRef>
-          <a:fillRef idx="0">
-            <a:schemeClr val="accent1"/>
-          </a:fillRef>
-          <a:effectRef idx="1">
-            <a:schemeClr val="accent1"/>
-          </a:effectRef>
-          <a:fontRef idx="minor">
-            <a:schemeClr val="tx1"/>
-          </a:fontRef>
-        </p:style>
-      </p:cxnSp>
       <p:pic>
         <p:nvPicPr>
-          <p:cNvPr id="27" name="Picture 26" descr="TM221CE16R Schneider Electric Modicon M221 PLC CPU Mini USB Interface –  Ralakde Automation">
-            <a:extLst>
-              <a:ext uri="{FF2B5EF4-FFF2-40B4-BE49-F238E27FC236}">
-                <a16:creationId xmlns:a16="http://schemas.microsoft.com/office/drawing/2014/main" id="{A1A9A7EE-B4C7-250B-71C9-F8F4124DC28E}"/>
+          <p:cNvPr id="42" name="Picture 41" descr="TM221CE16R Schneider Electric Modicon M221 PLC CPU Mini USB Interface –  Ralakde Automation">
+            <a:extLst>
+              <a:ext uri="{FF2B5EF4-FFF2-40B4-BE49-F238E27FC236}">
+                <a16:creationId xmlns:a16="http://schemas.microsoft.com/office/drawing/2014/main" id="{2F091C9B-1571-8FDF-57C3-4311E0CB97FD}"/>
               </a:ext>
             </a:extLst>
           </p:cNvPr>
@@ -5120,7 +6300,7 @@
           <p:nvPr/>
         </p:nvPicPr>
         <p:blipFill>
-          <a:blip r:embed="rId3">
+          <a:blip r:embed="rId12">
             <a:extLst>
               <a:ext uri="{28A0092B-C50C-407E-A947-70E740481C1C}">
                 <a14:useLocalDpi xmlns:a14="http://schemas.microsoft.com/office/drawing/2010/main" val="0"/>
@@ -5134,8 +6314,8 @@
         </p:blipFill>
         <p:spPr bwMode="auto">
           <a:xfrm>
-            <a:off x="8516825" y="3181554"/>
-            <a:ext cx="541118" cy="593226"/>
+            <a:off x="8291538" y="5167333"/>
+            <a:ext cx="642302" cy="704154"/>
           </a:xfrm>
           <a:prstGeom prst="rect">
             <a:avLst/>
@@ -5152,149 +6332,12 @@
           </a:extLst>
         </p:spPr>
       </p:pic>
-      <p:cxnSp>
-        <p:nvCxnSpPr>
-          <p:cNvPr id="28" name="Connector: Elbow 27">
-            <a:extLst>
-              <a:ext uri="{FF2B5EF4-FFF2-40B4-BE49-F238E27FC236}">
-                <a16:creationId xmlns:a16="http://schemas.microsoft.com/office/drawing/2014/main" id="{B143E3D0-9CF7-79E5-493D-7722E2C39E40}"/>
-              </a:ext>
-            </a:extLst>
-          </p:cNvPr>
-          <p:cNvCxnSpPr>
-            <a:cxnSpLocks/>
-          </p:cNvCxnSpPr>
-          <p:nvPr/>
-        </p:nvCxnSpPr>
-        <p:spPr>
-          <a:xfrm rot="10800000">
-            <a:off x="7196329" y="2773491"/>
-            <a:ext cx="1320497" cy="633736"/>
-          </a:xfrm>
-          <a:prstGeom prst="bentConnector3">
-            <a:avLst>
-              <a:gd name="adj1" fmla="val 100550"/>
-            </a:avLst>
-          </a:prstGeom>
-          <a:ln>
-            <a:solidFill>
-              <a:srgbClr val="C00000"/>
-            </a:solidFill>
-          </a:ln>
-        </p:spPr>
-        <p:style>
-          <a:lnRef idx="2">
-            <a:schemeClr val="accent1"/>
-          </a:lnRef>
-          <a:fillRef idx="0">
-            <a:schemeClr val="accent1"/>
-          </a:fillRef>
-          <a:effectRef idx="1">
-            <a:schemeClr val="accent1"/>
-          </a:effectRef>
-          <a:fontRef idx="minor">
-            <a:schemeClr val="tx1"/>
-          </a:fontRef>
-        </p:style>
-      </p:cxnSp>
-      <p:cxnSp>
-        <p:nvCxnSpPr>
-          <p:cNvPr id="35" name="Connector: Elbow 34">
-            <a:extLst>
-              <a:ext uri="{FF2B5EF4-FFF2-40B4-BE49-F238E27FC236}">
-                <a16:creationId xmlns:a16="http://schemas.microsoft.com/office/drawing/2014/main" id="{B6D6E6CE-A37B-5E25-B627-A48B38539CDF}"/>
-              </a:ext>
-            </a:extLst>
-          </p:cNvPr>
-          <p:cNvCxnSpPr>
-            <a:cxnSpLocks/>
-          </p:cNvCxnSpPr>
-          <p:nvPr/>
-        </p:nvCxnSpPr>
-        <p:spPr>
-          <a:xfrm rot="10800000" flipV="1">
-            <a:off x="7114034" y="3632406"/>
-            <a:ext cx="1402790" cy="775000"/>
-          </a:xfrm>
-          <a:prstGeom prst="bentConnector3">
-            <a:avLst>
-              <a:gd name="adj1" fmla="val 99540"/>
-            </a:avLst>
-          </a:prstGeom>
-          <a:ln>
-            <a:solidFill>
-              <a:srgbClr val="C00000"/>
-            </a:solidFill>
-          </a:ln>
-        </p:spPr>
-        <p:style>
-          <a:lnRef idx="2">
-            <a:schemeClr val="accent1"/>
-          </a:lnRef>
-          <a:fillRef idx="0">
-            <a:schemeClr val="accent1"/>
-          </a:fillRef>
-          <a:effectRef idx="1">
-            <a:schemeClr val="accent1"/>
-          </a:effectRef>
-          <a:fontRef idx="minor">
-            <a:schemeClr val="tx1"/>
-          </a:fontRef>
-        </p:style>
-      </p:cxnSp>
-      <p:cxnSp>
-        <p:nvCxnSpPr>
-          <p:cNvPr id="39" name="Connector: Elbow 38">
-            <a:extLst>
-              <a:ext uri="{FF2B5EF4-FFF2-40B4-BE49-F238E27FC236}">
-                <a16:creationId xmlns:a16="http://schemas.microsoft.com/office/drawing/2014/main" id="{12F22D0D-F842-E71E-9256-21714C19A98C}"/>
-              </a:ext>
-            </a:extLst>
-          </p:cNvPr>
-          <p:cNvCxnSpPr>
-            <a:cxnSpLocks/>
-            <a:endCxn id="27" idx="3"/>
-          </p:cNvCxnSpPr>
-          <p:nvPr/>
-        </p:nvCxnSpPr>
-        <p:spPr>
-          <a:xfrm rot="16200000" flipH="1">
-            <a:off x="8212894" y="2633118"/>
-            <a:ext cx="1481666" cy="208432"/>
-          </a:xfrm>
-          <a:prstGeom prst="bentConnector4">
-            <a:avLst>
-              <a:gd name="adj1" fmla="val -123"/>
-              <a:gd name="adj2" fmla="val 209676"/>
-            </a:avLst>
-          </a:prstGeom>
-          <a:ln>
-            <a:solidFill>
-              <a:srgbClr val="C00000"/>
-            </a:solidFill>
-          </a:ln>
-        </p:spPr>
-        <p:style>
-          <a:lnRef idx="2">
-            <a:schemeClr val="accent1"/>
-          </a:lnRef>
-          <a:fillRef idx="0">
-            <a:schemeClr val="accent1"/>
-          </a:fillRef>
-          <a:effectRef idx="1">
-            <a:schemeClr val="accent1"/>
-          </a:effectRef>
-          <a:fontRef idx="minor">
-            <a:schemeClr val="tx1"/>
-          </a:fontRef>
-        </p:style>
-      </p:cxnSp>
       <p:pic>
         <p:nvPicPr>
-          <p:cNvPr id="45" name="Picture 44" descr="TM221CE16R Schneider Electric Modicon M221 PLC CPU Mini USB Interface –  Ralakde Automation">
-            <a:extLst>
-              <a:ext uri="{FF2B5EF4-FFF2-40B4-BE49-F238E27FC236}">
-                <a16:creationId xmlns:a16="http://schemas.microsoft.com/office/drawing/2014/main" id="{CC7BD3C5-BF9E-E679-D0A3-E151C841577B}"/>
+          <p:cNvPr id="43" name="Picture 42" descr="TM221CE16R Schneider Electric Modicon M221 PLC CPU Mini USB Interface –  Ralakde Automation">
+            <a:extLst>
+              <a:ext uri="{FF2B5EF4-FFF2-40B4-BE49-F238E27FC236}">
+                <a16:creationId xmlns:a16="http://schemas.microsoft.com/office/drawing/2014/main" id="{2794A28D-67F7-634C-2380-43CCA57A2DE4}"/>
               </a:ext>
             </a:extLst>
           </p:cNvPr>
@@ -5304,7 +6347,7 @@
           <p:nvPr/>
         </p:nvPicPr>
         <p:blipFill>
-          <a:blip r:embed="rId3">
+          <a:blip r:embed="rId12">
             <a:extLst>
               <a:ext uri="{28A0092B-C50C-407E-A947-70E740481C1C}">
                 <a14:useLocalDpi xmlns:a14="http://schemas.microsoft.com/office/drawing/2010/main" val="0"/>
@@ -5318,8 +6361,8 @@
         </p:blipFill>
         <p:spPr bwMode="auto">
           <a:xfrm>
-            <a:off x="1906397" y="3687270"/>
-            <a:ext cx="541118" cy="593226"/>
+            <a:off x="7496902" y="5170760"/>
+            <a:ext cx="653959" cy="716933"/>
           </a:xfrm>
           <a:prstGeom prst="rect">
             <a:avLst/>
@@ -5336,35 +6379,118 @@
           </a:extLst>
         </p:spPr>
       </p:pic>
+      <p:sp>
+        <p:nvSpPr>
+          <p:cNvPr id="44" name="Rectangle 43">
+            <a:extLst>
+              <a:ext uri="{FF2B5EF4-FFF2-40B4-BE49-F238E27FC236}">
+                <a16:creationId xmlns:a16="http://schemas.microsoft.com/office/drawing/2014/main" id="{16260A5D-1A16-3BB9-C38C-E15F7A2DCEA6}"/>
+              </a:ext>
+            </a:extLst>
+          </p:cNvPr>
+          <p:cNvSpPr/>
+          <p:nvPr/>
+        </p:nvSpPr>
+        <p:spPr>
+          <a:xfrm>
+            <a:off x="7340387" y="5043574"/>
+            <a:ext cx="2535134" cy="1043942"/>
+          </a:xfrm>
+          <a:prstGeom prst="rect">
+            <a:avLst/>
+          </a:prstGeom>
+          <a:noFill/>
+          <a:ln>
+            <a:prstDash val="sysDash"/>
+          </a:ln>
+        </p:spPr>
+        <p:style>
+          <a:lnRef idx="2">
+            <a:schemeClr val="accent1">
+              <a:shade val="15000"/>
+            </a:schemeClr>
+          </a:lnRef>
+          <a:fillRef idx="1">
+            <a:schemeClr val="accent1"/>
+          </a:fillRef>
+          <a:effectRef idx="0">
+            <a:schemeClr val="accent1"/>
+          </a:effectRef>
+          <a:fontRef idx="minor">
+            <a:schemeClr val="lt1"/>
+          </a:fontRef>
+        </p:style>
+        <p:txBody>
+          <a:bodyPr rtlCol="0" anchor="ctr"/>
+          <a:lstStyle/>
+          <a:p>
+            <a:pPr algn="ctr"/>
+            <a:endParaRPr lang="en-SG" dirty="0"/>
+          </a:p>
+        </p:txBody>
+      </p:sp>
+      <p:sp>
+        <p:nvSpPr>
+          <p:cNvPr id="45" name="TextBox 44">
+            <a:extLst>
+              <a:ext uri="{FF2B5EF4-FFF2-40B4-BE49-F238E27FC236}">
+                <a16:creationId xmlns:a16="http://schemas.microsoft.com/office/drawing/2014/main" id="{8249ECC3-CBEF-20A7-7D38-69AB912C885A}"/>
+              </a:ext>
+            </a:extLst>
+          </p:cNvPr>
+          <p:cNvSpPr txBox="1"/>
+          <p:nvPr/>
+        </p:nvSpPr>
+        <p:spPr>
+          <a:xfrm>
+            <a:off x="7408964" y="5779739"/>
+            <a:ext cx="2729733" cy="307777"/>
+          </a:xfrm>
+          <a:prstGeom prst="rect">
+            <a:avLst/>
+          </a:prstGeom>
+          <a:noFill/>
+        </p:spPr>
+        <p:txBody>
+          <a:bodyPr wrap="square">
+            <a:spAutoFit/>
+          </a:bodyPr>
+          <a:lstStyle/>
+          <a:p>
+            <a:r>
+              <a:rPr lang="en-US" sz="1400" b="1" dirty="0"/>
+              <a:t>Railway Station Control PLCs </a:t>
+            </a:r>
+            <a:endParaRPr lang="en-SG" sz="1400" b="1" dirty="0"/>
+          </a:p>
+        </p:txBody>
+      </p:sp>
       <p:cxnSp>
         <p:nvCxnSpPr>
-          <p:cNvPr id="46" name="Connector: Elbow 45">
-            <a:extLst>
-              <a:ext uri="{FF2B5EF4-FFF2-40B4-BE49-F238E27FC236}">
-                <a16:creationId xmlns:a16="http://schemas.microsoft.com/office/drawing/2014/main" id="{485F5F6B-8AFC-951D-3017-E439F49161CE}"/>
+          <p:cNvPr id="46" name="Straight Connector 45">
+            <a:extLst>
+              <a:ext uri="{FF2B5EF4-FFF2-40B4-BE49-F238E27FC236}">
+                <a16:creationId xmlns:a16="http://schemas.microsoft.com/office/drawing/2014/main" id="{54996705-0DC8-AD69-B1D9-A274E61CEB40}"/>
               </a:ext>
             </a:extLst>
           </p:cNvPr>
           <p:cNvCxnSpPr>
             <a:cxnSpLocks/>
-            <a:endCxn id="45" idx="3"/>
           </p:cNvCxnSpPr>
           <p:nvPr/>
         </p:nvCxnSpPr>
         <p:spPr>
-          <a:xfrm rot="10800000" flipV="1">
-            <a:off x="2447516" y="2926015"/>
-            <a:ext cx="1228373" cy="1057867"/>
-          </a:xfrm>
-          <a:prstGeom prst="bentConnector3">
-            <a:avLst>
-              <a:gd name="adj1" fmla="val 125"/>
-            </a:avLst>
+          <a:xfrm>
+            <a:off x="777240" y="6471573"/>
+            <a:ext cx="8846820" cy="0"/>
+          </a:xfrm>
+          <a:prstGeom prst="line">
+            <a:avLst/>
           </a:prstGeom>
           <a:ln>
             <a:solidFill>
-              <a:schemeClr val="accent6">
-                <a:lumMod val="75000"/>
+              <a:schemeClr val="bg2">
+                <a:lumMod val="50000"/>
               </a:schemeClr>
             </a:solidFill>
           </a:ln>
@@ -5386,10 +6512,10 @@
       </p:cxnSp>
       <p:cxnSp>
         <p:nvCxnSpPr>
-          <p:cNvPr id="49" name="Connector: Elbow 48">
-            <a:extLst>
-              <a:ext uri="{FF2B5EF4-FFF2-40B4-BE49-F238E27FC236}">
-                <a16:creationId xmlns:a16="http://schemas.microsoft.com/office/drawing/2014/main" id="{98C2932B-862B-AE21-E3F1-8D9D19F28311}"/>
+          <p:cNvPr id="51" name="Straight Connector 50">
+            <a:extLst>
+              <a:ext uri="{FF2B5EF4-FFF2-40B4-BE49-F238E27FC236}">
+                <a16:creationId xmlns:a16="http://schemas.microsoft.com/office/drawing/2014/main" id="{ADC4770C-99CF-15D0-5A51-870826C36931}"/>
               </a:ext>
             </a:extLst>
           </p:cNvPr>
@@ -5399,18 +6525,18 @@
           <p:nvPr/>
         </p:nvCxnSpPr>
         <p:spPr>
-          <a:xfrm rot="5400000" flipH="1" flipV="1">
-            <a:off x="2320794" y="2900214"/>
-            <a:ext cx="1001290" cy="747844"/>
-          </a:xfrm>
-          <a:prstGeom prst="bentConnector3">
-            <a:avLst>
-              <a:gd name="adj1" fmla="val 1599"/>
-            </a:avLst>
+          <a:xfrm>
+            <a:off x="777240" y="6250670"/>
+            <a:ext cx="0" cy="220903"/>
+          </a:xfrm>
+          <a:prstGeom prst="line">
+            <a:avLst/>
           </a:prstGeom>
           <a:ln>
             <a:solidFill>
-              <a:srgbClr val="C00000"/>
+              <a:schemeClr val="bg2">
+                <a:lumMod val="50000"/>
+              </a:schemeClr>
             </a:solidFill>
           </a:ln>
         </p:spPr>
@@ -5431,10 +6557,10 @@
       </p:cxnSp>
       <p:cxnSp>
         <p:nvCxnSpPr>
-          <p:cNvPr id="56" name="Straight Connector 55">
-            <a:extLst>
-              <a:ext uri="{FF2B5EF4-FFF2-40B4-BE49-F238E27FC236}">
-                <a16:creationId xmlns:a16="http://schemas.microsoft.com/office/drawing/2014/main" id="{9C1BC191-8679-9556-A8D0-606E91BCAB7D}"/>
+          <p:cNvPr id="54" name="Straight Connector 53">
+            <a:extLst>
+              <a:ext uri="{FF2B5EF4-FFF2-40B4-BE49-F238E27FC236}">
+                <a16:creationId xmlns:a16="http://schemas.microsoft.com/office/drawing/2014/main" id="{0393EE44-7DF9-1C56-18B7-A37ACF831F18}"/>
               </a:ext>
             </a:extLst>
           </p:cNvPr>
@@ -5445,15 +6571,17 @@
         </p:nvCxnSpPr>
         <p:spPr>
           <a:xfrm>
-            <a:off x="2368980" y="4225630"/>
-            <a:ext cx="0" cy="840144"/>
+            <a:off x="2644140" y="6259907"/>
+            <a:ext cx="0" cy="220903"/>
           </a:xfrm>
           <a:prstGeom prst="line">
             <a:avLst/>
           </a:prstGeom>
           <a:ln>
             <a:solidFill>
-              <a:srgbClr val="C00000"/>
+              <a:schemeClr val="bg2">
+                <a:lumMod val="50000"/>
+              </a:schemeClr>
             </a:solidFill>
           </a:ln>
         </p:spPr>
@@ -5474,10 +6602,10 @@
       </p:cxnSp>
       <p:cxnSp>
         <p:nvCxnSpPr>
-          <p:cNvPr id="59" name="Connector: Elbow 58">
-            <a:extLst>
-              <a:ext uri="{FF2B5EF4-FFF2-40B4-BE49-F238E27FC236}">
-                <a16:creationId xmlns:a16="http://schemas.microsoft.com/office/drawing/2014/main" id="{FD7DAD94-6CA3-90A3-CF79-9E590212BB52}"/>
+          <p:cNvPr id="55" name="Straight Connector 54">
+            <a:extLst>
+              <a:ext uri="{FF2B5EF4-FFF2-40B4-BE49-F238E27FC236}">
+                <a16:creationId xmlns:a16="http://schemas.microsoft.com/office/drawing/2014/main" id="{8F824853-A5D8-E94C-EF8C-A851AC6BCD0A}"/>
               </a:ext>
             </a:extLst>
           </p:cNvPr>
@@ -5488,17 +6616,17 @@
         </p:nvCxnSpPr>
         <p:spPr>
           <a:xfrm>
-            <a:off x="2401454" y="4178187"/>
-            <a:ext cx="6115369" cy="1033893"/>
-          </a:xfrm>
-          <a:prstGeom prst="bentConnector3">
-            <a:avLst>
-              <a:gd name="adj1" fmla="val 50000"/>
-            </a:avLst>
+            <a:off x="4468687" y="6259907"/>
+            <a:ext cx="0" cy="209473"/>
+          </a:xfrm>
+          <a:prstGeom prst="line">
+            <a:avLst/>
           </a:prstGeom>
           <a:ln>
             <a:solidFill>
-              <a:srgbClr val="C00000"/>
+              <a:schemeClr val="bg2">
+                <a:lumMod val="50000"/>
+              </a:schemeClr>
             </a:solidFill>
           </a:ln>
         </p:spPr>
@@ -5517,144 +6645,12 @@
           </a:fontRef>
         </p:style>
       </p:cxnSp>
-      <p:sp>
-        <p:nvSpPr>
-          <p:cNvPr id="63" name="TextBox 62">
-            <a:extLst>
-              <a:ext uri="{FF2B5EF4-FFF2-40B4-BE49-F238E27FC236}">
-                <a16:creationId xmlns:a16="http://schemas.microsoft.com/office/drawing/2014/main" id="{1B12D4FC-7282-10D8-6243-02D499FA600E}"/>
-              </a:ext>
-            </a:extLst>
-          </p:cNvPr>
-          <p:cNvSpPr txBox="1"/>
-          <p:nvPr/>
-        </p:nvSpPr>
-        <p:spPr>
-          <a:xfrm>
-            <a:off x="4738332" y="1197149"/>
-            <a:ext cx="720806" cy="307777"/>
-          </a:xfrm>
-          <a:prstGeom prst="rect">
-            <a:avLst/>
-          </a:prstGeom>
-          <a:noFill/>
-        </p:spPr>
-        <p:txBody>
-          <a:bodyPr wrap="square" rtlCol="0">
-            <a:spAutoFit/>
-          </a:bodyPr>
-          <a:lstStyle/>
-          <a:p>
-            <a:r>
-              <a:rPr lang="en-US" sz="1400" b="1" dirty="0">
-                <a:solidFill>
-                  <a:srgbClr val="C00000"/>
-                </a:solidFill>
-              </a:rPr>
-              <a:t>PLC2</a:t>
-            </a:r>
-            <a:endParaRPr lang="en-SG" sz="1400" b="1" dirty="0">
-              <a:solidFill>
-                <a:srgbClr val="C00000"/>
-              </a:solidFill>
-            </a:endParaRPr>
-          </a:p>
-        </p:txBody>
-      </p:sp>
-      <p:sp>
-        <p:nvSpPr>
-          <p:cNvPr id="64" name="TextBox 63">
-            <a:extLst>
-              <a:ext uri="{FF2B5EF4-FFF2-40B4-BE49-F238E27FC236}">
-                <a16:creationId xmlns:a16="http://schemas.microsoft.com/office/drawing/2014/main" id="{85F1A20D-6E69-4CCC-D612-5076FB3C48BD}"/>
-              </a:ext>
-            </a:extLst>
-          </p:cNvPr>
-          <p:cNvSpPr txBox="1"/>
-          <p:nvPr/>
-        </p:nvSpPr>
-        <p:spPr>
-          <a:xfrm>
-            <a:off x="8516146" y="3744255"/>
-            <a:ext cx="720806" cy="307777"/>
-          </a:xfrm>
-          <a:prstGeom prst="rect">
-            <a:avLst/>
-          </a:prstGeom>
-          <a:noFill/>
-        </p:spPr>
-        <p:txBody>
-          <a:bodyPr wrap="square" rtlCol="0">
-            <a:spAutoFit/>
-          </a:bodyPr>
-          <a:lstStyle/>
-          <a:p>
-            <a:r>
-              <a:rPr lang="en-US" sz="1400" b="1" dirty="0">
-                <a:solidFill>
-                  <a:srgbClr val="C00000"/>
-                </a:solidFill>
-              </a:rPr>
-              <a:t>PLC1</a:t>
-            </a:r>
-            <a:endParaRPr lang="en-SG" sz="1400" b="1" dirty="0">
-              <a:solidFill>
-                <a:srgbClr val="C00000"/>
-              </a:solidFill>
-            </a:endParaRPr>
-          </a:p>
-        </p:txBody>
-      </p:sp>
-      <p:sp>
-        <p:nvSpPr>
-          <p:cNvPr id="65" name="TextBox 64">
-            <a:extLst>
-              <a:ext uri="{FF2B5EF4-FFF2-40B4-BE49-F238E27FC236}">
-                <a16:creationId xmlns:a16="http://schemas.microsoft.com/office/drawing/2014/main" id="{D5BA2788-A086-74DF-3E15-D5460526231A}"/>
-              </a:ext>
-            </a:extLst>
-          </p:cNvPr>
-          <p:cNvSpPr txBox="1"/>
-          <p:nvPr/>
-        </p:nvSpPr>
-        <p:spPr>
-          <a:xfrm>
-            <a:off x="1635009" y="4225630"/>
-            <a:ext cx="612443" cy="307777"/>
-          </a:xfrm>
-          <a:prstGeom prst="rect">
-            <a:avLst/>
-          </a:prstGeom>
-          <a:noFill/>
-        </p:spPr>
-        <p:txBody>
-          <a:bodyPr wrap="square" rtlCol="0">
-            <a:spAutoFit/>
-          </a:bodyPr>
-          <a:lstStyle/>
-          <a:p>
-            <a:r>
-              <a:rPr lang="en-US" sz="1400" b="1" dirty="0">
-                <a:solidFill>
-                  <a:srgbClr val="C00000"/>
-                </a:solidFill>
-              </a:rPr>
-              <a:t>PLC0</a:t>
-            </a:r>
-            <a:endParaRPr lang="en-SG" sz="1400" b="1" dirty="0">
-              <a:solidFill>
-                <a:srgbClr val="C00000"/>
-              </a:solidFill>
-            </a:endParaRPr>
-          </a:p>
-        </p:txBody>
-      </p:sp>
       <p:cxnSp>
         <p:nvCxnSpPr>
-          <p:cNvPr id="71" name="Straight Connector 70">
-            <a:extLst>
-              <a:ext uri="{FF2B5EF4-FFF2-40B4-BE49-F238E27FC236}">
-                <a16:creationId xmlns:a16="http://schemas.microsoft.com/office/drawing/2014/main" id="{64A66C3E-65EF-714A-DE82-2D3C862DF12F}"/>
+          <p:cNvPr id="58" name="Straight Connector 57">
+            <a:extLst>
+              <a:ext uri="{FF2B5EF4-FFF2-40B4-BE49-F238E27FC236}">
+                <a16:creationId xmlns:a16="http://schemas.microsoft.com/office/drawing/2014/main" id="{DA81491B-B0A8-E353-2807-FBA3B98CC0B6}"/>
               </a:ext>
             </a:extLst>
           </p:cNvPr>
@@ -5665,15 +6661,17 @@
         </p:nvCxnSpPr>
         <p:spPr>
           <a:xfrm>
-            <a:off x="2211168" y="4196475"/>
-            <a:ext cx="0" cy="1033893"/>
+            <a:off x="6267450" y="6233467"/>
+            <a:ext cx="0" cy="220903"/>
           </a:xfrm>
           <a:prstGeom prst="line">
             <a:avLst/>
           </a:prstGeom>
           <a:ln>
             <a:solidFill>
-              <a:srgbClr val="C00000"/>
+              <a:schemeClr val="bg2">
+                <a:lumMod val="50000"/>
+              </a:schemeClr>
             </a:solidFill>
           </a:ln>
         </p:spPr>
@@ -5692,10 +6690,664 @@
           </a:fontRef>
         </p:style>
       </p:cxnSp>
+      <p:cxnSp>
+        <p:nvCxnSpPr>
+          <p:cNvPr id="59" name="Straight Connector 58">
+            <a:extLst>
+              <a:ext uri="{FF2B5EF4-FFF2-40B4-BE49-F238E27FC236}">
+                <a16:creationId xmlns:a16="http://schemas.microsoft.com/office/drawing/2014/main" id="{76DB9782-618B-8914-1FCE-0382EC0D216F}"/>
+              </a:ext>
+            </a:extLst>
+          </p:cNvPr>
+          <p:cNvCxnSpPr>
+            <a:cxnSpLocks/>
+          </p:cNvCxnSpPr>
+          <p:nvPr/>
+        </p:nvCxnSpPr>
+        <p:spPr>
+          <a:xfrm>
+            <a:off x="7810500" y="5809672"/>
+            <a:ext cx="0" cy="644698"/>
+          </a:xfrm>
+          <a:prstGeom prst="line">
+            <a:avLst/>
+          </a:prstGeom>
+          <a:ln>
+            <a:solidFill>
+              <a:schemeClr val="bg2">
+                <a:lumMod val="50000"/>
+              </a:schemeClr>
+            </a:solidFill>
+          </a:ln>
+        </p:spPr>
+        <p:style>
+          <a:lnRef idx="2">
+            <a:schemeClr val="accent1"/>
+          </a:lnRef>
+          <a:fillRef idx="0">
+            <a:schemeClr val="accent1"/>
+          </a:fillRef>
+          <a:effectRef idx="1">
+            <a:schemeClr val="accent1"/>
+          </a:effectRef>
+          <a:fontRef idx="minor">
+            <a:schemeClr val="tx1"/>
+          </a:fontRef>
+        </p:style>
+      </p:cxnSp>
+      <p:cxnSp>
+        <p:nvCxnSpPr>
+          <p:cNvPr id="61" name="Straight Connector 60">
+            <a:extLst>
+              <a:ext uri="{FF2B5EF4-FFF2-40B4-BE49-F238E27FC236}">
+                <a16:creationId xmlns:a16="http://schemas.microsoft.com/office/drawing/2014/main" id="{49DBB59C-BC0D-2395-8E17-DD4F893F3375}"/>
+              </a:ext>
+            </a:extLst>
+          </p:cNvPr>
+          <p:cNvCxnSpPr>
+            <a:cxnSpLocks/>
+          </p:cNvCxnSpPr>
+          <p:nvPr/>
+        </p:nvCxnSpPr>
+        <p:spPr>
+          <a:xfrm>
+            <a:off x="8610600" y="5809672"/>
+            <a:ext cx="0" cy="659708"/>
+          </a:xfrm>
+          <a:prstGeom prst="line">
+            <a:avLst/>
+          </a:prstGeom>
+          <a:ln>
+            <a:solidFill>
+              <a:schemeClr val="bg2">
+                <a:lumMod val="50000"/>
+              </a:schemeClr>
+            </a:solidFill>
+          </a:ln>
+        </p:spPr>
+        <p:style>
+          <a:lnRef idx="2">
+            <a:schemeClr val="accent1"/>
+          </a:lnRef>
+          <a:fillRef idx="0">
+            <a:schemeClr val="accent1"/>
+          </a:fillRef>
+          <a:effectRef idx="1">
+            <a:schemeClr val="accent1"/>
+          </a:effectRef>
+          <a:fontRef idx="minor">
+            <a:schemeClr val="tx1"/>
+          </a:fontRef>
+        </p:style>
+      </p:cxnSp>
+      <p:cxnSp>
+        <p:nvCxnSpPr>
+          <p:cNvPr id="63" name="Straight Connector 62">
+            <a:extLst>
+              <a:ext uri="{FF2B5EF4-FFF2-40B4-BE49-F238E27FC236}">
+                <a16:creationId xmlns:a16="http://schemas.microsoft.com/office/drawing/2014/main" id="{43BC4A5D-A971-24A9-255E-3B1111B2432E}"/>
+              </a:ext>
+            </a:extLst>
+          </p:cNvPr>
+          <p:cNvCxnSpPr>
+            <a:cxnSpLocks/>
+          </p:cNvCxnSpPr>
+          <p:nvPr/>
+        </p:nvCxnSpPr>
+        <p:spPr>
+          <a:xfrm>
+            <a:off x="9376410" y="5809672"/>
+            <a:ext cx="0" cy="659708"/>
+          </a:xfrm>
+          <a:prstGeom prst="line">
+            <a:avLst/>
+          </a:prstGeom>
+          <a:ln>
+            <a:solidFill>
+              <a:schemeClr val="bg2">
+                <a:lumMod val="50000"/>
+              </a:schemeClr>
+            </a:solidFill>
+          </a:ln>
+        </p:spPr>
+        <p:style>
+          <a:lnRef idx="2">
+            <a:schemeClr val="accent1"/>
+          </a:lnRef>
+          <a:fillRef idx="0">
+            <a:schemeClr val="accent1"/>
+          </a:fillRef>
+          <a:effectRef idx="1">
+            <a:schemeClr val="accent1"/>
+          </a:effectRef>
+          <a:fontRef idx="minor">
+            <a:schemeClr val="tx1"/>
+          </a:fontRef>
+        </p:style>
+      </p:cxnSp>
+      <p:cxnSp>
+        <p:nvCxnSpPr>
+          <p:cNvPr id="67" name="Straight Connector 66">
+            <a:extLst>
+              <a:ext uri="{FF2B5EF4-FFF2-40B4-BE49-F238E27FC236}">
+                <a16:creationId xmlns:a16="http://schemas.microsoft.com/office/drawing/2014/main" id="{D3052393-AC5B-8739-57F7-148272A41E92}"/>
+              </a:ext>
+            </a:extLst>
+          </p:cNvPr>
+          <p:cNvCxnSpPr>
+            <a:cxnSpLocks/>
+          </p:cNvCxnSpPr>
+          <p:nvPr/>
+        </p:nvCxnSpPr>
+        <p:spPr>
+          <a:xfrm>
+            <a:off x="7389789" y="4567479"/>
+            <a:ext cx="4171719" cy="0"/>
+          </a:xfrm>
+          <a:prstGeom prst="line">
+            <a:avLst/>
+          </a:prstGeom>
+          <a:ln>
+            <a:solidFill>
+              <a:schemeClr val="accent6">
+                <a:lumMod val="75000"/>
+              </a:schemeClr>
+            </a:solidFill>
+          </a:ln>
+        </p:spPr>
+        <p:style>
+          <a:lnRef idx="2">
+            <a:schemeClr val="accent1"/>
+          </a:lnRef>
+          <a:fillRef idx="0">
+            <a:schemeClr val="accent1"/>
+          </a:fillRef>
+          <a:effectRef idx="1">
+            <a:schemeClr val="accent1"/>
+          </a:effectRef>
+          <a:fontRef idx="minor">
+            <a:schemeClr val="tx1"/>
+          </a:fontRef>
+        </p:style>
+      </p:cxnSp>
+      <p:cxnSp>
+        <p:nvCxnSpPr>
+          <p:cNvPr id="70" name="Straight Connector 69">
+            <a:extLst>
+              <a:ext uri="{FF2B5EF4-FFF2-40B4-BE49-F238E27FC236}">
+                <a16:creationId xmlns:a16="http://schemas.microsoft.com/office/drawing/2014/main" id="{8F727531-18C1-9516-089A-0A9F4CDCAEAF}"/>
+              </a:ext>
+            </a:extLst>
+          </p:cNvPr>
+          <p:cNvCxnSpPr>
+            <a:cxnSpLocks/>
+          </p:cNvCxnSpPr>
+          <p:nvPr/>
+        </p:nvCxnSpPr>
+        <p:spPr>
+          <a:xfrm flipV="1">
+            <a:off x="7823882" y="4594977"/>
+            <a:ext cx="0" cy="564353"/>
+          </a:xfrm>
+          <a:prstGeom prst="line">
+            <a:avLst/>
+          </a:prstGeom>
+          <a:ln>
+            <a:solidFill>
+              <a:schemeClr val="accent6">
+                <a:lumMod val="75000"/>
+              </a:schemeClr>
+            </a:solidFill>
+          </a:ln>
+        </p:spPr>
+        <p:style>
+          <a:lnRef idx="2">
+            <a:schemeClr val="accent1"/>
+          </a:lnRef>
+          <a:fillRef idx="0">
+            <a:schemeClr val="accent1"/>
+          </a:fillRef>
+          <a:effectRef idx="1">
+            <a:schemeClr val="accent1"/>
+          </a:effectRef>
+          <a:fontRef idx="minor">
+            <a:schemeClr val="tx1"/>
+          </a:fontRef>
+        </p:style>
+      </p:cxnSp>
+      <p:cxnSp>
+        <p:nvCxnSpPr>
+          <p:cNvPr id="73" name="Straight Connector 72">
+            <a:extLst>
+              <a:ext uri="{FF2B5EF4-FFF2-40B4-BE49-F238E27FC236}">
+                <a16:creationId xmlns:a16="http://schemas.microsoft.com/office/drawing/2014/main" id="{B5FB425D-0BFE-AFA6-6676-DFFF649FE755}"/>
+              </a:ext>
+            </a:extLst>
+          </p:cNvPr>
+          <p:cNvCxnSpPr>
+            <a:cxnSpLocks/>
+          </p:cNvCxnSpPr>
+          <p:nvPr/>
+        </p:nvCxnSpPr>
+        <p:spPr>
+          <a:xfrm flipV="1">
+            <a:off x="8610600" y="4599223"/>
+            <a:ext cx="0" cy="564353"/>
+          </a:xfrm>
+          <a:prstGeom prst="line">
+            <a:avLst/>
+          </a:prstGeom>
+          <a:ln>
+            <a:solidFill>
+              <a:schemeClr val="accent6">
+                <a:lumMod val="75000"/>
+              </a:schemeClr>
+            </a:solidFill>
+          </a:ln>
+        </p:spPr>
+        <p:style>
+          <a:lnRef idx="2">
+            <a:schemeClr val="accent1"/>
+          </a:lnRef>
+          <a:fillRef idx="0">
+            <a:schemeClr val="accent1"/>
+          </a:fillRef>
+          <a:effectRef idx="1">
+            <a:schemeClr val="accent1"/>
+          </a:effectRef>
+          <a:fontRef idx="minor">
+            <a:schemeClr val="tx1"/>
+          </a:fontRef>
+        </p:style>
+      </p:cxnSp>
+      <p:cxnSp>
+        <p:nvCxnSpPr>
+          <p:cNvPr id="74" name="Straight Connector 73">
+            <a:extLst>
+              <a:ext uri="{FF2B5EF4-FFF2-40B4-BE49-F238E27FC236}">
+                <a16:creationId xmlns:a16="http://schemas.microsoft.com/office/drawing/2014/main" id="{E7652DB9-F8E6-5560-8DB3-F8FE3B215090}"/>
+              </a:ext>
+            </a:extLst>
+          </p:cNvPr>
+          <p:cNvCxnSpPr>
+            <a:cxnSpLocks/>
+            <a:stCxn id="41" idx="0"/>
+          </p:cNvCxnSpPr>
+          <p:nvPr/>
+        </p:nvCxnSpPr>
+        <p:spPr>
+          <a:xfrm flipV="1">
+            <a:off x="9403799" y="4567479"/>
+            <a:ext cx="0" cy="616854"/>
+          </a:xfrm>
+          <a:prstGeom prst="line">
+            <a:avLst/>
+          </a:prstGeom>
+          <a:ln>
+            <a:solidFill>
+              <a:schemeClr val="accent6">
+                <a:lumMod val="75000"/>
+              </a:schemeClr>
+            </a:solidFill>
+          </a:ln>
+        </p:spPr>
+        <p:style>
+          <a:lnRef idx="2">
+            <a:schemeClr val="accent1"/>
+          </a:lnRef>
+          <a:fillRef idx="0">
+            <a:schemeClr val="accent1"/>
+          </a:fillRef>
+          <a:effectRef idx="1">
+            <a:schemeClr val="accent1"/>
+          </a:effectRef>
+          <a:fontRef idx="minor">
+            <a:schemeClr val="tx1"/>
+          </a:fontRef>
+        </p:style>
+      </p:cxnSp>
+      <p:sp>
+        <p:nvSpPr>
+          <p:cNvPr id="76" name="TextBox 75">
+            <a:extLst>
+              <a:ext uri="{FF2B5EF4-FFF2-40B4-BE49-F238E27FC236}">
+                <a16:creationId xmlns:a16="http://schemas.microsoft.com/office/drawing/2014/main" id="{243475AB-4BD8-6C3F-C677-9D9075AF5AB6}"/>
+              </a:ext>
+            </a:extLst>
+          </p:cNvPr>
+          <p:cNvSpPr txBox="1"/>
+          <p:nvPr/>
+        </p:nvSpPr>
+        <p:spPr>
+          <a:xfrm>
+            <a:off x="7115572" y="4201934"/>
+            <a:ext cx="1108465" cy="307777"/>
+          </a:xfrm>
+          <a:prstGeom prst="rect">
+            <a:avLst/>
+          </a:prstGeom>
+          <a:noFill/>
+        </p:spPr>
+        <p:txBody>
+          <a:bodyPr wrap="square">
+            <a:spAutoFit/>
+          </a:bodyPr>
+          <a:lstStyle/>
+          <a:p>
+            <a:r>
+              <a:rPr lang="en-US" sz="1400" b="1" dirty="0"/>
+              <a:t>IEC104 Bus </a:t>
+            </a:r>
+            <a:endParaRPr lang="en-SG" sz="1400" b="1" dirty="0"/>
+          </a:p>
+        </p:txBody>
+      </p:sp>
+      <p:pic>
+        <p:nvPicPr>
+          <p:cNvPr id="77" name="Picture 76">
+            <a:extLst>
+              <a:ext uri="{FF2B5EF4-FFF2-40B4-BE49-F238E27FC236}">
+                <a16:creationId xmlns:a16="http://schemas.microsoft.com/office/drawing/2014/main" id="{A1FBD933-AE33-794A-BD7C-BCFD67CFBEB6}"/>
+              </a:ext>
+            </a:extLst>
+          </p:cNvPr>
+          <p:cNvPicPr>
+            <a:picLocks noChangeAspect="1"/>
+          </p:cNvPicPr>
+          <p:nvPr/>
+        </p:nvPicPr>
+        <p:blipFill>
+          <a:blip r:embed="rId13"/>
+          <a:stretch>
+            <a:fillRect/>
+          </a:stretch>
+        </p:blipFill>
+        <p:spPr>
+          <a:xfrm>
+            <a:off x="8869921" y="2876919"/>
+            <a:ext cx="2691587" cy="1540934"/>
+          </a:xfrm>
+          <a:prstGeom prst="rect">
+            <a:avLst/>
+          </a:prstGeom>
+          <a:ln w="12700">
+            <a:solidFill>
+              <a:schemeClr val="tx1"/>
+            </a:solidFill>
+          </a:ln>
+        </p:spPr>
+      </p:pic>
+      <p:cxnSp>
+        <p:nvCxnSpPr>
+          <p:cNvPr id="78" name="Straight Connector 77">
+            <a:extLst>
+              <a:ext uri="{FF2B5EF4-FFF2-40B4-BE49-F238E27FC236}">
+                <a16:creationId xmlns:a16="http://schemas.microsoft.com/office/drawing/2014/main" id="{E518252C-7DD7-C5A6-71FC-692840668C12}"/>
+              </a:ext>
+            </a:extLst>
+          </p:cNvPr>
+          <p:cNvCxnSpPr>
+            <a:cxnSpLocks/>
+          </p:cNvCxnSpPr>
+          <p:nvPr/>
+        </p:nvCxnSpPr>
+        <p:spPr>
+          <a:xfrm flipV="1">
+            <a:off x="8291538" y="2599263"/>
+            <a:ext cx="0" cy="1952691"/>
+          </a:xfrm>
+          <a:prstGeom prst="line">
+            <a:avLst/>
+          </a:prstGeom>
+          <a:ln>
+            <a:solidFill>
+              <a:schemeClr val="accent6">
+                <a:lumMod val="75000"/>
+              </a:schemeClr>
+            </a:solidFill>
+          </a:ln>
+        </p:spPr>
+        <p:style>
+          <a:lnRef idx="2">
+            <a:schemeClr val="accent1"/>
+          </a:lnRef>
+          <a:fillRef idx="0">
+            <a:schemeClr val="accent1"/>
+          </a:fillRef>
+          <a:effectRef idx="1">
+            <a:schemeClr val="accent1"/>
+          </a:effectRef>
+          <a:fontRef idx="minor">
+            <a:schemeClr val="tx1"/>
+          </a:fontRef>
+        </p:style>
+      </p:cxnSp>
+      <p:cxnSp>
+        <p:nvCxnSpPr>
+          <p:cNvPr id="80" name="Straight Connector 79">
+            <a:extLst>
+              <a:ext uri="{FF2B5EF4-FFF2-40B4-BE49-F238E27FC236}">
+                <a16:creationId xmlns:a16="http://schemas.microsoft.com/office/drawing/2014/main" id="{1598CBC7-98F7-E78A-F0EE-C4F2030DAB4F}"/>
+              </a:ext>
+            </a:extLst>
+          </p:cNvPr>
+          <p:cNvCxnSpPr>
+            <a:cxnSpLocks/>
+            <a:endCxn id="77" idx="1"/>
+          </p:cNvCxnSpPr>
+          <p:nvPr/>
+        </p:nvCxnSpPr>
+        <p:spPr>
+          <a:xfrm>
+            <a:off x="8291536" y="3647386"/>
+            <a:ext cx="578385" cy="0"/>
+          </a:xfrm>
+          <a:prstGeom prst="line">
+            <a:avLst/>
+          </a:prstGeom>
+          <a:ln>
+            <a:solidFill>
+              <a:schemeClr val="accent6">
+                <a:lumMod val="75000"/>
+              </a:schemeClr>
+            </a:solidFill>
+          </a:ln>
+        </p:spPr>
+        <p:style>
+          <a:lnRef idx="2">
+            <a:schemeClr val="accent1"/>
+          </a:lnRef>
+          <a:fillRef idx="0">
+            <a:schemeClr val="accent1"/>
+          </a:fillRef>
+          <a:effectRef idx="1">
+            <a:schemeClr val="accent1"/>
+          </a:effectRef>
+          <a:fontRef idx="minor">
+            <a:schemeClr val="tx1"/>
+          </a:fontRef>
+        </p:style>
+      </p:cxnSp>
+      <p:sp>
+        <p:nvSpPr>
+          <p:cNvPr id="83" name="TextBox 82">
+            <a:extLst>
+              <a:ext uri="{FF2B5EF4-FFF2-40B4-BE49-F238E27FC236}">
+                <a16:creationId xmlns:a16="http://schemas.microsoft.com/office/drawing/2014/main" id="{86662420-EAFB-6FC0-91B6-AB9E2145D723}"/>
+              </a:ext>
+            </a:extLst>
+          </p:cNvPr>
+          <p:cNvSpPr txBox="1"/>
+          <p:nvPr/>
+        </p:nvSpPr>
+        <p:spPr>
+          <a:xfrm>
+            <a:off x="7429022" y="835416"/>
+            <a:ext cx="1967446" cy="307777"/>
+          </a:xfrm>
+          <a:prstGeom prst="rect">
+            <a:avLst/>
+          </a:prstGeom>
+          <a:noFill/>
+        </p:spPr>
+        <p:txBody>
+          <a:bodyPr wrap="square" rtlCol="0">
+            <a:spAutoFit/>
+          </a:bodyPr>
+          <a:lstStyle/>
+          <a:p>
+            <a:r>
+              <a:rPr lang="en-US" sz="1400" b="1" dirty="0"/>
+              <a:t>Station Control HMI</a:t>
+            </a:r>
+            <a:endParaRPr lang="en-SG" sz="1400" b="1" dirty="0"/>
+          </a:p>
+        </p:txBody>
+      </p:sp>
+      <p:sp>
+        <p:nvSpPr>
+          <p:cNvPr id="84" name="TextBox 83">
+            <a:extLst>
+              <a:ext uri="{FF2B5EF4-FFF2-40B4-BE49-F238E27FC236}">
+                <a16:creationId xmlns:a16="http://schemas.microsoft.com/office/drawing/2014/main" id="{3C107DDA-CA1F-5C06-576F-E33CC6EAE07D}"/>
+              </a:ext>
+            </a:extLst>
+          </p:cNvPr>
+          <p:cNvSpPr txBox="1"/>
+          <p:nvPr/>
+        </p:nvSpPr>
+        <p:spPr>
+          <a:xfrm>
+            <a:off x="8805700" y="2611220"/>
+            <a:ext cx="2755808" cy="307777"/>
+          </a:xfrm>
+          <a:prstGeom prst="rect">
+            <a:avLst/>
+          </a:prstGeom>
+          <a:noFill/>
+        </p:spPr>
+        <p:txBody>
+          <a:bodyPr wrap="square" rtlCol="0">
+            <a:spAutoFit/>
+          </a:bodyPr>
+          <a:lstStyle/>
+          <a:p>
+            <a:r>
+              <a:rPr lang="en-US" sz="1400" b="1" dirty="0"/>
+              <a:t>PLC State Monitoring Console </a:t>
+            </a:r>
+            <a:endParaRPr lang="en-SG" sz="1400" b="1" dirty="0"/>
+          </a:p>
+        </p:txBody>
+      </p:sp>
+      <p:pic>
+        <p:nvPicPr>
+          <p:cNvPr id="88" name="Picture 87" descr="A logo of a train&#10;&#10;AI-generated content may be incorrect.">
+            <a:extLst>
+              <a:ext uri="{FF2B5EF4-FFF2-40B4-BE49-F238E27FC236}">
+                <a16:creationId xmlns:a16="http://schemas.microsoft.com/office/drawing/2014/main" id="{1AB9DAB5-A811-7497-313C-A8C55B2CD2A5}"/>
+              </a:ext>
+            </a:extLst>
+          </p:cNvPr>
+          <p:cNvPicPr>
+            <a:picLocks noChangeAspect="1"/>
+          </p:cNvPicPr>
+          <p:nvPr/>
+        </p:nvPicPr>
+        <p:blipFill>
+          <a:blip r:embed="rId14">
+            <a:extLst>
+              <a:ext uri="{28A0092B-C50C-407E-A947-70E740481C1C}">
+                <a14:useLocalDpi xmlns:a14="http://schemas.microsoft.com/office/drawing/2010/main" val="0"/>
+              </a:ext>
+            </a:extLst>
+          </a:blip>
+          <a:stretch>
+            <a:fillRect/>
+          </a:stretch>
+        </p:blipFill>
+        <p:spPr>
+          <a:xfrm>
+            <a:off x="10081502" y="4893969"/>
+            <a:ext cx="1481433" cy="1522508"/>
+          </a:xfrm>
+          <a:prstGeom prst="roundRect">
+            <a:avLst>
+              <a:gd name="adj" fmla="val 4167"/>
+            </a:avLst>
+          </a:prstGeom>
+          <a:solidFill>
+            <a:srgbClr val="FFFFFF"/>
+          </a:solidFill>
+          <a:ln w="76200" cap="sq">
+            <a:solidFill>
+              <a:srgbClr val="292929"/>
+            </a:solidFill>
+            <a:miter lim="800000"/>
+          </a:ln>
+          <a:effectLst>
+            <a:reflection blurRad="12700" stA="28000" endPos="28000" dist="5000" dir="5400000" sy="-100000" algn="bl" rotWithShape="0"/>
+          </a:effectLst>
+          <a:scene3d>
+            <a:camera prst="orthographicFront"/>
+            <a:lightRig rig="threePt" dir="t">
+              <a:rot lat="0" lon="0" rev="2700000"/>
+            </a:lightRig>
+          </a:scene3d>
+          <a:sp3d>
+            <a:bevelT h="38100"/>
+            <a:contourClr>
+              <a:srgbClr val="C0C0C0"/>
+            </a:contourClr>
+          </a:sp3d>
+        </p:spPr>
+      </p:pic>
+      <p:sp>
+        <p:nvSpPr>
+          <p:cNvPr id="90" name="TextBox 89">
+            <a:extLst>
+              <a:ext uri="{FF2B5EF4-FFF2-40B4-BE49-F238E27FC236}">
+                <a16:creationId xmlns:a16="http://schemas.microsoft.com/office/drawing/2014/main" id="{9E7E7D82-D598-096C-9CC2-4E7F3BE4A052}"/>
+              </a:ext>
+            </a:extLst>
+          </p:cNvPr>
+          <p:cNvSpPr txBox="1"/>
+          <p:nvPr/>
+        </p:nvSpPr>
+        <p:spPr>
+          <a:xfrm>
+            <a:off x="552893" y="386721"/>
+            <a:ext cx="11085771" cy="369332"/>
+          </a:xfrm>
+          <a:prstGeom prst="rect">
+            <a:avLst/>
+          </a:prstGeom>
+          <a:noFill/>
+          <a:ln w="19050">
+            <a:solidFill>
+              <a:schemeClr val="tx1"/>
+            </a:solidFill>
+            <a:prstDash val="sysDash"/>
+          </a:ln>
+        </p:spPr>
+        <p:txBody>
+          <a:bodyPr wrap="square" rtlCol="0">
+            <a:spAutoFit/>
+          </a:bodyPr>
+          <a:lstStyle/>
+          <a:p>
+            <a:r>
+              <a:rPr lang="en-US" b="1" dirty="0"/>
+              <a:t>Simulating Simple Railway Station Train Dock and depart Auto-Control System with IEC104 PLC Simulator</a:t>
+            </a:r>
+            <a:endParaRPr lang="en-SG" b="1" dirty="0"/>
+          </a:p>
+        </p:txBody>
+      </p:sp>
     </p:spTree>
     <p:extLst>
       <p:ext uri="{BB962C8B-B14F-4D97-AF65-F5344CB8AC3E}">
-        <p14:creationId xmlns:p14="http://schemas.microsoft.com/office/powerpoint/2010/main" val="2293313693"/>
+        <p14:creationId xmlns:p14="http://schemas.microsoft.com/office/powerpoint/2010/main" val="1079758157"/>
       </p:ext>
     </p:extLst>
   </p:cSld>
@@ -5722,6 +7374,887 @@
           <a:chExt cx="0" cy="0"/>
         </a:xfrm>
       </p:grpSpPr>
+      <p:pic>
+        <p:nvPicPr>
+          <p:cNvPr id="5" name="Picture 4">
+            <a:extLst>
+              <a:ext uri="{FF2B5EF4-FFF2-40B4-BE49-F238E27FC236}">
+                <a16:creationId xmlns:a16="http://schemas.microsoft.com/office/drawing/2014/main" id="{FE5B9EAD-E40F-8FB2-37E1-0643057BAD55}"/>
+              </a:ext>
+            </a:extLst>
+          </p:cNvPr>
+          <p:cNvPicPr>
+            <a:picLocks noChangeAspect="1"/>
+          </p:cNvPicPr>
+          <p:nvPr/>
+        </p:nvPicPr>
+        <p:blipFill>
+          <a:blip r:embed="rId2">
+            <a:alphaModFix amt="50000"/>
+          </a:blip>
+          <a:stretch>
+            <a:fillRect/>
+          </a:stretch>
+        </p:blipFill>
+        <p:spPr>
+          <a:xfrm>
+            <a:off x="1239792" y="1790933"/>
+            <a:ext cx="9438095" cy="3733333"/>
+          </a:xfrm>
+          <a:prstGeom prst="rect">
+            <a:avLst/>
+          </a:prstGeom>
+        </p:spPr>
+      </p:pic>
+      <p:pic>
+        <p:nvPicPr>
+          <p:cNvPr id="6" name="Picture 5" descr="TM221CE16R Schneider Electric Modicon M221 PLC CPU Mini USB Interface –  Ralakde Automation">
+            <a:extLst>
+              <a:ext uri="{FF2B5EF4-FFF2-40B4-BE49-F238E27FC236}">
+                <a16:creationId xmlns:a16="http://schemas.microsoft.com/office/drawing/2014/main" id="{A1262E27-82A7-2046-B86D-4EE144249EB4}"/>
+              </a:ext>
+            </a:extLst>
+          </p:cNvPr>
+          <p:cNvPicPr>
+            <a:picLocks noChangeAspect="1" noChangeArrowheads="1"/>
+          </p:cNvPicPr>
+          <p:nvPr/>
+        </p:nvPicPr>
+        <p:blipFill>
+          <a:blip r:embed="rId3">
+            <a:extLst>
+              <a:ext uri="{28A0092B-C50C-407E-A947-70E740481C1C}">
+                <a14:useLocalDpi xmlns:a14="http://schemas.microsoft.com/office/drawing/2010/main" val="0"/>
+              </a:ext>
+            </a:extLst>
+          </a:blip>
+          <a:srcRect/>
+          <a:stretch>
+            <a:fillRect/>
+          </a:stretch>
+        </p:blipFill>
+        <p:spPr bwMode="auto">
+          <a:xfrm>
+            <a:off x="4277770" y="1202731"/>
+            <a:ext cx="541118" cy="593226"/>
+          </a:xfrm>
+          <a:prstGeom prst="rect">
+            <a:avLst/>
+          </a:prstGeom>
+          <a:noFill/>
+          <a:extLst>
+            <a:ext uri="{909E8E84-426E-40DD-AFC4-6F175D3DCCD1}">
+              <a14:hiddenFill xmlns:a14="http://schemas.microsoft.com/office/drawing/2010/main">
+                <a:solidFill>
+                  <a:srgbClr val="FFFFFF"/>
+                </a:solidFill>
+              </a14:hiddenFill>
+            </a:ext>
+          </a:extLst>
+        </p:spPr>
+      </p:pic>
+      <p:cxnSp>
+        <p:nvCxnSpPr>
+          <p:cNvPr id="8" name="Connector: Elbow 7">
+            <a:extLst>
+              <a:ext uri="{FF2B5EF4-FFF2-40B4-BE49-F238E27FC236}">
+                <a16:creationId xmlns:a16="http://schemas.microsoft.com/office/drawing/2014/main" id="{AF3E99B8-8170-595F-EC05-7D98E273FEE5}"/>
+              </a:ext>
+            </a:extLst>
+          </p:cNvPr>
+          <p:cNvCxnSpPr>
+            <a:cxnSpLocks/>
+            <a:endCxn id="6" idx="2"/>
+          </p:cNvCxnSpPr>
+          <p:nvPr/>
+        </p:nvCxnSpPr>
+        <p:spPr>
+          <a:xfrm flipV="1">
+            <a:off x="3661492" y="1795957"/>
+            <a:ext cx="886837" cy="640532"/>
+          </a:xfrm>
+          <a:prstGeom prst="bentConnector2">
+            <a:avLst/>
+          </a:prstGeom>
+          <a:ln>
+            <a:solidFill>
+              <a:schemeClr val="accent6">
+                <a:lumMod val="75000"/>
+              </a:schemeClr>
+            </a:solidFill>
+          </a:ln>
+        </p:spPr>
+        <p:style>
+          <a:lnRef idx="2">
+            <a:schemeClr val="accent1"/>
+          </a:lnRef>
+          <a:fillRef idx="0">
+            <a:schemeClr val="accent1"/>
+          </a:fillRef>
+          <a:effectRef idx="1">
+            <a:schemeClr val="accent1"/>
+          </a:effectRef>
+          <a:fontRef idx="minor">
+            <a:schemeClr val="tx1"/>
+          </a:fontRef>
+        </p:style>
+      </p:cxnSp>
+      <p:cxnSp>
+        <p:nvCxnSpPr>
+          <p:cNvPr id="11" name="Connector: Elbow 10">
+            <a:extLst>
+              <a:ext uri="{FF2B5EF4-FFF2-40B4-BE49-F238E27FC236}">
+                <a16:creationId xmlns:a16="http://schemas.microsoft.com/office/drawing/2014/main" id="{4C090FD7-83A6-1D2A-A156-108E8AD6F74F}"/>
+              </a:ext>
+            </a:extLst>
+          </p:cNvPr>
+          <p:cNvCxnSpPr>
+            <a:cxnSpLocks/>
+          </p:cNvCxnSpPr>
+          <p:nvPr/>
+        </p:nvCxnSpPr>
+        <p:spPr>
+          <a:xfrm rot="10800000">
+            <a:off x="6812992" y="2396806"/>
+            <a:ext cx="1974392" cy="784748"/>
+          </a:xfrm>
+          <a:prstGeom prst="bentConnector3">
+            <a:avLst>
+              <a:gd name="adj1" fmla="val -18"/>
+            </a:avLst>
+          </a:prstGeom>
+          <a:ln>
+            <a:solidFill>
+              <a:schemeClr val="accent6">
+                <a:lumMod val="75000"/>
+              </a:schemeClr>
+            </a:solidFill>
+          </a:ln>
+        </p:spPr>
+        <p:style>
+          <a:lnRef idx="2">
+            <a:schemeClr val="accent1"/>
+          </a:lnRef>
+          <a:fillRef idx="0">
+            <a:schemeClr val="accent1"/>
+          </a:fillRef>
+          <a:effectRef idx="1">
+            <a:schemeClr val="accent1"/>
+          </a:effectRef>
+          <a:fontRef idx="minor">
+            <a:schemeClr val="tx1"/>
+          </a:fontRef>
+        </p:style>
+      </p:cxnSp>
+      <p:cxnSp>
+        <p:nvCxnSpPr>
+          <p:cNvPr id="16" name="Connector: Elbow 15">
+            <a:extLst>
+              <a:ext uri="{FF2B5EF4-FFF2-40B4-BE49-F238E27FC236}">
+                <a16:creationId xmlns:a16="http://schemas.microsoft.com/office/drawing/2014/main" id="{9D15E74D-94FD-6DB4-4305-E49D6948E764}"/>
+              </a:ext>
+            </a:extLst>
+          </p:cNvPr>
+          <p:cNvCxnSpPr>
+            <a:cxnSpLocks/>
+            <a:stCxn id="6" idx="3"/>
+          </p:cNvCxnSpPr>
+          <p:nvPr/>
+        </p:nvCxnSpPr>
+        <p:spPr>
+          <a:xfrm>
+            <a:off x="4818888" y="1499344"/>
+            <a:ext cx="3915900" cy="378684"/>
+          </a:xfrm>
+          <a:prstGeom prst="bentConnector3">
+            <a:avLst>
+              <a:gd name="adj1" fmla="val 99738"/>
+            </a:avLst>
+          </a:prstGeom>
+          <a:ln>
+            <a:solidFill>
+              <a:srgbClr val="C00000"/>
+            </a:solidFill>
+          </a:ln>
+        </p:spPr>
+        <p:style>
+          <a:lnRef idx="2">
+            <a:schemeClr val="accent1"/>
+          </a:lnRef>
+          <a:fillRef idx="0">
+            <a:schemeClr val="accent1"/>
+          </a:fillRef>
+          <a:effectRef idx="1">
+            <a:schemeClr val="accent1"/>
+          </a:effectRef>
+          <a:fontRef idx="minor">
+            <a:schemeClr val="tx1"/>
+          </a:fontRef>
+        </p:style>
+      </p:cxnSp>
+      <p:cxnSp>
+        <p:nvCxnSpPr>
+          <p:cNvPr id="18" name="Connector: Elbow 17">
+            <a:extLst>
+              <a:ext uri="{FF2B5EF4-FFF2-40B4-BE49-F238E27FC236}">
+                <a16:creationId xmlns:a16="http://schemas.microsoft.com/office/drawing/2014/main" id="{443411A4-6C24-CE15-288A-37AA63F846FB}"/>
+              </a:ext>
+            </a:extLst>
+          </p:cNvPr>
+          <p:cNvCxnSpPr>
+            <a:cxnSpLocks/>
+            <a:stCxn id="6" idx="1"/>
+          </p:cNvCxnSpPr>
+          <p:nvPr/>
+        </p:nvCxnSpPr>
+        <p:spPr>
+          <a:xfrm rot="10800000" flipV="1">
+            <a:off x="2304972" y="1499344"/>
+            <a:ext cx="1972799" cy="403670"/>
+          </a:xfrm>
+          <a:prstGeom prst="bentConnector3">
+            <a:avLst>
+              <a:gd name="adj1" fmla="val 99131"/>
+            </a:avLst>
+          </a:prstGeom>
+          <a:ln>
+            <a:solidFill>
+              <a:srgbClr val="C00000"/>
+            </a:solidFill>
+          </a:ln>
+        </p:spPr>
+        <p:style>
+          <a:lnRef idx="2">
+            <a:schemeClr val="accent1"/>
+          </a:lnRef>
+          <a:fillRef idx="0">
+            <a:schemeClr val="accent1"/>
+          </a:fillRef>
+          <a:effectRef idx="1">
+            <a:schemeClr val="accent1"/>
+          </a:effectRef>
+          <a:fontRef idx="minor">
+            <a:schemeClr val="tx1"/>
+          </a:fontRef>
+        </p:style>
+      </p:cxnSp>
+      <p:pic>
+        <p:nvPicPr>
+          <p:cNvPr id="27" name="Picture 26" descr="TM221CE16R Schneider Electric Modicon M221 PLC CPU Mini USB Interface –  Ralakde Automation">
+            <a:extLst>
+              <a:ext uri="{FF2B5EF4-FFF2-40B4-BE49-F238E27FC236}">
+                <a16:creationId xmlns:a16="http://schemas.microsoft.com/office/drawing/2014/main" id="{A1A9A7EE-B4C7-250B-71C9-F8F4124DC28E}"/>
+              </a:ext>
+            </a:extLst>
+          </p:cNvPr>
+          <p:cNvPicPr>
+            <a:picLocks noChangeAspect="1" noChangeArrowheads="1"/>
+          </p:cNvPicPr>
+          <p:nvPr/>
+        </p:nvPicPr>
+        <p:blipFill>
+          <a:blip r:embed="rId3">
+            <a:extLst>
+              <a:ext uri="{28A0092B-C50C-407E-A947-70E740481C1C}">
+                <a14:useLocalDpi xmlns:a14="http://schemas.microsoft.com/office/drawing/2010/main" val="0"/>
+              </a:ext>
+            </a:extLst>
+          </a:blip>
+          <a:srcRect/>
+          <a:stretch>
+            <a:fillRect/>
+          </a:stretch>
+        </p:blipFill>
+        <p:spPr bwMode="auto">
+          <a:xfrm>
+            <a:off x="8516825" y="3181554"/>
+            <a:ext cx="541118" cy="593226"/>
+          </a:xfrm>
+          <a:prstGeom prst="rect">
+            <a:avLst/>
+          </a:prstGeom>
+          <a:noFill/>
+          <a:extLst>
+            <a:ext uri="{909E8E84-426E-40DD-AFC4-6F175D3DCCD1}">
+              <a14:hiddenFill xmlns:a14="http://schemas.microsoft.com/office/drawing/2010/main">
+                <a:solidFill>
+                  <a:srgbClr val="FFFFFF"/>
+                </a:solidFill>
+              </a14:hiddenFill>
+            </a:ext>
+          </a:extLst>
+        </p:spPr>
+      </p:pic>
+      <p:cxnSp>
+        <p:nvCxnSpPr>
+          <p:cNvPr id="28" name="Connector: Elbow 27">
+            <a:extLst>
+              <a:ext uri="{FF2B5EF4-FFF2-40B4-BE49-F238E27FC236}">
+                <a16:creationId xmlns:a16="http://schemas.microsoft.com/office/drawing/2014/main" id="{B143E3D0-9CF7-79E5-493D-7722E2C39E40}"/>
+              </a:ext>
+            </a:extLst>
+          </p:cNvPr>
+          <p:cNvCxnSpPr>
+            <a:cxnSpLocks/>
+          </p:cNvCxnSpPr>
+          <p:nvPr/>
+        </p:nvCxnSpPr>
+        <p:spPr>
+          <a:xfrm rot="10800000">
+            <a:off x="7196329" y="2773491"/>
+            <a:ext cx="1320497" cy="633736"/>
+          </a:xfrm>
+          <a:prstGeom prst="bentConnector3">
+            <a:avLst>
+              <a:gd name="adj1" fmla="val 100550"/>
+            </a:avLst>
+          </a:prstGeom>
+          <a:ln>
+            <a:solidFill>
+              <a:srgbClr val="C00000"/>
+            </a:solidFill>
+          </a:ln>
+        </p:spPr>
+        <p:style>
+          <a:lnRef idx="2">
+            <a:schemeClr val="accent1"/>
+          </a:lnRef>
+          <a:fillRef idx="0">
+            <a:schemeClr val="accent1"/>
+          </a:fillRef>
+          <a:effectRef idx="1">
+            <a:schemeClr val="accent1"/>
+          </a:effectRef>
+          <a:fontRef idx="minor">
+            <a:schemeClr val="tx1"/>
+          </a:fontRef>
+        </p:style>
+      </p:cxnSp>
+      <p:cxnSp>
+        <p:nvCxnSpPr>
+          <p:cNvPr id="35" name="Connector: Elbow 34">
+            <a:extLst>
+              <a:ext uri="{FF2B5EF4-FFF2-40B4-BE49-F238E27FC236}">
+                <a16:creationId xmlns:a16="http://schemas.microsoft.com/office/drawing/2014/main" id="{B6D6E6CE-A37B-5E25-B627-A48B38539CDF}"/>
+              </a:ext>
+            </a:extLst>
+          </p:cNvPr>
+          <p:cNvCxnSpPr>
+            <a:cxnSpLocks/>
+          </p:cNvCxnSpPr>
+          <p:nvPr/>
+        </p:nvCxnSpPr>
+        <p:spPr>
+          <a:xfrm rot="10800000" flipV="1">
+            <a:off x="7114034" y="3632406"/>
+            <a:ext cx="1402790" cy="775000"/>
+          </a:xfrm>
+          <a:prstGeom prst="bentConnector3">
+            <a:avLst>
+              <a:gd name="adj1" fmla="val 99540"/>
+            </a:avLst>
+          </a:prstGeom>
+          <a:ln>
+            <a:solidFill>
+              <a:srgbClr val="C00000"/>
+            </a:solidFill>
+          </a:ln>
+        </p:spPr>
+        <p:style>
+          <a:lnRef idx="2">
+            <a:schemeClr val="accent1"/>
+          </a:lnRef>
+          <a:fillRef idx="0">
+            <a:schemeClr val="accent1"/>
+          </a:fillRef>
+          <a:effectRef idx="1">
+            <a:schemeClr val="accent1"/>
+          </a:effectRef>
+          <a:fontRef idx="minor">
+            <a:schemeClr val="tx1"/>
+          </a:fontRef>
+        </p:style>
+      </p:cxnSp>
+      <p:cxnSp>
+        <p:nvCxnSpPr>
+          <p:cNvPr id="39" name="Connector: Elbow 38">
+            <a:extLst>
+              <a:ext uri="{FF2B5EF4-FFF2-40B4-BE49-F238E27FC236}">
+                <a16:creationId xmlns:a16="http://schemas.microsoft.com/office/drawing/2014/main" id="{12F22D0D-F842-E71E-9256-21714C19A98C}"/>
+              </a:ext>
+            </a:extLst>
+          </p:cNvPr>
+          <p:cNvCxnSpPr>
+            <a:cxnSpLocks/>
+            <a:endCxn id="27" idx="3"/>
+          </p:cNvCxnSpPr>
+          <p:nvPr/>
+        </p:nvCxnSpPr>
+        <p:spPr>
+          <a:xfrm rot="16200000" flipH="1">
+            <a:off x="8212894" y="2633118"/>
+            <a:ext cx="1481666" cy="208432"/>
+          </a:xfrm>
+          <a:prstGeom prst="bentConnector4">
+            <a:avLst>
+              <a:gd name="adj1" fmla="val -123"/>
+              <a:gd name="adj2" fmla="val 209676"/>
+            </a:avLst>
+          </a:prstGeom>
+          <a:ln>
+            <a:solidFill>
+              <a:srgbClr val="C00000"/>
+            </a:solidFill>
+          </a:ln>
+        </p:spPr>
+        <p:style>
+          <a:lnRef idx="2">
+            <a:schemeClr val="accent1"/>
+          </a:lnRef>
+          <a:fillRef idx="0">
+            <a:schemeClr val="accent1"/>
+          </a:fillRef>
+          <a:effectRef idx="1">
+            <a:schemeClr val="accent1"/>
+          </a:effectRef>
+          <a:fontRef idx="minor">
+            <a:schemeClr val="tx1"/>
+          </a:fontRef>
+        </p:style>
+      </p:cxnSp>
+      <p:pic>
+        <p:nvPicPr>
+          <p:cNvPr id="45" name="Picture 44" descr="TM221CE16R Schneider Electric Modicon M221 PLC CPU Mini USB Interface –  Ralakde Automation">
+            <a:extLst>
+              <a:ext uri="{FF2B5EF4-FFF2-40B4-BE49-F238E27FC236}">
+                <a16:creationId xmlns:a16="http://schemas.microsoft.com/office/drawing/2014/main" id="{CC7BD3C5-BF9E-E679-D0A3-E151C841577B}"/>
+              </a:ext>
+            </a:extLst>
+          </p:cNvPr>
+          <p:cNvPicPr>
+            <a:picLocks noChangeAspect="1" noChangeArrowheads="1"/>
+          </p:cNvPicPr>
+          <p:nvPr/>
+        </p:nvPicPr>
+        <p:blipFill>
+          <a:blip r:embed="rId3">
+            <a:extLst>
+              <a:ext uri="{28A0092B-C50C-407E-A947-70E740481C1C}">
+                <a14:useLocalDpi xmlns:a14="http://schemas.microsoft.com/office/drawing/2010/main" val="0"/>
+              </a:ext>
+            </a:extLst>
+          </a:blip>
+          <a:srcRect/>
+          <a:stretch>
+            <a:fillRect/>
+          </a:stretch>
+        </p:blipFill>
+        <p:spPr bwMode="auto">
+          <a:xfrm>
+            <a:off x="1906397" y="3687270"/>
+            <a:ext cx="541118" cy="593226"/>
+          </a:xfrm>
+          <a:prstGeom prst="rect">
+            <a:avLst/>
+          </a:prstGeom>
+          <a:noFill/>
+          <a:extLst>
+            <a:ext uri="{909E8E84-426E-40DD-AFC4-6F175D3DCCD1}">
+              <a14:hiddenFill xmlns:a14="http://schemas.microsoft.com/office/drawing/2010/main">
+                <a:solidFill>
+                  <a:srgbClr val="FFFFFF"/>
+                </a:solidFill>
+              </a14:hiddenFill>
+            </a:ext>
+          </a:extLst>
+        </p:spPr>
+      </p:pic>
+      <p:cxnSp>
+        <p:nvCxnSpPr>
+          <p:cNvPr id="46" name="Connector: Elbow 45">
+            <a:extLst>
+              <a:ext uri="{FF2B5EF4-FFF2-40B4-BE49-F238E27FC236}">
+                <a16:creationId xmlns:a16="http://schemas.microsoft.com/office/drawing/2014/main" id="{485F5F6B-8AFC-951D-3017-E439F49161CE}"/>
+              </a:ext>
+            </a:extLst>
+          </p:cNvPr>
+          <p:cNvCxnSpPr>
+            <a:cxnSpLocks/>
+            <a:endCxn id="45" idx="3"/>
+          </p:cNvCxnSpPr>
+          <p:nvPr/>
+        </p:nvCxnSpPr>
+        <p:spPr>
+          <a:xfrm rot="10800000" flipV="1">
+            <a:off x="2447516" y="2926015"/>
+            <a:ext cx="1228373" cy="1057867"/>
+          </a:xfrm>
+          <a:prstGeom prst="bentConnector3">
+            <a:avLst>
+              <a:gd name="adj1" fmla="val 125"/>
+            </a:avLst>
+          </a:prstGeom>
+          <a:ln>
+            <a:solidFill>
+              <a:schemeClr val="accent6">
+                <a:lumMod val="75000"/>
+              </a:schemeClr>
+            </a:solidFill>
+          </a:ln>
+        </p:spPr>
+        <p:style>
+          <a:lnRef idx="2">
+            <a:schemeClr val="accent1"/>
+          </a:lnRef>
+          <a:fillRef idx="0">
+            <a:schemeClr val="accent1"/>
+          </a:fillRef>
+          <a:effectRef idx="1">
+            <a:schemeClr val="accent1"/>
+          </a:effectRef>
+          <a:fontRef idx="minor">
+            <a:schemeClr val="tx1"/>
+          </a:fontRef>
+        </p:style>
+      </p:cxnSp>
+      <p:cxnSp>
+        <p:nvCxnSpPr>
+          <p:cNvPr id="49" name="Connector: Elbow 48">
+            <a:extLst>
+              <a:ext uri="{FF2B5EF4-FFF2-40B4-BE49-F238E27FC236}">
+                <a16:creationId xmlns:a16="http://schemas.microsoft.com/office/drawing/2014/main" id="{98C2932B-862B-AE21-E3F1-8D9D19F28311}"/>
+              </a:ext>
+            </a:extLst>
+          </p:cNvPr>
+          <p:cNvCxnSpPr>
+            <a:cxnSpLocks/>
+          </p:cNvCxnSpPr>
+          <p:nvPr/>
+        </p:nvCxnSpPr>
+        <p:spPr>
+          <a:xfrm rot="5400000" flipH="1" flipV="1">
+            <a:off x="2320794" y="2900214"/>
+            <a:ext cx="1001290" cy="747844"/>
+          </a:xfrm>
+          <a:prstGeom prst="bentConnector3">
+            <a:avLst>
+              <a:gd name="adj1" fmla="val 1599"/>
+            </a:avLst>
+          </a:prstGeom>
+          <a:ln>
+            <a:solidFill>
+              <a:srgbClr val="C00000"/>
+            </a:solidFill>
+          </a:ln>
+        </p:spPr>
+        <p:style>
+          <a:lnRef idx="2">
+            <a:schemeClr val="accent1"/>
+          </a:lnRef>
+          <a:fillRef idx="0">
+            <a:schemeClr val="accent1"/>
+          </a:fillRef>
+          <a:effectRef idx="1">
+            <a:schemeClr val="accent1"/>
+          </a:effectRef>
+          <a:fontRef idx="minor">
+            <a:schemeClr val="tx1"/>
+          </a:fontRef>
+        </p:style>
+      </p:cxnSp>
+      <p:cxnSp>
+        <p:nvCxnSpPr>
+          <p:cNvPr id="56" name="Straight Connector 55">
+            <a:extLst>
+              <a:ext uri="{FF2B5EF4-FFF2-40B4-BE49-F238E27FC236}">
+                <a16:creationId xmlns:a16="http://schemas.microsoft.com/office/drawing/2014/main" id="{9C1BC191-8679-9556-A8D0-606E91BCAB7D}"/>
+              </a:ext>
+            </a:extLst>
+          </p:cNvPr>
+          <p:cNvCxnSpPr>
+            <a:cxnSpLocks/>
+          </p:cNvCxnSpPr>
+          <p:nvPr/>
+        </p:nvCxnSpPr>
+        <p:spPr>
+          <a:xfrm>
+            <a:off x="2368980" y="4225630"/>
+            <a:ext cx="0" cy="840144"/>
+          </a:xfrm>
+          <a:prstGeom prst="line">
+            <a:avLst/>
+          </a:prstGeom>
+          <a:ln>
+            <a:solidFill>
+              <a:srgbClr val="C00000"/>
+            </a:solidFill>
+          </a:ln>
+        </p:spPr>
+        <p:style>
+          <a:lnRef idx="2">
+            <a:schemeClr val="accent1"/>
+          </a:lnRef>
+          <a:fillRef idx="0">
+            <a:schemeClr val="accent1"/>
+          </a:fillRef>
+          <a:effectRef idx="1">
+            <a:schemeClr val="accent1"/>
+          </a:effectRef>
+          <a:fontRef idx="minor">
+            <a:schemeClr val="tx1"/>
+          </a:fontRef>
+        </p:style>
+      </p:cxnSp>
+      <p:cxnSp>
+        <p:nvCxnSpPr>
+          <p:cNvPr id="59" name="Connector: Elbow 58">
+            <a:extLst>
+              <a:ext uri="{FF2B5EF4-FFF2-40B4-BE49-F238E27FC236}">
+                <a16:creationId xmlns:a16="http://schemas.microsoft.com/office/drawing/2014/main" id="{FD7DAD94-6CA3-90A3-CF79-9E590212BB52}"/>
+              </a:ext>
+            </a:extLst>
+          </p:cNvPr>
+          <p:cNvCxnSpPr>
+            <a:cxnSpLocks/>
+          </p:cNvCxnSpPr>
+          <p:nvPr/>
+        </p:nvCxnSpPr>
+        <p:spPr>
+          <a:xfrm>
+            <a:off x="2401454" y="4178187"/>
+            <a:ext cx="6115369" cy="1033893"/>
+          </a:xfrm>
+          <a:prstGeom prst="bentConnector3">
+            <a:avLst>
+              <a:gd name="adj1" fmla="val 50000"/>
+            </a:avLst>
+          </a:prstGeom>
+          <a:ln>
+            <a:solidFill>
+              <a:srgbClr val="C00000"/>
+            </a:solidFill>
+          </a:ln>
+        </p:spPr>
+        <p:style>
+          <a:lnRef idx="2">
+            <a:schemeClr val="accent1"/>
+          </a:lnRef>
+          <a:fillRef idx="0">
+            <a:schemeClr val="accent1"/>
+          </a:fillRef>
+          <a:effectRef idx="1">
+            <a:schemeClr val="accent1"/>
+          </a:effectRef>
+          <a:fontRef idx="minor">
+            <a:schemeClr val="tx1"/>
+          </a:fontRef>
+        </p:style>
+      </p:cxnSp>
+      <p:sp>
+        <p:nvSpPr>
+          <p:cNvPr id="63" name="TextBox 62">
+            <a:extLst>
+              <a:ext uri="{FF2B5EF4-FFF2-40B4-BE49-F238E27FC236}">
+                <a16:creationId xmlns:a16="http://schemas.microsoft.com/office/drawing/2014/main" id="{1B12D4FC-7282-10D8-6243-02D499FA600E}"/>
+              </a:ext>
+            </a:extLst>
+          </p:cNvPr>
+          <p:cNvSpPr txBox="1"/>
+          <p:nvPr/>
+        </p:nvSpPr>
+        <p:spPr>
+          <a:xfrm>
+            <a:off x="4738332" y="1197149"/>
+            <a:ext cx="720806" cy="307777"/>
+          </a:xfrm>
+          <a:prstGeom prst="rect">
+            <a:avLst/>
+          </a:prstGeom>
+          <a:noFill/>
+        </p:spPr>
+        <p:txBody>
+          <a:bodyPr wrap="square" rtlCol="0">
+            <a:spAutoFit/>
+          </a:bodyPr>
+          <a:lstStyle/>
+          <a:p>
+            <a:r>
+              <a:rPr lang="en-US" sz="1400" b="1" dirty="0">
+                <a:solidFill>
+                  <a:srgbClr val="C00000"/>
+                </a:solidFill>
+              </a:rPr>
+              <a:t>PLC2</a:t>
+            </a:r>
+            <a:endParaRPr lang="en-SG" sz="1400" b="1" dirty="0">
+              <a:solidFill>
+                <a:srgbClr val="C00000"/>
+              </a:solidFill>
+            </a:endParaRPr>
+          </a:p>
+        </p:txBody>
+      </p:sp>
+      <p:sp>
+        <p:nvSpPr>
+          <p:cNvPr id="64" name="TextBox 63">
+            <a:extLst>
+              <a:ext uri="{FF2B5EF4-FFF2-40B4-BE49-F238E27FC236}">
+                <a16:creationId xmlns:a16="http://schemas.microsoft.com/office/drawing/2014/main" id="{85F1A20D-6E69-4CCC-D612-5076FB3C48BD}"/>
+              </a:ext>
+            </a:extLst>
+          </p:cNvPr>
+          <p:cNvSpPr txBox="1"/>
+          <p:nvPr/>
+        </p:nvSpPr>
+        <p:spPr>
+          <a:xfrm>
+            <a:off x="8516146" y="3744255"/>
+            <a:ext cx="720806" cy="307777"/>
+          </a:xfrm>
+          <a:prstGeom prst="rect">
+            <a:avLst/>
+          </a:prstGeom>
+          <a:noFill/>
+        </p:spPr>
+        <p:txBody>
+          <a:bodyPr wrap="square" rtlCol="0">
+            <a:spAutoFit/>
+          </a:bodyPr>
+          <a:lstStyle/>
+          <a:p>
+            <a:r>
+              <a:rPr lang="en-US" sz="1400" b="1" dirty="0">
+                <a:solidFill>
+                  <a:srgbClr val="C00000"/>
+                </a:solidFill>
+              </a:rPr>
+              <a:t>PLC1</a:t>
+            </a:r>
+            <a:endParaRPr lang="en-SG" sz="1400" b="1" dirty="0">
+              <a:solidFill>
+                <a:srgbClr val="C00000"/>
+              </a:solidFill>
+            </a:endParaRPr>
+          </a:p>
+        </p:txBody>
+      </p:sp>
+      <p:sp>
+        <p:nvSpPr>
+          <p:cNvPr id="65" name="TextBox 64">
+            <a:extLst>
+              <a:ext uri="{FF2B5EF4-FFF2-40B4-BE49-F238E27FC236}">
+                <a16:creationId xmlns:a16="http://schemas.microsoft.com/office/drawing/2014/main" id="{D5BA2788-A086-74DF-3E15-D5460526231A}"/>
+              </a:ext>
+            </a:extLst>
+          </p:cNvPr>
+          <p:cNvSpPr txBox="1"/>
+          <p:nvPr/>
+        </p:nvSpPr>
+        <p:spPr>
+          <a:xfrm>
+            <a:off x="1635009" y="4225630"/>
+            <a:ext cx="612443" cy="307777"/>
+          </a:xfrm>
+          <a:prstGeom prst="rect">
+            <a:avLst/>
+          </a:prstGeom>
+          <a:noFill/>
+        </p:spPr>
+        <p:txBody>
+          <a:bodyPr wrap="square" rtlCol="0">
+            <a:spAutoFit/>
+          </a:bodyPr>
+          <a:lstStyle/>
+          <a:p>
+            <a:r>
+              <a:rPr lang="en-US" sz="1400" b="1" dirty="0">
+                <a:solidFill>
+                  <a:srgbClr val="C00000"/>
+                </a:solidFill>
+              </a:rPr>
+              <a:t>PLC0</a:t>
+            </a:r>
+            <a:endParaRPr lang="en-SG" sz="1400" b="1" dirty="0">
+              <a:solidFill>
+                <a:srgbClr val="C00000"/>
+              </a:solidFill>
+            </a:endParaRPr>
+          </a:p>
+        </p:txBody>
+      </p:sp>
+      <p:cxnSp>
+        <p:nvCxnSpPr>
+          <p:cNvPr id="71" name="Straight Connector 70">
+            <a:extLst>
+              <a:ext uri="{FF2B5EF4-FFF2-40B4-BE49-F238E27FC236}">
+                <a16:creationId xmlns:a16="http://schemas.microsoft.com/office/drawing/2014/main" id="{64A66C3E-65EF-714A-DE82-2D3C862DF12F}"/>
+              </a:ext>
+            </a:extLst>
+          </p:cNvPr>
+          <p:cNvCxnSpPr>
+            <a:cxnSpLocks/>
+          </p:cNvCxnSpPr>
+          <p:nvPr/>
+        </p:nvCxnSpPr>
+        <p:spPr>
+          <a:xfrm>
+            <a:off x="2211168" y="4196475"/>
+            <a:ext cx="0" cy="1033893"/>
+          </a:xfrm>
+          <a:prstGeom prst="line">
+            <a:avLst/>
+          </a:prstGeom>
+          <a:ln>
+            <a:solidFill>
+              <a:srgbClr val="C00000"/>
+            </a:solidFill>
+          </a:ln>
+        </p:spPr>
+        <p:style>
+          <a:lnRef idx="2">
+            <a:schemeClr val="accent1"/>
+          </a:lnRef>
+          <a:fillRef idx="0">
+            <a:schemeClr val="accent1"/>
+          </a:fillRef>
+          <a:effectRef idx="1">
+            <a:schemeClr val="accent1"/>
+          </a:effectRef>
+          <a:fontRef idx="minor">
+            <a:schemeClr val="tx1"/>
+          </a:fontRef>
+        </p:style>
+      </p:cxnSp>
+    </p:spTree>
+    <p:extLst>
+      <p:ext uri="{BB962C8B-B14F-4D97-AF65-F5344CB8AC3E}">
+        <p14:creationId xmlns:p14="http://schemas.microsoft.com/office/powerpoint/2010/main" val="2293313693"/>
+      </p:ext>
+    </p:extLst>
+  </p:cSld>
+  <p:clrMapOvr>
+    <a:masterClrMapping/>
+  </p:clrMapOvr>
+</p:sld>
+</file>
+
+<file path=ppt/slides/slide6.xml><?xml version="1.0" encoding="utf-8"?>
+<p:sld xmlns:a="http://schemas.openxmlformats.org/drawingml/2006/main" xmlns:r="http://schemas.openxmlformats.org/officeDocument/2006/relationships" xmlns:p="http://schemas.openxmlformats.org/presentationml/2006/main">
+  <p:cSld>
+    <p:spTree>
+      <p:nvGrpSpPr>
+        <p:cNvPr id="1" name=""/>
+        <p:cNvGrpSpPr/>
+        <p:nvPr/>
+      </p:nvGrpSpPr>
+      <p:grpSpPr>
+        <a:xfrm>
+          <a:off x="0" y="0"/>
+          <a:ext cx="0" cy="0"/>
+          <a:chOff x="0" y="0"/>
+          <a:chExt cx="0" cy="0"/>
+        </a:xfrm>
+      </p:grpSpPr>
       <p:cxnSp>
         <p:nvCxnSpPr>
           <p:cNvPr id="4" name="Straight Connector 3">
@@ -6973,7 +9506,7 @@
 </p:sld>
 </file>
 
-<file path=ppt/slides/slide6.xml><?xml version="1.0" encoding="utf-8"?>
+<file path=ppt/slides/slide7.xml><?xml version="1.0" encoding="utf-8"?>
 <p:sld xmlns:a="http://schemas.openxmlformats.org/drawingml/2006/main" xmlns:r="http://schemas.openxmlformats.org/officeDocument/2006/relationships" xmlns:p="http://schemas.openxmlformats.org/presentationml/2006/main">
   <p:cSld>
     <p:spTree>
@@ -8420,7 +10953,7 @@
 </p:sld>
 </file>
 
-<file path=ppt/slides/slide7.xml><?xml version="1.0" encoding="utf-8"?>
+<file path=ppt/slides/slide8.xml><?xml version="1.0" encoding="utf-8"?>
 <p:sld xmlns:a="http://schemas.openxmlformats.org/drawingml/2006/main" xmlns:r="http://schemas.openxmlformats.org/officeDocument/2006/relationships" xmlns:p="http://schemas.openxmlformats.org/presentationml/2006/main">
   <p:cSld>
     <p:spTree>
@@ -8912,13 +11445,8 @@
           <a:p>
             <a:r>
               <a:rPr lang="en-US" sz="1200" b="1" dirty="0"/>
-              <a:t>%M  </a:t>
-            </a:r>
-            <a:r>
-              <a:rPr lang="en-US" sz="1200" b="1"/>
-              <a:t>[000106]</a:t>
-            </a:r>
-            <a:endParaRPr lang="en-US" sz="1200" b="1" dirty="0"/>
+              <a:t>%M  [000106]</a:t>
+            </a:r>
           </a:p>
           <a:p>
             <a:r>
@@ -11043,4 +13571,319 @@
     </a:ext>
   </a:extLst>
 </a:theme>
+</file>
+
+<file path=ppt/theme/theme2.xml><?xml version="1.0" encoding="utf-8"?>
+<a:theme xmlns:a="http://schemas.openxmlformats.org/drawingml/2006/main" name="Office Theme">
+  <a:themeElements>
+    <a:clrScheme name="Office">
+      <a:dk1>
+        <a:sysClr val="windowText" lastClr="000000"/>
+      </a:dk1>
+      <a:lt1>
+        <a:sysClr val="window" lastClr="FFFFFF"/>
+      </a:lt1>
+      <a:dk2>
+        <a:srgbClr val="0E2841"/>
+      </a:dk2>
+      <a:lt2>
+        <a:srgbClr val="E8E8E8"/>
+      </a:lt2>
+      <a:accent1>
+        <a:srgbClr val="156082"/>
+      </a:accent1>
+      <a:accent2>
+        <a:srgbClr val="E97132"/>
+      </a:accent2>
+      <a:accent3>
+        <a:srgbClr val="196B24"/>
+      </a:accent3>
+      <a:accent4>
+        <a:srgbClr val="0F9ED5"/>
+      </a:accent4>
+      <a:accent5>
+        <a:srgbClr val="A02B93"/>
+      </a:accent5>
+      <a:accent6>
+        <a:srgbClr val="4EA72E"/>
+      </a:accent6>
+      <a:hlink>
+        <a:srgbClr val="467886"/>
+      </a:hlink>
+      <a:folHlink>
+        <a:srgbClr val="96607D"/>
+      </a:folHlink>
+    </a:clrScheme>
+    <a:fontScheme name="Office">
+      <a:majorFont>
+        <a:latin typeface="Aptos Display" panose="02110004020202020204"/>
+        <a:ea typeface=""/>
+        <a:cs typeface=""/>
+        <a:font script="Jpan" typeface="游ゴシック Light"/>
+        <a:font script="Hang" typeface="맑은 고딕"/>
+        <a:font script="Hans" typeface="等线 Light"/>
+        <a:font script="Hant" typeface="新細明體"/>
+        <a:font script="Arab" typeface="Times New Roman"/>
+        <a:font script="Hebr" typeface="Times New Roman"/>
+        <a:font script="Thai" typeface="Angsana New"/>
+        <a:font script="Ethi" typeface="Nyala"/>
+        <a:font script="Beng" typeface="Vrinda"/>
+        <a:font script="Gujr" typeface="Shruti"/>
+        <a:font script="Khmr" typeface="MoolBoran"/>
+        <a:font script="Knda" typeface="Tunga"/>
+        <a:font script="Guru" typeface="Raavi"/>
+        <a:font script="Cans" typeface="Euphemia"/>
+        <a:font script="Cher" typeface="Plantagenet Cherokee"/>
+        <a:font script="Yiii" typeface="Microsoft Yi Baiti"/>
+        <a:font script="Tibt" typeface="Microsoft Himalaya"/>
+        <a:font script="Thaa" typeface="MV Boli"/>
+        <a:font script="Deva" typeface="Mangal"/>
+        <a:font script="Telu" typeface="Gautami"/>
+        <a:font script="Taml" typeface="Latha"/>
+        <a:font script="Syrc" typeface="Estrangelo Edessa"/>
+        <a:font script="Orya" typeface="Kalinga"/>
+        <a:font script="Mlym" typeface="Kartika"/>
+        <a:font script="Laoo" typeface="DokChampa"/>
+        <a:font script="Sinh" typeface="Iskoola Pota"/>
+        <a:font script="Mong" typeface="Mongolian Baiti"/>
+        <a:font script="Viet" typeface="Times New Roman"/>
+        <a:font script="Uigh" typeface="Microsoft Uighur"/>
+        <a:font script="Geor" typeface="Sylfaen"/>
+        <a:font script="Armn" typeface="Arial"/>
+        <a:font script="Bugi" typeface="Leelawadee UI"/>
+        <a:font script="Bopo" typeface="Microsoft JhengHei"/>
+        <a:font script="Java" typeface="Javanese Text"/>
+        <a:font script="Lisu" typeface="Segoe UI"/>
+        <a:font script="Mymr" typeface="Myanmar Text"/>
+        <a:font script="Nkoo" typeface="Ebrima"/>
+        <a:font script="Olck" typeface="Nirmala UI"/>
+        <a:font script="Osma" typeface="Ebrima"/>
+        <a:font script="Phag" typeface="Phagspa"/>
+        <a:font script="Syrn" typeface="Estrangelo Edessa"/>
+        <a:font script="Syrj" typeface="Estrangelo Edessa"/>
+        <a:font script="Syre" typeface="Estrangelo Edessa"/>
+        <a:font script="Sora" typeface="Nirmala UI"/>
+        <a:font script="Tale" typeface="Microsoft Tai Le"/>
+        <a:font script="Talu" typeface="Microsoft New Tai Lue"/>
+        <a:font script="Tfng" typeface="Ebrima"/>
+      </a:majorFont>
+      <a:minorFont>
+        <a:latin typeface="Aptos" panose="02110004020202020204"/>
+        <a:ea typeface=""/>
+        <a:cs typeface=""/>
+        <a:font script="Jpan" typeface="游ゴシック"/>
+        <a:font script="Hang" typeface="맑은 고딕"/>
+        <a:font script="Hans" typeface="等线"/>
+        <a:font script="Hant" typeface="新細明體"/>
+        <a:font script="Arab" typeface="Arial"/>
+        <a:font script="Hebr" typeface="Arial"/>
+        <a:font script="Thai" typeface="Cordia New"/>
+        <a:font script="Ethi" typeface="Nyala"/>
+        <a:font script="Beng" typeface="Vrinda"/>
+        <a:font script="Gujr" typeface="Shruti"/>
+        <a:font script="Khmr" typeface="DaunPenh"/>
+        <a:font script="Knda" typeface="Tunga"/>
+        <a:font script="Guru" typeface="Raavi"/>
+        <a:font script="Cans" typeface="Euphemia"/>
+        <a:font script="Cher" typeface="Plantagenet Cherokee"/>
+        <a:font script="Yiii" typeface="Microsoft Yi Baiti"/>
+        <a:font script="Tibt" typeface="Microsoft Himalaya"/>
+        <a:font script="Thaa" typeface="MV Boli"/>
+        <a:font script="Deva" typeface="Mangal"/>
+        <a:font script="Telu" typeface="Gautami"/>
+        <a:font script="Taml" typeface="Latha"/>
+        <a:font script="Syrc" typeface="Estrangelo Edessa"/>
+        <a:font script="Orya" typeface="Kalinga"/>
+        <a:font script="Mlym" typeface="Kartika"/>
+        <a:font script="Laoo" typeface="DokChampa"/>
+        <a:font script="Sinh" typeface="Iskoola Pota"/>
+        <a:font script="Mong" typeface="Mongolian Baiti"/>
+        <a:font script="Viet" typeface="Arial"/>
+        <a:font script="Uigh" typeface="Microsoft Uighur"/>
+        <a:font script="Geor" typeface="Sylfaen"/>
+        <a:font script="Armn" typeface="Arial"/>
+        <a:font script="Bugi" typeface="Leelawadee UI"/>
+        <a:font script="Bopo" typeface="Microsoft JhengHei"/>
+        <a:font script="Java" typeface="Javanese Text"/>
+        <a:font script="Lisu" typeface="Segoe UI"/>
+        <a:font script="Mymr" typeface="Myanmar Text"/>
+        <a:font script="Nkoo" typeface="Ebrima"/>
+        <a:font script="Olck" typeface="Nirmala UI"/>
+        <a:font script="Osma" typeface="Ebrima"/>
+        <a:font script="Phag" typeface="Phagspa"/>
+        <a:font script="Syrn" typeface="Estrangelo Edessa"/>
+        <a:font script="Syrj" typeface="Estrangelo Edessa"/>
+        <a:font script="Syre" typeface="Estrangelo Edessa"/>
+        <a:font script="Sora" typeface="Nirmala UI"/>
+        <a:font script="Tale" typeface="Microsoft Tai Le"/>
+        <a:font script="Talu" typeface="Microsoft New Tai Lue"/>
+        <a:font script="Tfng" typeface="Ebrima"/>
+      </a:minorFont>
+    </a:fontScheme>
+    <a:fmtScheme name="Office">
+      <a:fillStyleLst>
+        <a:solidFill>
+          <a:schemeClr val="phClr"/>
+        </a:solidFill>
+        <a:gradFill rotWithShape="1">
+          <a:gsLst>
+            <a:gs pos="0">
+              <a:schemeClr val="phClr">
+                <a:lumMod val="110000"/>
+                <a:satMod val="105000"/>
+                <a:tint val="67000"/>
+              </a:schemeClr>
+            </a:gs>
+            <a:gs pos="50000">
+              <a:schemeClr val="phClr">
+                <a:lumMod val="105000"/>
+                <a:satMod val="103000"/>
+                <a:tint val="73000"/>
+              </a:schemeClr>
+            </a:gs>
+            <a:gs pos="100000">
+              <a:schemeClr val="phClr">
+                <a:lumMod val="105000"/>
+                <a:satMod val="109000"/>
+                <a:tint val="81000"/>
+              </a:schemeClr>
+            </a:gs>
+          </a:gsLst>
+          <a:lin ang="5400000" scaled="0"/>
+        </a:gradFill>
+        <a:gradFill rotWithShape="1">
+          <a:gsLst>
+            <a:gs pos="0">
+              <a:schemeClr val="phClr">
+                <a:satMod val="103000"/>
+                <a:lumMod val="102000"/>
+                <a:tint val="94000"/>
+              </a:schemeClr>
+            </a:gs>
+            <a:gs pos="50000">
+              <a:schemeClr val="phClr">
+                <a:satMod val="110000"/>
+                <a:lumMod val="100000"/>
+                <a:shade val="100000"/>
+              </a:schemeClr>
+            </a:gs>
+            <a:gs pos="100000">
+              <a:schemeClr val="phClr">
+                <a:lumMod val="99000"/>
+                <a:satMod val="120000"/>
+                <a:shade val="78000"/>
+              </a:schemeClr>
+            </a:gs>
+          </a:gsLst>
+          <a:lin ang="5400000" scaled="0"/>
+        </a:gradFill>
+      </a:fillStyleLst>
+      <a:lnStyleLst>
+        <a:ln w="12700" cap="flat" cmpd="sng" algn="ctr">
+          <a:solidFill>
+            <a:schemeClr val="phClr"/>
+          </a:solidFill>
+          <a:prstDash val="solid"/>
+          <a:miter lim="800000"/>
+        </a:ln>
+        <a:ln w="19050" cap="flat" cmpd="sng" algn="ctr">
+          <a:solidFill>
+            <a:schemeClr val="phClr"/>
+          </a:solidFill>
+          <a:prstDash val="solid"/>
+          <a:miter lim="800000"/>
+        </a:ln>
+        <a:ln w="25400" cap="flat" cmpd="sng" algn="ctr">
+          <a:solidFill>
+            <a:schemeClr val="phClr"/>
+          </a:solidFill>
+          <a:prstDash val="solid"/>
+          <a:miter lim="800000"/>
+        </a:ln>
+      </a:lnStyleLst>
+      <a:effectStyleLst>
+        <a:effectStyle>
+          <a:effectLst/>
+        </a:effectStyle>
+        <a:effectStyle>
+          <a:effectLst/>
+        </a:effectStyle>
+        <a:effectStyle>
+          <a:effectLst>
+            <a:outerShdw blurRad="57150" dist="19050" dir="5400000" algn="ctr" rotWithShape="0">
+              <a:srgbClr val="000000">
+                <a:alpha val="63000"/>
+              </a:srgbClr>
+            </a:outerShdw>
+          </a:effectLst>
+        </a:effectStyle>
+      </a:effectStyleLst>
+      <a:bgFillStyleLst>
+        <a:solidFill>
+          <a:schemeClr val="phClr"/>
+        </a:solidFill>
+        <a:solidFill>
+          <a:schemeClr val="phClr">
+            <a:tint val="95000"/>
+            <a:satMod val="170000"/>
+          </a:schemeClr>
+        </a:solidFill>
+        <a:gradFill rotWithShape="1">
+          <a:gsLst>
+            <a:gs pos="0">
+              <a:schemeClr val="phClr">
+                <a:tint val="93000"/>
+                <a:satMod val="150000"/>
+                <a:shade val="98000"/>
+                <a:lumMod val="102000"/>
+              </a:schemeClr>
+            </a:gs>
+            <a:gs pos="50000">
+              <a:schemeClr val="phClr">
+                <a:tint val="98000"/>
+                <a:satMod val="130000"/>
+                <a:shade val="90000"/>
+                <a:lumMod val="103000"/>
+              </a:schemeClr>
+            </a:gs>
+            <a:gs pos="100000">
+              <a:schemeClr val="phClr">
+                <a:shade val="63000"/>
+                <a:satMod val="120000"/>
+              </a:schemeClr>
+            </a:gs>
+          </a:gsLst>
+          <a:lin ang="5400000" scaled="0"/>
+        </a:gradFill>
+      </a:bgFillStyleLst>
+    </a:fmtScheme>
+  </a:themeElements>
+  <a:objectDefaults>
+    <a:lnDef>
+      <a:spPr/>
+      <a:bodyPr/>
+      <a:lstStyle/>
+      <a:style>
+        <a:lnRef idx="2">
+          <a:schemeClr val="accent1"/>
+        </a:lnRef>
+        <a:fillRef idx="0">
+          <a:schemeClr val="accent1"/>
+        </a:fillRef>
+        <a:effectRef idx="1">
+          <a:schemeClr val="accent1"/>
+        </a:effectRef>
+        <a:fontRef idx="minor">
+          <a:schemeClr val="tx1"/>
+        </a:fontRef>
+      </a:style>
+    </a:lnDef>
+  </a:objectDefaults>
+  <a:extraClrSchemeLst/>
+  <a:extLst>
+    <a:ext uri="{05A4C25C-085E-4340-85A3-A5531E510DB2}">
+      <thm15:themeFamily xmlns:thm15="http://schemas.microsoft.com/office/thememl/2012/main" name="Office Theme" id="{2E142A2C-CD16-42D6-873A-C26D2A0506FA}" vid="{1BDDFF52-6CD6-40A5-AB3C-68EB2F1E4D0A}"/>
+    </a:ext>
+  </a:extLst>
+</a:theme>
 </file>
</xml_diff>